<commit_message>
add stock investment check list, add android knowledge
[BeAInvestor]: add checklist, has some todo to finish. Aim is to construct my own checklist from some famous investors.
[BeAGeek]: add android knowledges on init, zygote, service manager, system server
</commit_message>
<xml_diff>
--- a/[BeAInvestor].pptx
+++ b/[BeAInvestor].pptx
@@ -5,11 +5,12 @@
     <p:sldMasterId id="2147483648" r:id="rId1"/>
   </p:sldMasterIdLst>
   <p:sldIdLst>
-    <p:sldId id="260" r:id="rId2"/>
-    <p:sldId id="257" r:id="rId3"/>
-    <p:sldId id="258" r:id="rId4"/>
-    <p:sldId id="259" r:id="rId5"/>
-    <p:sldId id="256" r:id="rId6"/>
+    <p:sldId id="261" r:id="rId2"/>
+    <p:sldId id="260" r:id="rId3"/>
+    <p:sldId id="257" r:id="rId4"/>
+    <p:sldId id="258" r:id="rId5"/>
+    <p:sldId id="259" r:id="rId6"/>
+    <p:sldId id="256" r:id="rId7"/>
   </p:sldIdLst>
   <p:sldSz cx="5715000" cy="9144000" type="screen16x10"/>
   <p:notesSz cx="6858000" cy="9144000"/>
@@ -292,7 +293,7 @@
           <a:p>
             <a:fld id="{E90ED720-0104-4369-84BC-D37694168613}" type="datetimeFigureOut">
               <a:rPr kumimoji="1" lang="ja-JP" altLang="en-US" smtClean="0"/>
-              <a:t>2018/7/4</a:t>
+              <a:t>2018/7/9</a:t>
             </a:fld>
             <a:endParaRPr kumimoji="1" lang="ja-JP" altLang="en-US"/>
           </a:p>
@@ -489,7 +490,7 @@
           <a:p>
             <a:fld id="{E90ED720-0104-4369-84BC-D37694168613}" type="datetimeFigureOut">
               <a:rPr kumimoji="1" lang="ja-JP" altLang="en-US" smtClean="0"/>
-              <a:t>2018/7/4</a:t>
+              <a:t>2018/7/9</a:t>
             </a:fld>
             <a:endParaRPr kumimoji="1" lang="ja-JP" altLang="en-US"/>
           </a:p>
@@ -696,7 +697,7 @@
           <a:p>
             <a:fld id="{E90ED720-0104-4369-84BC-D37694168613}" type="datetimeFigureOut">
               <a:rPr kumimoji="1" lang="ja-JP" altLang="en-US" smtClean="0"/>
-              <a:t>2018/7/4</a:t>
+              <a:t>2018/7/9</a:t>
             </a:fld>
             <a:endParaRPr kumimoji="1" lang="ja-JP" altLang="en-US"/>
           </a:p>
@@ -893,7 +894,7 @@
           <a:p>
             <a:fld id="{E90ED720-0104-4369-84BC-D37694168613}" type="datetimeFigureOut">
               <a:rPr kumimoji="1" lang="ja-JP" altLang="en-US" smtClean="0"/>
-              <a:t>2018/7/4</a:t>
+              <a:t>2018/7/9</a:t>
             </a:fld>
             <a:endParaRPr kumimoji="1" lang="ja-JP" altLang="en-US"/>
           </a:p>
@@ -1134,7 +1135,7 @@
           <a:p>
             <a:fld id="{E90ED720-0104-4369-84BC-D37694168613}" type="datetimeFigureOut">
               <a:rPr kumimoji="1" lang="ja-JP" altLang="en-US" smtClean="0"/>
-              <a:t>2018/7/4</a:t>
+              <a:t>2018/7/9</a:t>
             </a:fld>
             <a:endParaRPr kumimoji="1" lang="ja-JP" altLang="en-US"/>
           </a:p>
@@ -1481,7 +1482,7 @@
           <a:p>
             <a:fld id="{E90ED720-0104-4369-84BC-D37694168613}" type="datetimeFigureOut">
               <a:rPr kumimoji="1" lang="ja-JP" altLang="en-US" smtClean="0"/>
-              <a:t>2018/7/4</a:t>
+              <a:t>2018/7/9</a:t>
             </a:fld>
             <a:endParaRPr kumimoji="1" lang="ja-JP" altLang="en-US"/>
           </a:p>
@@ -1962,7 +1963,7 @@
           <a:p>
             <a:fld id="{E90ED720-0104-4369-84BC-D37694168613}" type="datetimeFigureOut">
               <a:rPr kumimoji="1" lang="ja-JP" altLang="en-US" smtClean="0"/>
-              <a:t>2018/7/4</a:t>
+              <a:t>2018/7/9</a:t>
             </a:fld>
             <a:endParaRPr kumimoji="1" lang="ja-JP" altLang="en-US"/>
           </a:p>
@@ -2075,7 +2076,7 @@
           <a:p>
             <a:fld id="{E90ED720-0104-4369-84BC-D37694168613}" type="datetimeFigureOut">
               <a:rPr kumimoji="1" lang="ja-JP" altLang="en-US" smtClean="0"/>
-              <a:t>2018/7/4</a:t>
+              <a:t>2018/7/9</a:t>
             </a:fld>
             <a:endParaRPr kumimoji="1" lang="ja-JP" altLang="en-US"/>
           </a:p>
@@ -2165,7 +2166,7 @@
           <a:p>
             <a:fld id="{E90ED720-0104-4369-84BC-D37694168613}" type="datetimeFigureOut">
               <a:rPr kumimoji="1" lang="ja-JP" altLang="en-US" smtClean="0"/>
-              <a:t>2018/7/4</a:t>
+              <a:t>2018/7/9</a:t>
             </a:fld>
             <a:endParaRPr kumimoji="1" lang="ja-JP" altLang="en-US"/>
           </a:p>
@@ -2469,7 +2470,7 @@
           <a:p>
             <a:fld id="{E90ED720-0104-4369-84BC-D37694168613}" type="datetimeFigureOut">
               <a:rPr kumimoji="1" lang="ja-JP" altLang="en-US" smtClean="0"/>
-              <a:t>2018/7/4</a:t>
+              <a:t>2018/7/9</a:t>
             </a:fld>
             <a:endParaRPr kumimoji="1" lang="ja-JP" altLang="en-US"/>
           </a:p>
@@ -2717,7 +2718,7 @@
           <a:p>
             <a:fld id="{E90ED720-0104-4369-84BC-D37694168613}" type="datetimeFigureOut">
               <a:rPr kumimoji="1" lang="ja-JP" altLang="en-US" smtClean="0"/>
-              <a:t>2018/7/4</a:t>
+              <a:t>2018/7/9</a:t>
             </a:fld>
             <a:endParaRPr kumimoji="1" lang="ja-JP" altLang="en-US"/>
           </a:p>
@@ -2957,7 +2958,7 @@
           <a:p>
             <a:fld id="{E90ED720-0104-4369-84BC-D37694168613}" type="datetimeFigureOut">
               <a:rPr kumimoji="1" lang="ja-JP" altLang="en-US" smtClean="0"/>
-              <a:t>2018/7/4</a:t>
+              <a:t>2018/7/9</a:t>
             </a:fld>
             <a:endParaRPr kumimoji="1" lang="ja-JP" altLang="en-US"/>
           </a:p>
@@ -3335,6 +3336,1232 @@
         </p:nvSpPr>
         <p:spPr>
           <a:xfrm>
+            <a:off x="1" y="0"/>
+            <a:ext cx="5715000" cy="6555641"/>
+          </a:xfrm>
+          <a:prstGeom prst="rect">
+            <a:avLst/>
+          </a:prstGeom>
+          <a:noFill/>
+        </p:spPr>
+        <p:txBody>
+          <a:bodyPr wrap="square" rtlCol="0">
+            <a:spAutoFit/>
+          </a:bodyPr>
+          <a:lstStyle/>
+          <a:p>
+            <a:r>
+              <a:rPr kumimoji="1" lang="en-US" altLang="ja-JP" sz="1200" dirty="0" smtClean="0">
+                <a:latin typeface="+mj-lt"/>
+              </a:rPr>
+              <a:t>My </a:t>
+            </a:r>
+            <a:r>
+              <a:rPr kumimoji="1" lang="en-US" altLang="ja-JP" sz="1200" b="1" dirty="0" smtClean="0">
+                <a:solidFill>
+                  <a:srgbClr val="FF0000"/>
+                </a:solidFill>
+                <a:latin typeface="+mj-lt"/>
+              </a:rPr>
+              <a:t>checklist</a:t>
+            </a:r>
+            <a:r>
+              <a:rPr kumimoji="1" lang="en-US" altLang="ja-JP" sz="1200" dirty="0" smtClean="0">
+                <a:solidFill>
+                  <a:srgbClr val="FF0000"/>
+                </a:solidFill>
+                <a:latin typeface="+mj-lt"/>
+              </a:rPr>
+              <a:t> </a:t>
+            </a:r>
+            <a:r>
+              <a:rPr kumimoji="1" lang="en-US" altLang="ja-JP" sz="1200" dirty="0" smtClean="0">
+                <a:latin typeface="+mj-lt"/>
+              </a:rPr>
+              <a:t>before investing in stock market.</a:t>
+            </a:r>
+          </a:p>
+          <a:p>
+            <a:r>
+              <a:rPr lang="zh-CN" altLang="en-US" sz="1200" dirty="0" smtClean="0">
+                <a:latin typeface="+mj-lt"/>
+              </a:rPr>
+              <a:t>以下是一些著名</a:t>
+            </a:r>
+            <a:r>
+              <a:rPr lang="en-US" altLang="zh-CN" sz="1200" dirty="0" smtClean="0">
+                <a:latin typeface="+mj-lt"/>
+              </a:rPr>
+              <a:t>investor</a:t>
+            </a:r>
+            <a:r>
+              <a:rPr lang="zh-CN" altLang="en-US" sz="1200" dirty="0" smtClean="0">
+                <a:latin typeface="+mj-lt"/>
+              </a:rPr>
+              <a:t>的投资</a:t>
+            </a:r>
+            <a:r>
+              <a:rPr lang="en-US" altLang="zh-CN" sz="1200" dirty="0" smtClean="0">
+                <a:latin typeface="+mj-lt"/>
+              </a:rPr>
+              <a:t>checklists</a:t>
+            </a:r>
+            <a:r>
+              <a:rPr lang="zh-CN" altLang="en-US" sz="1200" dirty="0" smtClean="0">
+                <a:latin typeface="+mj-lt"/>
+              </a:rPr>
+              <a:t>，我应该参考这些然后</a:t>
+            </a:r>
+            <a:r>
+              <a:rPr lang="en-US" altLang="zh-CN" sz="1200" dirty="0" smtClean="0">
+                <a:latin typeface="+mj-lt"/>
+              </a:rPr>
+              <a:t>work out</a:t>
+            </a:r>
+            <a:r>
+              <a:rPr lang="zh-CN" altLang="en-US" sz="1200" dirty="0" smtClean="0">
+                <a:latin typeface="+mj-lt"/>
+              </a:rPr>
+              <a:t>我自己的</a:t>
+            </a:r>
+            <a:r>
+              <a:rPr lang="en-US" altLang="zh-CN" sz="1200" dirty="0" smtClean="0">
+                <a:latin typeface="+mj-lt"/>
+              </a:rPr>
+              <a:t>list</a:t>
+            </a:r>
+          </a:p>
+          <a:p>
+            <a:r>
+              <a:rPr lang="en-US" altLang="zh-CN" sz="1200" dirty="0" smtClean="0">
+                <a:latin typeface="+mj-lt"/>
+              </a:rPr>
+              <a:t>(</a:t>
+            </a:r>
+            <a:r>
+              <a:rPr lang="zh-CN" altLang="en-US" sz="1200" dirty="0" smtClean="0">
+                <a:latin typeface="+mj-lt"/>
+              </a:rPr>
+              <a:t>以下是</a:t>
+            </a:r>
+            <a:r>
+              <a:rPr lang="en-US" altLang="zh-CN" sz="1200" b="1" dirty="0" smtClean="0">
+                <a:solidFill>
+                  <a:srgbClr val="FF0000"/>
+                </a:solidFill>
+                <a:latin typeface="+mj-lt"/>
+              </a:rPr>
+              <a:t>Philip Fisher</a:t>
+            </a:r>
+            <a:r>
+              <a:rPr lang="zh-CN" altLang="en-US" sz="1200" dirty="0" smtClean="0">
+                <a:latin typeface="+mj-lt"/>
+              </a:rPr>
+              <a:t>的</a:t>
+            </a:r>
+            <a:r>
+              <a:rPr lang="en-US" altLang="zh-CN" sz="1200" dirty="0" smtClean="0">
+                <a:latin typeface="+mj-lt"/>
+              </a:rPr>
+              <a:t>list – </a:t>
+            </a:r>
+            <a:r>
+              <a:rPr lang="en-US" altLang="zh-CN" sz="1200" b="1" dirty="0" smtClean="0">
+                <a:solidFill>
+                  <a:srgbClr val="FF0000"/>
+                </a:solidFill>
+                <a:latin typeface="+mj-lt"/>
+              </a:rPr>
+              <a:t>Growth Investment</a:t>
+            </a:r>
+            <a:r>
+              <a:rPr lang="en-US" altLang="zh-CN" sz="1200" dirty="0" smtClean="0">
+                <a:latin typeface="+mj-lt"/>
+              </a:rPr>
+              <a:t>)</a:t>
+            </a:r>
+            <a:endParaRPr lang="en-US" altLang="zh-CN" sz="1200" dirty="0" smtClean="0">
+              <a:latin typeface="+mj-lt"/>
+            </a:endParaRPr>
+          </a:p>
+          <a:p>
+            <a:pPr marL="285750" indent="-285750">
+              <a:buFont typeface="+mj-lt"/>
+              <a:buAutoNum type="arabicPeriod"/>
+            </a:pPr>
+            <a:r>
+              <a:rPr lang="zh-CN" altLang="en-US" sz="1200" dirty="0" smtClean="0">
+                <a:latin typeface="+mj-lt"/>
+              </a:rPr>
+              <a:t>一个公司的</a:t>
+            </a:r>
+            <a:r>
+              <a:rPr lang="en-US" altLang="zh-CN" sz="1200" dirty="0" smtClean="0">
+                <a:latin typeface="+mj-lt"/>
+              </a:rPr>
+              <a:t>product/service</a:t>
+            </a:r>
+            <a:r>
+              <a:rPr lang="zh-CN" altLang="en-US" sz="1200" dirty="0" smtClean="0">
+                <a:latin typeface="+mj-lt"/>
+              </a:rPr>
+              <a:t>有没有足够的</a:t>
+            </a:r>
+            <a:r>
+              <a:rPr lang="en-US" altLang="zh-CN" sz="1200" b="1" dirty="0" smtClean="0">
+                <a:solidFill>
+                  <a:srgbClr val="FF0000"/>
+                </a:solidFill>
+                <a:latin typeface="+mj-lt"/>
+              </a:rPr>
+              <a:t>market potential</a:t>
+            </a:r>
+            <a:r>
+              <a:rPr lang="en-US" altLang="zh-CN" sz="1200" dirty="0" smtClean="0">
+                <a:latin typeface="+mj-lt"/>
+              </a:rPr>
+              <a:t> (</a:t>
+            </a:r>
+            <a:r>
+              <a:rPr lang="zh-CN" altLang="en-US" sz="1200" dirty="0" smtClean="0">
+                <a:latin typeface="+mj-lt"/>
+              </a:rPr>
+              <a:t>有</a:t>
+            </a:r>
+            <a:r>
+              <a:rPr lang="en-US" altLang="zh-CN" sz="1200" dirty="0" smtClean="0">
+                <a:latin typeface="+mj-lt"/>
+              </a:rPr>
+              <a:t>market potential</a:t>
+            </a:r>
+            <a:r>
+              <a:rPr lang="zh-CN" altLang="en-US" sz="1200" dirty="0" smtClean="0">
+                <a:latin typeface="+mj-lt"/>
+              </a:rPr>
+              <a:t>是指在未来的几年中，此公司的</a:t>
+            </a:r>
+            <a:r>
+              <a:rPr lang="en-US" altLang="zh-CN" sz="1200" dirty="0" smtClean="0">
+                <a:latin typeface="+mj-lt"/>
+              </a:rPr>
+              <a:t>product/service</a:t>
+            </a:r>
+            <a:r>
+              <a:rPr lang="zh-CN" altLang="en-US" sz="1200" dirty="0" smtClean="0">
+                <a:latin typeface="+mj-lt"/>
+              </a:rPr>
+              <a:t>是否</a:t>
+            </a:r>
+            <a:r>
+              <a:rPr lang="zh-CN" altLang="en-US" sz="1200" dirty="0">
+                <a:latin typeface="+mj-lt"/>
+              </a:rPr>
+              <a:t>能</a:t>
+            </a:r>
+            <a:r>
+              <a:rPr lang="zh-CN" altLang="en-US" sz="1200" dirty="0" smtClean="0">
+                <a:latin typeface="+mj-lt"/>
+              </a:rPr>
+              <a:t>有</a:t>
+            </a:r>
+            <a:r>
+              <a:rPr lang="en-US" altLang="zh-CN" sz="1200" dirty="0" smtClean="0">
+                <a:latin typeface="+mj-lt"/>
+              </a:rPr>
+              <a:t>sizable increase in sales)</a:t>
+            </a:r>
+          </a:p>
+          <a:p>
+            <a:pPr marL="285750" indent="-285750">
+              <a:buFont typeface="+mj-lt"/>
+              <a:buAutoNum type="arabicPeriod"/>
+            </a:pPr>
+            <a:r>
+              <a:rPr lang="zh-CN" altLang="en-US" sz="1200" dirty="0" smtClean="0">
+                <a:latin typeface="+mj-lt"/>
+              </a:rPr>
+              <a:t>公司的</a:t>
+            </a:r>
+            <a:r>
+              <a:rPr lang="en-US" altLang="zh-CN" sz="1200" dirty="0" smtClean="0">
+                <a:latin typeface="+mj-lt"/>
+              </a:rPr>
+              <a:t>management</a:t>
+            </a:r>
+            <a:r>
+              <a:rPr lang="zh-CN" altLang="en-US" sz="1200" dirty="0" smtClean="0">
+                <a:latin typeface="+mj-lt"/>
+              </a:rPr>
+              <a:t>是否有决心去持续的投资并开发</a:t>
+            </a:r>
+            <a:r>
+              <a:rPr lang="zh-CN" altLang="en-US" sz="1200" b="1" dirty="0" smtClean="0">
+                <a:solidFill>
+                  <a:srgbClr val="FF0000"/>
+                </a:solidFill>
+                <a:latin typeface="+mj-lt"/>
+              </a:rPr>
+              <a:t>能带来</a:t>
+            </a:r>
+            <a:r>
+              <a:rPr lang="en-US" altLang="zh-CN" sz="1200" b="1" dirty="0" smtClean="0">
+                <a:solidFill>
+                  <a:srgbClr val="FF0000"/>
+                </a:solidFill>
+                <a:latin typeface="+mj-lt"/>
+              </a:rPr>
+              <a:t>total sales potentials</a:t>
+            </a:r>
+            <a:r>
+              <a:rPr lang="zh-CN" altLang="en-US" sz="1200" b="1" dirty="0" smtClean="0">
+                <a:solidFill>
+                  <a:srgbClr val="FF0000"/>
+                </a:solidFill>
+                <a:latin typeface="+mj-lt"/>
+              </a:rPr>
+              <a:t>增长的</a:t>
+            </a:r>
+            <a:r>
+              <a:rPr lang="zh-CN" altLang="en-US" sz="1200" dirty="0" smtClean="0">
+                <a:latin typeface="+mj-lt"/>
+              </a:rPr>
+              <a:t>新的</a:t>
+            </a:r>
+            <a:r>
+              <a:rPr lang="en-US" altLang="zh-CN" sz="1200" dirty="0" smtClean="0">
+                <a:latin typeface="+mj-lt"/>
+              </a:rPr>
+              <a:t>products or processes? </a:t>
+            </a:r>
+            <a:r>
+              <a:rPr lang="zh-CN" altLang="en-US" sz="1200" dirty="0" smtClean="0">
+                <a:latin typeface="+mj-lt"/>
+              </a:rPr>
+              <a:t>特别是当现在的主打</a:t>
+            </a:r>
+            <a:r>
+              <a:rPr lang="en-US" altLang="zh-CN" sz="1200" dirty="0" smtClean="0">
+                <a:latin typeface="+mj-lt"/>
+              </a:rPr>
+              <a:t>product</a:t>
+            </a:r>
+            <a:r>
+              <a:rPr lang="zh-CN" altLang="en-US" sz="1200" dirty="0" smtClean="0">
+                <a:latin typeface="+mj-lt"/>
+              </a:rPr>
+              <a:t>的</a:t>
+            </a:r>
+            <a:r>
+              <a:rPr lang="en-US" altLang="zh-CN" sz="1200" dirty="0" smtClean="0">
+                <a:latin typeface="+mj-lt"/>
+              </a:rPr>
+              <a:t>potential</a:t>
+            </a:r>
+            <a:r>
+              <a:rPr lang="zh-CN" altLang="en-US" sz="1200" dirty="0" smtClean="0">
+                <a:latin typeface="+mj-lt"/>
+              </a:rPr>
+              <a:t>已经被</a:t>
+            </a:r>
+            <a:r>
+              <a:rPr lang="en-US" altLang="zh-CN" sz="1200" dirty="0" smtClean="0">
+                <a:latin typeface="+mj-lt"/>
+              </a:rPr>
+              <a:t>fully exploited</a:t>
+            </a:r>
+            <a:r>
+              <a:rPr lang="zh-CN" altLang="en-US" sz="1200" dirty="0" smtClean="0">
+                <a:latin typeface="+mj-lt"/>
+              </a:rPr>
+              <a:t>的是时候</a:t>
+            </a:r>
+            <a:endParaRPr lang="en-US" altLang="zh-CN" sz="1200" dirty="0" smtClean="0">
+              <a:latin typeface="+mj-lt"/>
+            </a:endParaRPr>
+          </a:p>
+          <a:p>
+            <a:pPr marL="285750" indent="-285750">
+              <a:buFont typeface="+mj-lt"/>
+              <a:buAutoNum type="arabicPeriod"/>
+            </a:pPr>
+            <a:r>
+              <a:rPr lang="zh-CN" altLang="en-US" sz="1200" dirty="0" smtClean="0">
+                <a:latin typeface="+mj-lt"/>
+              </a:rPr>
+              <a:t>公司的</a:t>
+            </a:r>
+            <a:r>
+              <a:rPr lang="en-US" altLang="zh-CN" sz="1200" dirty="0" smtClean="0">
+                <a:latin typeface="+mj-lt"/>
+              </a:rPr>
+              <a:t>R&amp;D</a:t>
+            </a:r>
+            <a:r>
+              <a:rPr lang="zh-CN" altLang="en-US" sz="1200" dirty="0" smtClean="0">
+                <a:latin typeface="+mj-lt"/>
+              </a:rPr>
+              <a:t>成果和其公司</a:t>
+            </a:r>
+            <a:r>
+              <a:rPr lang="en-US" altLang="zh-CN" sz="1200" dirty="0" smtClean="0">
+                <a:latin typeface="+mj-lt"/>
+              </a:rPr>
+              <a:t>Size</a:t>
+            </a:r>
+            <a:r>
+              <a:rPr lang="zh-CN" altLang="en-US" sz="1200" dirty="0" smtClean="0">
+                <a:latin typeface="+mj-lt"/>
+              </a:rPr>
+              <a:t>的比例是否够大</a:t>
+            </a:r>
+            <a:r>
+              <a:rPr lang="en-US" altLang="zh-CN" sz="1200" dirty="0" smtClean="0">
+                <a:latin typeface="+mj-lt"/>
+              </a:rPr>
+              <a:t>(</a:t>
+            </a:r>
+            <a:r>
+              <a:rPr lang="zh-CN" altLang="en-US" sz="1200" dirty="0" smtClean="0">
+                <a:latin typeface="+mj-lt"/>
+              </a:rPr>
+              <a:t>可以用</a:t>
+            </a:r>
+            <a:r>
+              <a:rPr lang="en-US" altLang="zh-CN" sz="1200" dirty="0" smtClean="0">
+                <a:latin typeface="+mj-lt"/>
+              </a:rPr>
+              <a:t>R&amp;D</a:t>
+            </a:r>
+            <a:r>
+              <a:rPr lang="zh-CN" altLang="en-US" sz="1200" dirty="0" smtClean="0">
+                <a:latin typeface="+mj-lt"/>
+              </a:rPr>
+              <a:t>投资</a:t>
+            </a:r>
+            <a:r>
+              <a:rPr lang="en-US" altLang="zh-CN" sz="1200" dirty="0" smtClean="0">
+                <a:latin typeface="+mj-lt"/>
+              </a:rPr>
+              <a:t>/</a:t>
+            </a:r>
+            <a:r>
+              <a:rPr lang="zh-CN" altLang="en-US" sz="1200" dirty="0" smtClean="0">
+                <a:latin typeface="+mj-lt"/>
+              </a:rPr>
+              <a:t>成果和公司利益的比做评价</a:t>
+            </a:r>
+            <a:r>
+              <a:rPr lang="en-US" altLang="zh-CN" sz="1200" dirty="0" smtClean="0">
+                <a:latin typeface="+mj-lt"/>
+              </a:rPr>
+              <a:t>)</a:t>
+            </a:r>
+          </a:p>
+          <a:p>
+            <a:pPr marL="285750" indent="-285750">
+              <a:buFont typeface="+mj-lt"/>
+              <a:buAutoNum type="arabicPeriod"/>
+            </a:pPr>
+            <a:r>
+              <a:rPr lang="zh-CN" altLang="en-US" sz="1200" dirty="0" smtClean="0">
+                <a:latin typeface="+mj-lt"/>
+              </a:rPr>
+              <a:t>公司是否有一个好的</a:t>
+            </a:r>
+            <a:r>
+              <a:rPr lang="en-US" altLang="zh-CN" sz="1200" dirty="0" smtClean="0">
+                <a:latin typeface="+mj-lt"/>
+              </a:rPr>
+              <a:t>sales organization?  (sales organization</a:t>
+            </a:r>
+            <a:r>
+              <a:rPr lang="zh-CN" altLang="en-US" sz="1200" dirty="0" smtClean="0">
+                <a:latin typeface="+mj-lt"/>
+              </a:rPr>
+              <a:t>是专有名词，指公司里和</a:t>
+            </a:r>
+            <a:r>
+              <a:rPr lang="en-US" altLang="zh-CN" sz="1200" dirty="0" smtClean="0">
+                <a:latin typeface="+mj-lt"/>
+              </a:rPr>
+              <a:t>profitability</a:t>
+            </a:r>
+            <a:r>
+              <a:rPr lang="zh-CN" altLang="en-US" sz="1200" dirty="0" smtClean="0">
+                <a:latin typeface="+mj-lt"/>
+              </a:rPr>
+              <a:t>直接挂钩的，负责</a:t>
+            </a:r>
+            <a:r>
+              <a:rPr lang="en-US" altLang="zh-CN" sz="1200" dirty="0"/>
+              <a:t>distribute </a:t>
+            </a:r>
+            <a:r>
+              <a:rPr lang="en-US" altLang="zh-CN" sz="1200" dirty="0" smtClean="0"/>
+              <a:t> </a:t>
+            </a:r>
+            <a:r>
+              <a:rPr lang="en-US" altLang="zh-CN" sz="1200" dirty="0" smtClean="0">
+                <a:latin typeface="+mj-lt"/>
+              </a:rPr>
+              <a:t>goods to consumer</a:t>
+            </a:r>
+            <a:r>
+              <a:rPr lang="zh-CN" altLang="en-US" sz="1200" dirty="0" smtClean="0">
+                <a:latin typeface="+mj-lt"/>
+              </a:rPr>
+              <a:t>的部门</a:t>
+            </a:r>
+            <a:r>
+              <a:rPr lang="en-US" altLang="zh-CN" sz="1200" dirty="0" smtClean="0">
+                <a:latin typeface="+mj-lt"/>
+              </a:rPr>
+              <a:t>)</a:t>
+            </a:r>
+          </a:p>
+          <a:p>
+            <a:pPr marL="742950" lvl="1" indent="-285750">
+              <a:buFont typeface="Arial" panose="020B0604020202020204" pitchFamily="34" charset="0"/>
+              <a:buChar char="•"/>
+            </a:pPr>
+            <a:r>
+              <a:rPr lang="en-US" altLang="zh-CN" sz="1200" dirty="0" err="1" smtClean="0">
+                <a:latin typeface="+mj-lt"/>
+              </a:rPr>
+              <a:t>ToDo</a:t>
+            </a:r>
+            <a:r>
+              <a:rPr lang="zh-CN" altLang="en-US" sz="1200" dirty="0" smtClean="0">
+                <a:latin typeface="+mj-lt"/>
+              </a:rPr>
+              <a:t>：怎样评价一个公司的</a:t>
+            </a:r>
+            <a:r>
+              <a:rPr lang="en-US" altLang="zh-CN" sz="1200" dirty="0" smtClean="0">
+                <a:latin typeface="+mj-lt"/>
+              </a:rPr>
+              <a:t>sales organization</a:t>
+            </a:r>
+            <a:r>
+              <a:rPr lang="zh-CN" altLang="en-US" sz="1200" dirty="0" smtClean="0">
+                <a:latin typeface="+mj-lt"/>
+              </a:rPr>
+              <a:t>？</a:t>
+            </a:r>
+            <a:endParaRPr lang="en-US" altLang="zh-CN" sz="1200" dirty="0" smtClean="0">
+              <a:latin typeface="+mj-lt"/>
+            </a:endParaRPr>
+          </a:p>
+          <a:p>
+            <a:pPr marL="285750" indent="-285750">
+              <a:buFont typeface="+mj-lt"/>
+              <a:buAutoNum type="arabicPeriod"/>
+            </a:pPr>
+            <a:r>
+              <a:rPr lang="zh-CN" altLang="en-US" sz="1200" dirty="0" smtClean="0">
+                <a:latin typeface="+mj-lt"/>
+              </a:rPr>
+              <a:t>公司是否有一个</a:t>
+            </a:r>
+            <a:r>
+              <a:rPr lang="en-US" altLang="zh-CN" sz="1200" dirty="0" smtClean="0">
+                <a:latin typeface="+mj-lt"/>
+              </a:rPr>
+              <a:t>worthwhile profit margin?</a:t>
+            </a:r>
+          </a:p>
+          <a:p>
+            <a:pPr marL="742950" lvl="1" indent="-285750">
+              <a:buFont typeface="Arial" panose="020B0604020202020204" pitchFamily="34" charset="0"/>
+              <a:buChar char="•"/>
+            </a:pPr>
+            <a:r>
+              <a:rPr lang="en-US" altLang="zh-CN" sz="1200" dirty="0" err="1" smtClean="0">
+                <a:latin typeface="+mj-lt"/>
+              </a:rPr>
+              <a:t>ToDo</a:t>
+            </a:r>
+            <a:r>
+              <a:rPr lang="zh-CN" altLang="en-US" sz="1200" dirty="0" smtClean="0">
+                <a:latin typeface="+mj-lt"/>
+              </a:rPr>
+              <a:t>：啥是</a:t>
+            </a:r>
+            <a:r>
+              <a:rPr lang="en-US" altLang="zh-CN" sz="1200" dirty="0" smtClean="0">
+                <a:latin typeface="+mj-lt"/>
+              </a:rPr>
+              <a:t>profit margin? </a:t>
+            </a:r>
+            <a:r>
+              <a:rPr lang="zh-CN" altLang="en-US" sz="1200" dirty="0" smtClean="0">
+                <a:latin typeface="+mj-lt"/>
+              </a:rPr>
+              <a:t>咋样才能算是</a:t>
+            </a:r>
+            <a:r>
+              <a:rPr lang="en-US" altLang="zh-CN" sz="1200" dirty="0" smtClean="0">
+                <a:latin typeface="+mj-lt"/>
+              </a:rPr>
+              <a:t>worthwhile?</a:t>
+            </a:r>
+            <a:endParaRPr lang="en-US" altLang="zh-CN" sz="1200" dirty="0">
+              <a:latin typeface="+mj-lt"/>
+            </a:endParaRPr>
+          </a:p>
+          <a:p>
+            <a:pPr marL="285750" indent="-285750">
+              <a:buFont typeface="+mj-lt"/>
+              <a:buAutoNum type="arabicPeriod"/>
+            </a:pPr>
+            <a:r>
+              <a:rPr lang="zh-CN" altLang="en-US" sz="1200" dirty="0" smtClean="0">
+                <a:latin typeface="+mj-lt"/>
+              </a:rPr>
+              <a:t>公司是否在为了</a:t>
+            </a:r>
+            <a:r>
+              <a:rPr lang="en-US" altLang="zh-CN" sz="1200" dirty="0" smtClean="0">
+                <a:latin typeface="+mj-lt"/>
+              </a:rPr>
+              <a:t>maintain / improve profit margins</a:t>
+            </a:r>
+            <a:r>
+              <a:rPr lang="zh-CN" altLang="en-US" sz="1200" dirty="0" smtClean="0">
+                <a:latin typeface="+mj-lt"/>
+              </a:rPr>
+              <a:t>而努力</a:t>
+            </a:r>
+            <a:r>
+              <a:rPr lang="en-US" altLang="zh-CN" sz="1200" dirty="0" smtClean="0">
+                <a:latin typeface="+mj-lt"/>
+              </a:rPr>
+              <a:t>? </a:t>
+            </a:r>
+            <a:r>
+              <a:rPr lang="zh-CN" altLang="en-US" sz="1200" dirty="0" smtClean="0">
+                <a:latin typeface="+mj-lt"/>
+              </a:rPr>
+              <a:t>怎样努力</a:t>
+            </a:r>
+            <a:r>
+              <a:rPr lang="en-US" altLang="zh-CN" sz="1200" dirty="0" smtClean="0">
+                <a:latin typeface="+mj-lt"/>
+              </a:rPr>
+              <a:t>?</a:t>
+            </a:r>
+          </a:p>
+          <a:p>
+            <a:pPr marL="285750" indent="-285750">
+              <a:buFont typeface="+mj-lt"/>
+              <a:buAutoNum type="arabicPeriod"/>
+            </a:pPr>
+            <a:r>
+              <a:rPr lang="zh-CN" altLang="en-US" sz="1200" dirty="0">
+                <a:latin typeface="+mj-lt"/>
+              </a:rPr>
+              <a:t>公司</a:t>
+            </a:r>
+            <a:r>
+              <a:rPr lang="zh-CN" altLang="en-US" sz="1200" dirty="0" smtClean="0">
+                <a:latin typeface="+mj-lt"/>
+              </a:rPr>
+              <a:t>是否有</a:t>
+            </a:r>
+            <a:r>
+              <a:rPr lang="en-US" altLang="zh-CN" sz="1200" dirty="0" smtClean="0">
+                <a:latin typeface="+mj-lt"/>
+              </a:rPr>
+              <a:t>outstanding labor and personnel relations?</a:t>
+            </a:r>
+          </a:p>
+          <a:p>
+            <a:pPr marL="742950" lvl="1" indent="-285750">
+              <a:buFont typeface="Arial" panose="020B0604020202020204" pitchFamily="34" charset="0"/>
+              <a:buChar char="•"/>
+            </a:pPr>
+            <a:r>
+              <a:rPr lang="en-US" altLang="zh-CN" sz="1200" dirty="0" err="1" smtClean="0">
+                <a:latin typeface="+mj-lt"/>
+              </a:rPr>
+              <a:t>ToDo</a:t>
+            </a:r>
+            <a:r>
+              <a:rPr lang="en-US" altLang="zh-CN" sz="1200" dirty="0" smtClean="0">
+                <a:latin typeface="+mj-lt"/>
+              </a:rPr>
+              <a:t>: </a:t>
+            </a:r>
+            <a:r>
+              <a:rPr lang="zh-CN" altLang="en-US" sz="1200" dirty="0" smtClean="0">
+                <a:latin typeface="+mj-lt"/>
+              </a:rPr>
+              <a:t>怎样评价</a:t>
+            </a:r>
+            <a:r>
+              <a:rPr lang="en-US" altLang="zh-CN" sz="1200" dirty="0"/>
+              <a:t>labor and personnel </a:t>
+            </a:r>
+            <a:r>
+              <a:rPr lang="en-US" altLang="zh-CN" sz="1200" dirty="0" smtClean="0"/>
+              <a:t>relations</a:t>
+            </a:r>
+            <a:r>
+              <a:rPr lang="zh-CN" altLang="en-US" sz="1200" dirty="0" smtClean="0"/>
+              <a:t>的好坏</a:t>
+            </a:r>
+            <a:r>
+              <a:rPr lang="en-US" altLang="zh-CN" sz="1200" dirty="0" smtClean="0"/>
+              <a:t>?</a:t>
+            </a:r>
+          </a:p>
+          <a:p>
+            <a:pPr marL="285750" indent="-285750">
+              <a:buFont typeface="+mj-lt"/>
+              <a:buAutoNum type="arabicPeriod"/>
+            </a:pPr>
+            <a:r>
+              <a:rPr lang="zh-CN" altLang="en-US" sz="1200" dirty="0" smtClean="0">
+                <a:latin typeface="+mj-lt"/>
+              </a:rPr>
+              <a:t>公司是否有</a:t>
+            </a:r>
+            <a:r>
+              <a:rPr lang="en-US" altLang="zh-CN" sz="1200" dirty="0" smtClean="0">
+                <a:latin typeface="+mj-lt"/>
+              </a:rPr>
+              <a:t>outstanding executive relations? (</a:t>
+            </a:r>
+            <a:r>
+              <a:rPr lang="zh-CN" altLang="en-US" sz="1200" dirty="0" smtClean="0">
+                <a:latin typeface="+mj-lt"/>
+              </a:rPr>
+              <a:t>我的理解是，</a:t>
+            </a:r>
+            <a:r>
+              <a:rPr lang="en-US" altLang="zh-CN" sz="1200" dirty="0" smtClean="0">
+                <a:latin typeface="+mj-lt"/>
+              </a:rPr>
+              <a:t>executive relation</a:t>
+            </a:r>
+            <a:r>
+              <a:rPr lang="zh-CN" altLang="en-US" sz="1200" dirty="0" smtClean="0">
+                <a:latin typeface="+mj-lt"/>
+              </a:rPr>
+              <a:t>是指一个公司的</a:t>
+            </a:r>
+            <a:r>
+              <a:rPr lang="en-US" altLang="zh-CN" sz="1200" dirty="0" smtClean="0">
+                <a:latin typeface="+mj-lt"/>
+              </a:rPr>
+              <a:t>top</a:t>
+            </a:r>
+            <a:r>
+              <a:rPr lang="zh-CN" altLang="en-US" sz="1200" dirty="0" smtClean="0">
+                <a:latin typeface="+mj-lt"/>
+              </a:rPr>
+              <a:t>和此公司的</a:t>
+            </a:r>
+            <a:r>
+              <a:rPr lang="en-US" altLang="zh-CN" sz="1200" dirty="0" smtClean="0">
+                <a:latin typeface="+mj-lt"/>
+              </a:rPr>
+              <a:t>partner/customer</a:t>
+            </a:r>
+            <a:r>
+              <a:rPr lang="zh-CN" altLang="en-US" sz="1200" dirty="0" smtClean="0">
+                <a:latin typeface="+mj-lt"/>
+              </a:rPr>
+              <a:t>公司的</a:t>
+            </a:r>
+            <a:r>
+              <a:rPr lang="en-US" altLang="zh-CN" sz="1200" dirty="0" smtClean="0">
+                <a:latin typeface="+mj-lt"/>
+              </a:rPr>
+              <a:t>top</a:t>
+            </a:r>
+            <a:r>
+              <a:rPr lang="zh-CN" altLang="en-US" sz="1200" dirty="0" smtClean="0">
+                <a:latin typeface="+mj-lt"/>
+              </a:rPr>
+              <a:t>之间的关系，可以归结到</a:t>
+            </a:r>
+            <a:r>
+              <a:rPr lang="en-US" altLang="zh-CN" sz="1200" dirty="0" smtClean="0">
+                <a:latin typeface="+mj-lt"/>
+              </a:rPr>
+              <a:t>CEO</a:t>
+            </a:r>
+            <a:r>
+              <a:rPr lang="zh-CN" altLang="en-US" sz="1200" dirty="0" smtClean="0">
+                <a:latin typeface="+mj-lt"/>
+              </a:rPr>
+              <a:t>和</a:t>
+            </a:r>
+            <a:r>
+              <a:rPr lang="en-US" altLang="zh-CN" sz="1200" dirty="0" smtClean="0">
+                <a:latin typeface="+mj-lt"/>
+              </a:rPr>
+              <a:t>CEO</a:t>
+            </a:r>
+            <a:r>
+              <a:rPr lang="zh-CN" altLang="en-US" sz="1200" dirty="0" smtClean="0">
+                <a:latin typeface="+mj-lt"/>
+              </a:rPr>
+              <a:t>之间的关系；此</a:t>
+            </a:r>
+            <a:r>
+              <a:rPr lang="en-US" altLang="zh-CN" sz="1200" dirty="0" smtClean="0">
+                <a:latin typeface="+mj-lt"/>
+              </a:rPr>
+              <a:t>relation</a:t>
+            </a:r>
+            <a:r>
+              <a:rPr lang="zh-CN" altLang="en-US" sz="1200" dirty="0" smtClean="0">
+                <a:latin typeface="+mj-lt"/>
+              </a:rPr>
+              <a:t>关系到一个公司是否被其</a:t>
+            </a:r>
+            <a:r>
+              <a:rPr lang="en-US" altLang="zh-CN" sz="1200" dirty="0" smtClean="0">
+                <a:latin typeface="+mj-lt"/>
+              </a:rPr>
+              <a:t>customer</a:t>
+            </a:r>
+            <a:r>
+              <a:rPr lang="zh-CN" altLang="en-US" sz="1200" dirty="0" smtClean="0">
+                <a:latin typeface="+mj-lt"/>
+              </a:rPr>
+              <a:t>认为是一个</a:t>
+            </a:r>
+            <a:r>
+              <a:rPr lang="en-US" altLang="zh-CN" sz="1200" dirty="0" smtClean="0">
+                <a:latin typeface="+mj-lt"/>
+              </a:rPr>
+              <a:t>trusted partner that can shape the future together</a:t>
+            </a:r>
+            <a:r>
+              <a:rPr lang="zh-CN" altLang="en-US" sz="1200" dirty="0" smtClean="0">
+                <a:latin typeface="+mj-lt"/>
+              </a:rPr>
+              <a:t>，还是仅仅是一个</a:t>
+            </a:r>
+            <a:r>
+              <a:rPr lang="en-US" altLang="zh-CN" sz="1200" dirty="0" smtClean="0">
+                <a:latin typeface="+mj-lt"/>
+              </a:rPr>
+              <a:t>vendor that might be called later because of having competing price)</a:t>
+            </a:r>
+          </a:p>
+          <a:p>
+            <a:pPr marL="742950" lvl="1" indent="-285750">
+              <a:buFont typeface="+mj-lt"/>
+              <a:buAutoNum type="arabicPeriod"/>
+            </a:pPr>
+            <a:r>
+              <a:rPr lang="en-US" altLang="zh-CN" sz="1200" dirty="0" err="1" smtClean="0">
+                <a:latin typeface="+mj-lt"/>
+              </a:rPr>
+              <a:t>ToDo</a:t>
+            </a:r>
+            <a:r>
+              <a:rPr lang="en-US" altLang="zh-CN" sz="1200" dirty="0" smtClean="0">
+                <a:latin typeface="+mj-lt"/>
+              </a:rPr>
+              <a:t>: </a:t>
+            </a:r>
+            <a:r>
+              <a:rPr lang="zh-CN" altLang="en-US" sz="1200" dirty="0" smtClean="0">
+                <a:latin typeface="+mj-lt"/>
+              </a:rPr>
+              <a:t>怎样评价</a:t>
+            </a:r>
+            <a:r>
+              <a:rPr lang="en-US" altLang="zh-CN" sz="1200" dirty="0" smtClean="0">
+                <a:latin typeface="+mj-lt"/>
+              </a:rPr>
+              <a:t>executive relations</a:t>
+            </a:r>
+            <a:r>
+              <a:rPr lang="zh-CN" altLang="en-US" sz="1200" dirty="0" smtClean="0">
+                <a:latin typeface="+mj-lt"/>
+              </a:rPr>
+              <a:t>的好坏？</a:t>
+            </a:r>
+            <a:endParaRPr lang="en-US" altLang="zh-CN" sz="1200" dirty="0" smtClean="0">
+              <a:latin typeface="+mj-lt"/>
+            </a:endParaRPr>
+          </a:p>
+          <a:p>
+            <a:pPr marL="285750" indent="-285750">
+              <a:buFont typeface="+mj-lt"/>
+              <a:buAutoNum type="arabicPeriod"/>
+            </a:pPr>
+            <a:r>
+              <a:rPr lang="zh-CN" altLang="en-US" sz="1200" dirty="0" smtClean="0">
+                <a:latin typeface="+mj-lt"/>
+              </a:rPr>
+              <a:t>公司是否有</a:t>
+            </a:r>
+            <a:r>
+              <a:rPr lang="en-US" altLang="zh-CN" sz="1200" dirty="0" smtClean="0">
+                <a:latin typeface="+mj-lt"/>
+              </a:rPr>
+              <a:t>depth and talent in its management?</a:t>
+            </a:r>
+          </a:p>
+          <a:p>
+            <a:pPr marL="285750" indent="-285750">
+              <a:buFont typeface="+mj-lt"/>
+              <a:buAutoNum type="arabicPeriod"/>
+            </a:pPr>
+            <a:r>
+              <a:rPr lang="zh-CN" altLang="en-US" sz="1200" dirty="0" smtClean="0">
+                <a:latin typeface="+mj-lt"/>
+              </a:rPr>
+              <a:t>公司的</a:t>
+            </a:r>
+            <a:r>
+              <a:rPr lang="en-US" altLang="zh-CN" sz="1200" dirty="0" smtClean="0">
+                <a:latin typeface="+mj-lt"/>
+              </a:rPr>
+              <a:t>cost analysis and accounting</a:t>
+            </a:r>
+            <a:r>
+              <a:rPr lang="zh-CN" altLang="en-US" sz="1200" dirty="0" smtClean="0">
+                <a:latin typeface="+mj-lt"/>
+              </a:rPr>
+              <a:t>是否很好</a:t>
+            </a:r>
+            <a:r>
+              <a:rPr lang="en-US" altLang="zh-CN" sz="1200" dirty="0" smtClean="0">
+                <a:latin typeface="+mj-lt"/>
+              </a:rPr>
+              <a:t>?</a:t>
+            </a:r>
+          </a:p>
+          <a:p>
+            <a:pPr marL="285750" indent="-285750">
+              <a:buFont typeface="+mj-lt"/>
+              <a:buAutoNum type="arabicPeriod"/>
+            </a:pPr>
+            <a:r>
+              <a:rPr lang="zh-CN" altLang="en-US" sz="1200" dirty="0" smtClean="0">
+                <a:latin typeface="+mj-lt"/>
+              </a:rPr>
+              <a:t>是否有其他证据能表明此公司在其</a:t>
+            </a:r>
+            <a:r>
+              <a:rPr lang="en-US" altLang="zh-CN" sz="1200" dirty="0" smtClean="0">
+                <a:latin typeface="+mj-lt"/>
+              </a:rPr>
+              <a:t>involved industry</a:t>
+            </a:r>
+            <a:r>
+              <a:rPr lang="zh-CN" altLang="en-US" sz="1200" dirty="0" smtClean="0">
+                <a:latin typeface="+mj-lt"/>
+              </a:rPr>
+              <a:t>中，非常</a:t>
+            </a:r>
+            <a:r>
+              <a:rPr lang="en-US" altLang="zh-CN" sz="1200" dirty="0" smtClean="0">
+                <a:latin typeface="+mj-lt"/>
+              </a:rPr>
+              <a:t>outstanding?</a:t>
+            </a:r>
+          </a:p>
+          <a:p>
+            <a:pPr marL="285750" indent="-285750">
+              <a:buFont typeface="+mj-lt"/>
+              <a:buAutoNum type="arabicPeriod"/>
+            </a:pPr>
+            <a:r>
+              <a:rPr lang="zh-CN" altLang="en-US" sz="1200" dirty="0" smtClean="0">
+                <a:latin typeface="+mj-lt"/>
+              </a:rPr>
+              <a:t>公司是否有</a:t>
+            </a:r>
+            <a:r>
+              <a:rPr lang="en-US" altLang="zh-CN" sz="1200" dirty="0" smtClean="0">
+                <a:latin typeface="+mj-lt"/>
+              </a:rPr>
+              <a:t>profit</a:t>
+            </a:r>
+            <a:r>
+              <a:rPr lang="zh-CN" altLang="en-US" sz="1200" dirty="0" smtClean="0">
+                <a:latin typeface="+mj-lt"/>
+              </a:rPr>
+              <a:t>相关的</a:t>
+            </a:r>
+            <a:r>
+              <a:rPr lang="en-US" altLang="zh-CN" sz="1200" dirty="0" smtClean="0">
+                <a:latin typeface="+mj-lt"/>
+              </a:rPr>
+              <a:t>short-range / long-range outlook?</a:t>
+            </a:r>
+          </a:p>
+          <a:p>
+            <a:pPr marL="285750" indent="-285750">
+              <a:buFont typeface="+mj-lt"/>
+              <a:buAutoNum type="arabicPeriod"/>
+            </a:pPr>
+            <a:r>
+              <a:rPr lang="zh-CN" altLang="en-US" sz="1200" dirty="0" smtClean="0">
+                <a:latin typeface="+mj-lt"/>
+              </a:rPr>
+              <a:t>在</a:t>
+            </a:r>
+            <a:r>
+              <a:rPr lang="zh-CN" altLang="en-US" sz="1200" dirty="0">
+                <a:latin typeface="+mj-lt"/>
+              </a:rPr>
+              <a:t>可预见</a:t>
+            </a:r>
+            <a:r>
+              <a:rPr lang="zh-CN" altLang="en-US" sz="1200" dirty="0" smtClean="0">
+                <a:latin typeface="+mj-lt"/>
+              </a:rPr>
+              <a:t>的将来，公司是否需要大量股权融资，并且此融资会使现在的</a:t>
+            </a:r>
+            <a:r>
+              <a:rPr lang="en-US" altLang="zh-CN" sz="1200" dirty="0" smtClean="0">
+                <a:latin typeface="+mj-lt"/>
+              </a:rPr>
+              <a:t>stockholder</a:t>
+            </a:r>
+            <a:r>
+              <a:rPr lang="zh-CN" altLang="en-US" sz="1200" dirty="0" smtClean="0">
+                <a:latin typeface="+mj-lt"/>
+              </a:rPr>
+              <a:t>从公司</a:t>
+            </a:r>
+            <a:r>
+              <a:rPr lang="en-US" altLang="zh-CN" sz="1200" dirty="0" smtClean="0">
+                <a:latin typeface="+mj-lt"/>
+              </a:rPr>
+              <a:t>growth</a:t>
+            </a:r>
+            <a:r>
+              <a:rPr lang="zh-CN" altLang="en-US" sz="1200" dirty="0" smtClean="0">
+                <a:latin typeface="+mj-lt"/>
+              </a:rPr>
+              <a:t>中获得的利益减少很多</a:t>
+            </a:r>
+            <a:r>
+              <a:rPr lang="en-US" altLang="zh-CN" sz="1200" dirty="0" smtClean="0">
+                <a:latin typeface="+mj-lt"/>
+              </a:rPr>
+              <a:t>?</a:t>
+            </a:r>
+          </a:p>
+          <a:p>
+            <a:pPr marL="742950" lvl="1" indent="-285750">
+              <a:buFont typeface="+mj-lt"/>
+              <a:buAutoNum type="arabicPeriod"/>
+            </a:pPr>
+            <a:r>
+              <a:rPr lang="en-US" altLang="zh-CN" sz="1200" dirty="0" err="1" smtClean="0">
+                <a:latin typeface="+mj-lt"/>
+              </a:rPr>
+              <a:t>ToDo</a:t>
+            </a:r>
+            <a:r>
+              <a:rPr lang="en-US" altLang="zh-CN" sz="1200" dirty="0" smtClean="0">
+                <a:latin typeface="+mj-lt"/>
+              </a:rPr>
+              <a:t>: </a:t>
+            </a:r>
+            <a:r>
+              <a:rPr lang="zh-CN" altLang="en-US" sz="1200" dirty="0" smtClean="0">
+                <a:latin typeface="+mj-lt"/>
+              </a:rPr>
+              <a:t>这个怎么看</a:t>
+            </a:r>
+            <a:r>
+              <a:rPr lang="en-US" altLang="zh-CN" sz="1200" dirty="0" smtClean="0">
+                <a:latin typeface="+mj-lt"/>
+              </a:rPr>
+              <a:t>?</a:t>
+            </a:r>
+          </a:p>
+          <a:p>
+            <a:pPr marL="285750" indent="-285750">
+              <a:buFont typeface="+mj-lt"/>
+              <a:buAutoNum type="arabicPeriod"/>
+            </a:pPr>
+            <a:r>
+              <a:rPr lang="zh-CN" altLang="en-US" sz="1200" dirty="0" smtClean="0">
+                <a:latin typeface="+mj-lt"/>
+              </a:rPr>
+              <a:t>当</a:t>
+            </a:r>
+            <a:r>
+              <a:rPr lang="en-US" altLang="zh-CN" sz="1200" dirty="0" smtClean="0">
+                <a:latin typeface="+mj-lt"/>
+              </a:rPr>
+              <a:t>troubles</a:t>
+            </a:r>
+            <a:r>
+              <a:rPr lang="zh-CN" altLang="en-US" sz="1200" dirty="0" smtClean="0">
+                <a:latin typeface="+mj-lt"/>
+              </a:rPr>
+              <a:t>和</a:t>
+            </a:r>
+            <a:r>
+              <a:rPr lang="en-US" altLang="zh-CN" sz="1200" dirty="0" smtClean="0">
+                <a:latin typeface="+mj-lt"/>
+              </a:rPr>
+              <a:t>disappointment</a:t>
+            </a:r>
+            <a:r>
+              <a:rPr lang="zh-CN" altLang="en-US" sz="1200" dirty="0" smtClean="0">
+                <a:latin typeface="+mj-lt"/>
+              </a:rPr>
+              <a:t>发生的时候，公司的</a:t>
+            </a:r>
+            <a:r>
+              <a:rPr lang="en-US" altLang="zh-CN" sz="1200" dirty="0" smtClean="0">
+                <a:latin typeface="+mj-lt"/>
+              </a:rPr>
+              <a:t>management</a:t>
+            </a:r>
+            <a:r>
+              <a:rPr lang="zh-CN" altLang="en-US" sz="1200" dirty="0" smtClean="0">
+                <a:latin typeface="+mj-lt"/>
+              </a:rPr>
+              <a:t>是否能和</a:t>
+            </a:r>
+            <a:r>
+              <a:rPr lang="en-US" altLang="zh-CN" sz="1200" dirty="0" smtClean="0">
+                <a:latin typeface="+mj-lt"/>
+              </a:rPr>
+              <a:t>investors</a:t>
+            </a:r>
+            <a:r>
+              <a:rPr lang="zh-CN" altLang="en-US" sz="1200" dirty="0" smtClean="0">
+                <a:latin typeface="+mj-lt"/>
+              </a:rPr>
+              <a:t>良好的交流</a:t>
+            </a:r>
+            <a:r>
+              <a:rPr lang="en-US" altLang="zh-CN" sz="1200" dirty="0" smtClean="0">
+                <a:latin typeface="+mj-lt"/>
+              </a:rPr>
+              <a:t>?</a:t>
+            </a:r>
+          </a:p>
+          <a:p>
+            <a:pPr marL="285750" indent="-285750">
+              <a:buFont typeface="+mj-lt"/>
+              <a:buAutoNum type="arabicPeriod"/>
+            </a:pPr>
+            <a:r>
+              <a:rPr lang="zh-CN" altLang="en-US" sz="1200" dirty="0" smtClean="0">
+                <a:latin typeface="+mj-lt"/>
+              </a:rPr>
+              <a:t>公司的</a:t>
+            </a:r>
+            <a:r>
+              <a:rPr lang="en-US" altLang="zh-CN" sz="1200" dirty="0" smtClean="0">
+                <a:latin typeface="+mj-lt"/>
+              </a:rPr>
+              <a:t>management</a:t>
+            </a:r>
+            <a:r>
+              <a:rPr lang="zh-CN" altLang="en-US" sz="1200" dirty="0" smtClean="0">
+                <a:latin typeface="+mj-lt"/>
+              </a:rPr>
+              <a:t>是否有</a:t>
+            </a:r>
+            <a:r>
+              <a:rPr lang="en-US" altLang="zh-CN" sz="1200" dirty="0" smtClean="0">
+                <a:latin typeface="+mj-lt"/>
+              </a:rPr>
+              <a:t>unquestionable integrity?</a:t>
+            </a:r>
+          </a:p>
+          <a:p>
+            <a:pPr marL="742950" lvl="1" indent="-285750">
+              <a:buFont typeface="+mj-lt"/>
+              <a:buAutoNum type="arabicPeriod"/>
+            </a:pPr>
+            <a:r>
+              <a:rPr lang="en-US" altLang="zh-CN" sz="1200" dirty="0" err="1" smtClean="0">
+                <a:latin typeface="+mj-lt"/>
+              </a:rPr>
+              <a:t>ToDo</a:t>
+            </a:r>
+            <a:r>
+              <a:rPr lang="en-US" altLang="zh-CN" sz="1200" dirty="0" smtClean="0">
+                <a:latin typeface="+mj-lt"/>
+              </a:rPr>
+              <a:t>: </a:t>
+            </a:r>
+            <a:r>
+              <a:rPr lang="zh-CN" altLang="en-US" sz="1200" dirty="0" smtClean="0">
+                <a:latin typeface="+mj-lt"/>
+              </a:rPr>
+              <a:t>这个</a:t>
+            </a:r>
+            <a:r>
+              <a:rPr lang="en-US" altLang="zh-CN" sz="1200" dirty="0" smtClean="0">
+                <a:latin typeface="+mj-lt"/>
+              </a:rPr>
+              <a:t>info</a:t>
+            </a:r>
+            <a:r>
+              <a:rPr lang="zh-CN" altLang="en-US" sz="1200" dirty="0" smtClean="0">
+                <a:latin typeface="+mj-lt"/>
+              </a:rPr>
+              <a:t>怎么搜集</a:t>
+            </a:r>
+            <a:r>
+              <a:rPr lang="en-US" altLang="zh-CN" sz="1200" dirty="0" smtClean="0">
+                <a:latin typeface="+mj-lt"/>
+              </a:rPr>
+              <a:t>?</a:t>
+            </a:r>
+          </a:p>
+        </p:txBody>
+      </p:sp>
+    </p:spTree>
+    <p:extLst>
+      <p:ext uri="{BB962C8B-B14F-4D97-AF65-F5344CB8AC3E}">
+        <p14:creationId xmlns:p14="http://schemas.microsoft.com/office/powerpoint/2010/main" val="2382410945"/>
+      </p:ext>
+    </p:extLst>
+  </p:cSld>
+  <p:clrMapOvr>
+    <a:masterClrMapping/>
+  </p:clrMapOvr>
+</p:sld>
+</file>
+
+<file path=ppt/slides/slide2.xml><?xml version="1.0" encoding="utf-8"?>
+<p:sld xmlns:a="http://schemas.openxmlformats.org/drawingml/2006/main" xmlns:r="http://schemas.openxmlformats.org/officeDocument/2006/relationships" xmlns:p="http://schemas.openxmlformats.org/presentationml/2006/main">
+  <p:cSld>
+    <p:spTree>
+      <p:nvGrpSpPr>
+        <p:cNvPr id="1" name=""/>
+        <p:cNvGrpSpPr/>
+        <p:nvPr/>
+      </p:nvGrpSpPr>
+      <p:grpSpPr>
+        <a:xfrm>
+          <a:off x="0" y="0"/>
+          <a:ext cx="0" cy="0"/>
+          <a:chOff x="0" y="0"/>
+          <a:chExt cx="0" cy="0"/>
+        </a:xfrm>
+      </p:grpSpPr>
+      <p:sp>
+        <p:nvSpPr>
+          <p:cNvPr id="2" name="テキスト ボックス 1"/>
+          <p:cNvSpPr txBox="1"/>
+          <p:nvPr/>
+        </p:nvSpPr>
+        <p:spPr>
+          <a:xfrm>
             <a:off x="0" y="0"/>
             <a:ext cx="5715000" cy="4832092"/>
           </a:xfrm>
@@ -3890,208 +5117,6 @@
 </p:sld>
 </file>
 
-<file path=ppt/slides/slide2.xml><?xml version="1.0" encoding="utf-8"?>
-<p:sld xmlns:a="http://schemas.openxmlformats.org/drawingml/2006/main" xmlns:r="http://schemas.openxmlformats.org/officeDocument/2006/relationships" xmlns:p="http://schemas.openxmlformats.org/presentationml/2006/main">
-  <p:cSld>
-    <p:spTree>
-      <p:nvGrpSpPr>
-        <p:cNvPr id="1" name=""/>
-        <p:cNvGrpSpPr/>
-        <p:nvPr/>
-      </p:nvGrpSpPr>
-      <p:grpSpPr>
-        <a:xfrm>
-          <a:off x="0" y="0"/>
-          <a:ext cx="0" cy="0"/>
-          <a:chOff x="0" y="0"/>
-          <a:chExt cx="0" cy="0"/>
-        </a:xfrm>
-      </p:grpSpPr>
-      <p:sp>
-        <p:nvSpPr>
-          <p:cNvPr id="2" name="正方形/長方形 1"/>
-          <p:cNvSpPr/>
-          <p:nvPr/>
-        </p:nvSpPr>
-        <p:spPr>
-          <a:xfrm>
-            <a:off x="0" y="0"/>
-            <a:ext cx="5715000" cy="9571851"/>
-          </a:xfrm>
-          <a:prstGeom prst="rect">
-            <a:avLst/>
-          </a:prstGeom>
-        </p:spPr>
-        <p:txBody>
-          <a:bodyPr wrap="square">
-            <a:spAutoFit/>
-          </a:bodyPr>
-          <a:lstStyle/>
-          <a:p>
-            <a:r>
-              <a:rPr lang="en-US" altLang="ja-JP" sz="1400" b="1" dirty="0">
-                <a:solidFill>
-                  <a:srgbClr val="FF0000"/>
-                </a:solidFill>
-              </a:rPr>
-              <a:t>What Stock Markets Are (</a:t>
-            </a:r>
-            <a:r>
-              <a:rPr lang="zh-CN" altLang="en-US" sz="1400" b="1" dirty="0">
-                <a:solidFill>
-                  <a:srgbClr val="FF0000"/>
-                </a:solidFill>
-              </a:rPr>
-              <a:t>这个解释蛮简单，但引出一个新问题，为什么把</a:t>
-            </a:r>
-            <a:r>
-              <a:rPr lang="en-US" altLang="zh-CN" sz="1400" b="1" dirty="0">
-                <a:solidFill>
-                  <a:srgbClr val="FF0000"/>
-                </a:solidFill>
-              </a:rPr>
-              <a:t>share</a:t>
-            </a:r>
-            <a:r>
-              <a:rPr lang="zh-CN" altLang="en-US" sz="1400" b="1" dirty="0">
-                <a:solidFill>
-                  <a:srgbClr val="FF0000"/>
-                </a:solidFill>
-              </a:rPr>
-              <a:t>拿出来卖？</a:t>
-            </a:r>
-            <a:r>
-              <a:rPr lang="en-US" altLang="ja-JP" sz="1400" b="1" dirty="0">
-                <a:solidFill>
-                  <a:srgbClr val="FF0000"/>
-                </a:solidFill>
-              </a:rPr>
-              <a:t>)</a:t>
-            </a:r>
-          </a:p>
-          <a:p>
-            <a:r>
-              <a:rPr lang="en-US" altLang="ja-JP" sz="1400" dirty="0"/>
-              <a:t>Before you can understand why stock markets rise and fall, you need to understand what a stock market is. A stock market is a place where people come together to buy and sell ownership shares in a company. The value of a company, or its market capitalization, is the sum of all the ownership shares it has outstanding multiplied by the price of those shares. For example, Apple, Inc. (AAPL</a:t>
-            </a:r>
-          </a:p>
-          <a:p>
-            <a:r>
-              <a:rPr lang="en-US" altLang="ja-JP" sz="1400" dirty="0"/>
-              <a:t>) has 5.13 billion shares that trade at $178 a share as of January 2018—therefore Apple is worth $913 billion. (See also: Stocks Basics Tutorial.)</a:t>
-            </a:r>
-          </a:p>
-          <a:p>
-            <a:endParaRPr lang="en-US" altLang="ja-JP" sz="1400" dirty="0"/>
-          </a:p>
-          <a:p>
-            <a:r>
-              <a:rPr lang="zh-CN" altLang="en-US" sz="1400" b="1" dirty="0">
-                <a:solidFill>
-                  <a:srgbClr val="FF0000"/>
-                </a:solidFill>
-              </a:rPr>
-              <a:t>公司的</a:t>
-            </a:r>
-            <a:r>
-              <a:rPr lang="en-US" altLang="zh-CN" sz="1400" b="1" dirty="0">
-                <a:solidFill>
-                  <a:srgbClr val="FF0000"/>
-                </a:solidFill>
-              </a:rPr>
-              <a:t>Stock price</a:t>
-            </a:r>
-            <a:r>
-              <a:rPr lang="zh-CN" altLang="en-US" sz="1400" b="1" dirty="0">
-                <a:solidFill>
-                  <a:srgbClr val="FF0000"/>
-                </a:solidFill>
-              </a:rPr>
-              <a:t>是怎么定的？</a:t>
-            </a:r>
-            <a:endParaRPr lang="en-US" altLang="ja-JP" sz="1400" b="1" dirty="0">
-              <a:solidFill>
-                <a:srgbClr val="FF0000"/>
-              </a:solidFill>
-            </a:endParaRPr>
-          </a:p>
-          <a:p>
-            <a:r>
-              <a:rPr lang="en-US" altLang="ja-JP" sz="1400" dirty="0"/>
-              <a:t>The next piece to understand is what a company’s value represents. A company has stuff and it sells stuff. The stuff it has—buildings, machinery, patents, money in the bank, etc.—constitute its book value, or the amount of money a company would get if they sold all of that stuff at once. But companies are primarily in business of trying to make a profit, and in doing so they earn cash by selling products or services. So the value of a company has to do with </a:t>
-            </a:r>
-            <a:r>
-              <a:rPr lang="en-US" altLang="ja-JP" sz="1400" b="1" dirty="0"/>
-              <a:t>the stuff it owns now and the cash flows it will receive in the future</a:t>
-            </a:r>
-            <a:r>
-              <a:rPr lang="en-US" altLang="ja-JP" sz="1400" dirty="0"/>
-              <a:t>. The value of the stuff it owns now is fairly easy to determine, but the value of all the future cash flow streams is a bit trickier to nail down—and it is this piece that is responsible for market gyrations.</a:t>
-            </a:r>
-          </a:p>
-          <a:p>
-            <a:endParaRPr lang="en-US" altLang="ja-JP" sz="1400" dirty="0"/>
-          </a:p>
-          <a:p>
-            <a:r>
-              <a:rPr lang="en-US" altLang="ja-JP" sz="1400" dirty="0"/>
-              <a:t>Cash Flows and </a:t>
-            </a:r>
-            <a:r>
-              <a:rPr lang="en-US" altLang="ja-JP" sz="1400" b="1" dirty="0">
-                <a:solidFill>
-                  <a:srgbClr val="FF0000"/>
-                </a:solidFill>
-              </a:rPr>
-              <a:t>Price-to-Earnings (P/E ratio</a:t>
-            </a:r>
-            <a:r>
-              <a:rPr lang="zh-CN" altLang="en-US" sz="1400" b="1" dirty="0">
-                <a:solidFill>
-                  <a:srgbClr val="FF0000"/>
-                </a:solidFill>
-              </a:rPr>
-              <a:t>的易懂解释</a:t>
-            </a:r>
-            <a:r>
-              <a:rPr lang="en-US" altLang="ja-JP" sz="1400" b="1" dirty="0">
-                <a:solidFill>
-                  <a:srgbClr val="FF0000"/>
-                </a:solidFill>
-              </a:rPr>
-              <a:t>)</a:t>
-            </a:r>
-          </a:p>
-          <a:p>
-            <a:r>
-              <a:rPr lang="en-US" altLang="ja-JP" sz="1400" dirty="0"/>
-              <a:t>Once an appropriate discount rate has been estimated, the hard part is to figure out what future cash flows will be—a month from now, a year from now, five years from now. Financial analysts try to figure these amounts out in a number of ways accounting for both company-specific factors and macro factors such as overall economic health. Fortunately, the stock market reflects the expectation of future cash flows in an easy to compute ratio of price to earnings, also known as the P/E ratio. A P/E ratio of 10x means that a company is being valued today at 10 times its current earnings. A P/E ratio of 20x for the same company would mean that given the same amount of earnings, the market is giving it twice as much value, indicating that those future cash flows are going to be larger.</a:t>
-            </a:r>
-          </a:p>
-          <a:p>
-            <a:endParaRPr lang="en-US" altLang="ja-JP" sz="1400" dirty="0"/>
-          </a:p>
-          <a:p>
-            <a:r>
-              <a:rPr lang="en-US" altLang="ja-JP" sz="1400" dirty="0"/>
-              <a:t>So that’s basically it: stock markets are places where people buy and sell shares of companies, and these shares are valued in large part as a multiple of current earnings that represent the net present value of future cash flows. Because the future is unknown today, various peoples’ estimates will be different from one another, giving some a higher expected stock price and some a lower stock price. If the current price is lower than the expected price, people will buy it. If it is higher, people will sell it. And this is the stock market.</a:t>
-            </a:r>
-          </a:p>
-        </p:txBody>
-      </p:sp>
-    </p:spTree>
-    <p:extLst>
-      <p:ext uri="{BB962C8B-B14F-4D97-AF65-F5344CB8AC3E}">
-        <p14:creationId xmlns:p14="http://schemas.microsoft.com/office/powerpoint/2010/main" val="601941550"/>
-      </p:ext>
-    </p:extLst>
-  </p:cSld>
-  <p:clrMapOvr>
-    <a:masterClrMapping/>
-  </p:clrMapOvr>
-</p:sld>
-</file>
-
 <file path=ppt/slides/slide3.xml><?xml version="1.0" encoding="utf-8"?>
 <p:sld xmlns:a="http://schemas.openxmlformats.org/drawingml/2006/main" xmlns:r="http://schemas.openxmlformats.org/officeDocument/2006/relationships" xmlns:p="http://schemas.openxmlformats.org/presentationml/2006/main">
   <p:cSld>
@@ -4111,6 +5136,208 @@
       </p:grpSpPr>
       <p:sp>
         <p:nvSpPr>
+          <p:cNvPr id="2" name="正方形/長方形 1"/>
+          <p:cNvSpPr/>
+          <p:nvPr/>
+        </p:nvSpPr>
+        <p:spPr>
+          <a:xfrm>
+            <a:off x="0" y="0"/>
+            <a:ext cx="5715000" cy="9571851"/>
+          </a:xfrm>
+          <a:prstGeom prst="rect">
+            <a:avLst/>
+          </a:prstGeom>
+        </p:spPr>
+        <p:txBody>
+          <a:bodyPr wrap="square">
+            <a:spAutoFit/>
+          </a:bodyPr>
+          <a:lstStyle/>
+          <a:p>
+            <a:r>
+              <a:rPr lang="en-US" altLang="ja-JP" sz="1400" b="1" dirty="0">
+                <a:solidFill>
+                  <a:srgbClr val="FF0000"/>
+                </a:solidFill>
+              </a:rPr>
+              <a:t>What Stock Markets Are (</a:t>
+            </a:r>
+            <a:r>
+              <a:rPr lang="zh-CN" altLang="en-US" sz="1400" b="1" dirty="0">
+                <a:solidFill>
+                  <a:srgbClr val="FF0000"/>
+                </a:solidFill>
+              </a:rPr>
+              <a:t>这个解释蛮简单，但引出一个新问题，为什么把</a:t>
+            </a:r>
+            <a:r>
+              <a:rPr lang="en-US" altLang="zh-CN" sz="1400" b="1" dirty="0">
+                <a:solidFill>
+                  <a:srgbClr val="FF0000"/>
+                </a:solidFill>
+              </a:rPr>
+              <a:t>share</a:t>
+            </a:r>
+            <a:r>
+              <a:rPr lang="zh-CN" altLang="en-US" sz="1400" b="1" dirty="0">
+                <a:solidFill>
+                  <a:srgbClr val="FF0000"/>
+                </a:solidFill>
+              </a:rPr>
+              <a:t>拿出来卖？</a:t>
+            </a:r>
+            <a:r>
+              <a:rPr lang="en-US" altLang="ja-JP" sz="1400" b="1" dirty="0">
+                <a:solidFill>
+                  <a:srgbClr val="FF0000"/>
+                </a:solidFill>
+              </a:rPr>
+              <a:t>)</a:t>
+            </a:r>
+          </a:p>
+          <a:p>
+            <a:r>
+              <a:rPr lang="en-US" altLang="ja-JP" sz="1400" dirty="0"/>
+              <a:t>Before you can understand why stock markets rise and fall, you need to understand what a stock market is. A stock market is a place where people come together to buy and sell ownership shares in a company. The value of a company, or its market capitalization, is the sum of all the ownership shares it has outstanding multiplied by the price of those shares. For example, Apple, Inc. (AAPL</a:t>
+            </a:r>
+          </a:p>
+          <a:p>
+            <a:r>
+              <a:rPr lang="en-US" altLang="ja-JP" sz="1400" dirty="0"/>
+              <a:t>) has 5.13 billion shares that trade at $178 a share as of January 2018—therefore Apple is worth $913 billion. (See also: Stocks Basics Tutorial.)</a:t>
+            </a:r>
+          </a:p>
+          <a:p>
+            <a:endParaRPr lang="en-US" altLang="ja-JP" sz="1400" dirty="0"/>
+          </a:p>
+          <a:p>
+            <a:r>
+              <a:rPr lang="zh-CN" altLang="en-US" sz="1400" b="1" dirty="0">
+                <a:solidFill>
+                  <a:srgbClr val="FF0000"/>
+                </a:solidFill>
+              </a:rPr>
+              <a:t>公司的</a:t>
+            </a:r>
+            <a:r>
+              <a:rPr lang="en-US" altLang="zh-CN" sz="1400" b="1" dirty="0">
+                <a:solidFill>
+                  <a:srgbClr val="FF0000"/>
+                </a:solidFill>
+              </a:rPr>
+              <a:t>Stock price</a:t>
+            </a:r>
+            <a:r>
+              <a:rPr lang="zh-CN" altLang="en-US" sz="1400" b="1" dirty="0">
+                <a:solidFill>
+                  <a:srgbClr val="FF0000"/>
+                </a:solidFill>
+              </a:rPr>
+              <a:t>是怎么定的？</a:t>
+            </a:r>
+            <a:endParaRPr lang="en-US" altLang="ja-JP" sz="1400" b="1" dirty="0">
+              <a:solidFill>
+                <a:srgbClr val="FF0000"/>
+              </a:solidFill>
+            </a:endParaRPr>
+          </a:p>
+          <a:p>
+            <a:r>
+              <a:rPr lang="en-US" altLang="ja-JP" sz="1400" dirty="0"/>
+              <a:t>The next piece to understand is what a company’s value represents. A company has stuff and it sells stuff. The stuff it has—buildings, machinery, patents, money in the bank, etc.—constitute its book value, or the amount of money a company would get if they sold all of that stuff at once. But companies are primarily in business of trying to make a profit, and in doing so they earn cash by selling products or services. So the value of a company has to do with </a:t>
+            </a:r>
+            <a:r>
+              <a:rPr lang="en-US" altLang="ja-JP" sz="1400" b="1" dirty="0"/>
+              <a:t>the stuff it owns now and the cash flows it will receive in the future</a:t>
+            </a:r>
+            <a:r>
+              <a:rPr lang="en-US" altLang="ja-JP" sz="1400" dirty="0"/>
+              <a:t>. The value of the stuff it owns now is fairly easy to determine, but the value of all the future cash flow streams is a bit trickier to nail down—and it is this piece that is responsible for market gyrations.</a:t>
+            </a:r>
+          </a:p>
+          <a:p>
+            <a:endParaRPr lang="en-US" altLang="ja-JP" sz="1400" dirty="0"/>
+          </a:p>
+          <a:p>
+            <a:r>
+              <a:rPr lang="en-US" altLang="ja-JP" sz="1400" dirty="0"/>
+              <a:t>Cash Flows and </a:t>
+            </a:r>
+            <a:r>
+              <a:rPr lang="en-US" altLang="ja-JP" sz="1400" b="1" dirty="0">
+                <a:solidFill>
+                  <a:srgbClr val="FF0000"/>
+                </a:solidFill>
+              </a:rPr>
+              <a:t>Price-to-Earnings (P/E ratio</a:t>
+            </a:r>
+            <a:r>
+              <a:rPr lang="zh-CN" altLang="en-US" sz="1400" b="1" dirty="0">
+                <a:solidFill>
+                  <a:srgbClr val="FF0000"/>
+                </a:solidFill>
+              </a:rPr>
+              <a:t>的易懂解释</a:t>
+            </a:r>
+            <a:r>
+              <a:rPr lang="en-US" altLang="ja-JP" sz="1400" b="1" dirty="0">
+                <a:solidFill>
+                  <a:srgbClr val="FF0000"/>
+                </a:solidFill>
+              </a:rPr>
+              <a:t>)</a:t>
+            </a:r>
+          </a:p>
+          <a:p>
+            <a:r>
+              <a:rPr lang="en-US" altLang="ja-JP" sz="1400" dirty="0"/>
+              <a:t>Once an appropriate discount rate has been estimated, the hard part is to figure out what future cash flows will be—a month from now, a year from now, five years from now. Financial analysts try to figure these amounts out in a number of ways accounting for both company-specific factors and macro factors such as overall economic health. Fortunately, the stock market reflects the expectation of future cash flows in an easy to compute ratio of price to earnings, also known as the P/E ratio. A P/E ratio of 10x means that a company is being valued today at 10 times its current earnings. A P/E ratio of 20x for the same company would mean that given the same amount of earnings, the market is giving it twice as much value, indicating that those future cash flows are going to be larger.</a:t>
+            </a:r>
+          </a:p>
+          <a:p>
+            <a:endParaRPr lang="en-US" altLang="ja-JP" sz="1400" dirty="0"/>
+          </a:p>
+          <a:p>
+            <a:r>
+              <a:rPr lang="en-US" altLang="ja-JP" sz="1400" dirty="0"/>
+              <a:t>So that’s basically it: stock markets are places where people buy and sell shares of companies, and these shares are valued in large part as a multiple of current earnings that represent the net present value of future cash flows. Because the future is unknown today, various peoples’ estimates will be different from one another, giving some a higher expected stock price and some a lower stock price. If the current price is lower than the expected price, people will buy it. If it is higher, people will sell it. And this is the stock market.</a:t>
+            </a:r>
+          </a:p>
+        </p:txBody>
+      </p:sp>
+    </p:spTree>
+    <p:extLst>
+      <p:ext uri="{BB962C8B-B14F-4D97-AF65-F5344CB8AC3E}">
+        <p14:creationId xmlns:p14="http://schemas.microsoft.com/office/powerpoint/2010/main" val="601941550"/>
+      </p:ext>
+    </p:extLst>
+  </p:cSld>
+  <p:clrMapOvr>
+    <a:masterClrMapping/>
+  </p:clrMapOvr>
+</p:sld>
+</file>
+
+<file path=ppt/slides/slide4.xml><?xml version="1.0" encoding="utf-8"?>
+<p:sld xmlns:a="http://schemas.openxmlformats.org/drawingml/2006/main" xmlns:r="http://schemas.openxmlformats.org/officeDocument/2006/relationships" xmlns:p="http://schemas.openxmlformats.org/presentationml/2006/main">
+  <p:cSld>
+    <p:spTree>
+      <p:nvGrpSpPr>
+        <p:cNvPr id="1" name=""/>
+        <p:cNvGrpSpPr/>
+        <p:nvPr/>
+      </p:nvGrpSpPr>
+      <p:grpSpPr>
+        <a:xfrm>
+          <a:off x="0" y="0"/>
+          <a:ext cx="0" cy="0"/>
+          <a:chOff x="0" y="0"/>
+          <a:chExt cx="0" cy="0"/>
+        </a:xfrm>
+      </p:grpSpPr>
+      <p:sp>
+        <p:nvSpPr>
           <p:cNvPr id="2" name="テキスト ボックス 1"/>
           <p:cNvSpPr txBox="1"/>
           <p:nvPr/>
@@ -4241,7 +5468,7 @@
 </p:sld>
 </file>
 
-<file path=ppt/slides/slide4.xml><?xml version="1.0" encoding="utf-8"?>
+<file path=ppt/slides/slide5.xml><?xml version="1.0" encoding="utf-8"?>
 <p:sld xmlns:a="http://schemas.openxmlformats.org/drawingml/2006/main" xmlns:r="http://schemas.openxmlformats.org/officeDocument/2006/relationships" xmlns:p="http://schemas.openxmlformats.org/presentationml/2006/main">
   <p:cSld>
     <p:spTree>
@@ -4810,7 +6037,7 @@
 </p:sld>
 </file>
 
-<file path=ppt/slides/slide5.xml><?xml version="1.0" encoding="utf-8"?>
+<file path=ppt/slides/slide6.xml><?xml version="1.0" encoding="utf-8"?>
 <p:sld xmlns:a="http://schemas.openxmlformats.org/drawingml/2006/main" xmlns:r="http://schemas.openxmlformats.org/officeDocument/2006/relationships" xmlns:p="http://schemas.openxmlformats.org/presentationml/2006/main">
   <p:cSld>
     <p:spTree>

</xml_diff>

<commit_message>
added checklist to investing, trying to fix http.py
</commit_message>
<xml_diff>
--- a/[BeAInvestor].pptx
+++ b/[BeAInvestor].pptx
@@ -109,6 +109,22 @@
       </a:defRPr>
     </a:lvl9pPr>
   </p:defaultTextStyle>
+  <p:extLst>
+    <p:ext uri="{EFAFB233-063F-42B5-8137-9DF3F51BA10A}">
+      <p15:sldGuideLst xmlns:p15="http://schemas.microsoft.com/office/powerpoint/2012/main">
+        <p15:guide id="1" orient="horz" pos="2880">
+          <p15:clr>
+            <a:srgbClr val="A4A3A4"/>
+          </p15:clr>
+        </p15:guide>
+        <p15:guide id="2" pos="1800">
+          <p15:clr>
+            <a:srgbClr val="A4A3A4"/>
+          </p15:clr>
+        </p15:guide>
+      </p15:sldGuideLst>
+    </p:ext>
+  </p:extLst>
 </p:presentation>
 </file>
 
@@ -150,10 +166,9 @@
           <a:lstStyle/>
           <a:p>
             <a:r>
-              <a:rPr kumimoji="1" lang="ja-JP" altLang="en-US" smtClean="0"/>
+              <a:rPr kumimoji="1" lang="ja-JP" altLang="en-US"/>
               <a:t>マスタ タイトルの書式設定</a:t>
             </a:r>
-            <a:endParaRPr kumimoji="1" lang="ja-JP" altLang="en-US"/>
           </a:p>
         </p:txBody>
       </p:sp>
@@ -269,10 +284,9 @@
           </a:lstStyle>
           <a:p>
             <a:r>
-              <a:rPr kumimoji="1" lang="ja-JP" altLang="en-US" smtClean="0"/>
+              <a:rPr kumimoji="1" lang="ja-JP" altLang="en-US"/>
               <a:t>マスタ サブタイトルの書式設定</a:t>
             </a:r>
-            <a:endParaRPr kumimoji="1" lang="ja-JP" altLang="en-US"/>
           </a:p>
         </p:txBody>
       </p:sp>
@@ -293,7 +307,7 @@
           <a:p>
             <a:fld id="{E90ED720-0104-4369-84BC-D37694168613}" type="datetimeFigureOut">
               <a:rPr kumimoji="1" lang="ja-JP" altLang="en-US" smtClean="0"/>
-              <a:t>2018/7/9</a:t>
+              <a:t>2018/7/13</a:t>
             </a:fld>
             <a:endParaRPr kumimoji="1" lang="ja-JP" altLang="en-US"/>
           </a:p>
@@ -382,10 +396,9 @@
           <a:lstStyle/>
           <a:p>
             <a:r>
-              <a:rPr kumimoji="1" lang="ja-JP" altLang="en-US" smtClean="0"/>
+              <a:rPr kumimoji="1" lang="ja-JP" altLang="en-US"/>
               <a:t>マスタ タイトルの書式設定</a:t>
             </a:r>
-            <a:endParaRPr kumimoji="1" lang="ja-JP" altLang="en-US"/>
           </a:p>
         </p:txBody>
       </p:sp>
@@ -406,70 +419,69 @@
           <a:p>
             <a:pPr lvl="0"/>
             <a:r>
-              <a:rPr kumimoji="1" lang="ja-JP" altLang="en-US" smtClean="0"/>
+              <a:rPr kumimoji="1" lang="ja-JP" altLang="en-US"/>
               <a:t>マスタ テキストの書式設定</a:t>
             </a:r>
           </a:p>
           <a:p>
             <a:pPr lvl="1"/>
             <a:r>
-              <a:rPr kumimoji="1" lang="ja-JP" altLang="en-US" smtClean="0"/>
+              <a:rPr kumimoji="1" lang="ja-JP" altLang="en-US"/>
               <a:t>第 </a:t>
             </a:r>
             <a:r>
-              <a:rPr kumimoji="1" lang="en-US" altLang="ja-JP" smtClean="0"/>
+              <a:rPr kumimoji="1" lang="en-US" altLang="ja-JP"/>
               <a:t>2 </a:t>
             </a:r>
             <a:r>
-              <a:rPr kumimoji="1" lang="ja-JP" altLang="en-US" smtClean="0"/>
+              <a:rPr kumimoji="1" lang="ja-JP" altLang="en-US"/>
               <a:t>レベル</a:t>
             </a:r>
           </a:p>
           <a:p>
             <a:pPr lvl="2"/>
             <a:r>
-              <a:rPr kumimoji="1" lang="ja-JP" altLang="en-US" smtClean="0"/>
+              <a:rPr kumimoji="1" lang="ja-JP" altLang="en-US"/>
               <a:t>第 </a:t>
             </a:r>
             <a:r>
-              <a:rPr kumimoji="1" lang="en-US" altLang="ja-JP" smtClean="0"/>
+              <a:rPr kumimoji="1" lang="en-US" altLang="ja-JP"/>
               <a:t>3 </a:t>
             </a:r>
             <a:r>
-              <a:rPr kumimoji="1" lang="ja-JP" altLang="en-US" smtClean="0"/>
+              <a:rPr kumimoji="1" lang="ja-JP" altLang="en-US"/>
               <a:t>レベル</a:t>
             </a:r>
           </a:p>
           <a:p>
             <a:pPr lvl="3"/>
             <a:r>
-              <a:rPr kumimoji="1" lang="ja-JP" altLang="en-US" smtClean="0"/>
+              <a:rPr kumimoji="1" lang="ja-JP" altLang="en-US"/>
               <a:t>第 </a:t>
             </a:r>
             <a:r>
-              <a:rPr kumimoji="1" lang="en-US" altLang="ja-JP" smtClean="0"/>
+              <a:rPr kumimoji="1" lang="en-US" altLang="ja-JP"/>
               <a:t>4 </a:t>
             </a:r>
             <a:r>
-              <a:rPr kumimoji="1" lang="ja-JP" altLang="en-US" smtClean="0"/>
+              <a:rPr kumimoji="1" lang="ja-JP" altLang="en-US"/>
               <a:t>レベル</a:t>
             </a:r>
           </a:p>
           <a:p>
             <a:pPr lvl="4"/>
             <a:r>
-              <a:rPr kumimoji="1" lang="ja-JP" altLang="en-US" smtClean="0"/>
+              <a:rPr kumimoji="1" lang="ja-JP" altLang="en-US"/>
               <a:t>第 </a:t>
             </a:r>
             <a:r>
-              <a:rPr kumimoji="1" lang="en-US" altLang="ja-JP" smtClean="0"/>
+              <a:rPr kumimoji="1" lang="en-US" altLang="ja-JP"/>
               <a:t>5 </a:t>
             </a:r>
             <a:r>
-              <a:rPr kumimoji="1" lang="ja-JP" altLang="en-US" smtClean="0"/>
+              <a:rPr kumimoji="1" lang="ja-JP" altLang="en-US"/>
               <a:t>レベル</a:t>
             </a:r>
-            <a:endParaRPr kumimoji="1" lang="ja-JP" altLang="en-US"/>
           </a:p>
         </p:txBody>
       </p:sp>
@@ -490,7 +502,7 @@
           <a:p>
             <a:fld id="{E90ED720-0104-4369-84BC-D37694168613}" type="datetimeFigureOut">
               <a:rPr kumimoji="1" lang="ja-JP" altLang="en-US" smtClean="0"/>
-              <a:t>2018/7/9</a:t>
+              <a:t>2018/7/13</a:t>
             </a:fld>
             <a:endParaRPr kumimoji="1" lang="ja-JP" altLang="en-US"/>
           </a:p>
@@ -584,10 +596,9 @@
           <a:lstStyle/>
           <a:p>
             <a:r>
-              <a:rPr kumimoji="1" lang="ja-JP" altLang="en-US" smtClean="0"/>
+              <a:rPr kumimoji="1" lang="ja-JP" altLang="en-US"/>
               <a:t>マスタ タイトルの書式設定</a:t>
             </a:r>
-            <a:endParaRPr kumimoji="1" lang="ja-JP" altLang="en-US"/>
           </a:p>
         </p:txBody>
       </p:sp>
@@ -613,70 +624,69 @@
           <a:p>
             <a:pPr lvl="0"/>
             <a:r>
-              <a:rPr kumimoji="1" lang="ja-JP" altLang="en-US" smtClean="0"/>
+              <a:rPr kumimoji="1" lang="ja-JP" altLang="en-US"/>
               <a:t>マスタ テキストの書式設定</a:t>
             </a:r>
           </a:p>
           <a:p>
             <a:pPr lvl="1"/>
             <a:r>
-              <a:rPr kumimoji="1" lang="ja-JP" altLang="en-US" smtClean="0"/>
+              <a:rPr kumimoji="1" lang="ja-JP" altLang="en-US"/>
               <a:t>第 </a:t>
             </a:r>
             <a:r>
-              <a:rPr kumimoji="1" lang="en-US" altLang="ja-JP" smtClean="0"/>
+              <a:rPr kumimoji="1" lang="en-US" altLang="ja-JP"/>
               <a:t>2 </a:t>
             </a:r>
             <a:r>
-              <a:rPr kumimoji="1" lang="ja-JP" altLang="en-US" smtClean="0"/>
+              <a:rPr kumimoji="1" lang="ja-JP" altLang="en-US"/>
               <a:t>レベル</a:t>
             </a:r>
           </a:p>
           <a:p>
             <a:pPr lvl="2"/>
             <a:r>
-              <a:rPr kumimoji="1" lang="ja-JP" altLang="en-US" smtClean="0"/>
+              <a:rPr kumimoji="1" lang="ja-JP" altLang="en-US"/>
               <a:t>第 </a:t>
             </a:r>
             <a:r>
-              <a:rPr kumimoji="1" lang="en-US" altLang="ja-JP" smtClean="0"/>
+              <a:rPr kumimoji="1" lang="en-US" altLang="ja-JP"/>
               <a:t>3 </a:t>
             </a:r>
             <a:r>
-              <a:rPr kumimoji="1" lang="ja-JP" altLang="en-US" smtClean="0"/>
+              <a:rPr kumimoji="1" lang="ja-JP" altLang="en-US"/>
               <a:t>レベル</a:t>
             </a:r>
           </a:p>
           <a:p>
             <a:pPr lvl="3"/>
             <a:r>
-              <a:rPr kumimoji="1" lang="ja-JP" altLang="en-US" smtClean="0"/>
+              <a:rPr kumimoji="1" lang="ja-JP" altLang="en-US"/>
               <a:t>第 </a:t>
             </a:r>
             <a:r>
-              <a:rPr kumimoji="1" lang="en-US" altLang="ja-JP" smtClean="0"/>
+              <a:rPr kumimoji="1" lang="en-US" altLang="ja-JP"/>
               <a:t>4 </a:t>
             </a:r>
             <a:r>
-              <a:rPr kumimoji="1" lang="ja-JP" altLang="en-US" smtClean="0"/>
+              <a:rPr kumimoji="1" lang="ja-JP" altLang="en-US"/>
               <a:t>レベル</a:t>
             </a:r>
           </a:p>
           <a:p>
             <a:pPr lvl="4"/>
             <a:r>
-              <a:rPr kumimoji="1" lang="ja-JP" altLang="en-US" smtClean="0"/>
+              <a:rPr kumimoji="1" lang="ja-JP" altLang="en-US"/>
               <a:t>第 </a:t>
             </a:r>
             <a:r>
-              <a:rPr kumimoji="1" lang="en-US" altLang="ja-JP" smtClean="0"/>
+              <a:rPr kumimoji="1" lang="en-US" altLang="ja-JP"/>
               <a:t>5 </a:t>
             </a:r>
             <a:r>
-              <a:rPr kumimoji="1" lang="ja-JP" altLang="en-US" smtClean="0"/>
+              <a:rPr kumimoji="1" lang="ja-JP" altLang="en-US"/>
               <a:t>レベル</a:t>
             </a:r>
-            <a:endParaRPr kumimoji="1" lang="ja-JP" altLang="en-US"/>
           </a:p>
         </p:txBody>
       </p:sp>
@@ -697,7 +707,7 @@
           <a:p>
             <a:fld id="{E90ED720-0104-4369-84BC-D37694168613}" type="datetimeFigureOut">
               <a:rPr kumimoji="1" lang="ja-JP" altLang="en-US" smtClean="0"/>
-              <a:t>2018/7/9</a:t>
+              <a:t>2018/7/13</a:t>
             </a:fld>
             <a:endParaRPr kumimoji="1" lang="ja-JP" altLang="en-US"/>
           </a:p>
@@ -786,10 +796,9 @@
           <a:lstStyle/>
           <a:p>
             <a:r>
-              <a:rPr kumimoji="1" lang="ja-JP" altLang="en-US" smtClean="0"/>
+              <a:rPr kumimoji="1" lang="ja-JP" altLang="en-US"/>
               <a:t>マスタ タイトルの書式設定</a:t>
             </a:r>
-            <a:endParaRPr kumimoji="1" lang="ja-JP" altLang="en-US"/>
           </a:p>
         </p:txBody>
       </p:sp>
@@ -810,70 +819,69 @@
           <a:p>
             <a:pPr lvl="0"/>
             <a:r>
-              <a:rPr kumimoji="1" lang="ja-JP" altLang="en-US" smtClean="0"/>
+              <a:rPr kumimoji="1" lang="ja-JP" altLang="en-US"/>
               <a:t>マスタ テキストの書式設定</a:t>
             </a:r>
           </a:p>
           <a:p>
             <a:pPr lvl="1"/>
             <a:r>
-              <a:rPr kumimoji="1" lang="ja-JP" altLang="en-US" smtClean="0"/>
+              <a:rPr kumimoji="1" lang="ja-JP" altLang="en-US"/>
               <a:t>第 </a:t>
             </a:r>
             <a:r>
-              <a:rPr kumimoji="1" lang="en-US" altLang="ja-JP" smtClean="0"/>
+              <a:rPr kumimoji="1" lang="en-US" altLang="ja-JP"/>
               <a:t>2 </a:t>
             </a:r>
             <a:r>
-              <a:rPr kumimoji="1" lang="ja-JP" altLang="en-US" smtClean="0"/>
+              <a:rPr kumimoji="1" lang="ja-JP" altLang="en-US"/>
               <a:t>レベル</a:t>
             </a:r>
           </a:p>
           <a:p>
             <a:pPr lvl="2"/>
             <a:r>
-              <a:rPr kumimoji="1" lang="ja-JP" altLang="en-US" smtClean="0"/>
+              <a:rPr kumimoji="1" lang="ja-JP" altLang="en-US"/>
               <a:t>第 </a:t>
             </a:r>
             <a:r>
-              <a:rPr kumimoji="1" lang="en-US" altLang="ja-JP" smtClean="0"/>
+              <a:rPr kumimoji="1" lang="en-US" altLang="ja-JP"/>
               <a:t>3 </a:t>
             </a:r>
             <a:r>
-              <a:rPr kumimoji="1" lang="ja-JP" altLang="en-US" smtClean="0"/>
+              <a:rPr kumimoji="1" lang="ja-JP" altLang="en-US"/>
               <a:t>レベル</a:t>
             </a:r>
           </a:p>
           <a:p>
             <a:pPr lvl="3"/>
             <a:r>
-              <a:rPr kumimoji="1" lang="ja-JP" altLang="en-US" smtClean="0"/>
+              <a:rPr kumimoji="1" lang="ja-JP" altLang="en-US"/>
               <a:t>第 </a:t>
             </a:r>
             <a:r>
-              <a:rPr kumimoji="1" lang="en-US" altLang="ja-JP" smtClean="0"/>
+              <a:rPr kumimoji="1" lang="en-US" altLang="ja-JP"/>
               <a:t>4 </a:t>
             </a:r>
             <a:r>
-              <a:rPr kumimoji="1" lang="ja-JP" altLang="en-US" smtClean="0"/>
+              <a:rPr kumimoji="1" lang="ja-JP" altLang="en-US"/>
               <a:t>レベル</a:t>
             </a:r>
           </a:p>
           <a:p>
             <a:pPr lvl="4"/>
             <a:r>
-              <a:rPr kumimoji="1" lang="ja-JP" altLang="en-US" smtClean="0"/>
+              <a:rPr kumimoji="1" lang="ja-JP" altLang="en-US"/>
               <a:t>第 </a:t>
             </a:r>
             <a:r>
-              <a:rPr kumimoji="1" lang="en-US" altLang="ja-JP" smtClean="0"/>
+              <a:rPr kumimoji="1" lang="en-US" altLang="ja-JP"/>
               <a:t>5 </a:t>
             </a:r>
             <a:r>
-              <a:rPr kumimoji="1" lang="ja-JP" altLang="en-US" smtClean="0"/>
+              <a:rPr kumimoji="1" lang="ja-JP" altLang="en-US"/>
               <a:t>レベル</a:t>
             </a:r>
-            <a:endParaRPr kumimoji="1" lang="ja-JP" altLang="en-US"/>
           </a:p>
         </p:txBody>
       </p:sp>
@@ -894,7 +902,7 @@
           <a:p>
             <a:fld id="{E90ED720-0104-4369-84BC-D37694168613}" type="datetimeFigureOut">
               <a:rPr kumimoji="1" lang="ja-JP" altLang="en-US" smtClean="0"/>
-              <a:t>2018/7/9</a:t>
+              <a:t>2018/7/13</a:t>
             </a:fld>
             <a:endParaRPr kumimoji="1" lang="ja-JP" altLang="en-US"/>
           </a:p>
@@ -992,10 +1000,9 @@
           </a:lstStyle>
           <a:p>
             <a:r>
-              <a:rPr kumimoji="1" lang="ja-JP" altLang="en-US" smtClean="0"/>
+              <a:rPr kumimoji="1" lang="ja-JP" altLang="en-US"/>
               <a:t>マスタ タイトルの書式設定</a:t>
             </a:r>
-            <a:endParaRPr kumimoji="1" lang="ja-JP" altLang="en-US"/>
           </a:p>
         </p:txBody>
       </p:sp>
@@ -1112,7 +1119,7 @@
           <a:p>
             <a:pPr lvl="0"/>
             <a:r>
-              <a:rPr kumimoji="1" lang="ja-JP" altLang="en-US" smtClean="0"/>
+              <a:rPr kumimoji="1" lang="ja-JP" altLang="en-US"/>
               <a:t>マスタ テキストの書式設定</a:t>
             </a:r>
           </a:p>
@@ -1135,7 +1142,7 @@
           <a:p>
             <a:fld id="{E90ED720-0104-4369-84BC-D37694168613}" type="datetimeFigureOut">
               <a:rPr kumimoji="1" lang="ja-JP" altLang="en-US" smtClean="0"/>
-              <a:t>2018/7/9</a:t>
+              <a:t>2018/7/13</a:t>
             </a:fld>
             <a:endParaRPr kumimoji="1" lang="ja-JP" altLang="en-US"/>
           </a:p>
@@ -1224,10 +1231,9 @@
           <a:lstStyle/>
           <a:p>
             <a:r>
-              <a:rPr kumimoji="1" lang="ja-JP" altLang="en-US" smtClean="0"/>
+              <a:rPr kumimoji="1" lang="ja-JP" altLang="en-US"/>
               <a:t>マスタ タイトルの書式設定</a:t>
             </a:r>
-            <a:endParaRPr kumimoji="1" lang="ja-JP" altLang="en-US"/>
           </a:p>
         </p:txBody>
       </p:sp>
@@ -1281,70 +1287,69 @@
           <a:p>
             <a:pPr lvl="0"/>
             <a:r>
-              <a:rPr kumimoji="1" lang="ja-JP" altLang="en-US" smtClean="0"/>
+              <a:rPr kumimoji="1" lang="ja-JP" altLang="en-US"/>
               <a:t>マスタ テキストの書式設定</a:t>
             </a:r>
           </a:p>
           <a:p>
             <a:pPr lvl="1"/>
             <a:r>
-              <a:rPr kumimoji="1" lang="ja-JP" altLang="en-US" smtClean="0"/>
+              <a:rPr kumimoji="1" lang="ja-JP" altLang="en-US"/>
               <a:t>第 </a:t>
             </a:r>
             <a:r>
-              <a:rPr kumimoji="1" lang="en-US" altLang="ja-JP" smtClean="0"/>
+              <a:rPr kumimoji="1" lang="en-US" altLang="ja-JP"/>
               <a:t>2 </a:t>
             </a:r>
             <a:r>
-              <a:rPr kumimoji="1" lang="ja-JP" altLang="en-US" smtClean="0"/>
+              <a:rPr kumimoji="1" lang="ja-JP" altLang="en-US"/>
               <a:t>レベル</a:t>
             </a:r>
           </a:p>
           <a:p>
             <a:pPr lvl="2"/>
             <a:r>
-              <a:rPr kumimoji="1" lang="ja-JP" altLang="en-US" smtClean="0"/>
+              <a:rPr kumimoji="1" lang="ja-JP" altLang="en-US"/>
               <a:t>第 </a:t>
             </a:r>
             <a:r>
-              <a:rPr kumimoji="1" lang="en-US" altLang="ja-JP" smtClean="0"/>
+              <a:rPr kumimoji="1" lang="en-US" altLang="ja-JP"/>
               <a:t>3 </a:t>
             </a:r>
             <a:r>
-              <a:rPr kumimoji="1" lang="ja-JP" altLang="en-US" smtClean="0"/>
+              <a:rPr kumimoji="1" lang="ja-JP" altLang="en-US"/>
               <a:t>レベル</a:t>
             </a:r>
           </a:p>
           <a:p>
             <a:pPr lvl="3"/>
             <a:r>
-              <a:rPr kumimoji="1" lang="ja-JP" altLang="en-US" smtClean="0"/>
+              <a:rPr kumimoji="1" lang="ja-JP" altLang="en-US"/>
               <a:t>第 </a:t>
             </a:r>
             <a:r>
-              <a:rPr kumimoji="1" lang="en-US" altLang="ja-JP" smtClean="0"/>
+              <a:rPr kumimoji="1" lang="en-US" altLang="ja-JP"/>
               <a:t>4 </a:t>
             </a:r>
             <a:r>
-              <a:rPr kumimoji="1" lang="ja-JP" altLang="en-US" smtClean="0"/>
+              <a:rPr kumimoji="1" lang="ja-JP" altLang="en-US"/>
               <a:t>レベル</a:t>
             </a:r>
           </a:p>
           <a:p>
             <a:pPr lvl="4"/>
             <a:r>
-              <a:rPr kumimoji="1" lang="ja-JP" altLang="en-US" smtClean="0"/>
+              <a:rPr kumimoji="1" lang="ja-JP" altLang="en-US"/>
               <a:t>第 </a:t>
             </a:r>
             <a:r>
-              <a:rPr kumimoji="1" lang="en-US" altLang="ja-JP" smtClean="0"/>
+              <a:rPr kumimoji="1" lang="en-US" altLang="ja-JP"/>
               <a:t>5 </a:t>
             </a:r>
             <a:r>
-              <a:rPr kumimoji="1" lang="ja-JP" altLang="en-US" smtClean="0"/>
+              <a:rPr kumimoji="1" lang="ja-JP" altLang="en-US"/>
               <a:t>レベル</a:t>
             </a:r>
-            <a:endParaRPr kumimoji="1" lang="ja-JP" altLang="en-US"/>
           </a:p>
         </p:txBody>
       </p:sp>
@@ -1398,70 +1403,69 @@
           <a:p>
             <a:pPr lvl="0"/>
             <a:r>
-              <a:rPr kumimoji="1" lang="ja-JP" altLang="en-US" smtClean="0"/>
+              <a:rPr kumimoji="1" lang="ja-JP" altLang="en-US"/>
               <a:t>マスタ テキストの書式設定</a:t>
             </a:r>
           </a:p>
           <a:p>
             <a:pPr lvl="1"/>
             <a:r>
-              <a:rPr kumimoji="1" lang="ja-JP" altLang="en-US" smtClean="0"/>
+              <a:rPr kumimoji="1" lang="ja-JP" altLang="en-US"/>
               <a:t>第 </a:t>
             </a:r>
             <a:r>
-              <a:rPr kumimoji="1" lang="en-US" altLang="ja-JP" smtClean="0"/>
+              <a:rPr kumimoji="1" lang="en-US" altLang="ja-JP"/>
               <a:t>2 </a:t>
             </a:r>
             <a:r>
-              <a:rPr kumimoji="1" lang="ja-JP" altLang="en-US" smtClean="0"/>
+              <a:rPr kumimoji="1" lang="ja-JP" altLang="en-US"/>
               <a:t>レベル</a:t>
             </a:r>
           </a:p>
           <a:p>
             <a:pPr lvl="2"/>
             <a:r>
-              <a:rPr kumimoji="1" lang="ja-JP" altLang="en-US" smtClean="0"/>
+              <a:rPr kumimoji="1" lang="ja-JP" altLang="en-US"/>
               <a:t>第 </a:t>
             </a:r>
             <a:r>
-              <a:rPr kumimoji="1" lang="en-US" altLang="ja-JP" smtClean="0"/>
+              <a:rPr kumimoji="1" lang="en-US" altLang="ja-JP"/>
               <a:t>3 </a:t>
             </a:r>
             <a:r>
-              <a:rPr kumimoji="1" lang="ja-JP" altLang="en-US" smtClean="0"/>
+              <a:rPr kumimoji="1" lang="ja-JP" altLang="en-US"/>
               <a:t>レベル</a:t>
             </a:r>
           </a:p>
           <a:p>
             <a:pPr lvl="3"/>
             <a:r>
-              <a:rPr kumimoji="1" lang="ja-JP" altLang="en-US" smtClean="0"/>
+              <a:rPr kumimoji="1" lang="ja-JP" altLang="en-US"/>
               <a:t>第 </a:t>
             </a:r>
             <a:r>
-              <a:rPr kumimoji="1" lang="en-US" altLang="ja-JP" smtClean="0"/>
+              <a:rPr kumimoji="1" lang="en-US" altLang="ja-JP"/>
               <a:t>4 </a:t>
             </a:r>
             <a:r>
-              <a:rPr kumimoji="1" lang="ja-JP" altLang="en-US" smtClean="0"/>
+              <a:rPr kumimoji="1" lang="ja-JP" altLang="en-US"/>
               <a:t>レベル</a:t>
             </a:r>
           </a:p>
           <a:p>
             <a:pPr lvl="4"/>
             <a:r>
-              <a:rPr kumimoji="1" lang="ja-JP" altLang="en-US" smtClean="0"/>
+              <a:rPr kumimoji="1" lang="ja-JP" altLang="en-US"/>
               <a:t>第 </a:t>
             </a:r>
             <a:r>
-              <a:rPr kumimoji="1" lang="en-US" altLang="ja-JP" smtClean="0"/>
+              <a:rPr kumimoji="1" lang="en-US" altLang="ja-JP"/>
               <a:t>5 </a:t>
             </a:r>
             <a:r>
-              <a:rPr kumimoji="1" lang="ja-JP" altLang="en-US" smtClean="0"/>
+              <a:rPr kumimoji="1" lang="ja-JP" altLang="en-US"/>
               <a:t>レベル</a:t>
             </a:r>
-            <a:endParaRPr kumimoji="1" lang="ja-JP" altLang="en-US"/>
           </a:p>
         </p:txBody>
       </p:sp>
@@ -1482,7 +1486,7 @@
           <a:p>
             <a:fld id="{E90ED720-0104-4369-84BC-D37694168613}" type="datetimeFigureOut">
               <a:rPr kumimoji="1" lang="ja-JP" altLang="en-US" smtClean="0"/>
-              <a:t>2018/7/9</a:t>
+              <a:t>2018/7/13</a:t>
             </a:fld>
             <a:endParaRPr kumimoji="1" lang="ja-JP" altLang="en-US"/>
           </a:p>
@@ -1575,10 +1579,9 @@
           </a:lstStyle>
           <a:p>
             <a:r>
-              <a:rPr kumimoji="1" lang="ja-JP" altLang="en-US" smtClean="0"/>
+              <a:rPr kumimoji="1" lang="ja-JP" altLang="en-US"/>
               <a:t>マスタ タイトルの書式設定</a:t>
             </a:r>
-            <a:endParaRPr kumimoji="1" lang="ja-JP" altLang="en-US"/>
           </a:p>
         </p:txBody>
       </p:sp>
@@ -1641,7 +1644,7 @@
           <a:p>
             <a:pPr lvl="0"/>
             <a:r>
-              <a:rPr kumimoji="1" lang="ja-JP" altLang="en-US" smtClean="0"/>
+              <a:rPr kumimoji="1" lang="ja-JP" altLang="en-US"/>
               <a:t>マスタ テキストの書式設定</a:t>
             </a:r>
           </a:p>
@@ -1697,70 +1700,69 @@
           <a:p>
             <a:pPr lvl="0"/>
             <a:r>
-              <a:rPr kumimoji="1" lang="ja-JP" altLang="en-US" smtClean="0"/>
+              <a:rPr kumimoji="1" lang="ja-JP" altLang="en-US"/>
               <a:t>マスタ テキストの書式設定</a:t>
             </a:r>
           </a:p>
           <a:p>
             <a:pPr lvl="1"/>
             <a:r>
-              <a:rPr kumimoji="1" lang="ja-JP" altLang="en-US" smtClean="0"/>
+              <a:rPr kumimoji="1" lang="ja-JP" altLang="en-US"/>
               <a:t>第 </a:t>
             </a:r>
             <a:r>
-              <a:rPr kumimoji="1" lang="en-US" altLang="ja-JP" smtClean="0"/>
+              <a:rPr kumimoji="1" lang="en-US" altLang="ja-JP"/>
               <a:t>2 </a:t>
             </a:r>
             <a:r>
-              <a:rPr kumimoji="1" lang="ja-JP" altLang="en-US" smtClean="0"/>
+              <a:rPr kumimoji="1" lang="ja-JP" altLang="en-US"/>
               <a:t>レベル</a:t>
             </a:r>
           </a:p>
           <a:p>
             <a:pPr lvl="2"/>
             <a:r>
-              <a:rPr kumimoji="1" lang="ja-JP" altLang="en-US" smtClean="0"/>
+              <a:rPr kumimoji="1" lang="ja-JP" altLang="en-US"/>
               <a:t>第 </a:t>
             </a:r>
             <a:r>
-              <a:rPr kumimoji="1" lang="en-US" altLang="ja-JP" smtClean="0"/>
+              <a:rPr kumimoji="1" lang="en-US" altLang="ja-JP"/>
               <a:t>3 </a:t>
             </a:r>
             <a:r>
-              <a:rPr kumimoji="1" lang="ja-JP" altLang="en-US" smtClean="0"/>
+              <a:rPr kumimoji="1" lang="ja-JP" altLang="en-US"/>
               <a:t>レベル</a:t>
             </a:r>
           </a:p>
           <a:p>
             <a:pPr lvl="3"/>
             <a:r>
-              <a:rPr kumimoji="1" lang="ja-JP" altLang="en-US" smtClean="0"/>
+              <a:rPr kumimoji="1" lang="ja-JP" altLang="en-US"/>
               <a:t>第 </a:t>
             </a:r>
             <a:r>
-              <a:rPr kumimoji="1" lang="en-US" altLang="ja-JP" smtClean="0"/>
+              <a:rPr kumimoji="1" lang="en-US" altLang="ja-JP"/>
               <a:t>4 </a:t>
             </a:r>
             <a:r>
-              <a:rPr kumimoji="1" lang="ja-JP" altLang="en-US" smtClean="0"/>
+              <a:rPr kumimoji="1" lang="ja-JP" altLang="en-US"/>
               <a:t>レベル</a:t>
             </a:r>
           </a:p>
           <a:p>
             <a:pPr lvl="4"/>
             <a:r>
-              <a:rPr kumimoji="1" lang="ja-JP" altLang="en-US" smtClean="0"/>
+              <a:rPr kumimoji="1" lang="ja-JP" altLang="en-US"/>
               <a:t>第 </a:t>
             </a:r>
             <a:r>
-              <a:rPr kumimoji="1" lang="en-US" altLang="ja-JP" smtClean="0"/>
+              <a:rPr kumimoji="1" lang="en-US" altLang="ja-JP"/>
               <a:t>5 </a:t>
             </a:r>
             <a:r>
-              <a:rPr kumimoji="1" lang="ja-JP" altLang="en-US" smtClean="0"/>
+              <a:rPr kumimoji="1" lang="ja-JP" altLang="en-US"/>
               <a:t>レベル</a:t>
             </a:r>
-            <a:endParaRPr kumimoji="1" lang="ja-JP" altLang="en-US"/>
           </a:p>
         </p:txBody>
       </p:sp>
@@ -1823,7 +1825,7 @@
           <a:p>
             <a:pPr lvl="0"/>
             <a:r>
-              <a:rPr kumimoji="1" lang="ja-JP" altLang="en-US" smtClean="0"/>
+              <a:rPr kumimoji="1" lang="ja-JP" altLang="en-US"/>
               <a:t>マスタ テキストの書式設定</a:t>
             </a:r>
           </a:p>
@@ -1879,70 +1881,69 @@
           <a:p>
             <a:pPr lvl="0"/>
             <a:r>
-              <a:rPr kumimoji="1" lang="ja-JP" altLang="en-US" smtClean="0"/>
+              <a:rPr kumimoji="1" lang="ja-JP" altLang="en-US"/>
               <a:t>マスタ テキストの書式設定</a:t>
             </a:r>
           </a:p>
           <a:p>
             <a:pPr lvl="1"/>
             <a:r>
-              <a:rPr kumimoji="1" lang="ja-JP" altLang="en-US" smtClean="0"/>
+              <a:rPr kumimoji="1" lang="ja-JP" altLang="en-US"/>
               <a:t>第 </a:t>
             </a:r>
             <a:r>
-              <a:rPr kumimoji="1" lang="en-US" altLang="ja-JP" smtClean="0"/>
+              <a:rPr kumimoji="1" lang="en-US" altLang="ja-JP"/>
               <a:t>2 </a:t>
             </a:r>
             <a:r>
-              <a:rPr kumimoji="1" lang="ja-JP" altLang="en-US" smtClean="0"/>
+              <a:rPr kumimoji="1" lang="ja-JP" altLang="en-US"/>
               <a:t>レベル</a:t>
             </a:r>
           </a:p>
           <a:p>
             <a:pPr lvl="2"/>
             <a:r>
-              <a:rPr kumimoji="1" lang="ja-JP" altLang="en-US" smtClean="0"/>
+              <a:rPr kumimoji="1" lang="ja-JP" altLang="en-US"/>
               <a:t>第 </a:t>
             </a:r>
             <a:r>
-              <a:rPr kumimoji="1" lang="en-US" altLang="ja-JP" smtClean="0"/>
+              <a:rPr kumimoji="1" lang="en-US" altLang="ja-JP"/>
               <a:t>3 </a:t>
             </a:r>
             <a:r>
-              <a:rPr kumimoji="1" lang="ja-JP" altLang="en-US" smtClean="0"/>
+              <a:rPr kumimoji="1" lang="ja-JP" altLang="en-US"/>
               <a:t>レベル</a:t>
             </a:r>
           </a:p>
           <a:p>
             <a:pPr lvl="3"/>
             <a:r>
-              <a:rPr kumimoji="1" lang="ja-JP" altLang="en-US" smtClean="0"/>
+              <a:rPr kumimoji="1" lang="ja-JP" altLang="en-US"/>
               <a:t>第 </a:t>
             </a:r>
             <a:r>
-              <a:rPr kumimoji="1" lang="en-US" altLang="ja-JP" smtClean="0"/>
+              <a:rPr kumimoji="1" lang="en-US" altLang="ja-JP"/>
               <a:t>4 </a:t>
             </a:r>
             <a:r>
-              <a:rPr kumimoji="1" lang="ja-JP" altLang="en-US" smtClean="0"/>
+              <a:rPr kumimoji="1" lang="ja-JP" altLang="en-US"/>
               <a:t>レベル</a:t>
             </a:r>
           </a:p>
           <a:p>
             <a:pPr lvl="4"/>
             <a:r>
-              <a:rPr kumimoji="1" lang="ja-JP" altLang="en-US" smtClean="0"/>
+              <a:rPr kumimoji="1" lang="ja-JP" altLang="en-US"/>
               <a:t>第 </a:t>
             </a:r>
             <a:r>
-              <a:rPr kumimoji="1" lang="en-US" altLang="ja-JP" smtClean="0"/>
+              <a:rPr kumimoji="1" lang="en-US" altLang="ja-JP"/>
               <a:t>5 </a:t>
             </a:r>
             <a:r>
-              <a:rPr kumimoji="1" lang="ja-JP" altLang="en-US" smtClean="0"/>
+              <a:rPr kumimoji="1" lang="ja-JP" altLang="en-US"/>
               <a:t>レベル</a:t>
             </a:r>
-            <a:endParaRPr kumimoji="1" lang="ja-JP" altLang="en-US"/>
           </a:p>
         </p:txBody>
       </p:sp>
@@ -1963,7 +1964,7 @@
           <a:p>
             <a:fld id="{E90ED720-0104-4369-84BC-D37694168613}" type="datetimeFigureOut">
               <a:rPr kumimoji="1" lang="ja-JP" altLang="en-US" smtClean="0"/>
-              <a:t>2018/7/9</a:t>
+              <a:t>2018/7/13</a:t>
             </a:fld>
             <a:endParaRPr kumimoji="1" lang="ja-JP" altLang="en-US"/>
           </a:p>
@@ -2052,10 +2053,9 @@
           <a:lstStyle/>
           <a:p>
             <a:r>
-              <a:rPr kumimoji="1" lang="ja-JP" altLang="en-US" smtClean="0"/>
+              <a:rPr kumimoji="1" lang="ja-JP" altLang="en-US"/>
               <a:t>マスタ タイトルの書式設定</a:t>
             </a:r>
-            <a:endParaRPr kumimoji="1" lang="ja-JP" altLang="en-US"/>
           </a:p>
         </p:txBody>
       </p:sp>
@@ -2076,7 +2076,7 @@
           <a:p>
             <a:fld id="{E90ED720-0104-4369-84BC-D37694168613}" type="datetimeFigureOut">
               <a:rPr kumimoji="1" lang="ja-JP" altLang="en-US" smtClean="0"/>
-              <a:t>2018/7/9</a:t>
+              <a:t>2018/7/13</a:t>
             </a:fld>
             <a:endParaRPr kumimoji="1" lang="ja-JP" altLang="en-US"/>
           </a:p>
@@ -2166,7 +2166,7 @@
           <a:p>
             <a:fld id="{E90ED720-0104-4369-84BC-D37694168613}" type="datetimeFigureOut">
               <a:rPr kumimoji="1" lang="ja-JP" altLang="en-US" smtClean="0"/>
-              <a:t>2018/7/9</a:t>
+              <a:t>2018/7/13</a:t>
             </a:fld>
             <a:endParaRPr kumimoji="1" lang="ja-JP" altLang="en-US"/>
           </a:p>
@@ -2264,10 +2264,9 @@
           </a:lstStyle>
           <a:p>
             <a:r>
-              <a:rPr kumimoji="1" lang="ja-JP" altLang="en-US" smtClean="0"/>
+              <a:rPr kumimoji="1" lang="ja-JP" altLang="en-US"/>
               <a:t>マスタ タイトルの書式設定</a:t>
             </a:r>
-            <a:endParaRPr kumimoji="1" lang="ja-JP" altLang="en-US"/>
           </a:p>
         </p:txBody>
       </p:sp>
@@ -2321,70 +2320,69 @@
           <a:p>
             <a:pPr lvl="0"/>
             <a:r>
-              <a:rPr kumimoji="1" lang="ja-JP" altLang="en-US" smtClean="0"/>
+              <a:rPr kumimoji="1" lang="ja-JP" altLang="en-US"/>
               <a:t>マスタ テキストの書式設定</a:t>
             </a:r>
           </a:p>
           <a:p>
             <a:pPr lvl="1"/>
             <a:r>
-              <a:rPr kumimoji="1" lang="ja-JP" altLang="en-US" smtClean="0"/>
+              <a:rPr kumimoji="1" lang="ja-JP" altLang="en-US"/>
               <a:t>第 </a:t>
             </a:r>
             <a:r>
-              <a:rPr kumimoji="1" lang="en-US" altLang="ja-JP" smtClean="0"/>
+              <a:rPr kumimoji="1" lang="en-US" altLang="ja-JP"/>
               <a:t>2 </a:t>
             </a:r>
             <a:r>
-              <a:rPr kumimoji="1" lang="ja-JP" altLang="en-US" smtClean="0"/>
+              <a:rPr kumimoji="1" lang="ja-JP" altLang="en-US"/>
               <a:t>レベル</a:t>
             </a:r>
           </a:p>
           <a:p>
             <a:pPr lvl="2"/>
             <a:r>
-              <a:rPr kumimoji="1" lang="ja-JP" altLang="en-US" smtClean="0"/>
+              <a:rPr kumimoji="1" lang="ja-JP" altLang="en-US"/>
               <a:t>第 </a:t>
             </a:r>
             <a:r>
-              <a:rPr kumimoji="1" lang="en-US" altLang="ja-JP" smtClean="0"/>
+              <a:rPr kumimoji="1" lang="en-US" altLang="ja-JP"/>
               <a:t>3 </a:t>
             </a:r>
             <a:r>
-              <a:rPr kumimoji="1" lang="ja-JP" altLang="en-US" smtClean="0"/>
+              <a:rPr kumimoji="1" lang="ja-JP" altLang="en-US"/>
               <a:t>レベル</a:t>
             </a:r>
           </a:p>
           <a:p>
             <a:pPr lvl="3"/>
             <a:r>
-              <a:rPr kumimoji="1" lang="ja-JP" altLang="en-US" smtClean="0"/>
+              <a:rPr kumimoji="1" lang="ja-JP" altLang="en-US"/>
               <a:t>第 </a:t>
             </a:r>
             <a:r>
-              <a:rPr kumimoji="1" lang="en-US" altLang="ja-JP" smtClean="0"/>
+              <a:rPr kumimoji="1" lang="en-US" altLang="ja-JP"/>
               <a:t>4 </a:t>
             </a:r>
             <a:r>
-              <a:rPr kumimoji="1" lang="ja-JP" altLang="en-US" smtClean="0"/>
+              <a:rPr kumimoji="1" lang="ja-JP" altLang="en-US"/>
               <a:t>レベル</a:t>
             </a:r>
           </a:p>
           <a:p>
             <a:pPr lvl="4"/>
             <a:r>
-              <a:rPr kumimoji="1" lang="ja-JP" altLang="en-US" smtClean="0"/>
+              <a:rPr kumimoji="1" lang="ja-JP" altLang="en-US"/>
               <a:t>第 </a:t>
             </a:r>
             <a:r>
-              <a:rPr kumimoji="1" lang="en-US" altLang="ja-JP" smtClean="0"/>
+              <a:rPr kumimoji="1" lang="en-US" altLang="ja-JP"/>
               <a:t>5 </a:t>
             </a:r>
             <a:r>
-              <a:rPr kumimoji="1" lang="ja-JP" altLang="en-US" smtClean="0"/>
+              <a:rPr kumimoji="1" lang="ja-JP" altLang="en-US"/>
               <a:t>レベル</a:t>
             </a:r>
-            <a:endParaRPr kumimoji="1" lang="ja-JP" altLang="en-US"/>
           </a:p>
         </p:txBody>
       </p:sp>
@@ -2447,7 +2445,7 @@
           <a:p>
             <a:pPr lvl="0"/>
             <a:r>
-              <a:rPr kumimoji="1" lang="ja-JP" altLang="en-US" smtClean="0"/>
+              <a:rPr kumimoji="1" lang="ja-JP" altLang="en-US"/>
               <a:t>マスタ テキストの書式設定</a:t>
             </a:r>
           </a:p>
@@ -2470,7 +2468,7 @@
           <a:p>
             <a:fld id="{E90ED720-0104-4369-84BC-D37694168613}" type="datetimeFigureOut">
               <a:rPr kumimoji="1" lang="ja-JP" altLang="en-US" smtClean="0"/>
-              <a:t>2018/7/9</a:t>
+              <a:t>2018/7/13</a:t>
             </a:fld>
             <a:endParaRPr kumimoji="1" lang="ja-JP" altLang="en-US"/>
           </a:p>
@@ -2568,10 +2566,9 @@
           </a:lstStyle>
           <a:p>
             <a:r>
-              <a:rPr kumimoji="1" lang="ja-JP" altLang="en-US" smtClean="0"/>
+              <a:rPr kumimoji="1" lang="ja-JP" altLang="en-US"/>
               <a:t>マスタ タイトルの書式設定</a:t>
             </a:r>
-            <a:endParaRPr kumimoji="1" lang="ja-JP" altLang="en-US"/>
           </a:p>
         </p:txBody>
       </p:sp>
@@ -2695,7 +2692,7 @@
           <a:p>
             <a:pPr lvl="0"/>
             <a:r>
-              <a:rPr kumimoji="1" lang="ja-JP" altLang="en-US" smtClean="0"/>
+              <a:rPr kumimoji="1" lang="ja-JP" altLang="en-US"/>
               <a:t>マスタ テキストの書式設定</a:t>
             </a:r>
           </a:p>
@@ -2718,7 +2715,7 @@
           <a:p>
             <a:fld id="{E90ED720-0104-4369-84BC-D37694168613}" type="datetimeFigureOut">
               <a:rPr kumimoji="1" lang="ja-JP" altLang="en-US" smtClean="0"/>
-              <a:t>2018/7/9</a:t>
+              <a:t>2018/7/13</a:t>
             </a:fld>
             <a:endParaRPr kumimoji="1" lang="ja-JP" altLang="en-US"/>
           </a:p>
@@ -2822,10 +2819,9 @@
           <a:lstStyle/>
           <a:p>
             <a:r>
-              <a:rPr kumimoji="1" lang="ja-JP" altLang="en-US" smtClean="0"/>
+              <a:rPr kumimoji="1" lang="ja-JP" altLang="en-US"/>
               <a:t>マスタ タイトルの書式設定</a:t>
             </a:r>
-            <a:endParaRPr kumimoji="1" lang="ja-JP" altLang="en-US"/>
           </a:p>
         </p:txBody>
       </p:sp>
@@ -2856,70 +2852,69 @@
           <a:p>
             <a:pPr lvl="0"/>
             <a:r>
-              <a:rPr kumimoji="1" lang="ja-JP" altLang="en-US" smtClean="0"/>
+              <a:rPr kumimoji="1" lang="ja-JP" altLang="en-US"/>
               <a:t>マスタ テキストの書式設定</a:t>
             </a:r>
           </a:p>
           <a:p>
             <a:pPr lvl="1"/>
             <a:r>
-              <a:rPr kumimoji="1" lang="ja-JP" altLang="en-US" smtClean="0"/>
+              <a:rPr kumimoji="1" lang="ja-JP" altLang="en-US"/>
               <a:t>第 </a:t>
             </a:r>
             <a:r>
-              <a:rPr kumimoji="1" lang="en-US" altLang="ja-JP" smtClean="0"/>
+              <a:rPr kumimoji="1" lang="en-US" altLang="ja-JP"/>
               <a:t>2 </a:t>
             </a:r>
             <a:r>
-              <a:rPr kumimoji="1" lang="ja-JP" altLang="en-US" smtClean="0"/>
+              <a:rPr kumimoji="1" lang="ja-JP" altLang="en-US"/>
               <a:t>レベル</a:t>
             </a:r>
           </a:p>
           <a:p>
             <a:pPr lvl="2"/>
             <a:r>
-              <a:rPr kumimoji="1" lang="ja-JP" altLang="en-US" smtClean="0"/>
+              <a:rPr kumimoji="1" lang="ja-JP" altLang="en-US"/>
               <a:t>第 </a:t>
             </a:r>
             <a:r>
-              <a:rPr kumimoji="1" lang="en-US" altLang="ja-JP" smtClean="0"/>
+              <a:rPr kumimoji="1" lang="en-US" altLang="ja-JP"/>
               <a:t>3 </a:t>
             </a:r>
             <a:r>
-              <a:rPr kumimoji="1" lang="ja-JP" altLang="en-US" smtClean="0"/>
+              <a:rPr kumimoji="1" lang="ja-JP" altLang="en-US"/>
               <a:t>レベル</a:t>
             </a:r>
           </a:p>
           <a:p>
             <a:pPr lvl="3"/>
             <a:r>
-              <a:rPr kumimoji="1" lang="ja-JP" altLang="en-US" smtClean="0"/>
+              <a:rPr kumimoji="1" lang="ja-JP" altLang="en-US"/>
               <a:t>第 </a:t>
             </a:r>
             <a:r>
-              <a:rPr kumimoji="1" lang="en-US" altLang="ja-JP" smtClean="0"/>
+              <a:rPr kumimoji="1" lang="en-US" altLang="ja-JP"/>
               <a:t>4 </a:t>
             </a:r>
             <a:r>
-              <a:rPr kumimoji="1" lang="ja-JP" altLang="en-US" smtClean="0"/>
+              <a:rPr kumimoji="1" lang="ja-JP" altLang="en-US"/>
               <a:t>レベル</a:t>
             </a:r>
           </a:p>
           <a:p>
             <a:pPr lvl="4"/>
             <a:r>
-              <a:rPr kumimoji="1" lang="ja-JP" altLang="en-US" smtClean="0"/>
+              <a:rPr kumimoji="1" lang="ja-JP" altLang="en-US"/>
               <a:t>第 </a:t>
             </a:r>
             <a:r>
-              <a:rPr kumimoji="1" lang="en-US" altLang="ja-JP" smtClean="0"/>
+              <a:rPr kumimoji="1" lang="en-US" altLang="ja-JP"/>
               <a:t>5 </a:t>
             </a:r>
             <a:r>
-              <a:rPr kumimoji="1" lang="ja-JP" altLang="en-US" smtClean="0"/>
+              <a:rPr kumimoji="1" lang="ja-JP" altLang="en-US"/>
               <a:t>レベル</a:t>
             </a:r>
-            <a:endParaRPr kumimoji="1" lang="ja-JP" altLang="en-US"/>
           </a:p>
         </p:txBody>
       </p:sp>
@@ -2958,7 +2953,7 @@
           <a:p>
             <a:fld id="{E90ED720-0104-4369-84BC-D37694168613}" type="datetimeFigureOut">
               <a:rPr kumimoji="1" lang="ja-JP" altLang="en-US" smtClean="0"/>
-              <a:t>2018/7/9</a:t>
+              <a:t>2018/7/13</a:t>
             </a:fld>
             <a:endParaRPr kumimoji="1" lang="ja-JP" altLang="en-US"/>
           </a:p>
@@ -3337,7 +3332,7 @@
         <p:spPr>
           <a:xfrm>
             <a:off x="1" y="0"/>
-            <a:ext cx="5715000" cy="6555641"/>
+            <a:ext cx="5715000" cy="8402300"/>
           </a:xfrm>
           <a:prstGeom prst="rect">
             <a:avLst/>
@@ -3351,13 +3346,13 @@
           <a:lstStyle/>
           <a:p>
             <a:r>
-              <a:rPr kumimoji="1" lang="en-US" altLang="ja-JP" sz="1200" dirty="0" smtClean="0">
+              <a:rPr kumimoji="1" lang="en-US" altLang="ja-JP" sz="1200" dirty="0">
                 <a:latin typeface="+mj-lt"/>
               </a:rPr>
               <a:t>My </a:t>
             </a:r>
             <a:r>
-              <a:rPr kumimoji="1" lang="en-US" altLang="ja-JP" sz="1200" b="1" dirty="0" smtClean="0">
+              <a:rPr kumimoji="1" lang="en-US" altLang="ja-JP" sz="1200" b="1" dirty="0">
                 <a:solidFill>
                   <a:srgbClr val="FF0000"/>
                 </a:solidFill>
@@ -3366,7 +3361,7 @@
               <a:t>checklist</a:t>
             </a:r>
             <a:r>
-              <a:rPr kumimoji="1" lang="en-US" altLang="ja-JP" sz="1200" dirty="0" smtClean="0">
+              <a:rPr kumimoji="1" lang="en-US" altLang="ja-JP" sz="1200" dirty="0">
                 <a:solidFill>
                   <a:srgbClr val="FF0000"/>
                 </a:solidFill>
@@ -3375,7 +3370,7 @@
               <a:t> </a:t>
             </a:r>
             <a:r>
-              <a:rPr kumimoji="1" lang="en-US" altLang="ja-JP" sz="1200" dirty="0" smtClean="0">
+              <a:rPr kumimoji="1" lang="en-US" altLang="ja-JP" sz="1200" dirty="0">
                 <a:latin typeface="+mj-lt"/>
               </a:rPr>
               <a:t>before investing in stock market.</a:t>
@@ -3383,49 +3378,49 @@
           </a:p>
           <a:p>
             <a:r>
-              <a:rPr lang="zh-CN" altLang="en-US" sz="1200" dirty="0" smtClean="0">
+              <a:rPr lang="zh-CN" altLang="en-US" sz="1200" dirty="0">
                 <a:latin typeface="+mj-lt"/>
               </a:rPr>
               <a:t>以下是一些著名</a:t>
             </a:r>
             <a:r>
-              <a:rPr lang="en-US" altLang="zh-CN" sz="1200" dirty="0" smtClean="0">
+              <a:rPr lang="en-US" altLang="zh-CN" sz="1200" dirty="0">
                 <a:latin typeface="+mj-lt"/>
               </a:rPr>
               <a:t>investor</a:t>
             </a:r>
             <a:r>
-              <a:rPr lang="zh-CN" altLang="en-US" sz="1200" dirty="0" smtClean="0">
+              <a:rPr lang="zh-CN" altLang="en-US" sz="1200" dirty="0">
                 <a:latin typeface="+mj-lt"/>
               </a:rPr>
               <a:t>的投资</a:t>
             </a:r>
             <a:r>
-              <a:rPr lang="en-US" altLang="zh-CN" sz="1200" dirty="0" smtClean="0">
+              <a:rPr lang="en-US" altLang="zh-CN" sz="1200" dirty="0">
                 <a:latin typeface="+mj-lt"/>
               </a:rPr>
               <a:t>checklists</a:t>
             </a:r>
             <a:r>
-              <a:rPr lang="zh-CN" altLang="en-US" sz="1200" dirty="0" smtClean="0">
+              <a:rPr lang="zh-CN" altLang="en-US" sz="1200" dirty="0">
                 <a:latin typeface="+mj-lt"/>
               </a:rPr>
               <a:t>，我应该参考这些然后</a:t>
             </a:r>
             <a:r>
-              <a:rPr lang="en-US" altLang="zh-CN" sz="1200" dirty="0" smtClean="0">
+              <a:rPr lang="en-US" altLang="zh-CN" sz="1200" dirty="0">
                 <a:latin typeface="+mj-lt"/>
               </a:rPr>
               <a:t>work out</a:t>
             </a:r>
             <a:r>
-              <a:rPr lang="zh-CN" altLang="en-US" sz="1200" dirty="0" smtClean="0">
+              <a:rPr lang="zh-CN" altLang="en-US" sz="1200" dirty="0">
                 <a:latin typeface="+mj-lt"/>
               </a:rPr>
               <a:t>我自己的</a:t>
             </a:r>
             <a:r>
-              <a:rPr lang="en-US" altLang="zh-CN" sz="1200" dirty="0" smtClean="0">
+              <a:rPr lang="en-US" altLang="zh-CN" sz="1200" dirty="0">
                 <a:latin typeface="+mj-lt"/>
               </a:rPr>
               <a:t>list</a:t>
@@ -3433,19 +3428,19 @@
           </a:p>
           <a:p>
             <a:r>
-              <a:rPr lang="en-US" altLang="zh-CN" sz="1200" dirty="0" smtClean="0">
+              <a:rPr lang="en-US" altLang="zh-CN" sz="1200" dirty="0">
                 <a:latin typeface="+mj-lt"/>
               </a:rPr>
               <a:t>(</a:t>
             </a:r>
             <a:r>
-              <a:rPr lang="zh-CN" altLang="en-US" sz="1200" dirty="0" smtClean="0">
+              <a:rPr lang="zh-CN" altLang="en-US" sz="1200" dirty="0">
                 <a:latin typeface="+mj-lt"/>
               </a:rPr>
               <a:t>以下是</a:t>
             </a:r>
             <a:r>
-              <a:rPr lang="en-US" altLang="zh-CN" sz="1200" b="1" dirty="0" smtClean="0">
+              <a:rPr lang="en-US" altLang="zh-CN" sz="1200" b="1" dirty="0">
                 <a:solidFill>
                   <a:srgbClr val="FF0000"/>
                 </a:solidFill>
@@ -3454,19 +3449,19 @@
               <a:t>Philip Fisher</a:t>
             </a:r>
             <a:r>
-              <a:rPr lang="zh-CN" altLang="en-US" sz="1200" dirty="0" smtClean="0">
+              <a:rPr lang="zh-CN" altLang="en-US" sz="1200" dirty="0">
                 <a:latin typeface="+mj-lt"/>
               </a:rPr>
               <a:t>的</a:t>
             </a:r>
             <a:r>
-              <a:rPr lang="en-US" altLang="zh-CN" sz="1200" dirty="0" smtClean="0">
+              <a:rPr lang="en-US" altLang="zh-CN" sz="1200" dirty="0">
                 <a:latin typeface="+mj-lt"/>
               </a:rPr>
               <a:t>list – </a:t>
             </a:r>
             <a:r>
-              <a:rPr lang="en-US" altLang="zh-CN" sz="1200" b="1" dirty="0" smtClean="0">
+              <a:rPr lang="en-US" altLang="zh-CN" sz="1200" b="1" dirty="0">
                 <a:solidFill>
                   <a:srgbClr val="FF0000"/>
                 </a:solidFill>
@@ -3475,14 +3470,11 @@
               <a:t>Growth Investment</a:t>
             </a:r>
             <a:r>
-              <a:rPr lang="en-US" altLang="zh-CN" sz="1200" dirty="0" smtClean="0">
+              <a:rPr lang="en-US" altLang="zh-CN" sz="1200" dirty="0">
                 <a:latin typeface="+mj-lt"/>
               </a:rPr>
               <a:t>)</a:t>
             </a:r>
-            <a:endParaRPr lang="en-US" altLang="zh-CN" sz="1200" dirty="0" smtClean="0">
-              <a:latin typeface="+mj-lt"/>
-            </a:endParaRPr>
           </a:p>
           <a:p>
             <a:pPr marL="285750" indent="-285750">
@@ -3490,25 +3482,25 @@
               <a:buAutoNum type="arabicPeriod"/>
             </a:pPr>
             <a:r>
-              <a:rPr lang="zh-CN" altLang="en-US" sz="1200" dirty="0" smtClean="0">
+              <a:rPr lang="zh-CN" altLang="en-US" sz="1200" dirty="0">
                 <a:latin typeface="+mj-lt"/>
               </a:rPr>
               <a:t>一个公司的</a:t>
             </a:r>
             <a:r>
-              <a:rPr lang="en-US" altLang="zh-CN" sz="1200" dirty="0" smtClean="0">
+              <a:rPr lang="en-US" altLang="zh-CN" sz="1200" dirty="0">
                 <a:latin typeface="+mj-lt"/>
               </a:rPr>
               <a:t>product/service</a:t>
             </a:r>
             <a:r>
-              <a:rPr lang="zh-CN" altLang="en-US" sz="1200" dirty="0" smtClean="0">
+              <a:rPr lang="zh-CN" altLang="en-US" sz="1200" dirty="0">
                 <a:latin typeface="+mj-lt"/>
               </a:rPr>
               <a:t>有没有足够的</a:t>
             </a:r>
             <a:r>
-              <a:rPr lang="en-US" altLang="zh-CN" sz="1200" b="1" dirty="0" smtClean="0">
+              <a:rPr lang="en-US" altLang="zh-CN" sz="1200" b="1" dirty="0">
                 <a:solidFill>
                   <a:srgbClr val="FF0000"/>
                 </a:solidFill>
@@ -3517,55 +3509,43 @@
               <a:t>market potential</a:t>
             </a:r>
             <a:r>
-              <a:rPr lang="en-US" altLang="zh-CN" sz="1200" dirty="0" smtClean="0">
+              <a:rPr lang="en-US" altLang="zh-CN" sz="1200" dirty="0">
                 <a:latin typeface="+mj-lt"/>
               </a:rPr>
               <a:t> (</a:t>
             </a:r>
             <a:r>
-              <a:rPr lang="zh-CN" altLang="en-US" sz="1200" dirty="0" smtClean="0">
+              <a:rPr lang="zh-CN" altLang="en-US" sz="1200" dirty="0">
                 <a:latin typeface="+mj-lt"/>
               </a:rPr>
               <a:t>有</a:t>
             </a:r>
             <a:r>
-              <a:rPr lang="en-US" altLang="zh-CN" sz="1200" dirty="0" smtClean="0">
+              <a:rPr lang="en-US" altLang="zh-CN" sz="1200" dirty="0">
                 <a:latin typeface="+mj-lt"/>
               </a:rPr>
               <a:t>market potential</a:t>
             </a:r>
             <a:r>
-              <a:rPr lang="zh-CN" altLang="en-US" sz="1200" dirty="0" smtClean="0">
+              <a:rPr lang="zh-CN" altLang="en-US" sz="1200" dirty="0">
                 <a:latin typeface="+mj-lt"/>
               </a:rPr>
               <a:t>是指在未来的几年中，此公司的</a:t>
             </a:r>
             <a:r>
-              <a:rPr lang="en-US" altLang="zh-CN" sz="1200" dirty="0" smtClean="0">
+              <a:rPr lang="en-US" altLang="zh-CN" sz="1200" dirty="0">
                 <a:latin typeface="+mj-lt"/>
               </a:rPr>
               <a:t>product/service</a:t>
             </a:r>
             <a:r>
-              <a:rPr lang="zh-CN" altLang="en-US" sz="1200" dirty="0" smtClean="0">
-                <a:latin typeface="+mj-lt"/>
-              </a:rPr>
-              <a:t>是否</a:t>
-            </a:r>
-            <a:r>
-              <a:rPr lang="zh-CN" altLang="en-US" sz="1200" dirty="0">
-                <a:latin typeface="+mj-lt"/>
-              </a:rPr>
-              <a:t>能</a:t>
-            </a:r>
-            <a:r>
-              <a:rPr lang="zh-CN" altLang="en-US" sz="1200" dirty="0" smtClean="0">
-                <a:latin typeface="+mj-lt"/>
-              </a:rPr>
-              <a:t>有</a:t>
-            </a:r>
-            <a:r>
-              <a:rPr lang="en-US" altLang="zh-CN" sz="1200" dirty="0" smtClean="0">
+              <a:rPr lang="zh-CN" altLang="en-US" sz="1200" dirty="0">
+                <a:latin typeface="+mj-lt"/>
+              </a:rPr>
+              <a:t>是否能有</a:t>
+            </a:r>
+            <a:r>
+              <a:rPr lang="en-US" altLang="zh-CN" sz="1200" dirty="0">
                 <a:latin typeface="+mj-lt"/>
               </a:rPr>
               <a:t>sizable increase in sales)</a:t>
@@ -3577,25 +3557,25 @@
               <a:buAutoNum type="arabicPeriod"/>
             </a:pPr>
             <a:r>
-              <a:rPr lang="zh-CN" altLang="en-US" sz="1200" dirty="0" smtClean="0">
+              <a:rPr lang="zh-CN" altLang="en-US" sz="1200" dirty="0">
                 <a:latin typeface="+mj-lt"/>
               </a:rPr>
               <a:t>公司的</a:t>
             </a:r>
             <a:r>
-              <a:rPr lang="en-US" altLang="zh-CN" sz="1200" dirty="0" smtClean="0">
+              <a:rPr lang="en-US" altLang="zh-CN" sz="1200" dirty="0">
                 <a:latin typeface="+mj-lt"/>
               </a:rPr>
               <a:t>management</a:t>
             </a:r>
             <a:r>
-              <a:rPr lang="zh-CN" altLang="en-US" sz="1200" dirty="0" smtClean="0">
+              <a:rPr lang="zh-CN" altLang="en-US" sz="1200" dirty="0">
                 <a:latin typeface="+mj-lt"/>
               </a:rPr>
               <a:t>是否有决心去持续的投资并开发</a:t>
             </a:r>
             <a:r>
-              <a:rPr lang="zh-CN" altLang="en-US" sz="1200" b="1" dirty="0" smtClean="0">
+              <a:rPr lang="zh-CN" altLang="en-US" sz="1200" b="1" dirty="0">
                 <a:solidFill>
                   <a:srgbClr val="FF0000"/>
                 </a:solidFill>
@@ -3604,7 +3584,7 @@
               <a:t>能带来</a:t>
             </a:r>
             <a:r>
-              <a:rPr lang="en-US" altLang="zh-CN" sz="1200" b="1" dirty="0" smtClean="0">
+              <a:rPr lang="en-US" altLang="zh-CN" sz="1200" b="1" dirty="0">
                 <a:solidFill>
                   <a:srgbClr val="FF0000"/>
                 </a:solidFill>
@@ -3613,7 +3593,7 @@
               <a:t>total sales potentials</a:t>
             </a:r>
             <a:r>
-              <a:rPr lang="zh-CN" altLang="en-US" sz="1200" b="1" dirty="0" smtClean="0">
+              <a:rPr lang="zh-CN" altLang="en-US" sz="1200" b="1" dirty="0">
                 <a:solidFill>
                   <a:srgbClr val="FF0000"/>
                 </a:solidFill>
@@ -3622,60 +3602,60 @@
               <a:t>增长的</a:t>
             </a:r>
             <a:r>
-              <a:rPr lang="zh-CN" altLang="en-US" sz="1200" dirty="0" smtClean="0">
+              <a:rPr lang="zh-CN" altLang="en-US" sz="1200" dirty="0">
                 <a:latin typeface="+mj-lt"/>
               </a:rPr>
               <a:t>新的</a:t>
             </a:r>
             <a:r>
-              <a:rPr lang="en-US" altLang="zh-CN" sz="1200" dirty="0" smtClean="0">
+              <a:rPr lang="en-US" altLang="zh-CN" sz="1200" dirty="0">
                 <a:latin typeface="+mj-lt"/>
               </a:rPr>
               <a:t>products or processes? </a:t>
             </a:r>
             <a:r>
-              <a:rPr lang="zh-CN" altLang="en-US" sz="1200" dirty="0" smtClean="0">
+              <a:rPr lang="zh-CN" altLang="en-US" sz="1200" dirty="0">
                 <a:latin typeface="+mj-lt"/>
               </a:rPr>
               <a:t>特别是当现在的主打</a:t>
             </a:r>
             <a:r>
-              <a:rPr lang="en-US" altLang="zh-CN" sz="1200" dirty="0" smtClean="0">
+              <a:rPr lang="en-US" altLang="zh-CN" sz="1200" dirty="0">
                 <a:latin typeface="+mj-lt"/>
               </a:rPr>
               <a:t>product</a:t>
             </a:r>
             <a:r>
-              <a:rPr lang="zh-CN" altLang="en-US" sz="1200" dirty="0" smtClean="0">
+              <a:rPr lang="zh-CN" altLang="en-US" sz="1200" dirty="0">
                 <a:latin typeface="+mj-lt"/>
               </a:rPr>
               <a:t>的</a:t>
             </a:r>
             <a:r>
-              <a:rPr lang="en-US" altLang="zh-CN" sz="1200" dirty="0" smtClean="0">
+              <a:rPr lang="en-US" altLang="zh-CN" sz="1200" dirty="0">
                 <a:latin typeface="+mj-lt"/>
               </a:rPr>
               <a:t>potential</a:t>
             </a:r>
             <a:r>
-              <a:rPr lang="zh-CN" altLang="en-US" sz="1200" dirty="0" smtClean="0">
+              <a:rPr lang="zh-CN" altLang="en-US" sz="1200" dirty="0">
                 <a:latin typeface="+mj-lt"/>
               </a:rPr>
               <a:t>已经被</a:t>
             </a:r>
             <a:r>
-              <a:rPr lang="en-US" altLang="zh-CN" sz="1200" dirty="0" smtClean="0">
+              <a:rPr lang="en-US" altLang="zh-CN" sz="1200" dirty="0">
                 <a:latin typeface="+mj-lt"/>
               </a:rPr>
               <a:t>fully exploited</a:t>
             </a:r>
             <a:r>
-              <a:rPr lang="zh-CN" altLang="en-US" sz="1200" dirty="0" smtClean="0">
+              <a:rPr lang="zh-CN" altLang="en-US" sz="1200" dirty="0">
                 <a:latin typeface="+mj-lt"/>
               </a:rPr>
               <a:t>的是时候</a:t>
             </a:r>
-            <a:endParaRPr lang="en-US" altLang="zh-CN" sz="1200" dirty="0" smtClean="0">
+            <a:endParaRPr lang="en-US" altLang="zh-CN" sz="1200" dirty="0">
               <a:latin typeface="+mj-lt"/>
             </a:endParaRPr>
           </a:p>
@@ -3685,73 +3665,73 @@
               <a:buAutoNum type="arabicPeriod"/>
             </a:pPr>
             <a:r>
-              <a:rPr lang="zh-CN" altLang="en-US" sz="1200" dirty="0" smtClean="0">
+              <a:rPr lang="zh-CN" altLang="en-US" sz="1200" dirty="0">
                 <a:latin typeface="+mj-lt"/>
               </a:rPr>
               <a:t>公司的</a:t>
             </a:r>
             <a:r>
-              <a:rPr lang="en-US" altLang="zh-CN" sz="1200" dirty="0" smtClean="0">
+              <a:rPr lang="en-US" altLang="zh-CN" sz="1200" dirty="0">
                 <a:latin typeface="+mj-lt"/>
               </a:rPr>
               <a:t>R&amp;D</a:t>
             </a:r>
             <a:r>
-              <a:rPr lang="zh-CN" altLang="en-US" sz="1200" dirty="0" smtClean="0">
+              <a:rPr lang="zh-CN" altLang="en-US" sz="1200" dirty="0">
                 <a:latin typeface="+mj-lt"/>
               </a:rPr>
               <a:t>成果和其公司</a:t>
             </a:r>
             <a:r>
-              <a:rPr lang="en-US" altLang="zh-CN" sz="1200" dirty="0" smtClean="0">
+              <a:rPr lang="en-US" altLang="zh-CN" sz="1200" dirty="0">
                 <a:latin typeface="+mj-lt"/>
               </a:rPr>
               <a:t>Size</a:t>
             </a:r>
             <a:r>
-              <a:rPr lang="zh-CN" altLang="en-US" sz="1200" dirty="0" smtClean="0">
+              <a:rPr lang="zh-CN" altLang="en-US" sz="1200" dirty="0">
                 <a:latin typeface="+mj-lt"/>
               </a:rPr>
               <a:t>的比例是否够大</a:t>
             </a:r>
             <a:r>
-              <a:rPr lang="en-US" altLang="zh-CN" sz="1200" dirty="0" smtClean="0">
+              <a:rPr lang="en-US" altLang="zh-CN" sz="1200" dirty="0">
                 <a:latin typeface="+mj-lt"/>
               </a:rPr>
               <a:t>(</a:t>
             </a:r>
             <a:r>
-              <a:rPr lang="zh-CN" altLang="en-US" sz="1200" dirty="0" smtClean="0">
+              <a:rPr lang="zh-CN" altLang="en-US" sz="1200" dirty="0">
                 <a:latin typeface="+mj-lt"/>
               </a:rPr>
               <a:t>可以用</a:t>
             </a:r>
             <a:r>
-              <a:rPr lang="en-US" altLang="zh-CN" sz="1200" dirty="0" smtClean="0">
+              <a:rPr lang="en-US" altLang="zh-CN" sz="1200" dirty="0">
                 <a:latin typeface="+mj-lt"/>
               </a:rPr>
               <a:t>R&amp;D</a:t>
             </a:r>
             <a:r>
-              <a:rPr lang="zh-CN" altLang="en-US" sz="1200" dirty="0" smtClean="0">
+              <a:rPr lang="zh-CN" altLang="en-US" sz="1200" dirty="0">
                 <a:latin typeface="+mj-lt"/>
               </a:rPr>
               <a:t>投资</a:t>
             </a:r>
             <a:r>
-              <a:rPr lang="en-US" altLang="zh-CN" sz="1200" dirty="0" smtClean="0">
+              <a:rPr lang="en-US" altLang="zh-CN" sz="1200" dirty="0">
                 <a:latin typeface="+mj-lt"/>
               </a:rPr>
               <a:t>/</a:t>
             </a:r>
             <a:r>
-              <a:rPr lang="zh-CN" altLang="en-US" sz="1200" dirty="0" smtClean="0">
+              <a:rPr lang="zh-CN" altLang="en-US" sz="1200" dirty="0">
                 <a:latin typeface="+mj-lt"/>
               </a:rPr>
               <a:t>成果和公司利益的比做评价</a:t>
             </a:r>
             <a:r>
-              <a:rPr lang="en-US" altLang="zh-CN" sz="1200" dirty="0" smtClean="0">
+              <a:rPr lang="en-US" altLang="zh-CN" sz="1200" dirty="0">
                 <a:latin typeface="+mj-lt"/>
               </a:rPr>
               <a:t>)</a:t>
@@ -3763,57 +3743,53 @@
               <a:buAutoNum type="arabicPeriod"/>
             </a:pPr>
             <a:r>
-              <a:rPr lang="zh-CN" altLang="en-US" sz="1200" dirty="0" smtClean="0">
+              <a:rPr lang="zh-CN" altLang="en-US" sz="1200" dirty="0">
                 <a:latin typeface="+mj-lt"/>
               </a:rPr>
               <a:t>公司是否有一个好的</a:t>
             </a:r>
             <a:r>
-              <a:rPr lang="en-US" altLang="zh-CN" sz="1200" dirty="0" smtClean="0">
+              <a:rPr lang="en-US" altLang="zh-CN" sz="1200" dirty="0">
                 <a:latin typeface="+mj-lt"/>
               </a:rPr>
               <a:t>sales organization?  (sales organization</a:t>
             </a:r>
             <a:r>
-              <a:rPr lang="zh-CN" altLang="en-US" sz="1200" dirty="0" smtClean="0">
+              <a:rPr lang="zh-CN" altLang="en-US" sz="1200" dirty="0">
                 <a:latin typeface="+mj-lt"/>
               </a:rPr>
               <a:t>是专有名词，指公司里和</a:t>
             </a:r>
             <a:r>
-              <a:rPr lang="en-US" altLang="zh-CN" sz="1200" dirty="0" smtClean="0">
+              <a:rPr lang="en-US" altLang="zh-CN" sz="1200" dirty="0">
                 <a:latin typeface="+mj-lt"/>
               </a:rPr>
               <a:t>profitability</a:t>
             </a:r>
             <a:r>
-              <a:rPr lang="zh-CN" altLang="en-US" sz="1200" dirty="0" smtClean="0">
+              <a:rPr lang="zh-CN" altLang="en-US" sz="1200" dirty="0">
                 <a:latin typeface="+mj-lt"/>
               </a:rPr>
               <a:t>直接挂钩的，负责</a:t>
             </a:r>
             <a:r>
               <a:rPr lang="en-US" altLang="zh-CN" sz="1200" dirty="0"/>
-              <a:t>distribute </a:t>
-            </a:r>
-            <a:r>
-              <a:rPr lang="en-US" altLang="zh-CN" sz="1200" dirty="0" smtClean="0"/>
-              <a:t> </a:t>
-            </a:r>
-            <a:r>
-              <a:rPr lang="en-US" altLang="zh-CN" sz="1200" dirty="0" smtClean="0">
+              <a:t>distribute  </a:t>
+            </a:r>
+            <a:r>
+              <a:rPr lang="en-US" altLang="zh-CN" sz="1200" dirty="0">
                 <a:latin typeface="+mj-lt"/>
               </a:rPr>
               <a:t>goods to consumer</a:t>
             </a:r>
             <a:r>
-              <a:rPr lang="zh-CN" altLang="en-US" sz="1200" dirty="0" smtClean="0">
+              <a:rPr lang="zh-CN" altLang="en-US" sz="1200" dirty="0">
                 <a:latin typeface="+mj-lt"/>
               </a:rPr>
               <a:t>的部门</a:t>
             </a:r>
             <a:r>
-              <a:rPr lang="en-US" altLang="zh-CN" sz="1200" dirty="0" smtClean="0">
+              <a:rPr lang="en-US" altLang="zh-CN" sz="1200" dirty="0">
                 <a:latin typeface="+mj-lt"/>
               </a:rPr>
               <a:t>)</a:t>
@@ -3825,30 +3801,30 @@
               <a:buChar char="•"/>
             </a:pPr>
             <a:r>
-              <a:rPr lang="en-US" altLang="zh-CN" sz="1200" dirty="0" err="1" smtClean="0">
+              <a:rPr lang="en-US" altLang="zh-CN" sz="1200" dirty="0" err="1">
                 <a:latin typeface="+mj-lt"/>
               </a:rPr>
               <a:t>ToDo</a:t>
             </a:r>
             <a:r>
-              <a:rPr lang="zh-CN" altLang="en-US" sz="1200" dirty="0" smtClean="0">
+              <a:rPr lang="zh-CN" altLang="en-US" sz="1200" dirty="0">
                 <a:latin typeface="+mj-lt"/>
               </a:rPr>
               <a:t>：怎样评价一个公司的</a:t>
             </a:r>
             <a:r>
-              <a:rPr lang="en-US" altLang="zh-CN" sz="1200" dirty="0" smtClean="0">
+              <a:rPr lang="en-US" altLang="zh-CN" sz="1200" dirty="0">
                 <a:latin typeface="+mj-lt"/>
               </a:rPr>
               <a:t>sales organization</a:t>
             </a:r>
             <a:r>
-              <a:rPr lang="zh-CN" altLang="en-US" sz="1200" dirty="0" smtClean="0">
+              <a:rPr lang="zh-CN" altLang="en-US" sz="1200" dirty="0">
                 <a:latin typeface="+mj-lt"/>
               </a:rPr>
               <a:t>？</a:t>
             </a:r>
-            <a:endParaRPr lang="en-US" altLang="zh-CN" sz="1200" dirty="0" smtClean="0">
+            <a:endParaRPr lang="en-US" altLang="zh-CN" sz="1200" dirty="0">
               <a:latin typeface="+mj-lt"/>
             </a:endParaRPr>
           </a:p>
@@ -3858,13 +3834,13 @@
               <a:buAutoNum type="arabicPeriod"/>
             </a:pPr>
             <a:r>
-              <a:rPr lang="zh-CN" altLang="en-US" sz="1200" dirty="0" smtClean="0">
+              <a:rPr lang="zh-CN" altLang="en-US" sz="1200" dirty="0">
                 <a:latin typeface="+mj-lt"/>
               </a:rPr>
               <a:t>公司是否有一个</a:t>
             </a:r>
             <a:r>
-              <a:rPr lang="en-US" altLang="zh-CN" sz="1200" dirty="0" smtClean="0">
+              <a:rPr lang="en-US" altLang="zh-CN" sz="1200" dirty="0">
                 <a:latin typeface="+mj-lt"/>
               </a:rPr>
               <a:t>worthwhile profit margin?</a:t>
@@ -3876,38 +3852,35 @@
               <a:buChar char="•"/>
             </a:pPr>
             <a:r>
-              <a:rPr lang="en-US" altLang="zh-CN" sz="1200" dirty="0" err="1" smtClean="0">
+              <a:rPr lang="en-US" altLang="zh-CN" sz="1200" dirty="0" err="1">
                 <a:latin typeface="+mj-lt"/>
               </a:rPr>
               <a:t>ToDo</a:t>
             </a:r>
             <a:r>
-              <a:rPr lang="zh-CN" altLang="en-US" sz="1200" dirty="0" smtClean="0">
+              <a:rPr lang="zh-CN" altLang="en-US" sz="1200" dirty="0">
                 <a:latin typeface="+mj-lt"/>
               </a:rPr>
               <a:t>：啥是</a:t>
             </a:r>
             <a:r>
-              <a:rPr lang="en-US" altLang="zh-CN" sz="1200" dirty="0" smtClean="0">
+              <a:rPr lang="en-US" altLang="zh-CN" sz="1200" dirty="0">
                 <a:latin typeface="+mj-lt"/>
               </a:rPr>
               <a:t>profit margin? </a:t>
             </a:r>
             <a:r>
-              <a:rPr lang="zh-CN" altLang="en-US" sz="1200" dirty="0" smtClean="0">
+              <a:rPr lang="zh-CN" altLang="en-US" sz="1200" dirty="0">
                 <a:latin typeface="+mj-lt"/>
               </a:rPr>
               <a:t>咋样才能算是</a:t>
             </a:r>
             <a:r>
-              <a:rPr lang="en-US" altLang="zh-CN" sz="1200" dirty="0" smtClean="0">
+              <a:rPr lang="en-US" altLang="zh-CN" sz="1200" dirty="0">
                 <a:latin typeface="+mj-lt"/>
               </a:rPr>
               <a:t>worthwhile?</a:t>
             </a:r>
-            <a:endParaRPr lang="en-US" altLang="zh-CN" sz="1200" dirty="0">
-              <a:latin typeface="+mj-lt"/>
-            </a:endParaRPr>
           </a:p>
           <a:p>
             <a:pPr marL="285750" indent="-285750">
@@ -3915,37 +3888,37 @@
               <a:buAutoNum type="arabicPeriod"/>
             </a:pPr>
             <a:r>
-              <a:rPr lang="zh-CN" altLang="en-US" sz="1200" dirty="0" smtClean="0">
+              <a:rPr lang="zh-CN" altLang="en-US" sz="1200" dirty="0">
                 <a:latin typeface="+mj-lt"/>
               </a:rPr>
               <a:t>公司是否在为了</a:t>
             </a:r>
             <a:r>
-              <a:rPr lang="en-US" altLang="zh-CN" sz="1200" dirty="0" smtClean="0">
+              <a:rPr lang="en-US" altLang="zh-CN" sz="1200" dirty="0">
                 <a:latin typeface="+mj-lt"/>
               </a:rPr>
               <a:t>maintain / improve profit margins</a:t>
             </a:r>
             <a:r>
-              <a:rPr lang="zh-CN" altLang="en-US" sz="1200" dirty="0" smtClean="0">
+              <a:rPr lang="zh-CN" altLang="en-US" sz="1200" dirty="0">
                 <a:latin typeface="+mj-lt"/>
               </a:rPr>
               <a:t>而努力</a:t>
             </a:r>
             <a:r>
-              <a:rPr lang="en-US" altLang="zh-CN" sz="1200" dirty="0" smtClean="0">
+              <a:rPr lang="en-US" altLang="zh-CN" sz="1200" dirty="0">
                 <a:latin typeface="+mj-lt"/>
               </a:rPr>
               <a:t>? </a:t>
             </a:r>
             <a:r>
-              <a:rPr lang="zh-CN" altLang="en-US" sz="1200" dirty="0" smtClean="0">
+              <a:rPr lang="zh-CN" altLang="en-US" sz="1200" dirty="0">
                 <a:latin typeface="+mj-lt"/>
               </a:rPr>
               <a:t>怎样努力</a:t>
             </a:r>
             <a:r>
-              <a:rPr lang="en-US" altLang="zh-CN" sz="1200" dirty="0" smtClean="0">
+              <a:rPr lang="en-US" altLang="zh-CN" sz="1200" dirty="0">
                 <a:latin typeface="+mj-lt"/>
               </a:rPr>
               <a:t>?</a:t>
@@ -3960,16 +3933,10 @@
               <a:rPr lang="zh-CN" altLang="en-US" sz="1200" dirty="0">
                 <a:latin typeface="+mj-lt"/>
               </a:rPr>
-              <a:t>公司</a:t>
-            </a:r>
-            <a:r>
-              <a:rPr lang="zh-CN" altLang="en-US" sz="1200" dirty="0" smtClean="0">
-                <a:latin typeface="+mj-lt"/>
-              </a:rPr>
-              <a:t>是否有</a:t>
-            </a:r>
-            <a:r>
-              <a:rPr lang="en-US" altLang="zh-CN" sz="1200" dirty="0" smtClean="0">
+              <a:t>公司是否有</a:t>
+            </a:r>
+            <a:r>
+              <a:rPr lang="en-US" altLang="zh-CN" sz="1200" dirty="0">
                 <a:latin typeface="+mj-lt"/>
               </a:rPr>
               <a:t>outstanding labor and personnel relations?</a:t>
@@ -3981,37 +3948,33 @@
               <a:buChar char="•"/>
             </a:pPr>
             <a:r>
-              <a:rPr lang="en-US" altLang="zh-CN" sz="1200" dirty="0" err="1" smtClean="0">
+              <a:rPr lang="en-US" altLang="zh-CN" sz="1200" dirty="0" err="1">
                 <a:latin typeface="+mj-lt"/>
               </a:rPr>
               <a:t>ToDo</a:t>
             </a:r>
             <a:r>
-              <a:rPr lang="en-US" altLang="zh-CN" sz="1200" dirty="0" smtClean="0">
+              <a:rPr lang="en-US" altLang="zh-CN" sz="1200" dirty="0">
                 <a:latin typeface="+mj-lt"/>
               </a:rPr>
               <a:t>: </a:t>
             </a:r>
             <a:r>
-              <a:rPr lang="zh-CN" altLang="en-US" sz="1200" dirty="0" smtClean="0">
+              <a:rPr lang="zh-CN" altLang="en-US" sz="1200" dirty="0">
                 <a:latin typeface="+mj-lt"/>
               </a:rPr>
               <a:t>怎样评价</a:t>
             </a:r>
             <a:r>
               <a:rPr lang="en-US" altLang="zh-CN" sz="1200" dirty="0"/>
-              <a:t>labor and personnel </a:t>
-            </a:r>
-            <a:r>
-              <a:rPr lang="en-US" altLang="zh-CN" sz="1200" dirty="0" smtClean="0"/>
-              <a:t>relations</a:t>
-            </a:r>
-            <a:r>
-              <a:rPr lang="zh-CN" altLang="en-US" sz="1200" dirty="0" smtClean="0"/>
+              <a:t>labor and personnel relations</a:t>
+            </a:r>
+            <a:r>
+              <a:rPr lang="zh-CN" altLang="en-US" sz="1200" dirty="0"/>
               <a:t>的好坏</a:t>
             </a:r>
             <a:r>
-              <a:rPr lang="en-US" altLang="zh-CN" sz="1200" dirty="0" smtClean="0"/>
+              <a:rPr lang="en-US" altLang="zh-CN" sz="1200" dirty="0"/>
               <a:t>?</a:t>
             </a:r>
           </a:p>
@@ -4021,133 +3984,133 @@
               <a:buAutoNum type="arabicPeriod"/>
             </a:pPr>
             <a:r>
-              <a:rPr lang="zh-CN" altLang="en-US" sz="1200" dirty="0" smtClean="0">
+              <a:rPr lang="zh-CN" altLang="en-US" sz="1200" dirty="0">
                 <a:latin typeface="+mj-lt"/>
               </a:rPr>
               <a:t>公司是否有</a:t>
             </a:r>
             <a:r>
-              <a:rPr lang="en-US" altLang="zh-CN" sz="1200" dirty="0" smtClean="0">
+              <a:rPr lang="en-US" altLang="zh-CN" sz="1200" dirty="0">
                 <a:latin typeface="+mj-lt"/>
               </a:rPr>
               <a:t>outstanding executive relations? (</a:t>
             </a:r>
             <a:r>
-              <a:rPr lang="zh-CN" altLang="en-US" sz="1200" dirty="0" smtClean="0">
+              <a:rPr lang="zh-CN" altLang="en-US" sz="1200" dirty="0">
                 <a:latin typeface="+mj-lt"/>
               </a:rPr>
               <a:t>我的理解是，</a:t>
             </a:r>
             <a:r>
-              <a:rPr lang="en-US" altLang="zh-CN" sz="1200" dirty="0" smtClean="0">
+              <a:rPr lang="en-US" altLang="zh-CN" sz="1200" dirty="0">
                 <a:latin typeface="+mj-lt"/>
               </a:rPr>
               <a:t>executive relation</a:t>
             </a:r>
             <a:r>
-              <a:rPr lang="zh-CN" altLang="en-US" sz="1200" dirty="0" smtClean="0">
+              <a:rPr lang="zh-CN" altLang="en-US" sz="1200" dirty="0">
                 <a:latin typeface="+mj-lt"/>
               </a:rPr>
               <a:t>是指一个公司的</a:t>
             </a:r>
             <a:r>
-              <a:rPr lang="en-US" altLang="zh-CN" sz="1200" dirty="0" smtClean="0">
+              <a:rPr lang="en-US" altLang="zh-CN" sz="1200" dirty="0">
                 <a:latin typeface="+mj-lt"/>
               </a:rPr>
               <a:t>top</a:t>
             </a:r>
             <a:r>
-              <a:rPr lang="zh-CN" altLang="en-US" sz="1200" dirty="0" smtClean="0">
+              <a:rPr lang="zh-CN" altLang="en-US" sz="1200" dirty="0">
                 <a:latin typeface="+mj-lt"/>
               </a:rPr>
               <a:t>和此公司的</a:t>
             </a:r>
             <a:r>
-              <a:rPr lang="en-US" altLang="zh-CN" sz="1200" dirty="0" smtClean="0">
+              <a:rPr lang="en-US" altLang="zh-CN" sz="1200" dirty="0">
                 <a:latin typeface="+mj-lt"/>
               </a:rPr>
               <a:t>partner/customer</a:t>
             </a:r>
             <a:r>
-              <a:rPr lang="zh-CN" altLang="en-US" sz="1200" dirty="0" smtClean="0">
+              <a:rPr lang="zh-CN" altLang="en-US" sz="1200" dirty="0">
                 <a:latin typeface="+mj-lt"/>
               </a:rPr>
               <a:t>公司的</a:t>
             </a:r>
             <a:r>
-              <a:rPr lang="en-US" altLang="zh-CN" sz="1200" dirty="0" smtClean="0">
+              <a:rPr lang="en-US" altLang="zh-CN" sz="1200" dirty="0">
                 <a:latin typeface="+mj-lt"/>
               </a:rPr>
               <a:t>top</a:t>
             </a:r>
             <a:r>
-              <a:rPr lang="zh-CN" altLang="en-US" sz="1200" dirty="0" smtClean="0">
+              <a:rPr lang="zh-CN" altLang="en-US" sz="1200" dirty="0">
                 <a:latin typeface="+mj-lt"/>
               </a:rPr>
               <a:t>之间的关系，可以归结到</a:t>
             </a:r>
             <a:r>
-              <a:rPr lang="en-US" altLang="zh-CN" sz="1200" dirty="0" smtClean="0">
+              <a:rPr lang="en-US" altLang="zh-CN" sz="1200" dirty="0">
                 <a:latin typeface="+mj-lt"/>
               </a:rPr>
               <a:t>CEO</a:t>
             </a:r>
             <a:r>
-              <a:rPr lang="zh-CN" altLang="en-US" sz="1200" dirty="0" smtClean="0">
+              <a:rPr lang="zh-CN" altLang="en-US" sz="1200" dirty="0">
                 <a:latin typeface="+mj-lt"/>
               </a:rPr>
               <a:t>和</a:t>
             </a:r>
             <a:r>
-              <a:rPr lang="en-US" altLang="zh-CN" sz="1200" dirty="0" smtClean="0">
+              <a:rPr lang="en-US" altLang="zh-CN" sz="1200" dirty="0">
                 <a:latin typeface="+mj-lt"/>
               </a:rPr>
               <a:t>CEO</a:t>
             </a:r>
             <a:r>
-              <a:rPr lang="zh-CN" altLang="en-US" sz="1200" dirty="0" smtClean="0">
+              <a:rPr lang="zh-CN" altLang="en-US" sz="1200" dirty="0">
                 <a:latin typeface="+mj-lt"/>
               </a:rPr>
               <a:t>之间的关系；此</a:t>
             </a:r>
             <a:r>
-              <a:rPr lang="en-US" altLang="zh-CN" sz="1200" dirty="0" smtClean="0">
+              <a:rPr lang="en-US" altLang="zh-CN" sz="1200" dirty="0">
                 <a:latin typeface="+mj-lt"/>
               </a:rPr>
               <a:t>relation</a:t>
             </a:r>
             <a:r>
-              <a:rPr lang="zh-CN" altLang="en-US" sz="1200" dirty="0" smtClean="0">
+              <a:rPr lang="zh-CN" altLang="en-US" sz="1200" dirty="0">
                 <a:latin typeface="+mj-lt"/>
               </a:rPr>
               <a:t>关系到一个公司是否被其</a:t>
             </a:r>
             <a:r>
-              <a:rPr lang="en-US" altLang="zh-CN" sz="1200" dirty="0" smtClean="0">
+              <a:rPr lang="en-US" altLang="zh-CN" sz="1200" dirty="0">
                 <a:latin typeface="+mj-lt"/>
               </a:rPr>
               <a:t>customer</a:t>
             </a:r>
             <a:r>
-              <a:rPr lang="zh-CN" altLang="en-US" sz="1200" dirty="0" smtClean="0">
+              <a:rPr lang="zh-CN" altLang="en-US" sz="1200" dirty="0">
                 <a:latin typeface="+mj-lt"/>
               </a:rPr>
               <a:t>认为是一个</a:t>
             </a:r>
             <a:r>
-              <a:rPr lang="en-US" altLang="zh-CN" sz="1200" dirty="0" smtClean="0">
+              <a:rPr lang="en-US" altLang="zh-CN" sz="1200" dirty="0">
                 <a:latin typeface="+mj-lt"/>
               </a:rPr>
               <a:t>trusted partner that can shape the future together</a:t>
             </a:r>
             <a:r>
-              <a:rPr lang="zh-CN" altLang="en-US" sz="1200" dirty="0" smtClean="0">
+              <a:rPr lang="zh-CN" altLang="en-US" sz="1200" dirty="0">
                 <a:latin typeface="+mj-lt"/>
               </a:rPr>
               <a:t>，还是仅仅是一个</a:t>
             </a:r>
             <a:r>
-              <a:rPr lang="en-US" altLang="zh-CN" sz="1200" dirty="0" smtClean="0">
+              <a:rPr lang="en-US" altLang="zh-CN" sz="1200" dirty="0">
                 <a:latin typeface="+mj-lt"/>
               </a:rPr>
               <a:t>vendor that might be called later because of having competing price)</a:t>
@@ -4159,36 +4122,36 @@
               <a:buAutoNum type="arabicPeriod"/>
             </a:pPr>
             <a:r>
-              <a:rPr lang="en-US" altLang="zh-CN" sz="1200" dirty="0" err="1" smtClean="0">
+              <a:rPr lang="en-US" altLang="zh-CN" sz="1200" dirty="0" err="1">
                 <a:latin typeface="+mj-lt"/>
               </a:rPr>
               <a:t>ToDo</a:t>
             </a:r>
             <a:r>
-              <a:rPr lang="en-US" altLang="zh-CN" sz="1200" dirty="0" smtClean="0">
+              <a:rPr lang="en-US" altLang="zh-CN" sz="1200" dirty="0">
                 <a:latin typeface="+mj-lt"/>
               </a:rPr>
               <a:t>: </a:t>
             </a:r>
             <a:r>
-              <a:rPr lang="zh-CN" altLang="en-US" sz="1200" dirty="0" smtClean="0">
+              <a:rPr lang="zh-CN" altLang="en-US" sz="1200" dirty="0">
                 <a:latin typeface="+mj-lt"/>
               </a:rPr>
               <a:t>怎样评价</a:t>
             </a:r>
             <a:r>
-              <a:rPr lang="en-US" altLang="zh-CN" sz="1200" dirty="0" smtClean="0">
+              <a:rPr lang="en-US" altLang="zh-CN" sz="1200" dirty="0">
                 <a:latin typeface="+mj-lt"/>
               </a:rPr>
               <a:t>executive relations</a:t>
             </a:r>
             <a:r>
-              <a:rPr lang="zh-CN" altLang="en-US" sz="1200" dirty="0" smtClean="0">
+              <a:rPr lang="zh-CN" altLang="en-US" sz="1200" dirty="0">
                 <a:latin typeface="+mj-lt"/>
               </a:rPr>
               <a:t>的好坏？</a:t>
             </a:r>
-            <a:endParaRPr lang="en-US" altLang="zh-CN" sz="1200" dirty="0" smtClean="0">
+            <a:endParaRPr lang="en-US" altLang="zh-CN" sz="1200" dirty="0">
               <a:latin typeface="+mj-lt"/>
             </a:endParaRPr>
           </a:p>
@@ -4198,13 +4161,13 @@
               <a:buAutoNum type="arabicPeriod"/>
             </a:pPr>
             <a:r>
-              <a:rPr lang="zh-CN" altLang="en-US" sz="1200" dirty="0" smtClean="0">
+              <a:rPr lang="zh-CN" altLang="en-US" sz="1200" dirty="0">
                 <a:latin typeface="+mj-lt"/>
               </a:rPr>
               <a:t>公司是否有</a:t>
             </a:r>
             <a:r>
-              <a:rPr lang="en-US" altLang="zh-CN" sz="1200" dirty="0" smtClean="0">
+              <a:rPr lang="en-US" altLang="zh-CN" sz="1200" dirty="0">
                 <a:latin typeface="+mj-lt"/>
               </a:rPr>
               <a:t>depth and talent in its management?</a:t>
@@ -4216,25 +4179,25 @@
               <a:buAutoNum type="arabicPeriod"/>
             </a:pPr>
             <a:r>
-              <a:rPr lang="zh-CN" altLang="en-US" sz="1200" dirty="0" smtClean="0">
+              <a:rPr lang="zh-CN" altLang="en-US" sz="1200" dirty="0">
                 <a:latin typeface="+mj-lt"/>
               </a:rPr>
               <a:t>公司的</a:t>
             </a:r>
             <a:r>
-              <a:rPr lang="en-US" altLang="zh-CN" sz="1200" dirty="0" smtClean="0">
+              <a:rPr lang="en-US" altLang="zh-CN" sz="1200" dirty="0">
                 <a:latin typeface="+mj-lt"/>
               </a:rPr>
               <a:t>cost analysis and accounting</a:t>
             </a:r>
             <a:r>
-              <a:rPr lang="zh-CN" altLang="en-US" sz="1200" dirty="0" smtClean="0">
+              <a:rPr lang="zh-CN" altLang="en-US" sz="1200" dirty="0">
                 <a:latin typeface="+mj-lt"/>
               </a:rPr>
               <a:t>是否很好</a:t>
             </a:r>
             <a:r>
-              <a:rPr lang="en-US" altLang="zh-CN" sz="1200" dirty="0" smtClean="0">
+              <a:rPr lang="en-US" altLang="zh-CN" sz="1200" dirty="0">
                 <a:latin typeface="+mj-lt"/>
               </a:rPr>
               <a:t>?</a:t>
@@ -4246,25 +4209,25 @@
               <a:buAutoNum type="arabicPeriod"/>
             </a:pPr>
             <a:r>
-              <a:rPr lang="zh-CN" altLang="en-US" sz="1200" dirty="0" smtClean="0">
+              <a:rPr lang="zh-CN" altLang="en-US" sz="1200" dirty="0">
                 <a:latin typeface="+mj-lt"/>
               </a:rPr>
               <a:t>是否有其他证据能表明此公司在其</a:t>
             </a:r>
             <a:r>
-              <a:rPr lang="en-US" altLang="zh-CN" sz="1200" dirty="0" smtClean="0">
+              <a:rPr lang="en-US" altLang="zh-CN" sz="1200" dirty="0">
                 <a:latin typeface="+mj-lt"/>
               </a:rPr>
               <a:t>involved industry</a:t>
             </a:r>
             <a:r>
-              <a:rPr lang="zh-CN" altLang="en-US" sz="1200" dirty="0" smtClean="0">
+              <a:rPr lang="zh-CN" altLang="en-US" sz="1200" dirty="0">
                 <a:latin typeface="+mj-lt"/>
               </a:rPr>
               <a:t>中，非常</a:t>
             </a:r>
             <a:r>
-              <a:rPr lang="en-US" altLang="zh-CN" sz="1200" dirty="0" smtClean="0">
+              <a:rPr lang="en-US" altLang="zh-CN" sz="1200" dirty="0">
                 <a:latin typeface="+mj-lt"/>
               </a:rPr>
               <a:t>outstanding?</a:t>
@@ -4276,25 +4239,25 @@
               <a:buAutoNum type="arabicPeriod"/>
             </a:pPr>
             <a:r>
-              <a:rPr lang="zh-CN" altLang="en-US" sz="1200" dirty="0" smtClean="0">
+              <a:rPr lang="zh-CN" altLang="en-US" sz="1200" dirty="0">
                 <a:latin typeface="+mj-lt"/>
               </a:rPr>
               <a:t>公司是否有</a:t>
             </a:r>
             <a:r>
-              <a:rPr lang="en-US" altLang="zh-CN" sz="1200" dirty="0" smtClean="0">
+              <a:rPr lang="en-US" altLang="zh-CN" sz="1200" dirty="0">
                 <a:latin typeface="+mj-lt"/>
               </a:rPr>
               <a:t>profit</a:t>
             </a:r>
             <a:r>
-              <a:rPr lang="zh-CN" altLang="en-US" sz="1200" dirty="0" smtClean="0">
+              <a:rPr lang="zh-CN" altLang="en-US" sz="1200" dirty="0">
                 <a:latin typeface="+mj-lt"/>
               </a:rPr>
               <a:t>相关的</a:t>
             </a:r>
             <a:r>
-              <a:rPr lang="en-US" altLang="zh-CN" sz="1200" dirty="0" smtClean="0">
+              <a:rPr lang="en-US" altLang="zh-CN" sz="1200" dirty="0">
                 <a:latin typeface="+mj-lt"/>
               </a:rPr>
               <a:t>short-range / long-range outlook?</a:t>
@@ -4306,49 +4269,37 @@
               <a:buAutoNum type="arabicPeriod"/>
             </a:pPr>
             <a:r>
-              <a:rPr lang="zh-CN" altLang="en-US" sz="1200" dirty="0" smtClean="0">
-                <a:latin typeface="+mj-lt"/>
-              </a:rPr>
-              <a:t>在</a:t>
-            </a:r>
-            <a:r>
-              <a:rPr lang="zh-CN" altLang="en-US" sz="1200" dirty="0">
-                <a:latin typeface="+mj-lt"/>
-              </a:rPr>
-              <a:t>可预见</a:t>
-            </a:r>
-            <a:r>
-              <a:rPr lang="zh-CN" altLang="en-US" sz="1200" dirty="0" smtClean="0">
-                <a:latin typeface="+mj-lt"/>
-              </a:rPr>
-              <a:t>的将来，公司是否需要大量股权融资，并且此融资会使现在的</a:t>
-            </a:r>
-            <a:r>
-              <a:rPr lang="en-US" altLang="zh-CN" sz="1200" dirty="0" smtClean="0">
+              <a:rPr lang="zh-CN" altLang="en-US" sz="1200" dirty="0">
+                <a:latin typeface="+mj-lt"/>
+              </a:rPr>
+              <a:t>在可预见的将来，公司是否需要大量股权融资，并且此融资会使现在的</a:t>
+            </a:r>
+            <a:r>
+              <a:rPr lang="en-US" altLang="zh-CN" sz="1200" dirty="0">
                 <a:latin typeface="+mj-lt"/>
               </a:rPr>
               <a:t>stockholder</a:t>
             </a:r>
             <a:r>
-              <a:rPr lang="zh-CN" altLang="en-US" sz="1200" dirty="0" smtClean="0">
+              <a:rPr lang="zh-CN" altLang="en-US" sz="1200" dirty="0">
                 <a:latin typeface="+mj-lt"/>
               </a:rPr>
               <a:t>从公司</a:t>
             </a:r>
             <a:r>
-              <a:rPr lang="en-US" altLang="zh-CN" sz="1200" dirty="0" smtClean="0">
+              <a:rPr lang="en-US" altLang="zh-CN" sz="1200" dirty="0">
                 <a:latin typeface="+mj-lt"/>
               </a:rPr>
               <a:t>growth</a:t>
             </a:r>
             <a:r>
-              <a:rPr lang="zh-CN" altLang="en-US" sz="1200" dirty="0" smtClean="0">
+              <a:rPr lang="zh-CN" altLang="en-US" sz="1200" dirty="0">
                 <a:latin typeface="+mj-lt"/>
               </a:rPr>
               <a:t>中获得的利益减少很多</a:t>
             </a:r>
             <a:r>
-              <a:rPr lang="en-US" altLang="zh-CN" sz="1200" dirty="0" smtClean="0">
+              <a:rPr lang="en-US" altLang="zh-CN" sz="1200" dirty="0">
                 <a:latin typeface="+mj-lt"/>
               </a:rPr>
               <a:t>?</a:t>
@@ -4360,25 +4311,25 @@
               <a:buAutoNum type="arabicPeriod"/>
             </a:pPr>
             <a:r>
-              <a:rPr lang="en-US" altLang="zh-CN" sz="1200" dirty="0" err="1" smtClean="0">
+              <a:rPr lang="en-US" altLang="zh-CN" sz="1200" dirty="0" err="1">
                 <a:latin typeface="+mj-lt"/>
               </a:rPr>
               <a:t>ToDo</a:t>
             </a:r>
             <a:r>
-              <a:rPr lang="en-US" altLang="zh-CN" sz="1200" dirty="0" smtClean="0">
+              <a:rPr lang="en-US" altLang="zh-CN" sz="1200" dirty="0">
                 <a:latin typeface="+mj-lt"/>
               </a:rPr>
               <a:t>: </a:t>
             </a:r>
             <a:r>
-              <a:rPr lang="zh-CN" altLang="en-US" sz="1200" dirty="0" smtClean="0">
+              <a:rPr lang="zh-CN" altLang="en-US" sz="1200" dirty="0">
                 <a:latin typeface="+mj-lt"/>
               </a:rPr>
               <a:t>这个怎么看</a:t>
             </a:r>
             <a:r>
-              <a:rPr lang="en-US" altLang="zh-CN" sz="1200" dirty="0" smtClean="0">
+              <a:rPr lang="en-US" altLang="zh-CN" sz="1200" dirty="0">
                 <a:latin typeface="+mj-lt"/>
               </a:rPr>
               <a:t>?</a:t>
@@ -4390,61 +4341,61 @@
               <a:buAutoNum type="arabicPeriod"/>
             </a:pPr>
             <a:r>
-              <a:rPr lang="zh-CN" altLang="en-US" sz="1200" dirty="0" smtClean="0">
+              <a:rPr lang="zh-CN" altLang="en-US" sz="1200" dirty="0">
                 <a:latin typeface="+mj-lt"/>
               </a:rPr>
               <a:t>当</a:t>
             </a:r>
             <a:r>
-              <a:rPr lang="en-US" altLang="zh-CN" sz="1200" dirty="0" smtClean="0">
+              <a:rPr lang="en-US" altLang="zh-CN" sz="1200" dirty="0">
                 <a:latin typeface="+mj-lt"/>
               </a:rPr>
               <a:t>troubles</a:t>
             </a:r>
             <a:r>
-              <a:rPr lang="zh-CN" altLang="en-US" sz="1200" dirty="0" smtClean="0">
+              <a:rPr lang="zh-CN" altLang="en-US" sz="1200" dirty="0">
                 <a:latin typeface="+mj-lt"/>
               </a:rPr>
               <a:t>和</a:t>
             </a:r>
             <a:r>
-              <a:rPr lang="en-US" altLang="zh-CN" sz="1200" dirty="0" smtClean="0">
+              <a:rPr lang="en-US" altLang="zh-CN" sz="1200" dirty="0">
                 <a:latin typeface="+mj-lt"/>
               </a:rPr>
               <a:t>disappointment</a:t>
             </a:r>
             <a:r>
-              <a:rPr lang="zh-CN" altLang="en-US" sz="1200" dirty="0" smtClean="0">
+              <a:rPr lang="zh-CN" altLang="en-US" sz="1200" dirty="0">
                 <a:latin typeface="+mj-lt"/>
               </a:rPr>
               <a:t>发生的时候，公司的</a:t>
             </a:r>
             <a:r>
-              <a:rPr lang="en-US" altLang="zh-CN" sz="1200" dirty="0" smtClean="0">
+              <a:rPr lang="en-US" altLang="zh-CN" sz="1200" dirty="0">
                 <a:latin typeface="+mj-lt"/>
               </a:rPr>
               <a:t>management</a:t>
             </a:r>
             <a:r>
-              <a:rPr lang="zh-CN" altLang="en-US" sz="1200" dirty="0" smtClean="0">
+              <a:rPr lang="zh-CN" altLang="en-US" sz="1200" dirty="0">
                 <a:latin typeface="+mj-lt"/>
               </a:rPr>
               <a:t>是否能和</a:t>
             </a:r>
             <a:r>
-              <a:rPr lang="en-US" altLang="zh-CN" sz="1200" dirty="0" smtClean="0">
+              <a:rPr lang="en-US" altLang="zh-CN" sz="1200" dirty="0">
                 <a:latin typeface="+mj-lt"/>
               </a:rPr>
               <a:t>investors</a:t>
             </a:r>
             <a:r>
-              <a:rPr lang="zh-CN" altLang="en-US" sz="1200" dirty="0" smtClean="0">
+              <a:rPr lang="zh-CN" altLang="en-US" sz="1200" dirty="0">
                 <a:latin typeface="+mj-lt"/>
               </a:rPr>
               <a:t>良好的交流</a:t>
             </a:r>
             <a:r>
-              <a:rPr lang="en-US" altLang="zh-CN" sz="1200" dirty="0" smtClean="0">
+              <a:rPr lang="en-US" altLang="zh-CN" sz="1200" dirty="0">
                 <a:latin typeface="+mj-lt"/>
               </a:rPr>
               <a:t>?</a:t>
@@ -4456,25 +4407,25 @@
               <a:buAutoNum type="arabicPeriod"/>
             </a:pPr>
             <a:r>
-              <a:rPr lang="zh-CN" altLang="en-US" sz="1200" dirty="0" smtClean="0">
+              <a:rPr lang="zh-CN" altLang="en-US" sz="1200" dirty="0">
                 <a:latin typeface="+mj-lt"/>
               </a:rPr>
               <a:t>公司的</a:t>
             </a:r>
             <a:r>
-              <a:rPr lang="en-US" altLang="zh-CN" sz="1200" dirty="0" smtClean="0">
+              <a:rPr lang="en-US" altLang="zh-CN" sz="1200" dirty="0">
                 <a:latin typeface="+mj-lt"/>
               </a:rPr>
               <a:t>management</a:t>
             </a:r>
             <a:r>
-              <a:rPr lang="zh-CN" altLang="en-US" sz="1200" dirty="0" smtClean="0">
+              <a:rPr lang="zh-CN" altLang="en-US" sz="1200" dirty="0">
                 <a:latin typeface="+mj-lt"/>
               </a:rPr>
               <a:t>是否有</a:t>
             </a:r>
             <a:r>
-              <a:rPr lang="en-US" altLang="zh-CN" sz="1200" dirty="0" smtClean="0">
+              <a:rPr lang="en-US" altLang="zh-CN" sz="1200" dirty="0">
                 <a:latin typeface="+mj-lt"/>
               </a:rPr>
               <a:t>unquestionable integrity?</a:t>
@@ -4486,40 +4437,507 @@
               <a:buAutoNum type="arabicPeriod"/>
             </a:pPr>
             <a:r>
-              <a:rPr lang="en-US" altLang="zh-CN" sz="1200" dirty="0" err="1" smtClean="0">
+              <a:rPr lang="en-US" altLang="zh-CN" sz="1200" dirty="0" err="1">
                 <a:latin typeface="+mj-lt"/>
               </a:rPr>
               <a:t>ToDo</a:t>
             </a:r>
             <a:r>
-              <a:rPr lang="en-US" altLang="zh-CN" sz="1200" dirty="0" smtClean="0">
+              <a:rPr lang="en-US" altLang="zh-CN" sz="1200" dirty="0">
                 <a:latin typeface="+mj-lt"/>
               </a:rPr>
               <a:t>: </a:t>
             </a:r>
             <a:r>
-              <a:rPr lang="zh-CN" altLang="en-US" sz="1200" dirty="0" smtClean="0">
+              <a:rPr lang="zh-CN" altLang="en-US" sz="1200" dirty="0">
                 <a:latin typeface="+mj-lt"/>
               </a:rPr>
               <a:t>这个</a:t>
             </a:r>
             <a:r>
-              <a:rPr lang="en-US" altLang="zh-CN" sz="1200" dirty="0" smtClean="0">
+              <a:rPr lang="en-US" altLang="zh-CN" sz="1200" dirty="0">
                 <a:latin typeface="+mj-lt"/>
               </a:rPr>
               <a:t>info</a:t>
             </a:r>
             <a:r>
-              <a:rPr lang="zh-CN" altLang="en-US" sz="1200" dirty="0" smtClean="0">
+              <a:rPr lang="zh-CN" altLang="en-US" sz="1200" dirty="0">
                 <a:latin typeface="+mj-lt"/>
               </a:rPr>
               <a:t>怎么搜集</a:t>
             </a:r>
             <a:r>
-              <a:rPr lang="en-US" altLang="zh-CN" sz="1200" dirty="0" smtClean="0">
+              <a:rPr lang="en-US" altLang="zh-CN" sz="1200" dirty="0">
                 <a:latin typeface="+mj-lt"/>
               </a:rPr>
               <a:t>?</a:t>
+            </a:r>
+          </a:p>
+          <a:p>
+            <a:r>
+              <a:rPr lang="en-US" altLang="zh-CN" sz="1200" dirty="0">
+                <a:latin typeface="+mj-lt"/>
+              </a:rPr>
+              <a:t>(</a:t>
+            </a:r>
+            <a:r>
+              <a:rPr lang="ja-JP" altLang="en-US" sz="1200">
+                <a:latin typeface="+mj-lt"/>
+              </a:rPr>
+              <a:t>以下是</a:t>
+            </a:r>
+            <a:r>
+              <a:rPr lang="en-US" altLang="ja-JP" sz="1200" dirty="0">
+                <a:latin typeface="+mj-lt"/>
+              </a:rPr>
+              <a:t>Warren</a:t>
+            </a:r>
+            <a:r>
+              <a:rPr lang="zh-CN" altLang="en-US" sz="1200" dirty="0">
+                <a:latin typeface="+mj-lt"/>
+              </a:rPr>
+              <a:t> </a:t>
+            </a:r>
+            <a:r>
+              <a:rPr lang="en-US" altLang="zh-CN" sz="1200" dirty="0">
+                <a:latin typeface="+mj-lt"/>
+              </a:rPr>
+              <a:t>Buffet</a:t>
+            </a:r>
+            <a:r>
+              <a:rPr lang="ja-JP" altLang="en-US" sz="1200">
+                <a:latin typeface="+mj-lt"/>
+              </a:rPr>
+              <a:t>的</a:t>
+            </a:r>
+            <a:r>
+              <a:rPr lang="en-US" altLang="ja-JP" sz="1200" dirty="0">
+                <a:latin typeface="+mj-lt"/>
+              </a:rPr>
+              <a:t>checklist</a:t>
+            </a:r>
+            <a:r>
+              <a:rPr lang="zh-CN" altLang="en-US" sz="1200" dirty="0">
+                <a:latin typeface="+mj-lt"/>
+              </a:rPr>
+              <a:t>，</a:t>
+            </a:r>
+            <a:r>
+              <a:rPr lang="en-US" altLang="zh-CN" sz="1200" dirty="0">
+                <a:latin typeface="+mj-lt"/>
+              </a:rPr>
+              <a:t>Value</a:t>
+            </a:r>
+            <a:r>
+              <a:rPr lang="zh-CN" altLang="en-US" sz="1200" dirty="0">
+                <a:latin typeface="+mj-lt"/>
+              </a:rPr>
+              <a:t> </a:t>
+            </a:r>
+            <a:r>
+              <a:rPr lang="en-US" altLang="zh-CN" sz="1200" dirty="0">
+                <a:latin typeface="+mj-lt"/>
+              </a:rPr>
+              <a:t>invest)</a:t>
+            </a:r>
+          </a:p>
+          <a:p>
+            <a:pPr marL="285750" indent="-285750">
+              <a:buFont typeface="+mj-lt"/>
+              <a:buAutoNum type="arabicPeriod"/>
+            </a:pPr>
+            <a:r>
+              <a:rPr lang="en-US" altLang="zh-CN" sz="1200" dirty="0">
+                <a:latin typeface="+mj-lt"/>
+              </a:rPr>
+              <a:t>Buy high quality business at cheap price (ignore short-term</a:t>
+            </a:r>
+            <a:r>
+              <a:rPr lang="ja-JP" altLang="en-US" sz="1200">
+                <a:latin typeface="+mj-lt"/>
+              </a:rPr>
+              <a:t>别担心短期股市</a:t>
+            </a:r>
+            <a:r>
+              <a:rPr lang="en-US" altLang="ja-JP" sz="1200" dirty="0">
+                <a:latin typeface="+mj-lt"/>
+              </a:rPr>
+              <a:t>up</a:t>
+            </a:r>
+            <a:r>
+              <a:rPr lang="ja-JP" altLang="en-US" sz="1200">
+                <a:latin typeface="+mj-lt"/>
+              </a:rPr>
+              <a:t>和</a:t>
+            </a:r>
+            <a:r>
+              <a:rPr lang="en-US" altLang="ja-JP" sz="1200" dirty="0">
+                <a:latin typeface="+mj-lt"/>
+              </a:rPr>
+              <a:t>down</a:t>
+            </a:r>
+            <a:r>
+              <a:rPr lang="zh-CN" altLang="en-US" sz="1200" dirty="0">
+                <a:latin typeface="+mj-lt"/>
+              </a:rPr>
+              <a:t>，</a:t>
+            </a:r>
+            <a:r>
+              <a:rPr lang="ja-JP" altLang="en-US" sz="1200">
+                <a:latin typeface="+mj-lt"/>
+              </a:rPr>
+              <a:t>关心</a:t>
+            </a:r>
+            <a:r>
+              <a:rPr lang="en-US" altLang="ja-JP" sz="1200" dirty="0">
+                <a:latin typeface="+mj-lt"/>
+              </a:rPr>
+              <a:t>business</a:t>
+            </a:r>
+            <a:r>
+              <a:rPr lang="zh-CN" altLang="en-US" sz="1200" dirty="0">
+                <a:latin typeface="+mj-lt"/>
+              </a:rPr>
+              <a:t> </a:t>
+            </a:r>
+            <a:r>
+              <a:rPr lang="en-US" altLang="zh-CN" sz="1200" dirty="0">
+                <a:latin typeface="+mj-lt"/>
+              </a:rPr>
+              <a:t>quality</a:t>
+            </a:r>
+            <a:r>
+              <a:rPr lang="ja-JP" altLang="en-US" sz="1200">
+                <a:latin typeface="+mj-lt"/>
+              </a:rPr>
+              <a:t>是不是好</a:t>
+            </a:r>
+            <a:r>
+              <a:rPr lang="en-US" altLang="zh-CN" sz="1200" dirty="0">
+                <a:latin typeface="+mj-lt"/>
+              </a:rPr>
+              <a:t>)</a:t>
+            </a:r>
+          </a:p>
+          <a:p>
+            <a:pPr marL="285750" indent="-285750">
+              <a:buFont typeface="+mj-lt"/>
+              <a:buAutoNum type="arabicPeriod"/>
+            </a:pPr>
+            <a:r>
+              <a:rPr lang="ja-JP" altLang="en-US" sz="1200">
+                <a:latin typeface="+mj-lt"/>
+              </a:rPr>
+              <a:t>公司是否有</a:t>
+            </a:r>
+            <a:r>
+              <a:rPr lang="en-US" altLang="ja-JP" sz="1200" dirty="0">
+                <a:latin typeface="+mj-lt"/>
+              </a:rPr>
+              <a:t>great</a:t>
+            </a:r>
+            <a:r>
+              <a:rPr lang="zh-CN" altLang="en-US" sz="1200" dirty="0">
+                <a:latin typeface="+mj-lt"/>
+              </a:rPr>
+              <a:t> </a:t>
+            </a:r>
+            <a:r>
+              <a:rPr lang="en-US" altLang="zh-CN" sz="1200" dirty="0">
+                <a:latin typeface="+mj-lt"/>
+              </a:rPr>
+              <a:t>management</a:t>
+            </a:r>
+          </a:p>
+          <a:p>
+            <a:pPr marL="285750" indent="-285750">
+              <a:buFont typeface="+mj-lt"/>
+              <a:buAutoNum type="arabicPeriod"/>
+            </a:pPr>
+            <a:r>
+              <a:rPr lang="ja-JP" altLang="en-US" sz="1200">
+                <a:latin typeface="+mj-lt"/>
+              </a:rPr>
+              <a:t>公司是否</a:t>
+            </a:r>
+            <a:r>
+              <a:rPr lang="en-US" altLang="ja-JP" sz="1200" dirty="0">
+                <a:latin typeface="+mj-lt"/>
+              </a:rPr>
+              <a:t>shareholder</a:t>
+            </a:r>
+            <a:r>
+              <a:rPr lang="en-US" altLang="zh-CN" sz="1200" dirty="0">
+                <a:latin typeface="+mj-lt"/>
+              </a:rPr>
+              <a:t>-oriented (</a:t>
+            </a:r>
+            <a:r>
+              <a:rPr lang="ja-JP" altLang="en-US" sz="1200">
+                <a:latin typeface="+mj-lt"/>
+              </a:rPr>
+              <a:t>从</a:t>
+            </a:r>
+            <a:r>
+              <a:rPr lang="en-US" altLang="ja-JP" sz="1200" dirty="0">
+                <a:latin typeface="+mj-lt"/>
+              </a:rPr>
+              <a:t>dividends</a:t>
+            </a:r>
+            <a:r>
+              <a:rPr lang="ja-JP" altLang="en-US" sz="1200">
+                <a:latin typeface="+mj-lt"/>
+              </a:rPr>
+              <a:t>和</a:t>
+            </a:r>
+            <a:r>
+              <a:rPr lang="en-US" altLang="ja-JP" sz="1200" dirty="0">
+                <a:latin typeface="+mj-lt"/>
+              </a:rPr>
+              <a:t>share-buy-back</a:t>
+            </a:r>
+            <a:r>
+              <a:rPr lang="ja-JP" altLang="en-US" sz="1200">
+                <a:latin typeface="+mj-lt"/>
+              </a:rPr>
+              <a:t>上看</a:t>
+            </a:r>
+            <a:r>
+              <a:rPr lang="en-US" altLang="zh-CN" sz="1200" dirty="0">
+                <a:latin typeface="+mj-lt"/>
+              </a:rPr>
+              <a:t>)</a:t>
+            </a:r>
+          </a:p>
+          <a:p>
+            <a:pPr marL="285750" indent="-285750">
+              <a:buFont typeface="+mj-lt"/>
+              <a:buAutoNum type="arabicPeriod"/>
+            </a:pPr>
+            <a:r>
+              <a:rPr lang="ja-JP" altLang="en-US" sz="1200">
+                <a:latin typeface="+mj-lt"/>
+              </a:rPr>
+              <a:t>我是否理解公司在干什么</a:t>
+            </a:r>
+            <a:r>
+              <a:rPr lang="zh-CN" altLang="en-US" sz="1200" dirty="0">
+                <a:latin typeface="+mj-lt"/>
+              </a:rPr>
+              <a:t>，</a:t>
+            </a:r>
+            <a:r>
+              <a:rPr lang="ja-JP" altLang="en-US" sz="1200">
+                <a:latin typeface="+mj-lt"/>
+              </a:rPr>
+              <a:t>能不能用自己的话说公司从原材料购入到生产商品最后倒卖商品给谁</a:t>
+            </a:r>
+            <a:endParaRPr lang="en-US" altLang="ja-JP" sz="1200" dirty="0">
+              <a:latin typeface="+mj-lt"/>
+            </a:endParaRPr>
+          </a:p>
+          <a:p>
+            <a:pPr marL="285750" indent="-285750">
+              <a:buFont typeface="+mj-lt"/>
+              <a:buAutoNum type="arabicPeriod"/>
+            </a:pPr>
+            <a:r>
+              <a:rPr lang="ja-JP" altLang="en-US" sz="1200">
+                <a:latin typeface="+mj-lt"/>
+              </a:rPr>
+              <a:t>公司的</a:t>
+            </a:r>
+            <a:r>
+              <a:rPr lang="en-US" altLang="ja-JP" sz="1200" dirty="0">
+                <a:latin typeface="+mj-lt"/>
+              </a:rPr>
+              <a:t>product</a:t>
+            </a:r>
+            <a:r>
+              <a:rPr lang="ja-JP" altLang="en-US" sz="1200">
+                <a:latin typeface="+mj-lt"/>
+              </a:rPr>
+              <a:t>时候高品质</a:t>
+            </a:r>
+            <a:r>
+              <a:rPr lang="zh-CN" altLang="en-US" sz="1200" dirty="0">
+                <a:latin typeface="+mj-lt"/>
+              </a:rPr>
+              <a:t>，</a:t>
+            </a:r>
+            <a:r>
+              <a:rPr lang="ja-JP" altLang="en-US" sz="1200">
+                <a:latin typeface="+mj-lt"/>
+              </a:rPr>
+              <a:t>并且能让</a:t>
+            </a:r>
+            <a:r>
+              <a:rPr lang="en-US" altLang="ja-JP" sz="1200" dirty="0">
+                <a:latin typeface="+mj-lt"/>
+              </a:rPr>
+              <a:t>customers</a:t>
+            </a:r>
+            <a:r>
+              <a:rPr lang="zh-CN" altLang="en-US" sz="1200" dirty="0">
+                <a:latin typeface="+mj-lt"/>
+              </a:rPr>
+              <a:t> </a:t>
+            </a:r>
+            <a:r>
+              <a:rPr lang="en-US" altLang="zh-CN" sz="1200" dirty="0">
+                <a:latin typeface="+mj-lt"/>
+              </a:rPr>
+              <a:t>keep</a:t>
+            </a:r>
+            <a:r>
+              <a:rPr lang="zh-CN" altLang="en-US" sz="1200" dirty="0">
+                <a:latin typeface="+mj-lt"/>
+              </a:rPr>
+              <a:t> </a:t>
+            </a:r>
+            <a:r>
+              <a:rPr lang="en-US" altLang="zh-CN" sz="1200" dirty="0">
+                <a:latin typeface="+mj-lt"/>
+              </a:rPr>
+              <a:t>purchasing</a:t>
+            </a:r>
+          </a:p>
+          <a:p>
+            <a:pPr marL="285750" indent="-285750">
+              <a:buFont typeface="+mj-lt"/>
+              <a:buAutoNum type="arabicPeriod"/>
+            </a:pPr>
+            <a:r>
+              <a:rPr lang="ja-JP" altLang="en-US" sz="1200">
+                <a:latin typeface="+mj-lt"/>
+              </a:rPr>
+              <a:t>公司和其</a:t>
+            </a:r>
+            <a:r>
+              <a:rPr lang="en-US" altLang="ja-JP" sz="1200" dirty="0">
+                <a:latin typeface="+mj-lt"/>
+              </a:rPr>
+              <a:t>competitor</a:t>
+            </a:r>
+            <a:r>
+              <a:rPr lang="ja-JP" altLang="en-US" sz="1200">
+                <a:latin typeface="+mj-lt"/>
+              </a:rPr>
+              <a:t>相比</a:t>
+            </a:r>
+            <a:r>
+              <a:rPr lang="zh-CN" altLang="en-US" sz="1200" dirty="0">
+                <a:latin typeface="+mj-lt"/>
+              </a:rPr>
+              <a:t>，</a:t>
+            </a:r>
+            <a:r>
+              <a:rPr lang="ja-JP" altLang="en-US" sz="1200">
+                <a:latin typeface="+mj-lt"/>
+              </a:rPr>
+              <a:t>是否有</a:t>
+            </a:r>
+            <a:r>
+              <a:rPr lang="en-US" altLang="ja-JP" sz="1200" dirty="0">
+                <a:latin typeface="+mj-lt"/>
+              </a:rPr>
+              <a:t>moat</a:t>
+            </a:r>
+            <a:r>
+              <a:rPr lang="zh-CN" altLang="en-US" sz="1200" dirty="0">
+                <a:latin typeface="+mj-lt"/>
+              </a:rPr>
+              <a:t> </a:t>
+            </a:r>
+            <a:r>
+              <a:rPr lang="en-US" altLang="zh-CN" sz="1200" dirty="0">
+                <a:latin typeface="+mj-lt"/>
+              </a:rPr>
+              <a:t>(moat</a:t>
+            </a:r>
+            <a:r>
+              <a:rPr lang="ja-JP" altLang="en-US" sz="1200">
+                <a:latin typeface="+mj-lt"/>
+              </a:rPr>
+              <a:t>是护城河</a:t>
+            </a:r>
+            <a:r>
+              <a:rPr lang="zh-CN" altLang="en-US" sz="1200" dirty="0">
+                <a:latin typeface="+mj-lt"/>
+              </a:rPr>
+              <a:t>，</a:t>
+            </a:r>
+            <a:r>
+              <a:rPr lang="ja-JP" altLang="en-US" sz="1200">
+                <a:latin typeface="+mj-lt"/>
+              </a:rPr>
+              <a:t>指</a:t>
+            </a:r>
+            <a:r>
+              <a:rPr lang="en-US" altLang="ja-JP" sz="1200" dirty="0">
+                <a:latin typeface="+mj-lt"/>
+              </a:rPr>
+              <a:t>unique</a:t>
+            </a:r>
+            <a:r>
+              <a:rPr lang="zh-CN" altLang="en-US" sz="1200" dirty="0">
+                <a:latin typeface="+mj-lt"/>
+              </a:rPr>
+              <a:t> </a:t>
+            </a:r>
+            <a:r>
+              <a:rPr lang="en-US" altLang="zh-CN" sz="1200" dirty="0">
+                <a:latin typeface="+mj-lt"/>
+              </a:rPr>
+              <a:t>tech</a:t>
+            </a:r>
+            <a:r>
+              <a:rPr lang="zh-CN" altLang="en-US" sz="1200" dirty="0">
+                <a:latin typeface="+mj-lt"/>
+              </a:rPr>
+              <a:t>，</a:t>
+            </a:r>
+            <a:r>
+              <a:rPr lang="en-US" altLang="zh-CN" sz="1200" dirty="0">
+                <a:latin typeface="+mj-lt"/>
+              </a:rPr>
+              <a:t>patent</a:t>
+            </a:r>
+            <a:r>
+              <a:rPr lang="zh-CN" altLang="en-US" sz="1200" dirty="0">
+                <a:latin typeface="+mj-lt"/>
+              </a:rPr>
+              <a:t>，</a:t>
+            </a:r>
+            <a:r>
+              <a:rPr lang="en-US" altLang="zh-CN" sz="1200" dirty="0">
+                <a:latin typeface="+mj-lt"/>
+              </a:rPr>
+              <a:t>brand</a:t>
+            </a:r>
+            <a:r>
+              <a:rPr lang="zh-CN" altLang="en-US" sz="1200" dirty="0">
+                <a:latin typeface="+mj-lt"/>
+              </a:rPr>
+              <a:t> </a:t>
+            </a:r>
+            <a:r>
+              <a:rPr lang="en-US" altLang="zh-CN" sz="1200" dirty="0">
+                <a:latin typeface="+mj-lt"/>
+              </a:rPr>
+              <a:t>name</a:t>
+            </a:r>
+            <a:r>
+              <a:rPr lang="ja-JP" altLang="en-US" sz="1200">
+                <a:latin typeface="+mj-lt"/>
+              </a:rPr>
+              <a:t>等</a:t>
+            </a:r>
+            <a:r>
+              <a:rPr lang="en-US" altLang="zh-CN" sz="1200" dirty="0">
+                <a:latin typeface="+mj-lt"/>
+              </a:rPr>
+              <a:t>)</a:t>
             </a:r>
           </a:p>
         </p:txBody>
@@ -4577,26 +4995,10 @@
           <a:lstStyle/>
           <a:p>
             <a:r>
-              <a:rPr lang="zh-CN" altLang="en-US" sz="1400" dirty="0" smtClean="0"/>
-              <a:t>公司财报中的</a:t>
-            </a:r>
-            <a:r>
               <a:rPr lang="zh-CN" altLang="en-US" sz="1400" dirty="0"/>
-              <a:t>名词</a:t>
-            </a:r>
-            <a:r>
-              <a:rPr lang="zh-CN" altLang="en-US" sz="1400" dirty="0" smtClean="0"/>
-              <a:t>是什么</a:t>
-            </a:r>
-            <a:r>
-              <a:rPr lang="zh-CN" altLang="en-US" sz="1400" dirty="0"/>
-              <a:t>意思</a:t>
-            </a:r>
-            <a:r>
-              <a:rPr lang="zh-CN" altLang="en-US" sz="1400" dirty="0" smtClean="0"/>
-              <a:t>？</a:t>
-            </a:r>
-            <a:endParaRPr lang="en-US" altLang="zh-CN" sz="1400" dirty="0" smtClean="0"/>
+              <a:t>公司财报中的名词是什么意思？</a:t>
+            </a:r>
+            <a:endParaRPr lang="en-US" altLang="zh-CN" sz="1400" dirty="0"/>
           </a:p>
           <a:p>
             <a:pPr marL="285750" indent="-285750">
@@ -4604,7 +5006,7 @@
               <a:buChar char="•"/>
             </a:pPr>
             <a:r>
-              <a:rPr kumimoji="1" lang="en-US" altLang="ja-JP" sz="1400" b="1" dirty="0" smtClean="0">
+              <a:rPr kumimoji="1" lang="en-US" altLang="ja-JP" sz="1400" b="1" dirty="0">
                 <a:solidFill>
                   <a:srgbClr val="FF0000"/>
                 </a:solidFill>
@@ -4612,7 +5014,7 @@
               <a:t>Sales </a:t>
             </a:r>
             <a:r>
-              <a:rPr kumimoji="1" lang="en-US" altLang="ja-JP" sz="1400" dirty="0" smtClean="0"/>
+              <a:rPr kumimoji="1" lang="en-US" altLang="ja-JP" sz="1400" dirty="0"/>
               <a:t>(=</a:t>
             </a:r>
             <a:r>
@@ -4620,7 +5022,7 @@
               <a:t>(</a:t>
             </a:r>
             <a:r>
-              <a:rPr kumimoji="1" lang="en-US" altLang="ja-JP" sz="1400" b="1" dirty="0" smtClean="0">
+              <a:rPr kumimoji="1" lang="en-US" altLang="ja-JP" sz="1400" b="1" dirty="0">
                 <a:solidFill>
                   <a:srgbClr val="FF0000"/>
                 </a:solidFill>
@@ -4632,7 +5034,7 @@
               <a:t>)</a:t>
             </a:r>
             <a:r>
-              <a:rPr kumimoji="1" lang="en-US" altLang="ja-JP" sz="1400" b="1" dirty="0" smtClean="0">
+              <a:rPr kumimoji="1" lang="en-US" altLang="ja-JP" sz="1400" b="1" dirty="0">
                 <a:solidFill>
                   <a:srgbClr val="FF0000"/>
                 </a:solidFill>
@@ -4640,11 +5042,11 @@
               <a:t> Revenue </a:t>
             </a:r>
             <a:r>
-              <a:rPr lang="en-US" altLang="zh-CN" sz="1400" b="1" dirty="0" smtClean="0"/>
+              <a:rPr lang="en-US" altLang="zh-CN" sz="1400" b="1" dirty="0"/>
               <a:t>=</a:t>
             </a:r>
             <a:r>
-              <a:rPr lang="en-US" altLang="zh-CN" sz="1400" b="1" dirty="0" smtClean="0">
+              <a:rPr lang="en-US" altLang="zh-CN" sz="1400" b="1" dirty="0">
                 <a:solidFill>
                   <a:srgbClr val="FF0000"/>
                 </a:solidFill>
@@ -4652,7 +5054,7 @@
               <a:t> operation profit</a:t>
             </a:r>
             <a:r>
-              <a:rPr kumimoji="1" lang="en-US" altLang="ja-JP" sz="1400" dirty="0" smtClean="0"/>
+              <a:rPr kumimoji="1" lang="en-US" altLang="ja-JP" sz="1400" dirty="0"/>
               <a:t>)</a:t>
             </a:r>
           </a:p>
@@ -4662,10 +5064,10 @@
               <a:buChar char="•"/>
             </a:pPr>
             <a:r>
-              <a:rPr lang="en-US" altLang="ja-JP" sz="1400" dirty="0" smtClean="0"/>
+              <a:rPr lang="en-US" altLang="ja-JP" sz="1400" dirty="0"/>
               <a:t>Total amount earned from sales</a:t>
             </a:r>
-            <a:endParaRPr kumimoji="1" lang="en-US" altLang="ja-JP" sz="1400" dirty="0" smtClean="0"/>
+            <a:endParaRPr kumimoji="1" lang="en-US" altLang="ja-JP" sz="1400" dirty="0"/>
           </a:p>
           <a:p>
             <a:pPr marL="285750" indent="-285750">
@@ -4673,7 +5075,7 @@
               <a:buChar char="•"/>
             </a:pPr>
             <a:r>
-              <a:rPr kumimoji="1" lang="en-US" altLang="ja-JP" sz="1400" b="1" dirty="0" smtClean="0">
+              <a:rPr kumimoji="1" lang="en-US" altLang="ja-JP" sz="1400" b="1" dirty="0">
                 <a:solidFill>
                   <a:srgbClr val="FF0000"/>
                 </a:solidFill>
@@ -4681,15 +5083,15 @@
               <a:t>Net sales</a:t>
             </a:r>
             <a:r>
-              <a:rPr kumimoji="1" lang="en-US" altLang="ja-JP" sz="1400" dirty="0" smtClean="0"/>
+              <a:rPr kumimoji="1" lang="en-US" altLang="ja-JP" sz="1400" dirty="0"/>
               <a:t> (</a:t>
             </a:r>
             <a:r>
-              <a:rPr lang="en-US" altLang="ja-JP" sz="1400" dirty="0" smtClean="0"/>
+              <a:rPr lang="en-US" altLang="ja-JP" sz="1400" dirty="0"/>
               <a:t>=</a:t>
             </a:r>
             <a:r>
-              <a:rPr lang="en-US" altLang="ja-JP" sz="1400" b="1" dirty="0" smtClean="0">
+              <a:rPr lang="en-US" altLang="ja-JP" sz="1400" b="1" dirty="0">
                 <a:solidFill>
                   <a:srgbClr val="FF0000"/>
                 </a:solidFill>
@@ -4697,7 +5099,7 @@
               <a:t>net revenue</a:t>
             </a:r>
             <a:r>
-              <a:rPr lang="en-US" altLang="ja-JP" sz="1400" dirty="0" smtClean="0"/>
+              <a:rPr lang="en-US" altLang="ja-JP" sz="1400" dirty="0"/>
               <a:t>)</a:t>
             </a:r>
           </a:p>
@@ -4707,18 +5109,18 @@
               <a:buChar char="•"/>
             </a:pPr>
             <a:r>
-              <a:rPr lang="en-US" altLang="ja-JP" sz="1400" dirty="0" smtClean="0"/>
+              <a:rPr lang="en-US" altLang="ja-JP" sz="1400" dirty="0"/>
               <a:t>= gross revenue </a:t>
             </a:r>
             <a:r>
-              <a:rPr lang="zh-CN" altLang="en-US" sz="1400" dirty="0" smtClean="0"/>
+              <a:rPr lang="zh-CN" altLang="en-US" sz="1400" dirty="0"/>
               <a:t>减去 </a:t>
             </a:r>
             <a:r>
-              <a:rPr lang="en-US" altLang="ja-JP" sz="1400" dirty="0" smtClean="0"/>
+              <a:rPr lang="en-US" altLang="ja-JP" sz="1400" dirty="0"/>
               <a:t>all product-related costs</a:t>
             </a:r>
-            <a:endParaRPr kumimoji="1" lang="en-US" altLang="ja-JP" sz="1400" dirty="0" smtClean="0"/>
+            <a:endParaRPr kumimoji="1" lang="en-US" altLang="ja-JP" sz="1400" dirty="0"/>
           </a:p>
           <a:p>
             <a:pPr marL="285750" indent="-285750">
@@ -4726,7 +5128,7 @@
               <a:buChar char="•"/>
             </a:pPr>
             <a:r>
-              <a:rPr kumimoji="1" lang="en-US" altLang="ja-JP" sz="1400" b="1" dirty="0" smtClean="0">
+              <a:rPr kumimoji="1" lang="en-US" altLang="ja-JP" sz="1400" b="1" dirty="0">
                 <a:solidFill>
                   <a:srgbClr val="FF0000"/>
                 </a:solidFill>
@@ -4734,11 +5136,11 @@
               <a:t>Net profit</a:t>
             </a:r>
             <a:r>
-              <a:rPr kumimoji="1" lang="en-US" altLang="ja-JP" sz="1400" dirty="0" smtClean="0"/>
+              <a:rPr kumimoji="1" lang="en-US" altLang="ja-JP" sz="1400" dirty="0"/>
               <a:t> (=</a:t>
             </a:r>
             <a:r>
-              <a:rPr kumimoji="1" lang="en-US" altLang="ja-JP" sz="1400" b="1" dirty="0" smtClean="0">
+              <a:rPr kumimoji="1" lang="en-US" altLang="ja-JP" sz="1400" b="1" dirty="0">
                 <a:solidFill>
                   <a:srgbClr val="FF0000"/>
                 </a:solidFill>
@@ -4746,7 +5148,7 @@
               <a:t>net income</a:t>
             </a:r>
             <a:r>
-              <a:rPr kumimoji="1" lang="en-US" altLang="ja-JP" sz="1400" dirty="0" smtClean="0"/>
+              <a:rPr kumimoji="1" lang="en-US" altLang="ja-JP" sz="1400" dirty="0"/>
               <a:t>)</a:t>
             </a:r>
           </a:p>
@@ -4757,13 +5159,9 @@
             </a:pPr>
             <a:r>
               <a:rPr lang="zh-CN" altLang="en-US" sz="1400" dirty="0"/>
-              <a:t>可以</a:t>
-            </a:r>
-            <a:r>
-              <a:rPr lang="zh-CN" altLang="en-US" sz="1400" dirty="0" smtClean="0"/>
-              <a:t>是负的</a:t>
-            </a:r>
-            <a:endParaRPr lang="en-US" altLang="zh-CN" sz="1400" dirty="0" smtClean="0"/>
+              <a:t>可以是负的</a:t>
+            </a:r>
+            <a:endParaRPr lang="en-US" altLang="zh-CN" sz="1400" dirty="0"/>
           </a:p>
           <a:p>
             <a:pPr marL="742950" lvl="1" indent="-285750">
@@ -4771,31 +5169,31 @@
               <a:buChar char="•"/>
             </a:pPr>
             <a:r>
-              <a:rPr lang="en-US" altLang="ja-JP" sz="1400" dirty="0" smtClean="0"/>
+              <a:rPr lang="en-US" altLang="ja-JP" sz="1400" dirty="0"/>
               <a:t>= </a:t>
             </a:r>
             <a:r>
-              <a:rPr lang="en-US" altLang="zh-CN" sz="1400" dirty="0" smtClean="0"/>
+              <a:rPr lang="en-US" altLang="zh-CN" sz="1400" dirty="0"/>
               <a:t>net sales </a:t>
             </a:r>
             <a:r>
-              <a:rPr lang="zh-CN" altLang="en-US" sz="1400" dirty="0" smtClean="0"/>
+              <a:rPr lang="zh-CN" altLang="en-US" sz="1400" dirty="0"/>
               <a:t>减去 </a:t>
             </a:r>
             <a:r>
-              <a:rPr lang="en-US" altLang="zh-CN" sz="1400" dirty="0" smtClean="0"/>
+              <a:rPr lang="en-US" altLang="zh-CN" sz="1400" dirty="0"/>
               <a:t>all costs, </a:t>
             </a:r>
             <a:r>
-              <a:rPr lang="zh-CN" altLang="en-US" sz="1400" dirty="0" smtClean="0"/>
+              <a:rPr lang="zh-CN" altLang="en-US" sz="1400" dirty="0"/>
               <a:t>包括</a:t>
             </a:r>
             <a:r>
-              <a:rPr lang="en-US" altLang="zh-CN" sz="1400" dirty="0" smtClean="0"/>
+              <a:rPr lang="en-US" altLang="zh-CN" sz="1400" dirty="0"/>
               <a:t>tax</a:t>
             </a:r>
             <a:r>
-              <a:rPr lang="zh-CN" altLang="en-US" sz="1400" dirty="0" smtClean="0"/>
+              <a:rPr lang="zh-CN" altLang="en-US" sz="1400" dirty="0"/>
               <a:t>等</a:t>
             </a:r>
             <a:endParaRPr lang="en-US" altLang="zh-CN" sz="1400" dirty="0"/>
@@ -4806,42 +5204,42 @@
               <a:buChar char="•"/>
             </a:pPr>
             <a:r>
-              <a:rPr lang="zh-CN" altLang="en-US" sz="1400" dirty="0" smtClean="0"/>
+              <a:rPr lang="zh-CN" altLang="en-US" sz="1400" dirty="0"/>
               <a:t>公司可以决定把一部分</a:t>
             </a:r>
             <a:r>
-              <a:rPr lang="en-US" altLang="zh-CN" sz="1400" dirty="0" smtClean="0"/>
+              <a:rPr lang="en-US" altLang="zh-CN" sz="1400" dirty="0"/>
               <a:t>net profit</a:t>
             </a:r>
             <a:r>
-              <a:rPr lang="zh-CN" altLang="en-US" sz="1400" dirty="0" smtClean="0"/>
+              <a:rPr lang="zh-CN" altLang="en-US" sz="1400" dirty="0"/>
               <a:t>分给持股人</a:t>
             </a:r>
             <a:r>
-              <a:rPr lang="en-US" altLang="zh-CN" sz="1400" dirty="0" smtClean="0"/>
+              <a:rPr lang="en-US" altLang="zh-CN" sz="1400" dirty="0"/>
               <a:t>(pay dividend to stockholders)</a:t>
             </a:r>
             <a:r>
-              <a:rPr lang="zh-CN" altLang="en-US" sz="1400" dirty="0" smtClean="0"/>
+              <a:rPr lang="zh-CN" altLang="en-US" sz="1400" dirty="0"/>
               <a:t>，然后把其他的</a:t>
             </a:r>
             <a:r>
-              <a:rPr lang="en-US" altLang="zh-CN" sz="1400" dirty="0" smtClean="0"/>
+              <a:rPr lang="en-US" altLang="zh-CN" sz="1400" dirty="0"/>
               <a:t>reinvest</a:t>
             </a:r>
             <a:r>
-              <a:rPr lang="zh-CN" altLang="en-US" sz="1400" dirty="0" smtClean="0"/>
+              <a:rPr lang="zh-CN" altLang="en-US" sz="1400" dirty="0"/>
               <a:t>到</a:t>
             </a:r>
             <a:r>
-              <a:rPr lang="en-US" altLang="zh-CN" sz="1400" dirty="0" smtClean="0"/>
+              <a:rPr lang="en-US" altLang="zh-CN" sz="1400" dirty="0"/>
               <a:t>business</a:t>
             </a:r>
             <a:r>
-              <a:rPr lang="zh-CN" altLang="en-US" sz="1400" dirty="0" smtClean="0"/>
+              <a:rPr lang="zh-CN" altLang="en-US" sz="1400" dirty="0"/>
               <a:t>里去</a:t>
             </a:r>
-            <a:endParaRPr lang="en-US" altLang="zh-CN" sz="1400" dirty="0" smtClean="0"/>
+            <a:endParaRPr lang="en-US" altLang="zh-CN" sz="1400" dirty="0"/>
           </a:p>
           <a:p>
             <a:pPr marL="285750" indent="-285750">
@@ -4849,7 +5247,7 @@
               <a:buChar char="•"/>
             </a:pPr>
             <a:r>
-              <a:rPr lang="en-US" altLang="zh-CN" sz="1400" b="1" dirty="0" smtClean="0">
+              <a:rPr lang="en-US" altLang="zh-CN" sz="1400" b="1" dirty="0">
                 <a:solidFill>
                   <a:srgbClr val="FF0000"/>
                 </a:solidFill>
@@ -4857,15 +5255,15 @@
               <a:t>Operating expense </a:t>
             </a:r>
             <a:r>
-              <a:rPr lang="en-US" altLang="zh-CN" sz="1400" dirty="0" smtClean="0"/>
+              <a:rPr lang="en-US" altLang="zh-CN" sz="1400" dirty="0"/>
               <a:t>(</a:t>
             </a:r>
             <a:r>
-              <a:rPr lang="zh-CN" altLang="en-US" sz="1400" dirty="0" smtClean="0"/>
+              <a:rPr lang="zh-CN" altLang="en-US" sz="1400" dirty="0"/>
               <a:t>简称</a:t>
             </a:r>
             <a:r>
-              <a:rPr lang="en-US" altLang="zh-CN" sz="1400" dirty="0" smtClean="0"/>
+              <a:rPr lang="en-US" altLang="zh-CN" sz="1400" dirty="0"/>
               <a:t>OPEX)</a:t>
             </a:r>
           </a:p>
@@ -4875,11 +5273,11 @@
               <a:buChar char="•"/>
             </a:pPr>
             <a:r>
-              <a:rPr lang="zh-CN" altLang="en-US" sz="1400" dirty="0" smtClean="0"/>
+              <a:rPr lang="zh-CN" altLang="en-US" sz="1400" dirty="0"/>
               <a:t>包括</a:t>
             </a:r>
             <a:r>
-              <a:rPr lang="en-US" altLang="zh-CN" sz="1400" dirty="0" smtClean="0"/>
+              <a:rPr lang="en-US" altLang="zh-CN" sz="1400" dirty="0"/>
               <a:t>rent, equipment, inventory costs, marketing, payroll, insurance, research fee, etc.</a:t>
             </a:r>
           </a:p>
@@ -4889,7 +5287,7 @@
               <a:buChar char="•"/>
             </a:pPr>
             <a:r>
-              <a:rPr lang="en-US" altLang="ja-JP" sz="1400" b="1" dirty="0" smtClean="0">
+              <a:rPr lang="en-US" altLang="ja-JP" sz="1400" b="1" dirty="0">
                 <a:solidFill>
                   <a:srgbClr val="FF0000"/>
                 </a:solidFill>
@@ -4897,11 +5295,11 @@
               <a:t>Operating profit</a:t>
             </a:r>
             <a:r>
-              <a:rPr lang="en-US" altLang="ja-JP" sz="1400" dirty="0" smtClean="0"/>
+              <a:rPr lang="en-US" altLang="ja-JP" sz="1400" dirty="0"/>
               <a:t> (= </a:t>
             </a:r>
             <a:r>
-              <a:rPr lang="en-US" altLang="ja-JP" sz="1400" b="1" dirty="0" smtClean="0">
+              <a:rPr lang="en-US" altLang="ja-JP" sz="1400" b="1" dirty="0">
                 <a:solidFill>
                   <a:srgbClr val="FF0000"/>
                 </a:solidFill>
@@ -4909,7 +5307,7 @@
               <a:t>operating income</a:t>
             </a:r>
             <a:r>
-              <a:rPr lang="en-US" altLang="ja-JP" sz="1400" dirty="0" smtClean="0"/>
+              <a:rPr lang="en-US" altLang="ja-JP" sz="1400" dirty="0"/>
               <a:t>)</a:t>
             </a:r>
           </a:p>
@@ -4919,47 +5317,47 @@
               <a:buChar char="•"/>
             </a:pPr>
             <a:r>
-              <a:rPr lang="en-US" altLang="ja-JP" sz="1400" dirty="0" smtClean="0"/>
+              <a:rPr lang="en-US" altLang="ja-JP" sz="1400" dirty="0"/>
               <a:t>= operating revenue </a:t>
             </a:r>
             <a:r>
-              <a:rPr lang="zh-CN" altLang="en-US" sz="1400" dirty="0" smtClean="0"/>
+              <a:rPr lang="zh-CN" altLang="en-US" sz="1400" dirty="0"/>
               <a:t>减去 </a:t>
             </a:r>
             <a:r>
-              <a:rPr lang="en-US" altLang="zh-CN" sz="1400" dirty="0" smtClean="0"/>
+              <a:rPr lang="en-US" altLang="zh-CN" sz="1400" dirty="0"/>
               <a:t>cost of goods sold </a:t>
             </a:r>
             <a:r>
-              <a:rPr lang="zh-CN" altLang="en-US" sz="1400" dirty="0" smtClean="0"/>
+              <a:rPr lang="zh-CN" altLang="en-US" sz="1400" dirty="0"/>
               <a:t>减去 </a:t>
             </a:r>
             <a:r>
-              <a:rPr lang="en-US" altLang="zh-CN" sz="1400" dirty="0" smtClean="0"/>
+              <a:rPr lang="en-US" altLang="zh-CN" sz="1400" dirty="0"/>
               <a:t>operating expense </a:t>
             </a:r>
             <a:r>
-              <a:rPr lang="zh-CN" altLang="en-US" sz="1400" dirty="0" smtClean="0"/>
+              <a:rPr lang="zh-CN" altLang="en-US" sz="1400" dirty="0"/>
               <a:t>减去 </a:t>
             </a:r>
             <a:r>
-              <a:rPr lang="en-US" altLang="zh-CN" sz="1400" dirty="0" smtClean="0"/>
+              <a:rPr lang="en-US" altLang="zh-CN" sz="1400" dirty="0"/>
               <a:t>depreciation </a:t>
             </a:r>
             <a:r>
-              <a:rPr lang="zh-CN" altLang="en-US" sz="1400" dirty="0" smtClean="0"/>
+              <a:rPr lang="zh-CN" altLang="en-US" sz="1400" dirty="0"/>
               <a:t>减去 </a:t>
             </a:r>
             <a:r>
-              <a:rPr lang="en-US" altLang="zh-CN" sz="1400" dirty="0" smtClean="0"/>
+              <a:rPr lang="en-US" altLang="zh-CN" sz="1400" dirty="0"/>
               <a:t>amortization(</a:t>
             </a:r>
             <a:r>
-              <a:rPr lang="zh-CN" altLang="en-US" sz="1400" dirty="0" smtClean="0"/>
+              <a:rPr lang="zh-CN" altLang="en-US" sz="1400" dirty="0"/>
               <a:t>折旧</a:t>
             </a:r>
             <a:r>
-              <a:rPr lang="en-US" altLang="zh-CN" sz="1400" dirty="0" smtClean="0"/>
+              <a:rPr lang="en-US" altLang="zh-CN" sz="1400" dirty="0"/>
               <a:t>)</a:t>
             </a:r>
           </a:p>
@@ -4970,94 +5368,90 @@
             </a:pPr>
             <a:r>
               <a:rPr lang="zh-CN" altLang="en-US" sz="1400" dirty="0"/>
-              <a:t>并</a:t>
-            </a:r>
-            <a:r>
-              <a:rPr lang="zh-CN" altLang="en-US" sz="1400" dirty="0" smtClean="0"/>
-              <a:t>不包括</a:t>
-            </a:r>
-            <a:r>
-              <a:rPr lang="en-US" altLang="zh-CN" sz="1400" dirty="0" smtClean="0"/>
+              <a:t>并不包括</a:t>
+            </a:r>
+            <a:r>
+              <a:rPr lang="en-US" altLang="zh-CN" sz="1400" dirty="0"/>
               <a:t>tax</a:t>
             </a:r>
           </a:p>
           <a:p>
             <a:pPr lvl="1"/>
-            <a:endParaRPr lang="en-US" altLang="zh-CN" sz="1400" dirty="0" smtClean="0"/>
-          </a:p>
-          <a:p>
-            <a:r>
-              <a:rPr lang="zh-CN" altLang="en-US" sz="1400" dirty="0" smtClean="0"/>
+            <a:endParaRPr lang="en-US" altLang="zh-CN" sz="1400" dirty="0"/>
+          </a:p>
+          <a:p>
+            <a:r>
+              <a:rPr lang="zh-CN" altLang="en-US" sz="1400" dirty="0"/>
               <a:t>公司财报里面经常出现</a:t>
             </a:r>
             <a:r>
-              <a:rPr lang="en-US" altLang="zh-CN" sz="1400" dirty="0" smtClean="0"/>
+              <a:rPr lang="en-US" altLang="zh-CN" sz="1400" dirty="0"/>
               <a:t>net sales</a:t>
             </a:r>
             <a:r>
-              <a:rPr lang="zh-CN" altLang="en-US" sz="1400" dirty="0" smtClean="0"/>
+              <a:rPr lang="zh-CN" altLang="en-US" sz="1400" dirty="0"/>
               <a:t>，</a:t>
             </a:r>
             <a:r>
-              <a:rPr lang="en-US" altLang="zh-CN" sz="1400" dirty="0" smtClean="0"/>
+              <a:rPr lang="en-US" altLang="zh-CN" sz="1400" dirty="0"/>
               <a:t>operating profit</a:t>
             </a:r>
             <a:r>
-              <a:rPr lang="zh-CN" altLang="en-US" sz="1400" dirty="0" smtClean="0"/>
+              <a:rPr lang="zh-CN" altLang="en-US" sz="1400" dirty="0"/>
               <a:t>，</a:t>
             </a:r>
             <a:r>
-              <a:rPr lang="en-US" altLang="zh-CN" sz="1400" dirty="0" smtClean="0"/>
+              <a:rPr lang="en-US" altLang="zh-CN" sz="1400" dirty="0"/>
               <a:t>net profit</a:t>
             </a:r>
             <a:r>
-              <a:rPr lang="zh-CN" altLang="en-US" sz="1400" dirty="0" smtClean="0"/>
+              <a:rPr lang="zh-CN" altLang="en-US" sz="1400" dirty="0"/>
               <a:t>三个数值</a:t>
             </a:r>
-            <a:endParaRPr lang="en-US" altLang="zh-CN" sz="1400" dirty="0" smtClean="0"/>
-          </a:p>
-          <a:p>
-            <a:r>
-              <a:rPr lang="zh-CN" altLang="en-US" sz="1400" dirty="0" smtClean="0"/>
+            <a:endParaRPr lang="en-US" altLang="zh-CN" sz="1400" dirty="0"/>
+          </a:p>
+          <a:p>
+            <a:r>
+              <a:rPr lang="zh-CN" altLang="en-US" sz="1400" dirty="0"/>
               <a:t>右上是一例子，</a:t>
             </a:r>
-            <a:endParaRPr lang="en-US" altLang="zh-CN" sz="1400" dirty="0" smtClean="0"/>
-          </a:p>
-          <a:p>
-            <a:r>
-              <a:rPr lang="en-US" altLang="zh-CN" sz="1400" b="1" dirty="0" smtClean="0"/>
+            <a:endParaRPr lang="en-US" altLang="zh-CN" sz="1400" dirty="0"/>
+          </a:p>
+          <a:p>
+            <a:r>
+              <a:rPr lang="en-US" altLang="zh-CN" sz="1400" b="1" dirty="0"/>
               <a:t>net income</a:t>
             </a:r>
             <a:r>
-              <a:rPr lang="en-US" altLang="zh-CN" sz="1400" dirty="0" smtClean="0"/>
+              <a:rPr lang="en-US" altLang="zh-CN" sz="1400" dirty="0"/>
               <a:t> = </a:t>
             </a:r>
             <a:r>
-              <a:rPr lang="en-US" altLang="zh-CN" sz="1400" b="1" dirty="0" smtClean="0"/>
+              <a:rPr lang="en-US" altLang="zh-CN" sz="1400" b="1" dirty="0"/>
               <a:t>operating income</a:t>
             </a:r>
             <a:r>
-              <a:rPr lang="en-US" altLang="zh-CN" sz="1400" dirty="0" smtClean="0"/>
+              <a:rPr lang="en-US" altLang="zh-CN" sz="1400" dirty="0"/>
               <a:t> – </a:t>
             </a:r>
             <a:r>
-              <a:rPr lang="en-US" altLang="zh-CN" sz="1400" b="1" dirty="0" smtClean="0"/>
+              <a:rPr lang="en-US" altLang="zh-CN" sz="1400" b="1" dirty="0"/>
               <a:t>interest expense</a:t>
             </a:r>
             <a:r>
-              <a:rPr lang="en-US" altLang="zh-CN" sz="1400" dirty="0" smtClean="0"/>
+              <a:rPr lang="en-US" altLang="zh-CN" sz="1400" dirty="0"/>
               <a:t>(interest of borrowed money, </a:t>
             </a:r>
             <a:r>
-              <a:rPr lang="en-US" altLang="zh-CN" sz="1400" dirty="0" err="1" smtClean="0"/>
+              <a:rPr lang="en-US" altLang="zh-CN" sz="1400" dirty="0" err="1"/>
               <a:t>etc</a:t>
             </a:r>
             <a:r>
-              <a:rPr lang="en-US" altLang="zh-CN" sz="1400" dirty="0" smtClean="0"/>
+              <a:rPr lang="en-US" altLang="zh-CN" sz="1400" dirty="0"/>
               <a:t>) - </a:t>
             </a:r>
             <a:r>
-              <a:rPr lang="en-US" altLang="zh-CN" sz="1400" b="1" dirty="0" smtClean="0"/>
+              <a:rPr lang="en-US" altLang="zh-CN" sz="1400" b="1" dirty="0"/>
               <a:t>tax</a:t>
             </a:r>
           </a:p>
@@ -5490,7 +5884,7 @@
           <p:cNvPr id="2" name="TextBox 1">
             <a:extLst>
               <a:ext uri="{FF2B5EF4-FFF2-40B4-BE49-F238E27FC236}">
-                <a16:creationId xmlns:a16="http://schemas.microsoft.com/office/drawing/2014/main" xmlns="" id="{4A5C2DDE-5199-4DBB-ACD3-E82644E46320}"/>
+                <a16:creationId xmlns:a16="http://schemas.microsoft.com/office/drawing/2014/main" id="{4A5C2DDE-5199-4DBB-ACD3-E82644E46320}"/>
               </a:ext>
             </a:extLst>
           </p:cNvPr>

</xml_diff>

<commit_message>
added hedge/mutual fund knowledge, add pandas usage .py
</commit_message>
<xml_diff>
--- a/[BeAInvestor].pptx
+++ b/[BeAInvestor].pptx
@@ -112,7 +112,7 @@
   </p:defaultTextStyle>
   <p:extLst>
     <p:ext uri="{EFAFB233-063F-42B5-8137-9DF3F51BA10A}">
-      <p15:sldGuideLst xmlns:p15="http://schemas.microsoft.com/office/powerpoint/2012/main">
+      <p15:sldGuideLst xmlns="" xmlns:p15="http://schemas.microsoft.com/office/powerpoint/2012/main">
         <p15:guide id="1" orient="horz" pos="2880">
           <p15:clr>
             <a:srgbClr val="A4A3A4"/>
@@ -308,7 +308,7 @@
           <a:p>
             <a:fld id="{E90ED720-0104-4369-84BC-D37694168613}" type="datetimeFigureOut">
               <a:rPr kumimoji="1" lang="ja-JP" altLang="en-US" smtClean="0"/>
-              <a:t>2018/7/21</a:t>
+              <a:t>2018/7/24</a:t>
             </a:fld>
             <a:endParaRPr kumimoji="1" lang="ja-JP" altLang="en-US"/>
           </a:p>
@@ -503,7 +503,7 @@
           <a:p>
             <a:fld id="{E90ED720-0104-4369-84BC-D37694168613}" type="datetimeFigureOut">
               <a:rPr kumimoji="1" lang="ja-JP" altLang="en-US" smtClean="0"/>
-              <a:t>2018/7/21</a:t>
+              <a:t>2018/7/24</a:t>
             </a:fld>
             <a:endParaRPr kumimoji="1" lang="ja-JP" altLang="en-US"/>
           </a:p>
@@ -708,7 +708,7 @@
           <a:p>
             <a:fld id="{E90ED720-0104-4369-84BC-D37694168613}" type="datetimeFigureOut">
               <a:rPr kumimoji="1" lang="ja-JP" altLang="en-US" smtClean="0"/>
-              <a:t>2018/7/21</a:t>
+              <a:t>2018/7/24</a:t>
             </a:fld>
             <a:endParaRPr kumimoji="1" lang="ja-JP" altLang="en-US"/>
           </a:p>
@@ -903,7 +903,7 @@
           <a:p>
             <a:fld id="{E90ED720-0104-4369-84BC-D37694168613}" type="datetimeFigureOut">
               <a:rPr kumimoji="1" lang="ja-JP" altLang="en-US" smtClean="0"/>
-              <a:t>2018/7/21</a:t>
+              <a:t>2018/7/24</a:t>
             </a:fld>
             <a:endParaRPr kumimoji="1" lang="ja-JP" altLang="en-US"/>
           </a:p>
@@ -1143,7 +1143,7 @@
           <a:p>
             <a:fld id="{E90ED720-0104-4369-84BC-D37694168613}" type="datetimeFigureOut">
               <a:rPr kumimoji="1" lang="ja-JP" altLang="en-US" smtClean="0"/>
-              <a:t>2018/7/21</a:t>
+              <a:t>2018/7/24</a:t>
             </a:fld>
             <a:endParaRPr kumimoji="1" lang="ja-JP" altLang="en-US"/>
           </a:p>
@@ -1487,7 +1487,7 @@
           <a:p>
             <a:fld id="{E90ED720-0104-4369-84BC-D37694168613}" type="datetimeFigureOut">
               <a:rPr kumimoji="1" lang="ja-JP" altLang="en-US" smtClean="0"/>
-              <a:t>2018/7/21</a:t>
+              <a:t>2018/7/24</a:t>
             </a:fld>
             <a:endParaRPr kumimoji="1" lang="ja-JP" altLang="en-US"/>
           </a:p>
@@ -1965,7 +1965,7 @@
           <a:p>
             <a:fld id="{E90ED720-0104-4369-84BC-D37694168613}" type="datetimeFigureOut">
               <a:rPr kumimoji="1" lang="ja-JP" altLang="en-US" smtClean="0"/>
-              <a:t>2018/7/21</a:t>
+              <a:t>2018/7/24</a:t>
             </a:fld>
             <a:endParaRPr kumimoji="1" lang="ja-JP" altLang="en-US"/>
           </a:p>
@@ -2077,7 +2077,7 @@
           <a:p>
             <a:fld id="{E90ED720-0104-4369-84BC-D37694168613}" type="datetimeFigureOut">
               <a:rPr kumimoji="1" lang="ja-JP" altLang="en-US" smtClean="0"/>
-              <a:t>2018/7/21</a:t>
+              <a:t>2018/7/24</a:t>
             </a:fld>
             <a:endParaRPr kumimoji="1" lang="ja-JP" altLang="en-US"/>
           </a:p>
@@ -2167,7 +2167,7 @@
           <a:p>
             <a:fld id="{E90ED720-0104-4369-84BC-D37694168613}" type="datetimeFigureOut">
               <a:rPr kumimoji="1" lang="ja-JP" altLang="en-US" smtClean="0"/>
-              <a:t>2018/7/21</a:t>
+              <a:t>2018/7/24</a:t>
             </a:fld>
             <a:endParaRPr kumimoji="1" lang="ja-JP" altLang="en-US"/>
           </a:p>
@@ -2469,7 +2469,7 @@
           <a:p>
             <a:fld id="{E90ED720-0104-4369-84BC-D37694168613}" type="datetimeFigureOut">
               <a:rPr kumimoji="1" lang="ja-JP" altLang="en-US" smtClean="0"/>
-              <a:t>2018/7/21</a:t>
+              <a:t>2018/7/24</a:t>
             </a:fld>
             <a:endParaRPr kumimoji="1" lang="ja-JP" altLang="en-US"/>
           </a:p>
@@ -2716,7 +2716,7 @@
           <a:p>
             <a:fld id="{E90ED720-0104-4369-84BC-D37694168613}" type="datetimeFigureOut">
               <a:rPr kumimoji="1" lang="ja-JP" altLang="en-US" smtClean="0"/>
-              <a:t>2018/7/21</a:t>
+              <a:t>2018/7/24</a:t>
             </a:fld>
             <a:endParaRPr kumimoji="1" lang="ja-JP" altLang="en-US"/>
           </a:p>
@@ -2954,7 +2954,7 @@
           <a:p>
             <a:fld id="{E90ED720-0104-4369-84BC-D37694168613}" type="datetimeFigureOut">
               <a:rPr kumimoji="1" lang="ja-JP" altLang="en-US" smtClean="0"/>
-              <a:t>2018/7/21</a:t>
+              <a:t>2018/7/24</a:t>
             </a:fld>
             <a:endParaRPr kumimoji="1" lang="ja-JP" altLang="en-US"/>
           </a:p>
@@ -5215,7 +5215,7 @@
           <p:cNvPr id="2" name="TextBox 1">
             <a:extLst>
               <a:ext uri="{FF2B5EF4-FFF2-40B4-BE49-F238E27FC236}">
-                <a16:creationId xmlns:a16="http://schemas.microsoft.com/office/drawing/2014/main" id="{7089F4EE-31CC-4C8C-99D2-9CC3B35FDCAC}"/>
+                <a16:creationId xmlns="" xmlns:a16="http://schemas.microsoft.com/office/drawing/2014/main" id="{7089F4EE-31CC-4C8C-99D2-9CC3B35FDCAC}"/>
               </a:ext>
             </a:extLst>
           </p:cNvPr>
@@ -5373,7 +5373,7 @@
           <p:cNvPr id="3" name="TextBox 2">
             <a:extLst>
               <a:ext uri="{FF2B5EF4-FFF2-40B4-BE49-F238E27FC236}">
-                <a16:creationId xmlns:a16="http://schemas.microsoft.com/office/drawing/2014/main" id="{DB438EAF-213C-40F1-8DF0-CF7CBF419389}"/>
+                <a16:creationId xmlns="" xmlns:a16="http://schemas.microsoft.com/office/drawing/2014/main" id="{DB438EAF-213C-40F1-8DF0-CF7CBF419389}"/>
               </a:ext>
             </a:extLst>
           </p:cNvPr>
@@ -5563,7 +5563,7 @@
           <p:cNvPr id="4" name="TextBox 3">
             <a:extLst>
               <a:ext uri="{FF2B5EF4-FFF2-40B4-BE49-F238E27FC236}">
-                <a16:creationId xmlns:a16="http://schemas.microsoft.com/office/drawing/2014/main" id="{A645619F-2394-4D3E-89BC-966F9EC14737}"/>
+                <a16:creationId xmlns="" xmlns:a16="http://schemas.microsoft.com/office/drawing/2014/main" id="{A645619F-2394-4D3E-89BC-966F9EC14737}"/>
               </a:ext>
             </a:extLst>
           </p:cNvPr>
@@ -6917,7 +6917,7 @@
           <p:cNvPr id="2" name="TextBox 1">
             <a:extLst>
               <a:ext uri="{FF2B5EF4-FFF2-40B4-BE49-F238E27FC236}">
-                <a16:creationId xmlns:a16="http://schemas.microsoft.com/office/drawing/2014/main" id="{4A5C2DDE-5199-4DBB-ACD3-E82644E46320}"/>
+                <a16:creationId xmlns="" xmlns:a16="http://schemas.microsoft.com/office/drawing/2014/main" id="{4A5C2DDE-5199-4DBB-ACD3-E82644E46320}"/>
               </a:ext>
             </a:extLst>
           </p:cNvPr>
@@ -7481,6 +7481,353 @@
           <a:chExt cx="0" cy="0"/>
         </a:xfrm>
       </p:grpSpPr>
+      <p:sp>
+        <p:nvSpPr>
+          <p:cNvPr id="2" name="テキスト ボックス 1"/>
+          <p:cNvSpPr txBox="1"/>
+          <p:nvPr/>
+        </p:nvSpPr>
+        <p:spPr>
+          <a:xfrm>
+            <a:off x="0" y="0"/>
+            <a:ext cx="5715000" cy="5909310"/>
+          </a:xfrm>
+          <a:prstGeom prst="rect">
+            <a:avLst/>
+          </a:prstGeom>
+          <a:noFill/>
+        </p:spPr>
+        <p:txBody>
+          <a:bodyPr wrap="square" rtlCol="0">
+            <a:spAutoFit/>
+          </a:bodyPr>
+          <a:lstStyle/>
+          <a:p>
+            <a:r>
+              <a:rPr lang="en-US" altLang="ja-JP" dirty="0" smtClean="0"/>
+              <a:t>Funds</a:t>
+            </a:r>
+            <a:r>
+              <a:rPr lang="zh-CN" altLang="en-US" dirty="0" smtClean="0"/>
+              <a:t>分类</a:t>
+            </a:r>
+            <a:r>
+              <a:rPr lang="en-US" altLang="zh-CN" dirty="0" smtClean="0"/>
+              <a:t>:</a:t>
+            </a:r>
+          </a:p>
+          <a:p>
+            <a:r>
+              <a:rPr lang="zh-CN" altLang="en-US" dirty="0" smtClean="0"/>
+              <a:t>一般分为两类，</a:t>
+            </a:r>
+            <a:r>
+              <a:rPr lang="en-US" altLang="zh-CN" dirty="0" smtClean="0"/>
+              <a:t>Hedge Fund</a:t>
+            </a:r>
+            <a:r>
+              <a:rPr lang="zh-CN" altLang="en-US" dirty="0" smtClean="0"/>
+              <a:t>和</a:t>
+            </a:r>
+            <a:r>
+              <a:rPr lang="en-US" altLang="zh-CN" dirty="0" smtClean="0"/>
+              <a:t>Mutual fund</a:t>
+            </a:r>
+          </a:p>
+          <a:p>
+            <a:pPr marL="285750" indent="-285750">
+              <a:buFont typeface="Arial" panose="020B0604020202020204" pitchFamily="34" charset="0"/>
+              <a:buChar char="•"/>
+            </a:pPr>
+            <a:r>
+              <a:rPr kumimoji="1" lang="en-US" altLang="ja-JP" b="1" dirty="0" smtClean="0">
+                <a:solidFill>
+                  <a:srgbClr val="FF0000"/>
+                </a:solidFill>
+              </a:rPr>
+              <a:t>Hedge fund</a:t>
+            </a:r>
+            <a:r>
+              <a:rPr kumimoji="1" lang="en-US" altLang="ja-JP" dirty="0" smtClean="0"/>
+              <a:t>: </a:t>
+            </a:r>
+            <a:r>
+              <a:rPr kumimoji="1" lang="zh-CN" altLang="en-US" dirty="0" smtClean="0"/>
+              <a:t>汉语名应该叫私募</a:t>
+            </a:r>
+            <a:endParaRPr kumimoji="1" lang="en-US" altLang="zh-CN" dirty="0" smtClean="0"/>
+          </a:p>
+          <a:p>
+            <a:pPr marL="742950" lvl="1" indent="-285750">
+              <a:buFont typeface="Arial" panose="020B0604020202020204" pitchFamily="34" charset="0"/>
+              <a:buChar char="•"/>
+            </a:pPr>
+            <a:r>
+              <a:rPr lang="zh-CN" altLang="en-US" dirty="0"/>
+              <a:t>就美国而</a:t>
+            </a:r>
+            <a:r>
+              <a:rPr lang="zh-CN" altLang="en-US" dirty="0" smtClean="0"/>
+              <a:t>言，没有被</a:t>
+            </a:r>
+            <a:r>
+              <a:rPr lang="en-US" altLang="zh-CN" dirty="0" smtClean="0"/>
+              <a:t>SEC</a:t>
+            </a:r>
+            <a:r>
+              <a:rPr lang="zh-CN" altLang="en-US" dirty="0" smtClean="0"/>
+              <a:t>管理</a:t>
+            </a:r>
+            <a:endParaRPr lang="en-US" altLang="zh-CN" dirty="0" smtClean="0"/>
+          </a:p>
+          <a:p>
+            <a:pPr marL="742950" lvl="1" indent="-285750">
+              <a:buFont typeface="Arial" panose="020B0604020202020204" pitchFamily="34" charset="0"/>
+              <a:buChar char="•"/>
+            </a:pPr>
+            <a:r>
+              <a:rPr lang="zh-CN" altLang="en-US" dirty="0" smtClean="0"/>
+              <a:t>用的</a:t>
+            </a:r>
+            <a:r>
+              <a:rPr lang="en-US" altLang="zh-CN" dirty="0" smtClean="0"/>
+              <a:t>technique</a:t>
+            </a:r>
+            <a:r>
+              <a:rPr lang="zh-CN" altLang="en-US" dirty="0" smtClean="0"/>
+              <a:t>和</a:t>
+            </a:r>
+            <a:r>
+              <a:rPr lang="en-US" altLang="zh-CN" dirty="0" smtClean="0"/>
+              <a:t>mutual fund</a:t>
+            </a:r>
+            <a:r>
+              <a:rPr lang="zh-CN" altLang="en-US" dirty="0" smtClean="0"/>
+              <a:t>不同，经常</a:t>
+            </a:r>
+            <a:r>
+              <a:rPr lang="zh-CN" altLang="en-US" b="1" dirty="0" smtClean="0"/>
+              <a:t>借钱买卖股票</a:t>
+            </a:r>
+            <a:r>
+              <a:rPr lang="zh-CN" altLang="en-US" dirty="0" smtClean="0"/>
+              <a:t>，以使收益最大化 </a:t>
+            </a:r>
+            <a:r>
+              <a:rPr lang="en-US" altLang="zh-CN" dirty="0" smtClean="0"/>
+              <a:t>(</a:t>
+            </a:r>
+            <a:r>
+              <a:rPr lang="zh-CN" altLang="en-US" dirty="0" smtClean="0"/>
+              <a:t>这技巧叫</a:t>
+            </a:r>
+            <a:r>
+              <a:rPr lang="en-US" altLang="zh-CN" b="1" dirty="0" smtClean="0"/>
+              <a:t>leverage</a:t>
+            </a:r>
+            <a:r>
+              <a:rPr lang="en-US" altLang="zh-CN" dirty="0" smtClean="0"/>
+              <a:t>)</a:t>
+            </a:r>
+          </a:p>
+          <a:p>
+            <a:pPr marL="742950" lvl="1" indent="-285750">
+              <a:buFont typeface="Arial" panose="020B0604020202020204" pitchFamily="34" charset="0"/>
+              <a:buChar char="•"/>
+            </a:pPr>
+            <a:r>
+              <a:rPr lang="zh-CN" altLang="en-US" dirty="0" smtClean="0"/>
+              <a:t>经常投资 </a:t>
+            </a:r>
+            <a:r>
+              <a:rPr lang="en-US" altLang="zh-CN" dirty="0" smtClean="0"/>
+              <a:t>derivatives</a:t>
+            </a:r>
+          </a:p>
+          <a:p>
+            <a:pPr marL="742950" lvl="1" indent="-285750">
+              <a:buFont typeface="Arial" panose="020B0604020202020204" pitchFamily="34" charset="0"/>
+              <a:buChar char="•"/>
+            </a:pPr>
+            <a:r>
+              <a:rPr lang="zh-CN" altLang="en-US" dirty="0"/>
+              <a:t>一般</a:t>
+            </a:r>
+            <a:r>
+              <a:rPr lang="zh-CN" altLang="en-US" dirty="0" smtClean="0"/>
+              <a:t>是“死期投资”，不能随时出入</a:t>
+            </a:r>
+            <a:r>
+              <a:rPr lang="en-US" altLang="zh-CN" dirty="0" smtClean="0"/>
+              <a:t>fund (</a:t>
+            </a:r>
+            <a:r>
+              <a:rPr lang="zh-CN" altLang="en-US" dirty="0" smtClean="0"/>
+              <a:t>比如说一投就是</a:t>
+            </a:r>
+            <a:r>
+              <a:rPr lang="en-US" altLang="zh-CN" dirty="0" smtClean="0"/>
+              <a:t>5</a:t>
+            </a:r>
+            <a:r>
+              <a:rPr lang="zh-CN" altLang="en-US" dirty="0" smtClean="0"/>
+              <a:t>年</a:t>
+            </a:r>
+            <a:r>
+              <a:rPr lang="en-US" altLang="zh-CN" dirty="0" smtClean="0"/>
+              <a:t>)</a:t>
+            </a:r>
+          </a:p>
+          <a:p>
+            <a:pPr marL="742950" lvl="1" indent="-285750">
+              <a:buFont typeface="Arial" panose="020B0604020202020204" pitchFamily="34" charset="0"/>
+              <a:buChar char="•"/>
+            </a:pPr>
+            <a:r>
+              <a:rPr lang="zh-CN" altLang="en-US" dirty="0" smtClean="0"/>
+              <a:t>能入</a:t>
+            </a:r>
+            <a:r>
+              <a:rPr lang="en-US" altLang="zh-CN" dirty="0" smtClean="0"/>
+              <a:t>hedge fund</a:t>
+            </a:r>
+            <a:r>
+              <a:rPr lang="zh-CN" altLang="en-US" dirty="0" smtClean="0"/>
+              <a:t>的一般是很有钱的人或者</a:t>
+            </a:r>
+            <a:r>
+              <a:rPr lang="en-US" altLang="zh-CN" dirty="0" smtClean="0"/>
+              <a:t>institutes</a:t>
+            </a:r>
+            <a:endParaRPr kumimoji="1" lang="en-US" altLang="ja-JP" dirty="0" smtClean="0"/>
+          </a:p>
+          <a:p>
+            <a:pPr marL="285750" indent="-285750">
+              <a:buFont typeface="Arial" panose="020B0604020202020204" pitchFamily="34" charset="0"/>
+              <a:buChar char="•"/>
+            </a:pPr>
+            <a:r>
+              <a:rPr kumimoji="1" lang="en-US" altLang="zh-CN" b="1" dirty="0" smtClean="0">
+                <a:solidFill>
+                  <a:srgbClr val="FF0000"/>
+                </a:solidFill>
+              </a:rPr>
+              <a:t>Mutual fund</a:t>
+            </a:r>
+            <a:r>
+              <a:rPr kumimoji="1" lang="en-US" altLang="zh-CN" dirty="0" smtClean="0"/>
+              <a:t>: </a:t>
+            </a:r>
+            <a:r>
+              <a:rPr kumimoji="1" lang="zh-CN" altLang="en-US" dirty="0" smtClean="0"/>
+              <a:t>就是一般基金，根据策略可细分为</a:t>
+            </a:r>
+            <a:r>
+              <a:rPr kumimoji="1" lang="en-US" altLang="zh-CN" dirty="0" smtClean="0"/>
+              <a:t>index fund, balanced fund</a:t>
+            </a:r>
+          </a:p>
+          <a:p>
+            <a:pPr marL="742950" lvl="1" indent="-285750">
+              <a:buFont typeface="Arial" panose="020B0604020202020204" pitchFamily="34" charset="0"/>
+              <a:buChar char="•"/>
+            </a:pPr>
+            <a:r>
+              <a:rPr kumimoji="1" lang="zh-CN" altLang="en-US" dirty="0" smtClean="0"/>
+              <a:t>从散户收集资金</a:t>
+            </a:r>
+            <a:endParaRPr kumimoji="1" lang="en-US" altLang="zh-CN" dirty="0" smtClean="0"/>
+          </a:p>
+          <a:p>
+            <a:pPr marL="742950" lvl="1" indent="-285750">
+              <a:buFont typeface="Arial" panose="020B0604020202020204" pitchFamily="34" charset="0"/>
+              <a:buChar char="•"/>
+            </a:pPr>
+            <a:r>
+              <a:rPr lang="zh-CN" altLang="en-US" dirty="0" smtClean="0"/>
+              <a:t>每天计算</a:t>
+            </a:r>
+            <a:r>
+              <a:rPr lang="en-US" altLang="zh-CN" dirty="0" smtClean="0"/>
+              <a:t>mutual fund</a:t>
+            </a:r>
+            <a:r>
+              <a:rPr lang="zh-CN" altLang="en-US" dirty="0" smtClean="0"/>
+              <a:t>的</a:t>
+            </a:r>
+            <a:r>
+              <a:rPr lang="en-US" altLang="zh-CN" dirty="0" smtClean="0"/>
+              <a:t>share price</a:t>
+            </a:r>
+            <a:r>
+              <a:rPr lang="zh-CN" altLang="en-US" dirty="0" smtClean="0"/>
+              <a:t>，可以随时出入</a:t>
+            </a:r>
+            <a:endParaRPr lang="en-US" altLang="zh-CN" dirty="0" smtClean="0"/>
+          </a:p>
+          <a:p>
+            <a:pPr marL="742950" lvl="1" indent="-285750">
+              <a:buFont typeface="Arial" panose="020B0604020202020204" pitchFamily="34" charset="0"/>
+              <a:buChar char="•"/>
+            </a:pPr>
+            <a:r>
+              <a:rPr kumimoji="1" lang="zh-CN" altLang="en-US" dirty="0" smtClean="0"/>
+              <a:t>被</a:t>
+            </a:r>
+            <a:r>
+              <a:rPr kumimoji="1" lang="en-US" altLang="zh-CN" dirty="0" smtClean="0"/>
+              <a:t>SEC</a:t>
+            </a:r>
+            <a:r>
+              <a:rPr kumimoji="1" lang="zh-CN" altLang="en-US" dirty="0" smtClean="0"/>
+              <a:t>管理，投资种类有限定，比较稳妥的是投</a:t>
+            </a:r>
+            <a:r>
+              <a:rPr kumimoji="1" lang="en-US" altLang="zh-CN" dirty="0" smtClean="0"/>
+              <a:t>government/cooperate bonds</a:t>
+            </a:r>
+            <a:r>
+              <a:rPr kumimoji="1" lang="zh-CN" altLang="en-US" dirty="0" smtClean="0"/>
+              <a:t>和</a:t>
+            </a:r>
+            <a:r>
+              <a:rPr lang="zh-CN" altLang="en-US" dirty="0" smtClean="0"/>
+              <a:t>买</a:t>
+            </a:r>
+            <a:r>
+              <a:rPr lang="en-US" altLang="zh-CN" dirty="0" smtClean="0"/>
+              <a:t>index</a:t>
+            </a:r>
+            <a:r>
+              <a:rPr lang="zh-CN" altLang="en-US" dirty="0" smtClean="0"/>
+              <a:t>中所有</a:t>
+            </a:r>
+            <a:r>
+              <a:rPr lang="zh-CN" altLang="en-US" dirty="0" smtClean="0"/>
+              <a:t>股票</a:t>
+            </a:r>
+            <a:endParaRPr lang="en-US" altLang="zh-CN" dirty="0" smtClean="0"/>
+          </a:p>
+          <a:p>
+            <a:pPr marL="742950" lvl="1" indent="-285750">
+              <a:buFont typeface="Arial" panose="020B0604020202020204" pitchFamily="34" charset="0"/>
+              <a:buChar char="•"/>
+            </a:pPr>
+            <a:endParaRPr lang="en-US" altLang="zh-CN" dirty="0"/>
+          </a:p>
+          <a:p>
+            <a:r>
+              <a:rPr lang="zh-CN" altLang="en-US" dirty="0" smtClean="0"/>
+              <a:t>现</a:t>
+            </a:r>
+            <a:r>
+              <a:rPr lang="zh-CN" altLang="en-US" smtClean="0"/>
+              <a:t>在先理解到这，之后有需要再详细查。</a:t>
+            </a:r>
+            <a:endParaRPr lang="en-US" altLang="zh-CN" dirty="0"/>
+          </a:p>
+        </p:txBody>
+      </p:sp>
     </p:spTree>
     <p:extLst>
       <p:ext uri="{BB962C8B-B14F-4D97-AF65-F5344CB8AC3E}">

</xml_diff>

<commit_message>
added Buffett Indicator & P/S ratio knowledge
</commit_message>
<xml_diff>
--- a/[BeAInvestor].pptx
+++ b/[BeAInvestor].pptx
@@ -12,6 +12,7 @@
     <p:sldId id="258" r:id="rId6"/>
     <p:sldId id="259" r:id="rId7"/>
     <p:sldId id="256" r:id="rId8"/>
+    <p:sldId id="263" r:id="rId9"/>
   </p:sldIdLst>
   <p:sldSz cx="5715000" cy="9144000" type="screen16x10"/>
   <p:notesSz cx="6858000" cy="9144000"/>
@@ -112,7 +113,7 @@
   </p:defaultTextStyle>
   <p:extLst>
     <p:ext uri="{EFAFB233-063F-42B5-8137-9DF3F51BA10A}">
-      <p15:sldGuideLst xmlns="" xmlns:p15="http://schemas.microsoft.com/office/powerpoint/2012/main">
+      <p15:sldGuideLst xmlns:p15="http://schemas.microsoft.com/office/powerpoint/2012/main" xmlns="">
         <p15:guide id="1" orient="horz" pos="2880">
           <p15:clr>
             <a:srgbClr val="A4A3A4"/>
@@ -308,7 +309,7 @@
           <a:p>
             <a:fld id="{E90ED720-0104-4369-84BC-D37694168613}" type="datetimeFigureOut">
               <a:rPr kumimoji="1" lang="ja-JP" altLang="en-US" smtClean="0"/>
-              <a:t>2018/7/24</a:t>
+              <a:t>2018/8/9</a:t>
             </a:fld>
             <a:endParaRPr kumimoji="1" lang="ja-JP" altLang="en-US"/>
           </a:p>
@@ -503,7 +504,7 @@
           <a:p>
             <a:fld id="{E90ED720-0104-4369-84BC-D37694168613}" type="datetimeFigureOut">
               <a:rPr kumimoji="1" lang="ja-JP" altLang="en-US" smtClean="0"/>
-              <a:t>2018/7/24</a:t>
+              <a:t>2018/8/9</a:t>
             </a:fld>
             <a:endParaRPr kumimoji="1" lang="ja-JP" altLang="en-US"/>
           </a:p>
@@ -708,7 +709,7 @@
           <a:p>
             <a:fld id="{E90ED720-0104-4369-84BC-D37694168613}" type="datetimeFigureOut">
               <a:rPr kumimoji="1" lang="ja-JP" altLang="en-US" smtClean="0"/>
-              <a:t>2018/7/24</a:t>
+              <a:t>2018/8/9</a:t>
             </a:fld>
             <a:endParaRPr kumimoji="1" lang="ja-JP" altLang="en-US"/>
           </a:p>
@@ -903,7 +904,7 @@
           <a:p>
             <a:fld id="{E90ED720-0104-4369-84BC-D37694168613}" type="datetimeFigureOut">
               <a:rPr kumimoji="1" lang="ja-JP" altLang="en-US" smtClean="0"/>
-              <a:t>2018/7/24</a:t>
+              <a:t>2018/8/9</a:t>
             </a:fld>
             <a:endParaRPr kumimoji="1" lang="ja-JP" altLang="en-US"/>
           </a:p>
@@ -1143,7 +1144,7 @@
           <a:p>
             <a:fld id="{E90ED720-0104-4369-84BC-D37694168613}" type="datetimeFigureOut">
               <a:rPr kumimoji="1" lang="ja-JP" altLang="en-US" smtClean="0"/>
-              <a:t>2018/7/24</a:t>
+              <a:t>2018/8/9</a:t>
             </a:fld>
             <a:endParaRPr kumimoji="1" lang="ja-JP" altLang="en-US"/>
           </a:p>
@@ -1487,7 +1488,7 @@
           <a:p>
             <a:fld id="{E90ED720-0104-4369-84BC-D37694168613}" type="datetimeFigureOut">
               <a:rPr kumimoji="1" lang="ja-JP" altLang="en-US" smtClean="0"/>
-              <a:t>2018/7/24</a:t>
+              <a:t>2018/8/9</a:t>
             </a:fld>
             <a:endParaRPr kumimoji="1" lang="ja-JP" altLang="en-US"/>
           </a:p>
@@ -1965,7 +1966,7 @@
           <a:p>
             <a:fld id="{E90ED720-0104-4369-84BC-D37694168613}" type="datetimeFigureOut">
               <a:rPr kumimoji="1" lang="ja-JP" altLang="en-US" smtClean="0"/>
-              <a:t>2018/7/24</a:t>
+              <a:t>2018/8/9</a:t>
             </a:fld>
             <a:endParaRPr kumimoji="1" lang="ja-JP" altLang="en-US"/>
           </a:p>
@@ -2077,7 +2078,7 @@
           <a:p>
             <a:fld id="{E90ED720-0104-4369-84BC-D37694168613}" type="datetimeFigureOut">
               <a:rPr kumimoji="1" lang="ja-JP" altLang="en-US" smtClean="0"/>
-              <a:t>2018/7/24</a:t>
+              <a:t>2018/8/9</a:t>
             </a:fld>
             <a:endParaRPr kumimoji="1" lang="ja-JP" altLang="en-US"/>
           </a:p>
@@ -2167,7 +2168,7 @@
           <a:p>
             <a:fld id="{E90ED720-0104-4369-84BC-D37694168613}" type="datetimeFigureOut">
               <a:rPr kumimoji="1" lang="ja-JP" altLang="en-US" smtClean="0"/>
-              <a:t>2018/7/24</a:t>
+              <a:t>2018/8/9</a:t>
             </a:fld>
             <a:endParaRPr kumimoji="1" lang="ja-JP" altLang="en-US"/>
           </a:p>
@@ -2469,7 +2470,7 @@
           <a:p>
             <a:fld id="{E90ED720-0104-4369-84BC-D37694168613}" type="datetimeFigureOut">
               <a:rPr kumimoji="1" lang="ja-JP" altLang="en-US" smtClean="0"/>
-              <a:t>2018/7/24</a:t>
+              <a:t>2018/8/9</a:t>
             </a:fld>
             <a:endParaRPr kumimoji="1" lang="ja-JP" altLang="en-US"/>
           </a:p>
@@ -2716,7 +2717,7 @@
           <a:p>
             <a:fld id="{E90ED720-0104-4369-84BC-D37694168613}" type="datetimeFigureOut">
               <a:rPr kumimoji="1" lang="ja-JP" altLang="en-US" smtClean="0"/>
-              <a:t>2018/7/24</a:t>
+              <a:t>2018/8/9</a:t>
             </a:fld>
             <a:endParaRPr kumimoji="1" lang="ja-JP" altLang="en-US"/>
           </a:p>
@@ -2954,7 +2955,7 @@
           <a:p>
             <a:fld id="{E90ED720-0104-4369-84BC-D37694168613}" type="datetimeFigureOut">
               <a:rPr kumimoji="1" lang="ja-JP" altLang="en-US" smtClean="0"/>
-              <a:t>2018/7/24</a:t>
+              <a:t>2018/8/9</a:t>
             </a:fld>
             <a:endParaRPr kumimoji="1" lang="ja-JP" altLang="en-US"/>
           </a:p>
@@ -5215,7 +5216,7 @@
           <p:cNvPr id="2" name="TextBox 1">
             <a:extLst>
               <a:ext uri="{FF2B5EF4-FFF2-40B4-BE49-F238E27FC236}">
-                <a16:creationId xmlns="" xmlns:a16="http://schemas.microsoft.com/office/drawing/2014/main" id="{7089F4EE-31CC-4C8C-99D2-9CC3B35FDCAC}"/>
+                <a16:creationId xmlns:a16="http://schemas.microsoft.com/office/drawing/2014/main" xmlns="" id="{7089F4EE-31CC-4C8C-99D2-9CC3B35FDCAC}"/>
               </a:ext>
             </a:extLst>
           </p:cNvPr>
@@ -5373,7 +5374,7 @@
           <p:cNvPr id="3" name="TextBox 2">
             <a:extLst>
               <a:ext uri="{FF2B5EF4-FFF2-40B4-BE49-F238E27FC236}">
-                <a16:creationId xmlns="" xmlns:a16="http://schemas.microsoft.com/office/drawing/2014/main" id="{DB438EAF-213C-40F1-8DF0-CF7CBF419389}"/>
+                <a16:creationId xmlns:a16="http://schemas.microsoft.com/office/drawing/2014/main" xmlns="" id="{DB438EAF-213C-40F1-8DF0-CF7CBF419389}"/>
               </a:ext>
             </a:extLst>
           </p:cNvPr>
@@ -5563,7 +5564,7 @@
           <p:cNvPr id="4" name="TextBox 3">
             <a:extLst>
               <a:ext uri="{FF2B5EF4-FFF2-40B4-BE49-F238E27FC236}">
-                <a16:creationId xmlns="" xmlns:a16="http://schemas.microsoft.com/office/drawing/2014/main" id="{A645619F-2394-4D3E-89BC-966F9EC14737}"/>
+                <a16:creationId xmlns:a16="http://schemas.microsoft.com/office/drawing/2014/main" xmlns="" id="{A645619F-2394-4D3E-89BC-966F9EC14737}"/>
               </a:ext>
             </a:extLst>
           </p:cNvPr>
@@ -6917,7 +6918,7 @@
           <p:cNvPr id="2" name="TextBox 1">
             <a:extLst>
               <a:ext uri="{FF2B5EF4-FFF2-40B4-BE49-F238E27FC236}">
-                <a16:creationId xmlns="" xmlns:a16="http://schemas.microsoft.com/office/drawing/2014/main" id="{4A5C2DDE-5199-4DBB-ACD3-E82644E46320}"/>
+                <a16:creationId xmlns:a16="http://schemas.microsoft.com/office/drawing/2014/main" xmlns="" id="{4A5C2DDE-5199-4DBB-ACD3-E82644E46320}"/>
               </a:ext>
             </a:extLst>
           </p:cNvPr>
@@ -7800,11 +7801,7 @@
             </a:r>
             <a:r>
               <a:rPr lang="zh-CN" altLang="en-US" dirty="0" smtClean="0"/>
-              <a:t>中所有</a:t>
-            </a:r>
-            <a:r>
-              <a:rPr lang="zh-CN" altLang="en-US" dirty="0" smtClean="0"/>
-              <a:t>股票</a:t>
+              <a:t>中所有股票</a:t>
             </a:r>
             <a:endParaRPr lang="en-US" altLang="zh-CN" dirty="0" smtClean="0"/>
           </a:p>
@@ -7832,6 +7829,321 @@
     <p:extLst>
       <p:ext uri="{BB962C8B-B14F-4D97-AF65-F5344CB8AC3E}">
         <p14:creationId xmlns:p14="http://schemas.microsoft.com/office/powerpoint/2010/main" val="3466350154"/>
+      </p:ext>
+    </p:extLst>
+  </p:cSld>
+  <p:clrMapOvr>
+    <a:masterClrMapping/>
+  </p:clrMapOvr>
+</p:sld>
+</file>
+
+<file path=ppt/slides/slide8.xml><?xml version="1.0" encoding="utf-8"?>
+<p:sld xmlns:a="http://schemas.openxmlformats.org/drawingml/2006/main" xmlns:r="http://schemas.openxmlformats.org/officeDocument/2006/relationships" xmlns:p="http://schemas.openxmlformats.org/presentationml/2006/main">
+  <p:cSld>
+    <p:spTree>
+      <p:nvGrpSpPr>
+        <p:cNvPr id="1" name=""/>
+        <p:cNvGrpSpPr/>
+        <p:nvPr/>
+      </p:nvGrpSpPr>
+      <p:grpSpPr>
+        <a:xfrm>
+          <a:off x="0" y="0"/>
+          <a:ext cx="0" cy="0"/>
+          <a:chOff x="0" y="0"/>
+          <a:chExt cx="0" cy="0"/>
+        </a:xfrm>
+      </p:grpSpPr>
+      <p:sp>
+        <p:nvSpPr>
+          <p:cNvPr id="3" name="テキスト ボックス 2"/>
+          <p:cNvSpPr txBox="1"/>
+          <p:nvPr/>
+        </p:nvSpPr>
+        <p:spPr>
+          <a:xfrm>
+            <a:off x="-1" y="0"/>
+            <a:ext cx="5715001" cy="7294305"/>
+          </a:xfrm>
+          <a:prstGeom prst="rect">
+            <a:avLst/>
+          </a:prstGeom>
+          <a:noFill/>
+        </p:spPr>
+        <p:txBody>
+          <a:bodyPr wrap="square" rtlCol="0">
+            <a:spAutoFit/>
+          </a:bodyPr>
+          <a:lstStyle/>
+          <a:p>
+            <a:r>
+              <a:rPr kumimoji="1" lang="en-US" altLang="ja-JP" b="1" dirty="0" smtClean="0">
+                <a:solidFill>
+                  <a:srgbClr val="FF0000"/>
+                </a:solidFill>
+              </a:rPr>
+              <a:t>Buffet</a:t>
+            </a:r>
+            <a:r>
+              <a:rPr lang="en-US" altLang="ja-JP" b="1" dirty="0" smtClean="0">
+                <a:solidFill>
+                  <a:srgbClr val="FF0000"/>
+                </a:solidFill>
+              </a:rPr>
+              <a:t>t Indicator</a:t>
+            </a:r>
+            <a:r>
+              <a:rPr lang="en-US" altLang="ja-JP" dirty="0" smtClean="0"/>
+              <a:t>:</a:t>
+            </a:r>
+          </a:p>
+          <a:p>
+            <a:pPr marL="285750" indent="-285750">
+              <a:buFont typeface="Arial" panose="020B0604020202020204" pitchFamily="34" charset="0"/>
+              <a:buChar char="•"/>
+            </a:pPr>
+            <a:r>
+              <a:rPr kumimoji="1" lang="en-US" altLang="ja-JP" dirty="0" smtClean="0"/>
+              <a:t>Aka. Market cap to GDP ratio</a:t>
+            </a:r>
+          </a:p>
+          <a:p>
+            <a:pPr marL="285750" indent="-285750">
+              <a:buFont typeface="Arial" panose="020B0604020202020204" pitchFamily="34" charset="0"/>
+              <a:buChar char="•"/>
+            </a:pPr>
+            <a:r>
+              <a:rPr lang="en-US" altLang="ja-JP" dirty="0" smtClean="0"/>
+              <a:t>To assess whether the country’s stock market is overvalued or undervalued (</a:t>
+            </a:r>
+            <a:r>
+              <a:rPr lang="zh-CN" altLang="en-US" dirty="0" smtClean="0"/>
+              <a:t>这是一个用来评价</a:t>
+            </a:r>
+            <a:r>
+              <a:rPr lang="zh-CN" altLang="en-US" b="1" dirty="0" smtClean="0"/>
+              <a:t>一个国家的股票市场</a:t>
+            </a:r>
+            <a:r>
+              <a:rPr lang="zh-CN" altLang="en-US" dirty="0" smtClean="0"/>
+              <a:t>的指标，似乎也有用来评价一只股票的类似指标</a:t>
+            </a:r>
+            <a:r>
+              <a:rPr lang="en-US" altLang="ja-JP" dirty="0" smtClean="0"/>
+              <a:t>)</a:t>
+            </a:r>
+          </a:p>
+          <a:p>
+            <a:pPr marL="285750" indent="-285750">
+              <a:buFont typeface="Arial" panose="020B0604020202020204" pitchFamily="34" charset="0"/>
+              <a:buChar char="•"/>
+            </a:pPr>
+            <a:r>
+              <a:rPr lang="en-US" altLang="ja-JP" dirty="0" smtClean="0"/>
+              <a:t>= (value of all public stocks in a country) / (gross domestic product of a country)</a:t>
+            </a:r>
+          </a:p>
+          <a:p>
+            <a:pPr marL="285750" indent="-285750">
+              <a:buFont typeface="Arial" panose="020B0604020202020204" pitchFamily="34" charset="0"/>
+              <a:buChar char="•"/>
+            </a:pPr>
+            <a:r>
+              <a:rPr lang="en-US" altLang="ja-JP" dirty="0" smtClean="0"/>
+              <a:t>The numeric meaning:</a:t>
+            </a:r>
+          </a:p>
+          <a:p>
+            <a:pPr marL="742950" lvl="1" indent="-285750">
+              <a:buFont typeface="Arial" panose="020B0604020202020204" pitchFamily="34" charset="0"/>
+              <a:buChar char="•"/>
+            </a:pPr>
+            <a:r>
+              <a:rPr lang="en-US" altLang="ja-JP" dirty="0" smtClean="0"/>
+              <a:t>~ 50%, stock market too low</a:t>
+            </a:r>
+          </a:p>
+          <a:p>
+            <a:pPr marL="742950" lvl="1" indent="-285750">
+              <a:buFont typeface="Arial" panose="020B0604020202020204" pitchFamily="34" charset="0"/>
+              <a:buChar char="•"/>
+            </a:pPr>
+            <a:r>
+              <a:rPr lang="en-US" altLang="ja-JP" dirty="0" smtClean="0"/>
+              <a:t>75%~90%, stock market is just about right</a:t>
+            </a:r>
+          </a:p>
+          <a:p>
+            <a:pPr marL="742950" lvl="1" indent="-285750">
+              <a:buFont typeface="Arial" panose="020B0604020202020204" pitchFamily="34" charset="0"/>
+              <a:buChar char="•"/>
+            </a:pPr>
+            <a:r>
+              <a:rPr lang="en-US" altLang="ja-JP" dirty="0" smtClean="0"/>
+              <a:t>115%~, overvalued</a:t>
+            </a:r>
+          </a:p>
+          <a:p>
+            <a:pPr marL="742950" lvl="1" indent="-285750">
+              <a:buFont typeface="Arial" panose="020B0604020202020204" pitchFamily="34" charset="0"/>
+              <a:buChar char="•"/>
+            </a:pPr>
+            <a:endParaRPr lang="en-US" altLang="ja-JP" dirty="0"/>
+          </a:p>
+          <a:p>
+            <a:r>
+              <a:rPr lang="en-US" altLang="ja-JP" b="1" dirty="0" smtClean="0">
+                <a:solidFill>
+                  <a:srgbClr val="FF0000"/>
+                </a:solidFill>
+              </a:rPr>
+              <a:t>Price-to-Sales Ratio </a:t>
+            </a:r>
+            <a:r>
+              <a:rPr lang="en-US" altLang="ja-JP" dirty="0" smtClean="0"/>
+              <a:t>(</a:t>
+            </a:r>
+            <a:r>
+              <a:rPr lang="en-US" altLang="ja-JP" b="1" dirty="0" smtClean="0">
+                <a:solidFill>
+                  <a:srgbClr val="FF0000"/>
+                </a:solidFill>
+              </a:rPr>
+              <a:t>P/S ratio</a:t>
+            </a:r>
+            <a:r>
+              <a:rPr lang="en-US" altLang="ja-JP" dirty="0" smtClean="0"/>
+              <a:t>)</a:t>
+            </a:r>
+          </a:p>
+          <a:p>
+            <a:pPr marL="285750" indent="-285750">
+              <a:buFont typeface="Arial" panose="020B0604020202020204" pitchFamily="34" charset="0"/>
+              <a:buChar char="•"/>
+            </a:pPr>
+            <a:r>
+              <a:rPr lang="zh-CN" altLang="en-US" dirty="0" smtClean="0"/>
+              <a:t>和</a:t>
+            </a:r>
+            <a:r>
+              <a:rPr lang="en-US" altLang="zh-CN" dirty="0" smtClean="0"/>
+              <a:t>Buffett indicator</a:t>
+            </a:r>
+            <a:r>
+              <a:rPr lang="zh-CN" altLang="en-US" dirty="0" smtClean="0"/>
+              <a:t>比较相似，用来评价</a:t>
+            </a:r>
+            <a:r>
+              <a:rPr lang="zh-CN" altLang="en-US" b="1" dirty="0" smtClean="0"/>
+              <a:t>一只股票</a:t>
+            </a:r>
+            <a:r>
+              <a:rPr lang="zh-CN" altLang="en-US" dirty="0" smtClean="0"/>
+              <a:t>是</a:t>
+            </a:r>
+            <a:r>
+              <a:rPr lang="en-US" altLang="zh-CN" dirty="0" smtClean="0"/>
+              <a:t>overvalued</a:t>
+            </a:r>
+            <a:r>
+              <a:rPr lang="zh-CN" altLang="en-US" dirty="0" smtClean="0"/>
+              <a:t>还是</a:t>
+            </a:r>
+            <a:r>
+              <a:rPr lang="en-US" altLang="zh-CN" dirty="0" smtClean="0"/>
+              <a:t>under</a:t>
+            </a:r>
+          </a:p>
+          <a:p>
+            <a:pPr marL="285750" indent="-285750">
+              <a:buFont typeface="Arial" panose="020B0604020202020204" pitchFamily="34" charset="0"/>
+              <a:buChar char="•"/>
+            </a:pPr>
+            <a:r>
+              <a:rPr lang="en-US" altLang="ja-JP" dirty="0" smtClean="0"/>
+              <a:t>A indicator of the </a:t>
+            </a:r>
+            <a:r>
+              <a:rPr lang="en-US" altLang="ja-JP" dirty="0"/>
+              <a:t>value placed on each dollar of a company’s sales or </a:t>
+            </a:r>
+            <a:r>
+              <a:rPr lang="en-US" altLang="ja-JP" dirty="0" smtClean="0"/>
+              <a:t>revenues</a:t>
+            </a:r>
+            <a:endParaRPr lang="en-US" altLang="ja-JP" dirty="0"/>
+          </a:p>
+          <a:p>
+            <a:pPr marL="285750" indent="-285750">
+              <a:buFont typeface="Arial" panose="020B0604020202020204" pitchFamily="34" charset="0"/>
+              <a:buChar char="•"/>
+            </a:pPr>
+            <a:r>
+              <a:rPr lang="en-US" altLang="ja-JP" dirty="0"/>
+              <a:t>used to compare </a:t>
+            </a:r>
+            <a:r>
+              <a:rPr lang="en-US" altLang="ja-JP" b="1" dirty="0"/>
+              <a:t>companies in the same </a:t>
+            </a:r>
+            <a:r>
+              <a:rPr lang="en-US" altLang="ja-JP" b="1" dirty="0" smtClean="0"/>
+              <a:t>sector</a:t>
+            </a:r>
+            <a:r>
+              <a:rPr lang="en-US" altLang="ja-JP" dirty="0" smtClean="0"/>
+              <a:t>. </a:t>
+            </a:r>
+            <a:r>
+              <a:rPr lang="en-US" altLang="ja-JP" dirty="0"/>
+              <a:t>A low ratio may indicate possible undervaluation, while a ratio that is significantly above the average may suggest overvaluation</a:t>
+            </a:r>
+            <a:r>
+              <a:rPr lang="en-US" altLang="ja-JP" dirty="0" smtClean="0"/>
+              <a:t>.</a:t>
+            </a:r>
+            <a:endParaRPr lang="en-US" altLang="ja-JP" dirty="0"/>
+          </a:p>
+          <a:p>
+            <a:pPr marL="285750" indent="-285750">
+              <a:buFont typeface="Arial" panose="020B0604020202020204" pitchFamily="34" charset="0"/>
+              <a:buChar char="•"/>
+            </a:pPr>
+            <a:r>
+              <a:rPr lang="en-US" altLang="ja-JP" dirty="0" smtClean="0"/>
+              <a:t>Usually calculate based on yearly sales,</a:t>
+            </a:r>
+          </a:p>
+          <a:p>
+            <a:pPr marL="742950" lvl="1" indent="-285750">
+              <a:buFont typeface="Arial" panose="020B0604020202020204" pitchFamily="34" charset="0"/>
+              <a:buChar char="•"/>
+            </a:pPr>
+            <a:r>
+              <a:rPr lang="en-US" altLang="ja-JP" dirty="0" smtClean="0"/>
+              <a:t>E.g., if a company’s yearly sales is $455 M, this company has 100 M shares, and is trading at $10, then P/S = 10 / (455M/100</a:t>
+            </a:r>
+            <a:r>
+              <a:rPr lang="en-US" altLang="zh-CN" dirty="0" smtClean="0"/>
+              <a:t>M</a:t>
+            </a:r>
+            <a:r>
+              <a:rPr lang="en-US" altLang="zh-CN" dirty="0"/>
+              <a:t>)</a:t>
+            </a:r>
+            <a:r>
+              <a:rPr lang="en-US" altLang="zh-CN" dirty="0" smtClean="0"/>
+              <a:t>= 2.20</a:t>
+            </a:r>
+            <a:endParaRPr lang="en-US" altLang="ja-JP" dirty="0" smtClean="0"/>
+          </a:p>
+        </p:txBody>
+      </p:sp>
+    </p:spTree>
+    <p:extLst>
+      <p:ext uri="{BB962C8B-B14F-4D97-AF65-F5344CB8AC3E}">
+        <p14:creationId xmlns:p14="http://schemas.microsoft.com/office/powerpoint/2010/main" val="1816948120"/>
       </p:ext>
     </p:extLst>
   </p:cSld>

</xml_diff>

<commit_message>
added SMA, adding EMA and MACD
</commit_message>
<xml_diff>
--- a/[BeAInvestor].pptx
+++ b/[BeAInvestor].pptx
@@ -5,14 +5,16 @@
     <p:sldMasterId id="2147483648" r:id="rId1"/>
   </p:sldMasterIdLst>
   <p:sldIdLst>
-    <p:sldId id="261" r:id="rId2"/>
-    <p:sldId id="262" r:id="rId3"/>
-    <p:sldId id="260" r:id="rId4"/>
-    <p:sldId id="257" r:id="rId5"/>
-    <p:sldId id="258" r:id="rId6"/>
-    <p:sldId id="259" r:id="rId7"/>
-    <p:sldId id="256" r:id="rId8"/>
-    <p:sldId id="263" r:id="rId9"/>
+    <p:sldId id="264" r:id="rId2"/>
+    <p:sldId id="261" r:id="rId3"/>
+    <p:sldId id="262" r:id="rId4"/>
+    <p:sldId id="260" r:id="rId5"/>
+    <p:sldId id="257" r:id="rId6"/>
+    <p:sldId id="258" r:id="rId7"/>
+    <p:sldId id="259" r:id="rId8"/>
+    <p:sldId id="256" r:id="rId9"/>
+    <p:sldId id="263" r:id="rId10"/>
+    <p:sldId id="265" r:id="rId11"/>
   </p:sldIdLst>
   <p:sldSz cx="5715000" cy="9144000" type="screen16x10"/>
   <p:notesSz cx="6858000" cy="9144000"/>
@@ -113,7 +115,7 @@
   </p:defaultTextStyle>
   <p:extLst>
     <p:ext uri="{EFAFB233-063F-42B5-8137-9DF3F51BA10A}">
-      <p15:sldGuideLst xmlns:p15="http://schemas.microsoft.com/office/powerpoint/2012/main" xmlns="">
+      <p15:sldGuideLst xmlns="" xmlns:p15="http://schemas.microsoft.com/office/powerpoint/2012/main">
         <p15:guide id="1" orient="horz" pos="2880">
           <p15:clr>
             <a:srgbClr val="A4A3A4"/>
@@ -3333,8 +3335,95 @@
         </p:nvSpPr>
         <p:spPr>
           <a:xfrm>
-            <a:off x="1" y="0"/>
-            <a:ext cx="5715000" cy="10618291"/>
+            <a:off x="-334454" y="2339752"/>
+            <a:ext cx="6243953" cy="1200329"/>
+          </a:xfrm>
+          <a:prstGeom prst="rect">
+            <a:avLst/>
+          </a:prstGeom>
+          <a:noFill/>
+        </p:spPr>
+        <p:txBody>
+          <a:bodyPr wrap="none" rtlCol="0">
+            <a:spAutoFit/>
+          </a:bodyPr>
+          <a:lstStyle/>
+          <a:p>
+            <a:pPr algn="ctr"/>
+            <a:r>
+              <a:rPr kumimoji="1" lang="en-US" altLang="ja-JP" dirty="0" smtClean="0"/>
+              <a:t>This slide is intentionally left blank.</a:t>
+            </a:r>
+          </a:p>
+          <a:p>
+            <a:pPr algn="ctr"/>
+            <a:endParaRPr kumimoji="1" lang="en-US" altLang="ja-JP" dirty="0" smtClean="0"/>
+          </a:p>
+          <a:p>
+            <a:pPr algn="ctr"/>
+            <a:r>
+              <a:rPr lang="en-US" altLang="ja-JP" dirty="0" smtClean="0"/>
+              <a:t>Only add finance, investment concepts to this slide!</a:t>
+            </a:r>
+          </a:p>
+          <a:p>
+            <a:pPr algn="ctr"/>
+            <a:r>
+              <a:rPr kumimoji="1" lang="en-US" altLang="ja-JP" dirty="0" smtClean="0"/>
+              <a:t>About the implementation, refer to another repo “</a:t>
+            </a:r>
+            <a:r>
+              <a:rPr kumimoji="1" lang="en-US" altLang="ja-JP" dirty="0" err="1" smtClean="0"/>
+              <a:t>StockCracker</a:t>
+            </a:r>
+            <a:r>
+              <a:rPr kumimoji="1" lang="en-US" altLang="ja-JP" dirty="0" smtClean="0"/>
+              <a:t>”.</a:t>
+            </a:r>
+            <a:endParaRPr kumimoji="1" lang="ja-JP" altLang="en-US" dirty="0"/>
+          </a:p>
+        </p:txBody>
+      </p:sp>
+    </p:spTree>
+    <p:extLst>
+      <p:ext uri="{BB962C8B-B14F-4D97-AF65-F5344CB8AC3E}">
+        <p14:creationId xmlns:p14="http://schemas.microsoft.com/office/powerpoint/2010/main" val="4159083650"/>
+      </p:ext>
+    </p:extLst>
+  </p:cSld>
+  <p:clrMapOvr>
+    <a:masterClrMapping/>
+  </p:clrMapOvr>
+</p:sld>
+</file>
+
+<file path=ppt/slides/slide10.xml><?xml version="1.0" encoding="utf-8"?>
+<p:sld xmlns:a="http://schemas.openxmlformats.org/drawingml/2006/main" xmlns:r="http://schemas.openxmlformats.org/officeDocument/2006/relationships" xmlns:p="http://schemas.openxmlformats.org/presentationml/2006/main">
+  <p:cSld>
+    <p:spTree>
+      <p:nvGrpSpPr>
+        <p:cNvPr id="1" name=""/>
+        <p:cNvGrpSpPr/>
+        <p:nvPr/>
+      </p:nvGrpSpPr>
+      <p:grpSpPr>
+        <a:xfrm>
+          <a:off x="0" y="0"/>
+          <a:ext cx="0" cy="0"/>
+          <a:chOff x="0" y="0"/>
+          <a:chExt cx="0" cy="0"/>
+        </a:xfrm>
+      </p:grpSpPr>
+      <p:sp>
+        <p:nvSpPr>
+          <p:cNvPr id="2" name="テキスト ボックス 1"/>
+          <p:cNvSpPr txBox="1"/>
+          <p:nvPr/>
+        </p:nvSpPr>
+        <p:spPr>
+          <a:xfrm>
+            <a:off x="0" y="0"/>
+            <a:ext cx="5715000" cy="3785652"/>
           </a:xfrm>
           <a:prstGeom prst="rect">
             <a:avLst/>
@@ -3348,1843 +3437,462 @@
           <a:lstStyle/>
           <a:p>
             <a:r>
-              <a:rPr kumimoji="1" lang="en-US" altLang="ja-JP" sz="1200" dirty="0">
-                <a:latin typeface="+mj-lt"/>
-              </a:rPr>
-              <a:t>My </a:t>
-            </a:r>
-            <a:r>
-              <a:rPr kumimoji="1" lang="en-US" altLang="ja-JP" sz="1200" b="1" dirty="0">
+              <a:rPr lang="en-US" altLang="ja-JP" sz="1200" b="1" dirty="0" smtClean="0">
                 <a:solidFill>
                   <a:srgbClr val="FF0000"/>
                 </a:solidFill>
-                <a:latin typeface="+mj-lt"/>
-              </a:rPr>
-              <a:t>checklist</a:t>
-            </a:r>
-            <a:r>
-              <a:rPr kumimoji="1" lang="en-US" altLang="ja-JP" sz="1200" dirty="0">
+              </a:rPr>
+              <a:t>SMA </a:t>
+            </a:r>
+            <a:r>
+              <a:rPr lang="en-US" altLang="ja-JP" sz="1200" dirty="0" smtClean="0"/>
+              <a:t>(simple moving average)</a:t>
+            </a:r>
+          </a:p>
+          <a:p>
+            <a:pPr marL="285750" indent="-285750">
+              <a:buFont typeface="Arial" panose="020B0604020202020204" pitchFamily="34" charset="0"/>
+              <a:buChar char="•"/>
+            </a:pPr>
+            <a:r>
+              <a:rPr lang="zh-CN" altLang="en-US" sz="1200" dirty="0" smtClean="0"/>
+              <a:t>经常用 </a:t>
+            </a:r>
+            <a:r>
+              <a:rPr lang="en-US" altLang="zh-CN" sz="1200" dirty="0" smtClean="0"/>
+              <a:t>n-day SMA</a:t>
+            </a:r>
+            <a:r>
+              <a:rPr lang="zh-CN" altLang="en-US" sz="1200" dirty="0" smtClean="0"/>
+              <a:t>来评价在一定期间的</a:t>
+            </a:r>
+            <a:r>
+              <a:rPr lang="en-US" altLang="zh-CN" sz="1200" dirty="0" smtClean="0"/>
+              <a:t>average</a:t>
+            </a:r>
+            <a:endParaRPr lang="en-US" altLang="zh-CN" sz="1200" dirty="0"/>
+          </a:p>
+          <a:p>
+            <a:pPr marL="285750" indent="-285750">
+              <a:buFont typeface="Arial" panose="020B0604020202020204" pitchFamily="34" charset="0"/>
+              <a:buChar char="•"/>
+            </a:pPr>
+            <a:r>
+              <a:rPr lang="zh-CN" altLang="en-US" sz="1200" dirty="0" smtClean="0"/>
+              <a:t>计算方法，需要某只股票我有</a:t>
+            </a:r>
+            <a:r>
+              <a:rPr lang="en-US" altLang="zh-CN" sz="1200" dirty="0" smtClean="0"/>
+              <a:t>100</a:t>
+            </a:r>
+            <a:r>
+              <a:rPr lang="zh-CN" altLang="en-US" sz="1200" dirty="0" smtClean="0"/>
+              <a:t>天的</a:t>
+            </a:r>
+            <a:r>
+              <a:rPr lang="en-US" altLang="zh-CN" sz="1200" dirty="0" smtClean="0"/>
+              <a:t>closing price</a:t>
+            </a:r>
+            <a:r>
+              <a:rPr lang="zh-CN" altLang="en-US" sz="1200" dirty="0" smtClean="0"/>
+              <a:t>，当要计算</a:t>
+            </a:r>
+            <a:r>
+              <a:rPr lang="en-US" altLang="zh-CN" sz="1200" dirty="0" smtClean="0"/>
+              <a:t>5-day SMA</a:t>
+            </a:r>
+            <a:r>
+              <a:rPr lang="zh-CN" altLang="en-US" sz="1200" dirty="0" smtClean="0"/>
+              <a:t>时，</a:t>
+            </a:r>
+            <a:endParaRPr lang="en-US" altLang="zh-CN" sz="1200" dirty="0" smtClean="0"/>
+          </a:p>
+          <a:p>
+            <a:pPr marL="742950" lvl="1" indent="-285750">
+              <a:buFont typeface="Arial" panose="020B0604020202020204" pitchFamily="34" charset="0"/>
+              <a:buChar char="•"/>
+            </a:pPr>
+            <a:r>
+              <a:rPr lang="zh-CN" altLang="en-US" sz="1200" dirty="0"/>
+              <a:t>从</a:t>
+            </a:r>
+            <a:r>
+              <a:rPr lang="zh-CN" altLang="en-US" sz="1200" dirty="0" smtClean="0"/>
+              <a:t>第</a:t>
+            </a:r>
+            <a:r>
+              <a:rPr lang="en-US" altLang="zh-CN" sz="1200" dirty="0" smtClean="0"/>
+              <a:t>1</a:t>
+            </a:r>
+            <a:r>
+              <a:rPr lang="zh-CN" altLang="en-US" sz="1200" dirty="0" smtClean="0"/>
+              <a:t>天开始，抽出紧跟着的</a:t>
+            </a:r>
+            <a:r>
+              <a:rPr lang="en-US" altLang="zh-CN" sz="1200" dirty="0" smtClean="0"/>
+              <a:t>5</a:t>
+            </a:r>
+            <a:r>
+              <a:rPr lang="zh-CN" altLang="en-US" sz="1200" dirty="0" smtClean="0"/>
+              <a:t>天的</a:t>
+            </a:r>
+            <a:r>
+              <a:rPr lang="en-US" altLang="zh-CN" sz="1200" dirty="0" smtClean="0"/>
+              <a:t>closing price</a:t>
+            </a:r>
+            <a:r>
+              <a:rPr lang="zh-CN" altLang="en-US" sz="1200" dirty="0" smtClean="0"/>
+              <a:t>，</a:t>
+            </a:r>
+            <a:r>
+              <a:rPr lang="en-US" altLang="zh-CN" sz="1200" dirty="0" smtClean="0"/>
+              <a:t>sum</a:t>
+            </a:r>
+            <a:r>
+              <a:rPr lang="zh-CN" altLang="en-US" sz="1200" dirty="0" smtClean="0"/>
+              <a:t>之后除以</a:t>
+            </a:r>
+            <a:r>
+              <a:rPr lang="en-US" altLang="zh-CN" sz="1200" dirty="0" smtClean="0"/>
+              <a:t>5</a:t>
+            </a:r>
+            <a:r>
+              <a:rPr lang="zh-CN" altLang="en-US" sz="1200" dirty="0" smtClean="0"/>
+              <a:t>，就是第一个</a:t>
+            </a:r>
+            <a:r>
+              <a:rPr lang="en-US" altLang="zh-CN" sz="1200" dirty="0" smtClean="0"/>
+              <a:t>5-day SMA</a:t>
+            </a:r>
+          </a:p>
+          <a:p>
+            <a:pPr marL="742950" lvl="1" indent="-285750">
+              <a:buFont typeface="Arial" panose="020B0604020202020204" pitchFamily="34" charset="0"/>
+              <a:buChar char="•"/>
+            </a:pPr>
+            <a:r>
+              <a:rPr lang="zh-CN" altLang="en-US" sz="1200" dirty="0" smtClean="0"/>
+              <a:t>从第</a:t>
+            </a:r>
+            <a:r>
+              <a:rPr lang="en-US" altLang="zh-CN" sz="1200" dirty="0" smtClean="0"/>
+              <a:t>2</a:t>
+            </a:r>
+            <a:r>
+              <a:rPr lang="zh-CN" altLang="en-US" sz="1200" dirty="0" smtClean="0"/>
+              <a:t>天开始，抽出</a:t>
+            </a:r>
+            <a:r>
+              <a:rPr lang="zh-CN" altLang="en-US" sz="1200" dirty="0"/>
+              <a:t>紧跟着的</a:t>
+            </a:r>
+            <a:r>
+              <a:rPr lang="en-US" altLang="zh-CN" sz="1200" dirty="0"/>
+              <a:t>5</a:t>
+            </a:r>
+            <a:r>
+              <a:rPr lang="zh-CN" altLang="en-US" sz="1200" dirty="0"/>
+              <a:t>天的</a:t>
+            </a:r>
+            <a:r>
+              <a:rPr lang="en-US" altLang="zh-CN" sz="1200" dirty="0"/>
+              <a:t>closing price</a:t>
+            </a:r>
+            <a:r>
+              <a:rPr lang="zh-CN" altLang="en-US" sz="1200" dirty="0"/>
+              <a:t>，</a:t>
+            </a:r>
+            <a:r>
+              <a:rPr lang="en-US" altLang="zh-CN" sz="1200" dirty="0"/>
+              <a:t>sum</a:t>
+            </a:r>
+            <a:r>
+              <a:rPr lang="zh-CN" altLang="en-US" sz="1200" dirty="0"/>
+              <a:t>之后除以</a:t>
+            </a:r>
+            <a:r>
+              <a:rPr lang="en-US" altLang="zh-CN" sz="1200" dirty="0"/>
+              <a:t>5</a:t>
+            </a:r>
+            <a:r>
+              <a:rPr lang="zh-CN" altLang="en-US" sz="1200" dirty="0"/>
+              <a:t>，就是第一个</a:t>
+            </a:r>
+            <a:r>
+              <a:rPr lang="en-US" altLang="zh-CN" sz="1200" dirty="0"/>
+              <a:t>5-day </a:t>
+            </a:r>
+            <a:r>
+              <a:rPr lang="en-US" altLang="zh-CN" sz="1200" dirty="0" smtClean="0"/>
+              <a:t>SMA…</a:t>
+            </a:r>
+          </a:p>
+          <a:p>
+            <a:pPr marL="742950" lvl="1" indent="-285750">
+              <a:buFont typeface="Arial" panose="020B0604020202020204" pitchFamily="34" charset="0"/>
+              <a:buChar char="•"/>
+            </a:pPr>
+            <a:r>
+              <a:rPr lang="zh-CN" altLang="en-US" sz="1200" dirty="0"/>
+              <a:t>如</a:t>
+            </a:r>
+            <a:r>
+              <a:rPr lang="zh-CN" altLang="en-US" sz="1200" dirty="0" smtClean="0"/>
+              <a:t>此重复</a:t>
+            </a:r>
+            <a:endParaRPr lang="en-US" altLang="zh-CN" sz="1200" dirty="0" smtClean="0"/>
+          </a:p>
+          <a:p>
+            <a:pPr marL="285750" indent="-285750">
+              <a:buFont typeface="Arial" panose="020B0604020202020204" pitchFamily="34" charset="0"/>
+              <a:buChar char="•"/>
+            </a:pPr>
+            <a:r>
+              <a:rPr lang="en-US" altLang="zh-CN" sz="1200" dirty="0" smtClean="0"/>
+              <a:t>SMA</a:t>
+            </a:r>
+            <a:r>
+              <a:rPr lang="zh-CN" altLang="en-US" sz="1200" dirty="0" smtClean="0"/>
+              <a:t>可以用来</a:t>
+            </a:r>
+            <a:r>
+              <a:rPr lang="en-US" altLang="zh-CN" sz="1200" dirty="0" smtClean="0"/>
+              <a:t>indicate “lagging”, </a:t>
+            </a:r>
+            <a:r>
+              <a:rPr lang="zh-CN" altLang="en-US" sz="1200" dirty="0" smtClean="0"/>
+              <a:t>或者说用来“预测”将来几天股价走向</a:t>
+            </a:r>
+            <a:endParaRPr lang="en-US" altLang="zh-CN" sz="1200" dirty="0" smtClean="0"/>
+          </a:p>
+          <a:p>
+            <a:pPr marL="285750" indent="-285750">
+              <a:buFont typeface="Arial" panose="020B0604020202020204" pitchFamily="34" charset="0"/>
+              <a:buChar char="•"/>
+            </a:pPr>
+            <a:r>
+              <a:rPr lang="en-US" altLang="ja-JP" sz="1200" dirty="0" smtClean="0"/>
+              <a:t>E.g., </a:t>
+            </a:r>
+            <a:r>
+              <a:rPr lang="zh-CN" altLang="en-US" sz="1200" dirty="0" smtClean="0"/>
+              <a:t>对于</a:t>
+            </a:r>
+            <a:r>
+              <a:rPr lang="en-US" altLang="zh-CN" sz="1200" dirty="0" smtClean="0"/>
+              <a:t>11, 12, 13, 14, 15, 16, 17</a:t>
+            </a:r>
+            <a:r>
+              <a:rPr lang="zh-CN" altLang="en-US" sz="1200" dirty="0" smtClean="0"/>
+              <a:t>这样一个</a:t>
+            </a:r>
+            <a:r>
+              <a:rPr lang="en-US" altLang="zh-CN" sz="1200" dirty="0" smtClean="0"/>
+              <a:t>array</a:t>
+            </a:r>
+            <a:r>
+              <a:rPr lang="zh-CN" altLang="en-US" sz="1200" dirty="0" smtClean="0"/>
+              <a:t>，</a:t>
+            </a:r>
+            <a:r>
+              <a:rPr lang="en-US" altLang="zh-CN" sz="1200" dirty="0" smtClean="0"/>
+              <a:t>11</a:t>
+            </a:r>
+            <a:r>
+              <a:rPr lang="zh-CN" altLang="en-US" sz="1200" dirty="0" smtClean="0"/>
+              <a:t>那天的</a:t>
+            </a:r>
+            <a:r>
+              <a:rPr lang="en-US" altLang="zh-CN" sz="1200" dirty="0" smtClean="0"/>
+              <a:t>5-day SMA</a:t>
+            </a:r>
+            <a:r>
+              <a:rPr lang="zh-CN" altLang="en-US" sz="1200" dirty="0" smtClean="0"/>
+              <a:t>是</a:t>
+            </a:r>
+            <a:r>
+              <a:rPr lang="en-US" altLang="zh-CN" sz="1200" dirty="0" smtClean="0"/>
+              <a:t>13</a:t>
+            </a:r>
+            <a:r>
+              <a:rPr lang="zh-CN" altLang="en-US" sz="1200" dirty="0" smtClean="0"/>
+              <a:t>，</a:t>
+            </a:r>
+            <a:r>
+              <a:rPr lang="en-US" altLang="zh-CN" sz="1200" dirty="0" smtClean="0"/>
+              <a:t>12</a:t>
+            </a:r>
+            <a:r>
+              <a:rPr lang="zh-CN" altLang="en-US" sz="1200" dirty="0" smtClean="0"/>
+              <a:t>的是</a:t>
+            </a:r>
+            <a:r>
+              <a:rPr lang="en-US" altLang="zh-CN" sz="1200" dirty="0" smtClean="0"/>
+              <a:t>14</a:t>
+            </a:r>
+            <a:r>
+              <a:rPr lang="zh-CN" altLang="en-US" sz="1200" dirty="0" smtClean="0"/>
+              <a:t>，</a:t>
+            </a:r>
+            <a:r>
+              <a:rPr lang="en-US" altLang="zh-CN" sz="1200" dirty="0" smtClean="0"/>
+              <a:t>13</a:t>
+            </a:r>
+            <a:r>
+              <a:rPr lang="zh-CN" altLang="en-US" sz="1200" dirty="0" smtClean="0"/>
+              <a:t>的是</a:t>
+            </a:r>
+            <a:r>
+              <a:rPr lang="en-US" altLang="zh-CN" sz="1200" dirty="0" smtClean="0"/>
+              <a:t>15</a:t>
+            </a:r>
+            <a:r>
+              <a:rPr lang="zh-CN" altLang="en-US" sz="1200" dirty="0" smtClean="0"/>
+              <a:t>，</a:t>
+            </a:r>
+            <a:r>
+              <a:rPr lang="en-US" altLang="zh-CN" sz="1200" dirty="0" smtClean="0"/>
+              <a:t>11</a:t>
+            </a:r>
+            <a:r>
+              <a:rPr lang="zh-CN" altLang="en-US" sz="1200" dirty="0" smtClean="0"/>
+              <a:t>那天的</a:t>
+            </a:r>
+            <a:r>
+              <a:rPr lang="en-US" altLang="zh-CN" sz="1200" dirty="0" smtClean="0"/>
+              <a:t>SMA</a:t>
+            </a:r>
+            <a:r>
+              <a:rPr lang="zh-CN" altLang="en-US" sz="1200" dirty="0" smtClean="0"/>
+              <a:t>可以预测</a:t>
+            </a:r>
+            <a:r>
+              <a:rPr lang="en-US" altLang="zh-CN" sz="1200" dirty="0" smtClean="0"/>
+              <a:t>13</a:t>
+            </a:r>
+            <a:r>
+              <a:rPr lang="zh-CN" altLang="en-US" sz="1200" dirty="0" smtClean="0"/>
+              <a:t>那天</a:t>
+            </a:r>
+            <a:endParaRPr lang="en-US" altLang="zh-CN" sz="1200" dirty="0" smtClean="0"/>
+          </a:p>
+          <a:p>
+            <a:endParaRPr lang="en-US" altLang="ja-JP" sz="1200" dirty="0"/>
+          </a:p>
+          <a:p>
+            <a:r>
+              <a:rPr kumimoji="1" lang="en-US" altLang="ja-JP" sz="1200" b="1" dirty="0" smtClean="0">
                 <a:solidFill>
                   <a:srgbClr val="FF0000"/>
                 </a:solidFill>
-                <a:latin typeface="+mj-lt"/>
-              </a:rPr>
-              <a:t> </a:t>
-            </a:r>
-            <a:r>
-              <a:rPr kumimoji="1" lang="en-US" altLang="ja-JP" sz="1200" dirty="0">
-                <a:latin typeface="+mj-lt"/>
-              </a:rPr>
-              <a:t>before investing in stock market.</a:t>
-            </a:r>
-          </a:p>
-          <a:p>
-            <a:r>
-              <a:rPr lang="zh-CN" altLang="en-US" sz="1200" dirty="0">
-                <a:latin typeface="+mj-lt"/>
-              </a:rPr>
-              <a:t>以下是一些著名</a:t>
-            </a:r>
-            <a:r>
-              <a:rPr lang="en-US" altLang="zh-CN" sz="1200" dirty="0">
-                <a:latin typeface="+mj-lt"/>
-              </a:rPr>
-              <a:t>investor</a:t>
-            </a:r>
-            <a:r>
-              <a:rPr lang="zh-CN" altLang="en-US" sz="1200" dirty="0">
-                <a:latin typeface="+mj-lt"/>
-              </a:rPr>
-              <a:t>的投资</a:t>
-            </a:r>
-            <a:r>
-              <a:rPr lang="en-US" altLang="zh-CN" sz="1200" dirty="0">
-                <a:latin typeface="+mj-lt"/>
-              </a:rPr>
-              <a:t>checklists</a:t>
-            </a:r>
-            <a:r>
-              <a:rPr lang="zh-CN" altLang="en-US" sz="1200" dirty="0">
-                <a:latin typeface="+mj-lt"/>
-              </a:rPr>
-              <a:t>，我应该参考这些然后</a:t>
-            </a:r>
-            <a:r>
-              <a:rPr lang="en-US" altLang="zh-CN" sz="1200" dirty="0">
-                <a:latin typeface="+mj-lt"/>
-              </a:rPr>
-              <a:t>work out</a:t>
-            </a:r>
-            <a:r>
-              <a:rPr lang="zh-CN" altLang="en-US" sz="1200" dirty="0">
-                <a:latin typeface="+mj-lt"/>
-              </a:rPr>
-              <a:t>我自己的</a:t>
-            </a:r>
-            <a:r>
-              <a:rPr lang="en-US" altLang="zh-CN" sz="1200" dirty="0">
-                <a:latin typeface="+mj-lt"/>
-              </a:rPr>
-              <a:t>list</a:t>
-            </a:r>
-          </a:p>
-          <a:p>
-            <a:r>
-              <a:rPr lang="en-US" altLang="zh-CN" sz="1200" dirty="0">
-                <a:latin typeface="+mj-lt"/>
-              </a:rPr>
-              <a:t>(</a:t>
-            </a:r>
-            <a:r>
-              <a:rPr lang="zh-CN" altLang="en-US" sz="1200" dirty="0">
-                <a:latin typeface="+mj-lt"/>
-              </a:rPr>
-              <a:t>以下是</a:t>
-            </a:r>
-            <a:r>
-              <a:rPr lang="en-US" altLang="zh-CN" sz="1200" b="1" dirty="0">
+              </a:rPr>
+              <a:t>EMA </a:t>
+            </a:r>
+            <a:r>
+              <a:rPr lang="en-US" altLang="ja-JP" sz="1200" dirty="0" smtClean="0"/>
+              <a:t>(exponential moving average)</a:t>
+            </a:r>
+          </a:p>
+          <a:p>
+            <a:pPr marL="285750" indent="-285750">
+              <a:buFont typeface="Arial" panose="020B0604020202020204" pitchFamily="34" charset="0"/>
+              <a:buChar char="•"/>
+            </a:pPr>
+            <a:r>
+              <a:rPr kumimoji="1" lang="zh-CN" altLang="en-US" sz="1200" dirty="0" smtClean="0"/>
+              <a:t>相比</a:t>
+            </a:r>
+            <a:r>
+              <a:rPr kumimoji="1" lang="en-US" altLang="zh-CN" sz="1200" dirty="0" smtClean="0"/>
+              <a:t>SMA</a:t>
+            </a:r>
+            <a:r>
+              <a:rPr kumimoji="1" lang="zh-CN" altLang="en-US" sz="1200" dirty="0" smtClean="0"/>
+              <a:t>，</a:t>
+            </a:r>
+            <a:r>
+              <a:rPr kumimoji="1" lang="en-US" altLang="zh-CN" sz="1200" dirty="0" smtClean="0"/>
+              <a:t>EMA assign more weight to recent prices</a:t>
+            </a:r>
+          </a:p>
+          <a:p>
+            <a:pPr marL="285750" indent="-285750">
+              <a:buFont typeface="Arial" panose="020B0604020202020204" pitchFamily="34" charset="0"/>
+              <a:buChar char="•"/>
+            </a:pPr>
+            <a:endParaRPr kumimoji="1" lang="en-US" altLang="ja-JP" sz="1200" dirty="0" smtClean="0"/>
+          </a:p>
+          <a:p>
+            <a:endParaRPr lang="en-US" altLang="ja-JP" sz="1200" b="1" dirty="0">
+              <a:solidFill>
+                <a:srgbClr val="FF0000"/>
+              </a:solidFill>
+            </a:endParaRPr>
+          </a:p>
+          <a:p>
+            <a:endParaRPr kumimoji="1" lang="en-US" altLang="ja-JP" sz="1200" b="1" dirty="0" smtClean="0">
+              <a:solidFill>
+                <a:srgbClr val="FF0000"/>
+              </a:solidFill>
+            </a:endParaRPr>
+          </a:p>
+          <a:p>
+            <a:r>
+              <a:rPr kumimoji="1" lang="en-US" altLang="ja-JP" sz="1200" b="1" dirty="0" smtClean="0">
                 <a:solidFill>
                   <a:srgbClr val="FF0000"/>
                 </a:solidFill>
-                <a:latin typeface="+mj-lt"/>
-              </a:rPr>
-              <a:t>Philip Fisher</a:t>
-            </a:r>
-            <a:r>
-              <a:rPr lang="zh-CN" altLang="en-US" sz="1200" dirty="0">
-                <a:latin typeface="+mj-lt"/>
-              </a:rPr>
-              <a:t>的</a:t>
-            </a:r>
-            <a:r>
-              <a:rPr lang="en-US" altLang="zh-CN" sz="1200" dirty="0">
-                <a:latin typeface="+mj-lt"/>
-              </a:rPr>
-              <a:t>list – </a:t>
-            </a:r>
-            <a:r>
-              <a:rPr lang="en-US" altLang="zh-CN" sz="1200" b="1" dirty="0">
+              </a:rPr>
+              <a:t>MACD</a:t>
+            </a:r>
+            <a:r>
+              <a:rPr kumimoji="1" lang="en-US" altLang="ja-JP" sz="1200" dirty="0" smtClean="0">
                 <a:solidFill>
                   <a:srgbClr val="FF0000"/>
                 </a:solidFill>
-                <a:latin typeface="+mj-lt"/>
-              </a:rPr>
-              <a:t>Growth Investment</a:t>
-            </a:r>
-            <a:r>
-              <a:rPr lang="en-US" altLang="zh-CN" sz="1200" dirty="0">
-                <a:latin typeface="+mj-lt"/>
-              </a:rPr>
-              <a:t>)</a:t>
+              </a:rPr>
+              <a:t> </a:t>
+            </a:r>
+            <a:r>
+              <a:rPr kumimoji="1" lang="en-US" altLang="ja-JP" sz="1200" dirty="0" smtClean="0"/>
+              <a:t>(moving average convergence/divergence oscillator):</a:t>
             </a:r>
           </a:p>
           <a:p>
             <a:pPr marL="285750" indent="-285750">
-              <a:buFont typeface="+mj-lt"/>
-              <a:buAutoNum type="arabicPeriod"/>
-            </a:pPr>
-            <a:r>
-              <a:rPr lang="zh-CN" altLang="en-US" sz="1200" dirty="0">
-                <a:latin typeface="+mj-lt"/>
-              </a:rPr>
-              <a:t>一个公司的</a:t>
-            </a:r>
-            <a:r>
-              <a:rPr lang="en-US" altLang="zh-CN" sz="1200" dirty="0">
-                <a:latin typeface="+mj-lt"/>
-              </a:rPr>
-              <a:t>product/service</a:t>
-            </a:r>
-            <a:r>
-              <a:rPr lang="zh-CN" altLang="en-US" sz="1200" dirty="0">
-                <a:latin typeface="+mj-lt"/>
-              </a:rPr>
-              <a:t>有没有足够的</a:t>
-            </a:r>
-            <a:r>
-              <a:rPr lang="en-US" altLang="zh-CN" sz="1200" b="1" dirty="0">
-                <a:solidFill>
-                  <a:srgbClr val="FF0000"/>
-                </a:solidFill>
-                <a:latin typeface="+mj-lt"/>
-              </a:rPr>
-              <a:t>market potential</a:t>
-            </a:r>
-            <a:r>
-              <a:rPr lang="en-US" altLang="zh-CN" sz="1200" dirty="0">
-                <a:latin typeface="+mj-lt"/>
-              </a:rPr>
-              <a:t> (</a:t>
-            </a:r>
-            <a:r>
-              <a:rPr lang="zh-CN" altLang="en-US" sz="1200" dirty="0">
-                <a:latin typeface="+mj-lt"/>
-              </a:rPr>
-              <a:t>有</a:t>
-            </a:r>
-            <a:r>
-              <a:rPr lang="en-US" altLang="zh-CN" sz="1200" dirty="0">
-                <a:latin typeface="+mj-lt"/>
-              </a:rPr>
-              <a:t>market potential</a:t>
-            </a:r>
-            <a:r>
-              <a:rPr lang="zh-CN" altLang="en-US" sz="1200" dirty="0">
-                <a:latin typeface="+mj-lt"/>
-              </a:rPr>
-              <a:t>是指在未来的几年中，此公司的</a:t>
-            </a:r>
-            <a:r>
-              <a:rPr lang="en-US" altLang="zh-CN" sz="1200" dirty="0">
-                <a:latin typeface="+mj-lt"/>
-              </a:rPr>
-              <a:t>product/service</a:t>
-            </a:r>
-            <a:r>
-              <a:rPr lang="zh-CN" altLang="en-US" sz="1200" dirty="0">
-                <a:latin typeface="+mj-lt"/>
-              </a:rPr>
-              <a:t>是否能有</a:t>
-            </a:r>
-            <a:r>
-              <a:rPr lang="en-US" altLang="zh-CN" sz="1200" dirty="0">
-                <a:latin typeface="+mj-lt"/>
-              </a:rPr>
-              <a:t>sizable increase in sales)</a:t>
-            </a:r>
-          </a:p>
-          <a:p>
-            <a:pPr marL="285750" indent="-285750">
-              <a:buFont typeface="+mj-lt"/>
-              <a:buAutoNum type="arabicPeriod"/>
-            </a:pPr>
-            <a:r>
-              <a:rPr lang="zh-CN" altLang="en-US" sz="1200" dirty="0">
-                <a:latin typeface="+mj-lt"/>
-              </a:rPr>
-              <a:t>公司的</a:t>
-            </a:r>
-            <a:r>
-              <a:rPr lang="en-US" altLang="zh-CN" sz="1200" dirty="0">
-                <a:latin typeface="+mj-lt"/>
-              </a:rPr>
-              <a:t>management</a:t>
-            </a:r>
-            <a:r>
-              <a:rPr lang="zh-CN" altLang="en-US" sz="1200" dirty="0">
-                <a:latin typeface="+mj-lt"/>
-              </a:rPr>
-              <a:t>是否有决心去持续的投资并开发</a:t>
-            </a:r>
-            <a:r>
-              <a:rPr lang="zh-CN" altLang="en-US" sz="1200" b="1" dirty="0">
-                <a:solidFill>
-                  <a:srgbClr val="FF0000"/>
-                </a:solidFill>
-                <a:latin typeface="+mj-lt"/>
-              </a:rPr>
-              <a:t>能带来</a:t>
-            </a:r>
-            <a:r>
-              <a:rPr lang="en-US" altLang="zh-CN" sz="1200" b="1" dirty="0">
-                <a:solidFill>
-                  <a:srgbClr val="FF0000"/>
-                </a:solidFill>
-                <a:latin typeface="+mj-lt"/>
-              </a:rPr>
-              <a:t>total sales potentials</a:t>
-            </a:r>
-            <a:r>
-              <a:rPr lang="zh-CN" altLang="en-US" sz="1200" b="1" dirty="0">
-                <a:solidFill>
-                  <a:srgbClr val="FF0000"/>
-                </a:solidFill>
-                <a:latin typeface="+mj-lt"/>
-              </a:rPr>
-              <a:t>增长的</a:t>
-            </a:r>
-            <a:r>
-              <a:rPr lang="zh-CN" altLang="en-US" sz="1200" dirty="0">
-                <a:latin typeface="+mj-lt"/>
-              </a:rPr>
-              <a:t>新的</a:t>
-            </a:r>
-            <a:r>
-              <a:rPr lang="en-US" altLang="zh-CN" sz="1200" dirty="0">
-                <a:latin typeface="+mj-lt"/>
-              </a:rPr>
-              <a:t>products or processes? </a:t>
-            </a:r>
-            <a:r>
-              <a:rPr lang="zh-CN" altLang="en-US" sz="1200" dirty="0">
-                <a:latin typeface="+mj-lt"/>
-              </a:rPr>
-              <a:t>特别是当现在的主打</a:t>
-            </a:r>
-            <a:r>
-              <a:rPr lang="en-US" altLang="zh-CN" sz="1200" dirty="0">
-                <a:latin typeface="+mj-lt"/>
-              </a:rPr>
-              <a:t>product</a:t>
-            </a:r>
-            <a:r>
-              <a:rPr lang="zh-CN" altLang="en-US" sz="1200" dirty="0">
-                <a:latin typeface="+mj-lt"/>
-              </a:rPr>
-              <a:t>的</a:t>
-            </a:r>
-            <a:r>
-              <a:rPr lang="en-US" altLang="zh-CN" sz="1200" dirty="0">
-                <a:latin typeface="+mj-lt"/>
-              </a:rPr>
-              <a:t>potential</a:t>
-            </a:r>
-            <a:r>
-              <a:rPr lang="zh-CN" altLang="en-US" sz="1200" dirty="0">
-                <a:latin typeface="+mj-lt"/>
-              </a:rPr>
-              <a:t>已经被</a:t>
-            </a:r>
-            <a:r>
-              <a:rPr lang="en-US" altLang="zh-CN" sz="1200" dirty="0">
-                <a:latin typeface="+mj-lt"/>
-              </a:rPr>
-              <a:t>fully exploited</a:t>
-            </a:r>
-            <a:r>
-              <a:rPr lang="zh-CN" altLang="en-US" sz="1200" dirty="0">
-                <a:latin typeface="+mj-lt"/>
-              </a:rPr>
-              <a:t>的是时候</a:t>
-            </a:r>
-            <a:endParaRPr lang="en-US" altLang="zh-CN" sz="1200" dirty="0">
-              <a:latin typeface="+mj-lt"/>
-            </a:endParaRPr>
-          </a:p>
-          <a:p>
-            <a:pPr marL="285750" indent="-285750">
-              <a:buFont typeface="+mj-lt"/>
-              <a:buAutoNum type="arabicPeriod"/>
-            </a:pPr>
-            <a:r>
-              <a:rPr lang="zh-CN" altLang="en-US" sz="1200" dirty="0">
-                <a:latin typeface="+mj-lt"/>
-              </a:rPr>
-              <a:t>公司的</a:t>
-            </a:r>
-            <a:r>
-              <a:rPr lang="en-US" altLang="zh-CN" sz="1200" dirty="0">
-                <a:latin typeface="+mj-lt"/>
-              </a:rPr>
-              <a:t>R&amp;D</a:t>
-            </a:r>
-            <a:r>
-              <a:rPr lang="zh-CN" altLang="en-US" sz="1200" dirty="0">
-                <a:latin typeface="+mj-lt"/>
-              </a:rPr>
-              <a:t>成果和其公司</a:t>
-            </a:r>
-            <a:r>
-              <a:rPr lang="en-US" altLang="zh-CN" sz="1200" dirty="0">
-                <a:latin typeface="+mj-lt"/>
-              </a:rPr>
-              <a:t>Size</a:t>
-            </a:r>
-            <a:r>
-              <a:rPr lang="zh-CN" altLang="en-US" sz="1200" dirty="0">
-                <a:latin typeface="+mj-lt"/>
-              </a:rPr>
-              <a:t>的比例是否够大</a:t>
-            </a:r>
-            <a:r>
-              <a:rPr lang="en-US" altLang="zh-CN" sz="1200" dirty="0">
-                <a:latin typeface="+mj-lt"/>
-              </a:rPr>
-              <a:t>(</a:t>
-            </a:r>
-            <a:r>
-              <a:rPr lang="zh-CN" altLang="en-US" sz="1200" dirty="0">
-                <a:latin typeface="+mj-lt"/>
-              </a:rPr>
-              <a:t>可以用</a:t>
-            </a:r>
-            <a:r>
-              <a:rPr lang="en-US" altLang="zh-CN" sz="1200" dirty="0">
-                <a:latin typeface="+mj-lt"/>
-              </a:rPr>
-              <a:t>R&amp;D</a:t>
-            </a:r>
-            <a:r>
-              <a:rPr lang="zh-CN" altLang="en-US" sz="1200" dirty="0">
-                <a:latin typeface="+mj-lt"/>
-              </a:rPr>
-              <a:t>投资</a:t>
-            </a:r>
-            <a:r>
-              <a:rPr lang="en-US" altLang="zh-CN" sz="1200" dirty="0">
-                <a:latin typeface="+mj-lt"/>
-              </a:rPr>
-              <a:t>/</a:t>
-            </a:r>
-            <a:r>
-              <a:rPr lang="zh-CN" altLang="en-US" sz="1200" dirty="0">
-                <a:latin typeface="+mj-lt"/>
-              </a:rPr>
-              <a:t>成果和公司利益的比做评价</a:t>
-            </a:r>
-            <a:r>
-              <a:rPr lang="en-US" altLang="zh-CN" sz="1200" dirty="0">
-                <a:latin typeface="+mj-lt"/>
-              </a:rPr>
-              <a:t>)</a:t>
-            </a:r>
-          </a:p>
-          <a:p>
-            <a:pPr marL="285750" indent="-285750">
-              <a:buFont typeface="+mj-lt"/>
-              <a:buAutoNum type="arabicPeriod"/>
-            </a:pPr>
-            <a:r>
-              <a:rPr lang="zh-CN" altLang="en-US" sz="1200" dirty="0">
-                <a:latin typeface="+mj-lt"/>
-              </a:rPr>
-              <a:t>公司是否有一个好的</a:t>
-            </a:r>
-            <a:r>
-              <a:rPr lang="en-US" altLang="zh-CN" sz="1200" dirty="0">
-                <a:latin typeface="+mj-lt"/>
-              </a:rPr>
-              <a:t>sales organization?  (sales organization</a:t>
-            </a:r>
-            <a:r>
-              <a:rPr lang="zh-CN" altLang="en-US" sz="1200" dirty="0">
-                <a:latin typeface="+mj-lt"/>
-              </a:rPr>
-              <a:t>是专有名词，指公司里和</a:t>
-            </a:r>
-            <a:r>
-              <a:rPr lang="en-US" altLang="zh-CN" sz="1200" dirty="0">
-                <a:latin typeface="+mj-lt"/>
-              </a:rPr>
-              <a:t>profitability</a:t>
-            </a:r>
-            <a:r>
-              <a:rPr lang="zh-CN" altLang="en-US" sz="1200" dirty="0">
-                <a:latin typeface="+mj-lt"/>
-              </a:rPr>
-              <a:t>直接挂钩的，负责</a:t>
-            </a:r>
-            <a:r>
-              <a:rPr lang="en-US" altLang="zh-CN" sz="1200" dirty="0"/>
-              <a:t>distribute  </a:t>
-            </a:r>
-            <a:r>
-              <a:rPr lang="en-US" altLang="zh-CN" sz="1200" dirty="0">
-                <a:latin typeface="+mj-lt"/>
-              </a:rPr>
-              <a:t>goods to consumer</a:t>
-            </a:r>
-            <a:r>
-              <a:rPr lang="zh-CN" altLang="en-US" sz="1200" dirty="0">
-                <a:latin typeface="+mj-lt"/>
-              </a:rPr>
-              <a:t>的部门</a:t>
-            </a:r>
-            <a:r>
-              <a:rPr lang="en-US" altLang="zh-CN" sz="1200" dirty="0">
-                <a:latin typeface="+mj-lt"/>
-              </a:rPr>
-              <a:t>)</a:t>
-            </a:r>
-          </a:p>
-          <a:p>
-            <a:pPr marL="742950" lvl="1" indent="-285750">
               <a:buFont typeface="Arial" panose="020B0604020202020204" pitchFamily="34" charset="0"/>
               <a:buChar char="•"/>
             </a:pPr>
             <a:r>
-              <a:rPr lang="en-US" altLang="zh-CN" sz="1200" dirty="0" err="1">
-                <a:latin typeface="+mj-lt"/>
-              </a:rPr>
-              <a:t>ToDo</a:t>
-            </a:r>
-            <a:r>
-              <a:rPr lang="zh-CN" altLang="en-US" sz="1200" dirty="0">
-                <a:latin typeface="+mj-lt"/>
-              </a:rPr>
-              <a:t>：怎样评价一个公司的</a:t>
-            </a:r>
-            <a:r>
-              <a:rPr lang="en-US" altLang="zh-CN" sz="1200" dirty="0">
-                <a:latin typeface="+mj-lt"/>
-              </a:rPr>
-              <a:t>sales organization</a:t>
-            </a:r>
-            <a:r>
-              <a:rPr lang="zh-CN" altLang="en-US" sz="1200" dirty="0">
-                <a:latin typeface="+mj-lt"/>
-              </a:rPr>
-              <a:t>？</a:t>
-            </a:r>
-            <a:endParaRPr lang="en-US" altLang="zh-CN" sz="1200" dirty="0">
-              <a:latin typeface="+mj-lt"/>
-            </a:endParaRPr>
+              <a:rPr lang="zh-CN" altLang="en-US" sz="1200" dirty="0" smtClean="0"/>
+              <a:t>关于怎样计算，看我的另一个</a:t>
+            </a:r>
+            <a:r>
+              <a:rPr lang="en-US" altLang="zh-CN" sz="1200" dirty="0" smtClean="0"/>
+              <a:t>repo “</a:t>
+            </a:r>
+            <a:r>
+              <a:rPr lang="en-US" altLang="zh-CN" sz="1200" dirty="0" err="1" smtClean="0"/>
+              <a:t>StockCracker</a:t>
+            </a:r>
+            <a:r>
+              <a:rPr lang="en-US" altLang="zh-CN" sz="1200" dirty="0" smtClean="0"/>
+              <a:t>”</a:t>
+            </a:r>
           </a:p>
           <a:p>
             <a:pPr marL="285750" indent="-285750">
-              <a:buFont typeface="+mj-lt"/>
-              <a:buAutoNum type="arabicPeriod"/>
-            </a:pPr>
-            <a:r>
-              <a:rPr lang="zh-CN" altLang="en-US" sz="1200" dirty="0">
-                <a:latin typeface="+mj-lt"/>
-              </a:rPr>
-              <a:t>公司是否有一个</a:t>
-            </a:r>
-            <a:r>
-              <a:rPr lang="en-US" altLang="zh-CN" sz="1200" dirty="0">
-                <a:latin typeface="+mj-lt"/>
-              </a:rPr>
-              <a:t>worthwhile profit margin?</a:t>
-            </a:r>
-          </a:p>
-          <a:p>
-            <a:pPr marL="742950" lvl="1" indent="-285750">
               <a:buFont typeface="Arial" panose="020B0604020202020204" pitchFamily="34" charset="0"/>
               <a:buChar char="•"/>
             </a:pPr>
-            <a:r>
-              <a:rPr lang="en-US" altLang="zh-CN" sz="1200" dirty="0" err="1">
-                <a:latin typeface="+mj-lt"/>
-              </a:rPr>
-              <a:t>ToDo</a:t>
-            </a:r>
-            <a:r>
-              <a:rPr lang="zh-CN" altLang="en-US" sz="1200" dirty="0">
-                <a:latin typeface="+mj-lt"/>
-              </a:rPr>
-              <a:t>：啥是</a:t>
-            </a:r>
-            <a:r>
-              <a:rPr lang="en-US" altLang="zh-CN" sz="1200" dirty="0">
-                <a:latin typeface="+mj-lt"/>
-              </a:rPr>
-              <a:t>profit margin? </a:t>
-            </a:r>
-            <a:r>
-              <a:rPr lang="zh-CN" altLang="en-US" sz="1200" dirty="0">
-                <a:latin typeface="+mj-lt"/>
-              </a:rPr>
-              <a:t>咋样才能算是</a:t>
-            </a:r>
-            <a:r>
-              <a:rPr lang="en-US" altLang="zh-CN" sz="1200" dirty="0">
-                <a:latin typeface="+mj-lt"/>
-              </a:rPr>
-              <a:t>worthwhile?</a:t>
-            </a:r>
-          </a:p>
-          <a:p>
-            <a:pPr marL="285750" indent="-285750">
-              <a:buFont typeface="+mj-lt"/>
-              <a:buAutoNum type="arabicPeriod"/>
-            </a:pPr>
-            <a:r>
-              <a:rPr lang="zh-CN" altLang="en-US" sz="1200" dirty="0">
-                <a:latin typeface="+mj-lt"/>
-              </a:rPr>
-              <a:t>公司是否在为了</a:t>
-            </a:r>
-            <a:r>
-              <a:rPr lang="en-US" altLang="zh-CN" sz="1200" dirty="0">
-                <a:latin typeface="+mj-lt"/>
-              </a:rPr>
-              <a:t>maintain / improve profit margins</a:t>
-            </a:r>
-            <a:r>
-              <a:rPr lang="zh-CN" altLang="en-US" sz="1200" dirty="0">
-                <a:latin typeface="+mj-lt"/>
-              </a:rPr>
-              <a:t>而努力</a:t>
-            </a:r>
-            <a:r>
-              <a:rPr lang="en-US" altLang="zh-CN" sz="1200" dirty="0">
-                <a:latin typeface="+mj-lt"/>
-              </a:rPr>
-              <a:t>? </a:t>
-            </a:r>
-            <a:r>
-              <a:rPr lang="zh-CN" altLang="en-US" sz="1200" dirty="0">
-                <a:latin typeface="+mj-lt"/>
-              </a:rPr>
-              <a:t>怎样努力</a:t>
-            </a:r>
-            <a:r>
-              <a:rPr lang="en-US" altLang="zh-CN" sz="1200" dirty="0">
-                <a:latin typeface="+mj-lt"/>
-              </a:rPr>
-              <a:t>?</a:t>
-            </a:r>
-          </a:p>
-          <a:p>
-            <a:pPr marL="285750" indent="-285750">
-              <a:buFont typeface="+mj-lt"/>
-              <a:buAutoNum type="arabicPeriod"/>
-            </a:pPr>
-            <a:r>
-              <a:rPr lang="zh-CN" altLang="en-US" sz="1200" dirty="0">
-                <a:latin typeface="+mj-lt"/>
-              </a:rPr>
-              <a:t>公司是否有</a:t>
-            </a:r>
-            <a:r>
-              <a:rPr lang="en-US" altLang="zh-CN" sz="1200" dirty="0">
-                <a:latin typeface="+mj-lt"/>
-              </a:rPr>
-              <a:t>outstanding labor and personnel relations?</a:t>
-            </a:r>
-          </a:p>
-          <a:p>
-            <a:pPr marL="742950" lvl="1" indent="-285750">
-              <a:buFont typeface="Arial" panose="020B0604020202020204" pitchFamily="34" charset="0"/>
-              <a:buChar char="•"/>
-            </a:pPr>
-            <a:r>
-              <a:rPr lang="en-US" altLang="zh-CN" sz="1200" dirty="0" err="1">
-                <a:latin typeface="+mj-lt"/>
-              </a:rPr>
-              <a:t>ToDo</a:t>
-            </a:r>
-            <a:r>
-              <a:rPr lang="en-US" altLang="zh-CN" sz="1200" dirty="0">
-                <a:latin typeface="+mj-lt"/>
-              </a:rPr>
-              <a:t>: </a:t>
-            </a:r>
-            <a:r>
-              <a:rPr lang="zh-CN" altLang="en-US" sz="1200" dirty="0">
-                <a:latin typeface="+mj-lt"/>
-              </a:rPr>
-              <a:t>怎样评价</a:t>
-            </a:r>
-            <a:r>
-              <a:rPr lang="en-US" altLang="zh-CN" sz="1200" dirty="0"/>
-              <a:t>labor and personnel relations</a:t>
-            </a:r>
-            <a:r>
-              <a:rPr lang="zh-CN" altLang="en-US" sz="1200" dirty="0"/>
-              <a:t>的好坏</a:t>
-            </a:r>
-            <a:r>
-              <a:rPr lang="en-US" altLang="zh-CN" sz="1200" dirty="0"/>
-              <a:t>?</a:t>
-            </a:r>
-          </a:p>
-          <a:p>
-            <a:pPr marL="285750" indent="-285750">
-              <a:buFont typeface="+mj-lt"/>
-              <a:buAutoNum type="arabicPeriod"/>
-            </a:pPr>
-            <a:r>
-              <a:rPr lang="zh-CN" altLang="en-US" sz="1200" dirty="0">
-                <a:latin typeface="+mj-lt"/>
-              </a:rPr>
-              <a:t>公司是否有</a:t>
-            </a:r>
-            <a:r>
-              <a:rPr lang="en-US" altLang="zh-CN" sz="1200" dirty="0">
-                <a:latin typeface="+mj-lt"/>
-              </a:rPr>
-              <a:t>outstanding executive relations? (</a:t>
-            </a:r>
-            <a:r>
-              <a:rPr lang="zh-CN" altLang="en-US" sz="1200" dirty="0">
-                <a:latin typeface="+mj-lt"/>
-              </a:rPr>
-              <a:t>我的理解是，</a:t>
-            </a:r>
-            <a:r>
-              <a:rPr lang="en-US" altLang="zh-CN" sz="1200" dirty="0">
-                <a:latin typeface="+mj-lt"/>
-              </a:rPr>
-              <a:t>executive relation</a:t>
-            </a:r>
-            <a:r>
-              <a:rPr lang="zh-CN" altLang="en-US" sz="1200" dirty="0">
-                <a:latin typeface="+mj-lt"/>
-              </a:rPr>
-              <a:t>是指一个公司的</a:t>
-            </a:r>
-            <a:r>
-              <a:rPr lang="en-US" altLang="zh-CN" sz="1200" dirty="0">
-                <a:latin typeface="+mj-lt"/>
-              </a:rPr>
-              <a:t>top</a:t>
-            </a:r>
-            <a:r>
-              <a:rPr lang="zh-CN" altLang="en-US" sz="1200" dirty="0">
-                <a:latin typeface="+mj-lt"/>
-              </a:rPr>
-              <a:t>和此公司的</a:t>
-            </a:r>
-            <a:r>
-              <a:rPr lang="en-US" altLang="zh-CN" sz="1200" dirty="0">
-                <a:latin typeface="+mj-lt"/>
-              </a:rPr>
-              <a:t>partner/customer</a:t>
-            </a:r>
-            <a:r>
-              <a:rPr lang="zh-CN" altLang="en-US" sz="1200" dirty="0">
-                <a:latin typeface="+mj-lt"/>
-              </a:rPr>
-              <a:t>公司的</a:t>
-            </a:r>
-            <a:r>
-              <a:rPr lang="en-US" altLang="zh-CN" sz="1200" dirty="0">
-                <a:latin typeface="+mj-lt"/>
-              </a:rPr>
-              <a:t>top</a:t>
-            </a:r>
-            <a:r>
-              <a:rPr lang="zh-CN" altLang="en-US" sz="1200" dirty="0">
-                <a:latin typeface="+mj-lt"/>
-              </a:rPr>
-              <a:t>之间的关系，可以归结到</a:t>
-            </a:r>
-            <a:r>
-              <a:rPr lang="en-US" altLang="zh-CN" sz="1200" dirty="0">
-                <a:latin typeface="+mj-lt"/>
-              </a:rPr>
-              <a:t>CEO</a:t>
-            </a:r>
-            <a:r>
-              <a:rPr lang="zh-CN" altLang="en-US" sz="1200" dirty="0">
-                <a:latin typeface="+mj-lt"/>
-              </a:rPr>
-              <a:t>和</a:t>
-            </a:r>
-            <a:r>
-              <a:rPr lang="en-US" altLang="zh-CN" sz="1200" dirty="0">
-                <a:latin typeface="+mj-lt"/>
-              </a:rPr>
-              <a:t>CEO</a:t>
-            </a:r>
-            <a:r>
-              <a:rPr lang="zh-CN" altLang="en-US" sz="1200" dirty="0">
-                <a:latin typeface="+mj-lt"/>
-              </a:rPr>
-              <a:t>之间的关系；此</a:t>
-            </a:r>
-            <a:r>
-              <a:rPr lang="en-US" altLang="zh-CN" sz="1200" dirty="0">
-                <a:latin typeface="+mj-lt"/>
-              </a:rPr>
-              <a:t>relation</a:t>
-            </a:r>
-            <a:r>
-              <a:rPr lang="zh-CN" altLang="en-US" sz="1200" dirty="0">
-                <a:latin typeface="+mj-lt"/>
-              </a:rPr>
-              <a:t>关系到一个公司是否被其</a:t>
-            </a:r>
-            <a:r>
-              <a:rPr lang="en-US" altLang="zh-CN" sz="1200" dirty="0">
-                <a:latin typeface="+mj-lt"/>
-              </a:rPr>
-              <a:t>customer</a:t>
-            </a:r>
-            <a:r>
-              <a:rPr lang="zh-CN" altLang="en-US" sz="1200" dirty="0">
-                <a:latin typeface="+mj-lt"/>
-              </a:rPr>
-              <a:t>认为是一个</a:t>
-            </a:r>
-            <a:r>
-              <a:rPr lang="en-US" altLang="zh-CN" sz="1200" dirty="0">
-                <a:latin typeface="+mj-lt"/>
-              </a:rPr>
-              <a:t>trusted partner that can shape the future together</a:t>
-            </a:r>
-            <a:r>
-              <a:rPr lang="zh-CN" altLang="en-US" sz="1200" dirty="0">
-                <a:latin typeface="+mj-lt"/>
-              </a:rPr>
-              <a:t>，还是仅仅是一个</a:t>
-            </a:r>
-            <a:r>
-              <a:rPr lang="en-US" altLang="zh-CN" sz="1200" dirty="0">
-                <a:latin typeface="+mj-lt"/>
-              </a:rPr>
-              <a:t>vendor that might be called later because of having competing price)</a:t>
-            </a:r>
-          </a:p>
-          <a:p>
-            <a:pPr marL="742950" lvl="1" indent="-285750">
-              <a:buFont typeface="+mj-lt"/>
-              <a:buAutoNum type="arabicPeriod"/>
-            </a:pPr>
-            <a:r>
-              <a:rPr lang="en-US" altLang="zh-CN" sz="1200" dirty="0" err="1">
-                <a:latin typeface="+mj-lt"/>
-              </a:rPr>
-              <a:t>ToDo</a:t>
-            </a:r>
-            <a:r>
-              <a:rPr lang="en-US" altLang="zh-CN" sz="1200" dirty="0">
-                <a:latin typeface="+mj-lt"/>
-              </a:rPr>
-              <a:t>: </a:t>
-            </a:r>
-            <a:r>
-              <a:rPr lang="zh-CN" altLang="en-US" sz="1200" dirty="0">
-                <a:latin typeface="+mj-lt"/>
-              </a:rPr>
-              <a:t>怎样评价</a:t>
-            </a:r>
-            <a:r>
-              <a:rPr lang="en-US" altLang="zh-CN" sz="1200" dirty="0">
-                <a:latin typeface="+mj-lt"/>
-              </a:rPr>
-              <a:t>executive relations</a:t>
-            </a:r>
-            <a:r>
-              <a:rPr lang="zh-CN" altLang="en-US" sz="1200" dirty="0">
-                <a:latin typeface="+mj-lt"/>
-              </a:rPr>
-              <a:t>的好坏？</a:t>
-            </a:r>
-            <a:endParaRPr lang="en-US" altLang="zh-CN" sz="1200" dirty="0">
-              <a:latin typeface="+mj-lt"/>
-            </a:endParaRPr>
-          </a:p>
-          <a:p>
-            <a:pPr marL="285750" indent="-285750">
-              <a:buFont typeface="+mj-lt"/>
-              <a:buAutoNum type="arabicPeriod"/>
-            </a:pPr>
-            <a:r>
-              <a:rPr lang="zh-CN" altLang="en-US" sz="1200" dirty="0">
-                <a:latin typeface="+mj-lt"/>
-              </a:rPr>
-              <a:t>公司是否有</a:t>
-            </a:r>
-            <a:r>
-              <a:rPr lang="en-US" altLang="zh-CN" sz="1200" dirty="0">
-                <a:latin typeface="+mj-lt"/>
-              </a:rPr>
-              <a:t>depth and talent in its management?</a:t>
-            </a:r>
-          </a:p>
-          <a:p>
-            <a:pPr marL="285750" indent="-285750">
-              <a:buFont typeface="+mj-lt"/>
-              <a:buAutoNum type="arabicPeriod"/>
-            </a:pPr>
-            <a:r>
-              <a:rPr lang="zh-CN" altLang="en-US" sz="1200" dirty="0">
-                <a:latin typeface="+mj-lt"/>
-              </a:rPr>
-              <a:t>公司的</a:t>
-            </a:r>
-            <a:r>
-              <a:rPr lang="en-US" altLang="zh-CN" sz="1200" dirty="0">
-                <a:latin typeface="+mj-lt"/>
-              </a:rPr>
-              <a:t>cost analysis and accounting</a:t>
-            </a:r>
-            <a:r>
-              <a:rPr lang="zh-CN" altLang="en-US" sz="1200" dirty="0">
-                <a:latin typeface="+mj-lt"/>
-              </a:rPr>
-              <a:t>是否很好</a:t>
-            </a:r>
-            <a:r>
-              <a:rPr lang="en-US" altLang="zh-CN" sz="1200" dirty="0">
-                <a:latin typeface="+mj-lt"/>
-              </a:rPr>
-              <a:t>?</a:t>
-            </a:r>
-          </a:p>
-          <a:p>
-            <a:pPr marL="285750" indent="-285750">
-              <a:buFont typeface="+mj-lt"/>
-              <a:buAutoNum type="arabicPeriod"/>
-            </a:pPr>
-            <a:r>
-              <a:rPr lang="zh-CN" altLang="en-US" sz="1200" dirty="0">
-                <a:latin typeface="+mj-lt"/>
-              </a:rPr>
-              <a:t>是否有其他证据能表明此公司在其</a:t>
-            </a:r>
-            <a:r>
-              <a:rPr lang="en-US" altLang="zh-CN" sz="1200" dirty="0">
-                <a:latin typeface="+mj-lt"/>
-              </a:rPr>
-              <a:t>involved industry</a:t>
-            </a:r>
-            <a:r>
-              <a:rPr lang="zh-CN" altLang="en-US" sz="1200" dirty="0">
-                <a:latin typeface="+mj-lt"/>
-              </a:rPr>
-              <a:t>中，非常</a:t>
-            </a:r>
-            <a:r>
-              <a:rPr lang="en-US" altLang="zh-CN" sz="1200" dirty="0">
-                <a:latin typeface="+mj-lt"/>
-              </a:rPr>
-              <a:t>outstanding?</a:t>
-            </a:r>
-          </a:p>
-          <a:p>
-            <a:pPr marL="285750" indent="-285750">
-              <a:buFont typeface="+mj-lt"/>
-              <a:buAutoNum type="arabicPeriod"/>
-            </a:pPr>
-            <a:r>
-              <a:rPr lang="zh-CN" altLang="en-US" sz="1200" dirty="0">
-                <a:latin typeface="+mj-lt"/>
-              </a:rPr>
-              <a:t>公司是否有</a:t>
-            </a:r>
-            <a:r>
-              <a:rPr lang="en-US" altLang="zh-CN" sz="1200" dirty="0">
-                <a:latin typeface="+mj-lt"/>
-              </a:rPr>
-              <a:t>profit</a:t>
-            </a:r>
-            <a:r>
-              <a:rPr lang="zh-CN" altLang="en-US" sz="1200" dirty="0">
-                <a:latin typeface="+mj-lt"/>
-              </a:rPr>
-              <a:t>相关的</a:t>
-            </a:r>
-            <a:r>
-              <a:rPr lang="en-US" altLang="zh-CN" sz="1200" dirty="0">
-                <a:latin typeface="+mj-lt"/>
-              </a:rPr>
-              <a:t>short-range / long-range outlook?</a:t>
-            </a:r>
-          </a:p>
-          <a:p>
-            <a:pPr marL="285750" indent="-285750">
-              <a:buFont typeface="+mj-lt"/>
-              <a:buAutoNum type="arabicPeriod"/>
-            </a:pPr>
-            <a:r>
-              <a:rPr lang="zh-CN" altLang="en-US" sz="1200" dirty="0">
-                <a:latin typeface="+mj-lt"/>
-              </a:rPr>
-              <a:t>在可预见的将来，公司是否需要大量股权融资，并且此融资会使现在的</a:t>
-            </a:r>
-            <a:r>
-              <a:rPr lang="en-US" altLang="zh-CN" sz="1200" dirty="0">
-                <a:latin typeface="+mj-lt"/>
-              </a:rPr>
-              <a:t>stockholder</a:t>
-            </a:r>
-            <a:r>
-              <a:rPr lang="zh-CN" altLang="en-US" sz="1200" dirty="0">
-                <a:latin typeface="+mj-lt"/>
-              </a:rPr>
-              <a:t>从公司</a:t>
-            </a:r>
-            <a:r>
-              <a:rPr lang="en-US" altLang="zh-CN" sz="1200" dirty="0">
-                <a:latin typeface="+mj-lt"/>
-              </a:rPr>
-              <a:t>growth</a:t>
-            </a:r>
-            <a:r>
-              <a:rPr lang="zh-CN" altLang="en-US" sz="1200" dirty="0">
-                <a:latin typeface="+mj-lt"/>
-              </a:rPr>
-              <a:t>中获得的利益减少很多</a:t>
-            </a:r>
-            <a:r>
-              <a:rPr lang="en-US" altLang="zh-CN" sz="1200" dirty="0">
-                <a:latin typeface="+mj-lt"/>
-              </a:rPr>
-              <a:t>?</a:t>
-            </a:r>
-          </a:p>
-          <a:p>
-            <a:pPr marL="742950" lvl="1" indent="-285750">
-              <a:buFont typeface="+mj-lt"/>
-              <a:buAutoNum type="arabicPeriod"/>
-            </a:pPr>
-            <a:r>
-              <a:rPr lang="en-US" altLang="zh-CN" sz="1200" dirty="0" err="1">
-                <a:latin typeface="+mj-lt"/>
-              </a:rPr>
-              <a:t>ToDo</a:t>
-            </a:r>
-            <a:r>
-              <a:rPr lang="en-US" altLang="zh-CN" sz="1200" dirty="0">
-                <a:latin typeface="+mj-lt"/>
-              </a:rPr>
-              <a:t>: </a:t>
-            </a:r>
-            <a:r>
-              <a:rPr lang="zh-CN" altLang="en-US" sz="1200" dirty="0">
-                <a:latin typeface="+mj-lt"/>
-              </a:rPr>
-              <a:t>这个怎么看</a:t>
-            </a:r>
-            <a:r>
-              <a:rPr lang="en-US" altLang="zh-CN" sz="1200" dirty="0">
-                <a:latin typeface="+mj-lt"/>
-              </a:rPr>
-              <a:t>?</a:t>
-            </a:r>
-          </a:p>
-          <a:p>
-            <a:pPr marL="285750" indent="-285750">
-              <a:buFont typeface="+mj-lt"/>
-              <a:buAutoNum type="arabicPeriod"/>
-            </a:pPr>
-            <a:r>
-              <a:rPr lang="zh-CN" altLang="en-US" sz="1200" dirty="0">
-                <a:latin typeface="+mj-lt"/>
-              </a:rPr>
-              <a:t>当</a:t>
-            </a:r>
-            <a:r>
-              <a:rPr lang="en-US" altLang="zh-CN" sz="1200" dirty="0">
-                <a:latin typeface="+mj-lt"/>
-              </a:rPr>
-              <a:t>troubles</a:t>
-            </a:r>
-            <a:r>
-              <a:rPr lang="zh-CN" altLang="en-US" sz="1200" dirty="0">
-                <a:latin typeface="+mj-lt"/>
-              </a:rPr>
-              <a:t>和</a:t>
-            </a:r>
-            <a:r>
-              <a:rPr lang="en-US" altLang="zh-CN" sz="1200" dirty="0">
-                <a:latin typeface="+mj-lt"/>
-              </a:rPr>
-              <a:t>disappointment</a:t>
-            </a:r>
-            <a:r>
-              <a:rPr lang="zh-CN" altLang="en-US" sz="1200" dirty="0">
-                <a:latin typeface="+mj-lt"/>
-              </a:rPr>
-              <a:t>发生的时候，公司的</a:t>
-            </a:r>
-            <a:r>
-              <a:rPr lang="en-US" altLang="zh-CN" sz="1200" dirty="0">
-                <a:latin typeface="+mj-lt"/>
-              </a:rPr>
-              <a:t>management</a:t>
-            </a:r>
-            <a:r>
-              <a:rPr lang="zh-CN" altLang="en-US" sz="1200" dirty="0">
-                <a:latin typeface="+mj-lt"/>
-              </a:rPr>
-              <a:t>是否能和</a:t>
-            </a:r>
-            <a:r>
-              <a:rPr lang="en-US" altLang="zh-CN" sz="1200" dirty="0">
-                <a:latin typeface="+mj-lt"/>
-              </a:rPr>
-              <a:t>investors</a:t>
-            </a:r>
-            <a:r>
-              <a:rPr lang="zh-CN" altLang="en-US" sz="1200" dirty="0">
-                <a:latin typeface="+mj-lt"/>
-              </a:rPr>
-              <a:t>良好的交流</a:t>
-            </a:r>
-            <a:r>
-              <a:rPr lang="en-US" altLang="zh-CN" sz="1200" dirty="0">
-                <a:latin typeface="+mj-lt"/>
-              </a:rPr>
-              <a:t>?</a:t>
-            </a:r>
-          </a:p>
-          <a:p>
-            <a:pPr marL="285750" indent="-285750">
-              <a:buFont typeface="+mj-lt"/>
-              <a:buAutoNum type="arabicPeriod"/>
-            </a:pPr>
-            <a:r>
-              <a:rPr lang="zh-CN" altLang="en-US" sz="1200" dirty="0">
-                <a:latin typeface="+mj-lt"/>
-              </a:rPr>
-              <a:t>公司的</a:t>
-            </a:r>
-            <a:r>
-              <a:rPr lang="en-US" altLang="zh-CN" sz="1200" dirty="0">
-                <a:latin typeface="+mj-lt"/>
-              </a:rPr>
-              <a:t>management</a:t>
-            </a:r>
-            <a:r>
-              <a:rPr lang="zh-CN" altLang="en-US" sz="1200" dirty="0">
-                <a:latin typeface="+mj-lt"/>
-              </a:rPr>
-              <a:t>是否有</a:t>
-            </a:r>
-            <a:r>
-              <a:rPr lang="en-US" altLang="zh-CN" sz="1200" dirty="0">
-                <a:latin typeface="+mj-lt"/>
-              </a:rPr>
-              <a:t>unquestionable integrity?</a:t>
-            </a:r>
-          </a:p>
-          <a:p>
-            <a:pPr marL="742950" lvl="1" indent="-285750">
-              <a:buFont typeface="+mj-lt"/>
-              <a:buAutoNum type="arabicPeriod"/>
-            </a:pPr>
-            <a:r>
-              <a:rPr lang="en-US" altLang="zh-CN" sz="1200" dirty="0" err="1">
-                <a:latin typeface="+mj-lt"/>
-              </a:rPr>
-              <a:t>ToDo</a:t>
-            </a:r>
-            <a:r>
-              <a:rPr lang="en-US" altLang="zh-CN" sz="1200" dirty="0">
-                <a:latin typeface="+mj-lt"/>
-              </a:rPr>
-              <a:t>: </a:t>
-            </a:r>
-            <a:r>
-              <a:rPr lang="zh-CN" altLang="en-US" sz="1200" dirty="0">
-                <a:latin typeface="+mj-lt"/>
-              </a:rPr>
-              <a:t>这个</a:t>
-            </a:r>
-            <a:r>
-              <a:rPr lang="en-US" altLang="zh-CN" sz="1200" dirty="0">
-                <a:latin typeface="+mj-lt"/>
-              </a:rPr>
-              <a:t>info</a:t>
-            </a:r>
-            <a:r>
-              <a:rPr lang="zh-CN" altLang="en-US" sz="1200" dirty="0">
-                <a:latin typeface="+mj-lt"/>
-              </a:rPr>
-              <a:t>怎么搜集</a:t>
-            </a:r>
-            <a:r>
-              <a:rPr lang="en-US" altLang="zh-CN" sz="1200" dirty="0">
-                <a:latin typeface="+mj-lt"/>
-              </a:rPr>
-              <a:t>?</a:t>
-            </a:r>
-          </a:p>
-          <a:p>
-            <a:r>
-              <a:rPr lang="en-US" altLang="zh-CN" sz="1200" dirty="0">
-                <a:latin typeface="+mj-lt"/>
-              </a:rPr>
-              <a:t>(</a:t>
-            </a:r>
-            <a:r>
-              <a:rPr lang="ja-JP" altLang="en-US" sz="1200" dirty="0">
-                <a:latin typeface="+mj-lt"/>
-              </a:rPr>
-              <a:t>以下是</a:t>
-            </a:r>
-            <a:r>
-              <a:rPr lang="en-US" altLang="ja-JP" sz="1200" dirty="0">
-                <a:latin typeface="+mj-lt"/>
-              </a:rPr>
-              <a:t>Warren</a:t>
-            </a:r>
-            <a:r>
-              <a:rPr lang="zh-CN" altLang="en-US" sz="1200" dirty="0">
-                <a:latin typeface="+mj-lt"/>
-              </a:rPr>
-              <a:t> </a:t>
-            </a:r>
-            <a:r>
-              <a:rPr lang="en-US" altLang="zh-CN" sz="1200" dirty="0">
-                <a:latin typeface="+mj-lt"/>
-              </a:rPr>
-              <a:t>Buffet</a:t>
-            </a:r>
-            <a:r>
-              <a:rPr lang="ja-JP" altLang="en-US" sz="1200" dirty="0">
-                <a:latin typeface="+mj-lt"/>
-              </a:rPr>
-              <a:t>的</a:t>
-            </a:r>
-            <a:r>
-              <a:rPr lang="en-US" altLang="ja-JP" sz="1200" dirty="0">
-                <a:latin typeface="+mj-lt"/>
-              </a:rPr>
-              <a:t>checklist</a:t>
-            </a:r>
-            <a:r>
-              <a:rPr lang="zh-CN" altLang="en-US" sz="1200" dirty="0">
-                <a:latin typeface="+mj-lt"/>
-              </a:rPr>
-              <a:t>，</a:t>
-            </a:r>
-            <a:r>
-              <a:rPr lang="en-US" altLang="zh-CN" sz="1200" dirty="0">
-                <a:latin typeface="+mj-lt"/>
-              </a:rPr>
-              <a:t>Value</a:t>
-            </a:r>
-            <a:r>
-              <a:rPr lang="zh-CN" altLang="en-US" sz="1200" dirty="0">
-                <a:latin typeface="+mj-lt"/>
-              </a:rPr>
-              <a:t> </a:t>
-            </a:r>
-            <a:r>
-              <a:rPr lang="en-US" altLang="zh-CN" sz="1200" dirty="0">
-                <a:latin typeface="+mj-lt"/>
-              </a:rPr>
-              <a:t>invest)</a:t>
-            </a:r>
-          </a:p>
-          <a:p>
-            <a:pPr marL="285750" indent="-285750">
-              <a:buFont typeface="+mj-lt"/>
-              <a:buAutoNum type="arabicPeriod"/>
-            </a:pPr>
-            <a:r>
-              <a:rPr lang="en-US" altLang="zh-CN" sz="1200" dirty="0">
-                <a:latin typeface="+mj-lt"/>
-              </a:rPr>
-              <a:t>Buy high quality business at cheap price (ignore short-term</a:t>
-            </a:r>
-            <a:r>
-              <a:rPr lang="ja-JP" altLang="en-US" sz="1200" dirty="0">
-                <a:latin typeface="+mj-lt"/>
-              </a:rPr>
-              <a:t>别担心短期股市</a:t>
-            </a:r>
-            <a:r>
-              <a:rPr lang="en-US" altLang="ja-JP" sz="1200" dirty="0">
-                <a:latin typeface="+mj-lt"/>
-              </a:rPr>
-              <a:t>up</a:t>
-            </a:r>
-            <a:r>
-              <a:rPr lang="ja-JP" altLang="en-US" sz="1200" dirty="0">
-                <a:latin typeface="+mj-lt"/>
-              </a:rPr>
-              <a:t>和</a:t>
-            </a:r>
-            <a:r>
-              <a:rPr lang="en-US" altLang="ja-JP" sz="1200" dirty="0">
-                <a:latin typeface="+mj-lt"/>
-              </a:rPr>
-              <a:t>down</a:t>
-            </a:r>
-            <a:r>
-              <a:rPr lang="zh-CN" altLang="en-US" sz="1200" dirty="0">
-                <a:latin typeface="+mj-lt"/>
-              </a:rPr>
-              <a:t>，</a:t>
-            </a:r>
-            <a:r>
-              <a:rPr lang="ja-JP" altLang="en-US" sz="1200" dirty="0">
-                <a:latin typeface="+mj-lt"/>
-              </a:rPr>
-              <a:t>关心</a:t>
-            </a:r>
-            <a:r>
-              <a:rPr lang="en-US" altLang="ja-JP" sz="1200" dirty="0">
-                <a:latin typeface="+mj-lt"/>
-              </a:rPr>
-              <a:t>business</a:t>
-            </a:r>
-            <a:r>
-              <a:rPr lang="zh-CN" altLang="en-US" sz="1200" dirty="0">
-                <a:latin typeface="+mj-lt"/>
-              </a:rPr>
-              <a:t> </a:t>
-            </a:r>
-            <a:r>
-              <a:rPr lang="en-US" altLang="zh-CN" sz="1200" dirty="0">
-                <a:latin typeface="+mj-lt"/>
-              </a:rPr>
-              <a:t>quality</a:t>
-            </a:r>
-            <a:r>
-              <a:rPr lang="ja-JP" altLang="en-US" sz="1200" dirty="0">
-                <a:latin typeface="+mj-lt"/>
-              </a:rPr>
-              <a:t>是不是好</a:t>
-            </a:r>
-            <a:r>
-              <a:rPr lang="en-US" altLang="zh-CN" sz="1200" dirty="0">
-                <a:latin typeface="+mj-lt"/>
-              </a:rPr>
-              <a:t>)</a:t>
-            </a:r>
-          </a:p>
-          <a:p>
-            <a:pPr marL="285750" indent="-285750">
-              <a:buFont typeface="+mj-lt"/>
-              <a:buAutoNum type="arabicPeriod"/>
-            </a:pPr>
-            <a:r>
-              <a:rPr lang="ja-JP" altLang="en-US" sz="1200" dirty="0">
-                <a:latin typeface="+mj-lt"/>
-              </a:rPr>
-              <a:t>公司是否有</a:t>
-            </a:r>
-            <a:r>
-              <a:rPr lang="en-US" altLang="ja-JP" sz="1200" dirty="0">
-                <a:latin typeface="+mj-lt"/>
-              </a:rPr>
-              <a:t>great</a:t>
-            </a:r>
-            <a:r>
-              <a:rPr lang="zh-CN" altLang="en-US" sz="1200" dirty="0">
-                <a:latin typeface="+mj-lt"/>
-              </a:rPr>
-              <a:t> </a:t>
-            </a:r>
-            <a:r>
-              <a:rPr lang="en-US" altLang="zh-CN" sz="1200" dirty="0">
-                <a:latin typeface="+mj-lt"/>
-              </a:rPr>
-              <a:t>management</a:t>
-            </a:r>
-          </a:p>
-          <a:p>
-            <a:pPr marL="285750" indent="-285750">
-              <a:buFont typeface="+mj-lt"/>
-              <a:buAutoNum type="arabicPeriod"/>
-            </a:pPr>
-            <a:r>
-              <a:rPr lang="ja-JP" altLang="en-US" sz="1200" dirty="0">
-                <a:latin typeface="+mj-lt"/>
-              </a:rPr>
-              <a:t>公司是否</a:t>
-            </a:r>
-            <a:r>
-              <a:rPr lang="en-US" altLang="ja-JP" sz="1200" dirty="0">
-                <a:latin typeface="+mj-lt"/>
-              </a:rPr>
-              <a:t>shareholder</a:t>
-            </a:r>
-            <a:r>
-              <a:rPr lang="en-US" altLang="zh-CN" sz="1200" dirty="0">
-                <a:latin typeface="+mj-lt"/>
-              </a:rPr>
-              <a:t>-oriented (</a:t>
-            </a:r>
-            <a:r>
-              <a:rPr lang="ja-JP" altLang="en-US" sz="1200" dirty="0">
-                <a:latin typeface="+mj-lt"/>
-              </a:rPr>
-              <a:t>从</a:t>
-            </a:r>
-            <a:r>
-              <a:rPr lang="en-US" altLang="ja-JP" sz="1200" dirty="0">
-                <a:latin typeface="+mj-lt"/>
-              </a:rPr>
-              <a:t>dividends</a:t>
-            </a:r>
-            <a:r>
-              <a:rPr lang="ja-JP" altLang="en-US" sz="1200" dirty="0">
-                <a:latin typeface="+mj-lt"/>
-              </a:rPr>
-              <a:t>和</a:t>
-            </a:r>
-            <a:r>
-              <a:rPr lang="en-US" altLang="ja-JP" sz="1200" dirty="0">
-                <a:latin typeface="+mj-lt"/>
-              </a:rPr>
-              <a:t>share-buy-back</a:t>
-            </a:r>
-            <a:r>
-              <a:rPr lang="ja-JP" altLang="en-US" sz="1200" dirty="0">
-                <a:latin typeface="+mj-lt"/>
-              </a:rPr>
-              <a:t>上看</a:t>
-            </a:r>
-            <a:r>
-              <a:rPr lang="en-US" altLang="zh-CN" sz="1200" dirty="0">
-                <a:latin typeface="+mj-lt"/>
-              </a:rPr>
-              <a:t>)</a:t>
-            </a:r>
-          </a:p>
-          <a:p>
-            <a:pPr marL="285750" indent="-285750">
-              <a:buFont typeface="+mj-lt"/>
-              <a:buAutoNum type="arabicPeriod"/>
-            </a:pPr>
-            <a:r>
-              <a:rPr lang="ja-JP" altLang="en-US" sz="1200" dirty="0">
-                <a:latin typeface="+mj-lt"/>
-              </a:rPr>
-              <a:t>我是否理解公司在干什么</a:t>
-            </a:r>
-            <a:r>
-              <a:rPr lang="zh-CN" altLang="en-US" sz="1200" dirty="0">
-                <a:latin typeface="+mj-lt"/>
-              </a:rPr>
-              <a:t>，</a:t>
-            </a:r>
-            <a:r>
-              <a:rPr lang="ja-JP" altLang="en-US" sz="1200" dirty="0">
-                <a:latin typeface="+mj-lt"/>
-              </a:rPr>
-              <a:t>能不能用自己的话说公司从原材料购入到生产商品最后倒卖商品给谁</a:t>
-            </a:r>
-            <a:endParaRPr lang="en-US" altLang="ja-JP" sz="1200" dirty="0">
-              <a:latin typeface="+mj-lt"/>
-            </a:endParaRPr>
-          </a:p>
-          <a:p>
-            <a:pPr marL="285750" indent="-285750">
-              <a:buFont typeface="+mj-lt"/>
-              <a:buAutoNum type="arabicPeriod"/>
-            </a:pPr>
-            <a:r>
-              <a:rPr lang="ja-JP" altLang="en-US" sz="1200" dirty="0">
-                <a:latin typeface="+mj-lt"/>
-              </a:rPr>
-              <a:t>公司的</a:t>
-            </a:r>
-            <a:r>
-              <a:rPr lang="en-US" altLang="ja-JP" sz="1200" dirty="0">
-                <a:latin typeface="+mj-lt"/>
-              </a:rPr>
-              <a:t>product</a:t>
-            </a:r>
-            <a:r>
-              <a:rPr lang="ja-JP" altLang="en-US" sz="1200" dirty="0">
-                <a:latin typeface="+mj-lt"/>
-              </a:rPr>
-              <a:t>时候高品质</a:t>
-            </a:r>
-            <a:r>
-              <a:rPr lang="zh-CN" altLang="en-US" sz="1200" dirty="0">
-                <a:latin typeface="+mj-lt"/>
-              </a:rPr>
-              <a:t>，</a:t>
-            </a:r>
-            <a:r>
-              <a:rPr lang="ja-JP" altLang="en-US" sz="1200" dirty="0">
-                <a:latin typeface="+mj-lt"/>
-              </a:rPr>
-              <a:t>并且能让</a:t>
-            </a:r>
-            <a:r>
-              <a:rPr lang="en-US" altLang="ja-JP" sz="1200" dirty="0">
-                <a:latin typeface="+mj-lt"/>
-              </a:rPr>
-              <a:t>customers</a:t>
-            </a:r>
-            <a:r>
-              <a:rPr lang="zh-CN" altLang="en-US" sz="1200" dirty="0">
-                <a:latin typeface="+mj-lt"/>
-              </a:rPr>
-              <a:t> </a:t>
-            </a:r>
-            <a:r>
-              <a:rPr lang="en-US" altLang="zh-CN" sz="1200" dirty="0">
-                <a:latin typeface="+mj-lt"/>
-              </a:rPr>
-              <a:t>keep</a:t>
-            </a:r>
-            <a:r>
-              <a:rPr lang="zh-CN" altLang="en-US" sz="1200" dirty="0">
-                <a:latin typeface="+mj-lt"/>
-              </a:rPr>
-              <a:t> </a:t>
-            </a:r>
-            <a:r>
-              <a:rPr lang="en-US" altLang="zh-CN" sz="1200" dirty="0">
-                <a:latin typeface="+mj-lt"/>
-              </a:rPr>
-              <a:t>purchasing</a:t>
-            </a:r>
-          </a:p>
-          <a:p>
-            <a:pPr marL="285750" indent="-285750">
-              <a:buFont typeface="+mj-lt"/>
-              <a:buAutoNum type="arabicPeriod"/>
-            </a:pPr>
-            <a:r>
-              <a:rPr lang="ja-JP" altLang="en-US" sz="1200" dirty="0">
-                <a:latin typeface="+mj-lt"/>
-              </a:rPr>
-              <a:t>公司和其</a:t>
-            </a:r>
-            <a:r>
-              <a:rPr lang="en-US" altLang="ja-JP" sz="1200" dirty="0">
-                <a:latin typeface="+mj-lt"/>
-              </a:rPr>
-              <a:t>competitor</a:t>
-            </a:r>
-            <a:r>
-              <a:rPr lang="ja-JP" altLang="en-US" sz="1200" dirty="0">
-                <a:latin typeface="+mj-lt"/>
-              </a:rPr>
-              <a:t>相比</a:t>
-            </a:r>
-            <a:r>
-              <a:rPr lang="zh-CN" altLang="en-US" sz="1200" dirty="0">
-                <a:latin typeface="+mj-lt"/>
-              </a:rPr>
-              <a:t>，</a:t>
-            </a:r>
-            <a:r>
-              <a:rPr lang="ja-JP" altLang="en-US" sz="1200" dirty="0">
-                <a:latin typeface="+mj-lt"/>
-              </a:rPr>
-              <a:t>是否有</a:t>
-            </a:r>
-            <a:r>
-              <a:rPr lang="en-US" altLang="ja-JP" sz="1200" dirty="0">
-                <a:latin typeface="+mj-lt"/>
-              </a:rPr>
-              <a:t>moat</a:t>
-            </a:r>
-            <a:r>
-              <a:rPr lang="zh-CN" altLang="en-US" sz="1200" dirty="0">
-                <a:latin typeface="+mj-lt"/>
-              </a:rPr>
-              <a:t> </a:t>
-            </a:r>
-            <a:r>
-              <a:rPr lang="en-US" altLang="zh-CN" sz="1200" dirty="0">
-                <a:latin typeface="+mj-lt"/>
-              </a:rPr>
-              <a:t>(moat</a:t>
-            </a:r>
-            <a:r>
-              <a:rPr lang="ja-JP" altLang="en-US" sz="1200" dirty="0">
-                <a:latin typeface="+mj-lt"/>
-              </a:rPr>
-              <a:t>是护城河</a:t>
-            </a:r>
-            <a:r>
-              <a:rPr lang="zh-CN" altLang="en-US" sz="1200" dirty="0">
-                <a:latin typeface="+mj-lt"/>
-              </a:rPr>
-              <a:t>，</a:t>
-            </a:r>
-            <a:r>
-              <a:rPr lang="ja-JP" altLang="en-US" sz="1200" dirty="0">
-                <a:latin typeface="+mj-lt"/>
-              </a:rPr>
-              <a:t>指</a:t>
-            </a:r>
-            <a:r>
-              <a:rPr lang="en-US" altLang="ja-JP" sz="1200" dirty="0">
-                <a:latin typeface="+mj-lt"/>
-              </a:rPr>
-              <a:t>unique</a:t>
-            </a:r>
-            <a:r>
-              <a:rPr lang="zh-CN" altLang="en-US" sz="1200" dirty="0">
-                <a:latin typeface="+mj-lt"/>
-              </a:rPr>
-              <a:t> </a:t>
-            </a:r>
-            <a:r>
-              <a:rPr lang="en-US" altLang="zh-CN" sz="1200" dirty="0">
-                <a:latin typeface="+mj-lt"/>
-              </a:rPr>
-              <a:t>tech</a:t>
-            </a:r>
-            <a:r>
-              <a:rPr lang="zh-CN" altLang="en-US" sz="1200" dirty="0">
-                <a:latin typeface="+mj-lt"/>
-              </a:rPr>
-              <a:t>，</a:t>
-            </a:r>
-            <a:r>
-              <a:rPr lang="en-US" altLang="zh-CN" sz="1200" dirty="0">
-                <a:latin typeface="+mj-lt"/>
-              </a:rPr>
-              <a:t>patent</a:t>
-            </a:r>
-            <a:r>
-              <a:rPr lang="zh-CN" altLang="en-US" sz="1200" dirty="0">
-                <a:latin typeface="+mj-lt"/>
-              </a:rPr>
-              <a:t>，</a:t>
-            </a:r>
-            <a:r>
-              <a:rPr lang="en-US" altLang="zh-CN" sz="1200" dirty="0">
-                <a:latin typeface="+mj-lt"/>
-              </a:rPr>
-              <a:t>brand</a:t>
-            </a:r>
-            <a:r>
-              <a:rPr lang="zh-CN" altLang="en-US" sz="1200" dirty="0">
-                <a:latin typeface="+mj-lt"/>
-              </a:rPr>
-              <a:t> </a:t>
-            </a:r>
-            <a:r>
-              <a:rPr lang="en-US" altLang="zh-CN" sz="1200" dirty="0">
-                <a:latin typeface="+mj-lt"/>
-              </a:rPr>
-              <a:t>name</a:t>
-            </a:r>
-            <a:r>
-              <a:rPr lang="ja-JP" altLang="en-US" sz="1200" dirty="0">
-                <a:latin typeface="+mj-lt"/>
-              </a:rPr>
-              <a:t>等</a:t>
-            </a:r>
-            <a:r>
-              <a:rPr lang="en-US" altLang="zh-CN" sz="1200" dirty="0">
-                <a:latin typeface="+mj-lt"/>
-              </a:rPr>
-              <a:t>)</a:t>
-            </a:r>
-          </a:p>
-          <a:p>
-            <a:r>
-              <a:rPr lang="en-US" altLang="zh-CN" sz="1200" dirty="0" err="1">
-                <a:latin typeface="+mj-lt"/>
-              </a:rPr>
-              <a:t>Lych’s</a:t>
-            </a:r>
-            <a:r>
-              <a:rPr lang="en-US" altLang="zh-CN" sz="1200" dirty="0">
-                <a:latin typeface="+mj-lt"/>
-              </a:rPr>
-              <a:t> list</a:t>
-            </a:r>
-          </a:p>
-          <a:p>
-            <a:pPr marL="228600" indent="-228600">
-              <a:buFont typeface="+mj-lt"/>
-              <a:buAutoNum type="arabicPeriod"/>
-            </a:pPr>
-            <a:r>
-              <a:rPr lang="zh-CN" altLang="en-US" sz="1200" dirty="0">
-                <a:latin typeface="+mj-lt"/>
-              </a:rPr>
-              <a:t>看看自己周围，大家都在用什么产品；</a:t>
-            </a:r>
-            <a:r>
-              <a:rPr lang="en-US" altLang="zh-CN" sz="1200" dirty="0">
-                <a:latin typeface="+mj-lt"/>
-              </a:rPr>
-              <a:t>if you are a construction worker, look at what cement you are using, etc.</a:t>
-            </a:r>
-          </a:p>
-          <a:p>
-            <a:pPr marL="228600" indent="-228600">
-              <a:buFont typeface="+mj-lt"/>
-              <a:buAutoNum type="arabicPeriod"/>
-            </a:pPr>
-            <a:r>
-              <a:rPr lang="en-US" altLang="zh-CN" sz="1200" dirty="0">
-                <a:latin typeface="+mj-lt"/>
-              </a:rPr>
-              <a:t>Use PEG (Price / earing to growth)</a:t>
-            </a:r>
-          </a:p>
-          <a:p>
-            <a:pPr marL="228600" indent="-228600">
-              <a:buFont typeface="+mj-lt"/>
-              <a:buAutoNum type="arabicPeriod"/>
-            </a:pPr>
-            <a:r>
-              <a:rPr lang="en-US" altLang="zh-CN" sz="1200" dirty="0">
-                <a:latin typeface="+mj-lt"/>
-              </a:rPr>
-              <a:t>Look at percentage of assets in cash. Strong cash position is better.</a:t>
-            </a:r>
-          </a:p>
-          <a:p>
-            <a:pPr marL="228600" indent="-228600">
-              <a:buFont typeface="+mj-lt"/>
-              <a:buAutoNum type="arabicPeriod"/>
-            </a:pPr>
-            <a:r>
-              <a:rPr lang="en-US" altLang="zh-CN" sz="1200" dirty="0">
-                <a:latin typeface="+mj-lt"/>
-              </a:rPr>
-              <a:t>Look at debts, lower is better.</a:t>
-            </a:r>
-          </a:p>
-          <a:p>
-            <a:pPr marL="228600" indent="-228600">
-              <a:buFont typeface="+mj-lt"/>
-              <a:buAutoNum type="arabicPeriod"/>
-            </a:pPr>
-            <a:r>
-              <a:rPr lang="zh-CN" altLang="en-US" sz="1200" dirty="0">
-                <a:latin typeface="+mj-lt"/>
-              </a:rPr>
-              <a:t>投资之前，</a:t>
-            </a:r>
-            <a:r>
-              <a:rPr lang="en-US" altLang="zh-CN" sz="1200" dirty="0">
-                <a:latin typeface="+mj-lt"/>
-              </a:rPr>
-              <a:t>create a story. About</a:t>
-            </a:r>
-            <a:r>
-              <a:rPr lang="zh-CN" altLang="en-US" sz="1200" dirty="0">
-                <a:latin typeface="+mj-lt"/>
-              </a:rPr>
-              <a:t> </a:t>
-            </a:r>
-            <a:r>
-              <a:rPr lang="en-US" altLang="zh-CN" sz="1200" dirty="0">
-                <a:latin typeface="+mj-lt"/>
-              </a:rPr>
-              <a:t>a</a:t>
-            </a:r>
-            <a:r>
-              <a:rPr lang="zh-CN" altLang="en-US" sz="1200" dirty="0">
-                <a:latin typeface="+mj-lt"/>
-              </a:rPr>
-              <a:t> </a:t>
-            </a:r>
-            <a:r>
-              <a:rPr lang="en-US" altLang="zh-CN" sz="1200" dirty="0">
-                <a:latin typeface="+mj-lt"/>
-              </a:rPr>
-              <a:t>company,</a:t>
-            </a:r>
-            <a:r>
-              <a:rPr lang="zh-CN" altLang="en-US" sz="1200" dirty="0">
-                <a:latin typeface="+mj-lt"/>
-              </a:rPr>
-              <a:t> </a:t>
-            </a:r>
-            <a:r>
-              <a:rPr lang="en-US" altLang="zh-CN" sz="1200" dirty="0">
-                <a:latin typeface="+mj-lt"/>
-              </a:rPr>
-              <a:t>why it’s good investment? What it needs to do to perform well? Where I</a:t>
-            </a:r>
-            <a:r>
-              <a:rPr lang="zh-CN" altLang="en-US" sz="1200" dirty="0">
-                <a:latin typeface="+mj-lt"/>
-              </a:rPr>
-              <a:t> </a:t>
-            </a:r>
-            <a:r>
-              <a:rPr lang="en-US" altLang="zh-CN" sz="1200" dirty="0">
-                <a:latin typeface="+mj-lt"/>
-              </a:rPr>
-              <a:t>hope</a:t>
-            </a:r>
-            <a:r>
-              <a:rPr lang="zh-CN" altLang="en-US" sz="1200" dirty="0">
-                <a:latin typeface="+mj-lt"/>
-              </a:rPr>
-              <a:t> </a:t>
-            </a:r>
-            <a:r>
-              <a:rPr lang="en-US" altLang="zh-CN" sz="1200" dirty="0">
-                <a:latin typeface="+mj-lt"/>
-              </a:rPr>
-              <a:t>it</a:t>
-            </a:r>
-            <a:r>
-              <a:rPr lang="zh-CN" altLang="en-US" sz="1200" dirty="0">
-                <a:latin typeface="+mj-lt"/>
-              </a:rPr>
-              <a:t> </a:t>
-            </a:r>
-            <a:r>
-              <a:rPr lang="en-US" altLang="zh-CN" sz="1200" dirty="0">
-                <a:latin typeface="+mj-lt"/>
-              </a:rPr>
-              <a:t>is</a:t>
-            </a:r>
-            <a:r>
-              <a:rPr lang="zh-CN" altLang="en-US" sz="1200" dirty="0">
-                <a:latin typeface="+mj-lt"/>
-              </a:rPr>
-              <a:t> </a:t>
-            </a:r>
-            <a:r>
-              <a:rPr lang="en-US" altLang="zh-CN" sz="1200" dirty="0">
-                <a:latin typeface="+mj-lt"/>
-              </a:rPr>
-              <a:t>headed? </a:t>
-            </a:r>
-            <a:r>
-              <a:rPr lang="zh-CN" altLang="en-US" sz="1200" dirty="0">
-                <a:latin typeface="+mj-lt"/>
-              </a:rPr>
-              <a:t>把这个</a:t>
-            </a:r>
-            <a:r>
-              <a:rPr lang="en-US" altLang="zh-CN" sz="1200" dirty="0">
-                <a:latin typeface="+mj-lt"/>
-              </a:rPr>
-              <a:t>story</a:t>
-            </a:r>
-            <a:r>
-              <a:rPr lang="zh-CN" altLang="en-US" sz="1200" dirty="0">
-                <a:latin typeface="+mj-lt"/>
-              </a:rPr>
-              <a:t>记下来，时不时</a:t>
-            </a:r>
-            <a:r>
-              <a:rPr lang="en-US" altLang="zh-CN" sz="1200" dirty="0">
-                <a:latin typeface="+mj-lt"/>
-              </a:rPr>
-              <a:t>recheck</a:t>
-            </a:r>
-            <a:r>
-              <a:rPr lang="zh-CN" altLang="en-US" sz="1200" dirty="0">
-                <a:latin typeface="+mj-lt"/>
-              </a:rPr>
-              <a:t>一下</a:t>
-            </a:r>
-            <a:endParaRPr lang="en-US" altLang="zh-CN" sz="1200" dirty="0">
-              <a:latin typeface="+mj-lt"/>
-            </a:endParaRPr>
-          </a:p>
-          <a:p>
-            <a:endParaRPr lang="en-US" altLang="zh-CN" sz="1200" dirty="0">
-              <a:latin typeface="+mj-lt"/>
-            </a:endParaRPr>
-          </a:p>
-          <a:p>
-            <a:r>
-              <a:rPr lang="en-US" altLang="zh-CN" sz="1200" dirty="0">
-                <a:latin typeface="+mj-lt"/>
-              </a:rPr>
-              <a:t>Value investor</a:t>
-            </a:r>
-            <a:r>
-              <a:rPr lang="zh-CN" altLang="en-US" sz="1200" dirty="0">
-                <a:latin typeface="+mj-lt"/>
-              </a:rPr>
-              <a:t>很看重现在公司的股价要低，低买高卖；</a:t>
-            </a:r>
-            <a:r>
-              <a:rPr lang="en-US" altLang="zh-CN" sz="1200" dirty="0">
-                <a:latin typeface="+mj-lt"/>
-              </a:rPr>
-              <a:t>growth investor</a:t>
-            </a:r>
-            <a:r>
-              <a:rPr lang="zh-CN" altLang="en-US" sz="1200" dirty="0">
-                <a:latin typeface="+mj-lt"/>
-              </a:rPr>
-              <a:t>则更看重公司前景，即使现在公司股价高也会买</a:t>
-            </a:r>
-            <a:endParaRPr lang="en-US" altLang="zh-CN" sz="1200" dirty="0">
-              <a:latin typeface="+mj-lt"/>
-            </a:endParaRPr>
+            <a:endParaRPr kumimoji="1" lang="ja-JP" altLang="en-US" sz="1200" dirty="0"/>
           </a:p>
         </p:txBody>
       </p:sp>
     </p:spTree>
     <p:extLst>
       <p:ext uri="{BB962C8B-B14F-4D97-AF65-F5344CB8AC3E}">
-        <p14:creationId xmlns:p14="http://schemas.microsoft.com/office/powerpoint/2010/main" val="2382410945"/>
+        <p14:creationId xmlns:p14="http://schemas.microsoft.com/office/powerpoint/2010/main" val="1825832579"/>
       </p:ext>
     </p:extLst>
   </p:cSld>
@@ -5213,10 +3921,1896 @@
       </p:grpSpPr>
       <p:sp>
         <p:nvSpPr>
+          <p:cNvPr id="2" name="テキスト ボックス 1"/>
+          <p:cNvSpPr txBox="1"/>
+          <p:nvPr/>
+        </p:nvSpPr>
+        <p:spPr>
+          <a:xfrm>
+            <a:off x="1" y="0"/>
+            <a:ext cx="5715000" cy="10618291"/>
+          </a:xfrm>
+          <a:prstGeom prst="rect">
+            <a:avLst/>
+          </a:prstGeom>
+          <a:noFill/>
+        </p:spPr>
+        <p:txBody>
+          <a:bodyPr wrap="square" rtlCol="0">
+            <a:spAutoFit/>
+          </a:bodyPr>
+          <a:lstStyle/>
+          <a:p>
+            <a:r>
+              <a:rPr kumimoji="1" lang="en-US" altLang="ja-JP" sz="1200" dirty="0">
+                <a:latin typeface="+mj-lt"/>
+              </a:rPr>
+              <a:t>My </a:t>
+            </a:r>
+            <a:r>
+              <a:rPr kumimoji="1" lang="en-US" altLang="ja-JP" sz="1200" b="1" dirty="0">
+                <a:solidFill>
+                  <a:srgbClr val="FF0000"/>
+                </a:solidFill>
+                <a:latin typeface="+mj-lt"/>
+              </a:rPr>
+              <a:t>checklist</a:t>
+            </a:r>
+            <a:r>
+              <a:rPr kumimoji="1" lang="en-US" altLang="ja-JP" sz="1200" dirty="0">
+                <a:solidFill>
+                  <a:srgbClr val="FF0000"/>
+                </a:solidFill>
+                <a:latin typeface="+mj-lt"/>
+              </a:rPr>
+              <a:t> </a:t>
+            </a:r>
+            <a:r>
+              <a:rPr kumimoji="1" lang="en-US" altLang="ja-JP" sz="1200" dirty="0">
+                <a:latin typeface="+mj-lt"/>
+              </a:rPr>
+              <a:t>before investing in stock market.</a:t>
+            </a:r>
+          </a:p>
+          <a:p>
+            <a:r>
+              <a:rPr lang="zh-CN" altLang="en-US" sz="1200" dirty="0">
+                <a:latin typeface="+mj-lt"/>
+              </a:rPr>
+              <a:t>以下是一些著名</a:t>
+            </a:r>
+            <a:r>
+              <a:rPr lang="en-US" altLang="zh-CN" sz="1200" dirty="0">
+                <a:latin typeface="+mj-lt"/>
+              </a:rPr>
+              <a:t>investor</a:t>
+            </a:r>
+            <a:r>
+              <a:rPr lang="zh-CN" altLang="en-US" sz="1200" dirty="0">
+                <a:latin typeface="+mj-lt"/>
+              </a:rPr>
+              <a:t>的投资</a:t>
+            </a:r>
+            <a:r>
+              <a:rPr lang="en-US" altLang="zh-CN" sz="1200" dirty="0">
+                <a:latin typeface="+mj-lt"/>
+              </a:rPr>
+              <a:t>checklists</a:t>
+            </a:r>
+            <a:r>
+              <a:rPr lang="zh-CN" altLang="en-US" sz="1200" dirty="0">
+                <a:latin typeface="+mj-lt"/>
+              </a:rPr>
+              <a:t>，我应该参考这些然后</a:t>
+            </a:r>
+            <a:r>
+              <a:rPr lang="en-US" altLang="zh-CN" sz="1200" dirty="0">
+                <a:latin typeface="+mj-lt"/>
+              </a:rPr>
+              <a:t>work out</a:t>
+            </a:r>
+            <a:r>
+              <a:rPr lang="zh-CN" altLang="en-US" sz="1200" dirty="0">
+                <a:latin typeface="+mj-lt"/>
+              </a:rPr>
+              <a:t>我自己的</a:t>
+            </a:r>
+            <a:r>
+              <a:rPr lang="en-US" altLang="zh-CN" sz="1200" dirty="0">
+                <a:latin typeface="+mj-lt"/>
+              </a:rPr>
+              <a:t>list</a:t>
+            </a:r>
+          </a:p>
+          <a:p>
+            <a:r>
+              <a:rPr lang="en-US" altLang="zh-CN" sz="1200" dirty="0">
+                <a:latin typeface="+mj-lt"/>
+              </a:rPr>
+              <a:t>(</a:t>
+            </a:r>
+            <a:r>
+              <a:rPr lang="zh-CN" altLang="en-US" sz="1200" dirty="0">
+                <a:latin typeface="+mj-lt"/>
+              </a:rPr>
+              <a:t>以下是</a:t>
+            </a:r>
+            <a:r>
+              <a:rPr lang="en-US" altLang="zh-CN" sz="1200" b="1" dirty="0">
+                <a:solidFill>
+                  <a:srgbClr val="FF0000"/>
+                </a:solidFill>
+                <a:latin typeface="+mj-lt"/>
+              </a:rPr>
+              <a:t>Philip Fisher</a:t>
+            </a:r>
+            <a:r>
+              <a:rPr lang="zh-CN" altLang="en-US" sz="1200" dirty="0">
+                <a:latin typeface="+mj-lt"/>
+              </a:rPr>
+              <a:t>的</a:t>
+            </a:r>
+            <a:r>
+              <a:rPr lang="en-US" altLang="zh-CN" sz="1200" dirty="0">
+                <a:latin typeface="+mj-lt"/>
+              </a:rPr>
+              <a:t>list – </a:t>
+            </a:r>
+            <a:r>
+              <a:rPr lang="en-US" altLang="zh-CN" sz="1200" b="1" dirty="0">
+                <a:solidFill>
+                  <a:srgbClr val="FF0000"/>
+                </a:solidFill>
+                <a:latin typeface="+mj-lt"/>
+              </a:rPr>
+              <a:t>Growth Investment</a:t>
+            </a:r>
+            <a:r>
+              <a:rPr lang="en-US" altLang="zh-CN" sz="1200" dirty="0">
+                <a:latin typeface="+mj-lt"/>
+              </a:rPr>
+              <a:t>)</a:t>
+            </a:r>
+          </a:p>
+          <a:p>
+            <a:pPr marL="285750" indent="-285750">
+              <a:buFont typeface="+mj-lt"/>
+              <a:buAutoNum type="arabicPeriod"/>
+            </a:pPr>
+            <a:r>
+              <a:rPr lang="zh-CN" altLang="en-US" sz="1200" dirty="0">
+                <a:latin typeface="+mj-lt"/>
+              </a:rPr>
+              <a:t>一个公司的</a:t>
+            </a:r>
+            <a:r>
+              <a:rPr lang="en-US" altLang="zh-CN" sz="1200" dirty="0">
+                <a:latin typeface="+mj-lt"/>
+              </a:rPr>
+              <a:t>product/service</a:t>
+            </a:r>
+            <a:r>
+              <a:rPr lang="zh-CN" altLang="en-US" sz="1200" dirty="0">
+                <a:latin typeface="+mj-lt"/>
+              </a:rPr>
+              <a:t>有没有足够的</a:t>
+            </a:r>
+            <a:r>
+              <a:rPr lang="en-US" altLang="zh-CN" sz="1200" b="1" dirty="0">
+                <a:solidFill>
+                  <a:srgbClr val="FF0000"/>
+                </a:solidFill>
+                <a:latin typeface="+mj-lt"/>
+              </a:rPr>
+              <a:t>market potential</a:t>
+            </a:r>
+            <a:r>
+              <a:rPr lang="en-US" altLang="zh-CN" sz="1200" dirty="0">
+                <a:latin typeface="+mj-lt"/>
+              </a:rPr>
+              <a:t> (</a:t>
+            </a:r>
+            <a:r>
+              <a:rPr lang="zh-CN" altLang="en-US" sz="1200" dirty="0">
+                <a:latin typeface="+mj-lt"/>
+              </a:rPr>
+              <a:t>有</a:t>
+            </a:r>
+            <a:r>
+              <a:rPr lang="en-US" altLang="zh-CN" sz="1200" dirty="0">
+                <a:latin typeface="+mj-lt"/>
+              </a:rPr>
+              <a:t>market potential</a:t>
+            </a:r>
+            <a:r>
+              <a:rPr lang="zh-CN" altLang="en-US" sz="1200" dirty="0">
+                <a:latin typeface="+mj-lt"/>
+              </a:rPr>
+              <a:t>是指在未来的几年中，此公司的</a:t>
+            </a:r>
+            <a:r>
+              <a:rPr lang="en-US" altLang="zh-CN" sz="1200" dirty="0">
+                <a:latin typeface="+mj-lt"/>
+              </a:rPr>
+              <a:t>product/service</a:t>
+            </a:r>
+            <a:r>
+              <a:rPr lang="zh-CN" altLang="en-US" sz="1200" dirty="0">
+                <a:latin typeface="+mj-lt"/>
+              </a:rPr>
+              <a:t>是否能有</a:t>
+            </a:r>
+            <a:r>
+              <a:rPr lang="en-US" altLang="zh-CN" sz="1200" dirty="0">
+                <a:latin typeface="+mj-lt"/>
+              </a:rPr>
+              <a:t>sizable increase in sales)</a:t>
+            </a:r>
+          </a:p>
+          <a:p>
+            <a:pPr marL="285750" indent="-285750">
+              <a:buFont typeface="+mj-lt"/>
+              <a:buAutoNum type="arabicPeriod"/>
+            </a:pPr>
+            <a:r>
+              <a:rPr lang="zh-CN" altLang="en-US" sz="1200" dirty="0">
+                <a:latin typeface="+mj-lt"/>
+              </a:rPr>
+              <a:t>公司的</a:t>
+            </a:r>
+            <a:r>
+              <a:rPr lang="en-US" altLang="zh-CN" sz="1200" dirty="0">
+                <a:latin typeface="+mj-lt"/>
+              </a:rPr>
+              <a:t>management</a:t>
+            </a:r>
+            <a:r>
+              <a:rPr lang="zh-CN" altLang="en-US" sz="1200" dirty="0">
+                <a:latin typeface="+mj-lt"/>
+              </a:rPr>
+              <a:t>是否有决心去持续的投资并开发</a:t>
+            </a:r>
+            <a:r>
+              <a:rPr lang="zh-CN" altLang="en-US" sz="1200" b="1" dirty="0">
+                <a:solidFill>
+                  <a:srgbClr val="FF0000"/>
+                </a:solidFill>
+                <a:latin typeface="+mj-lt"/>
+              </a:rPr>
+              <a:t>能带来</a:t>
+            </a:r>
+            <a:r>
+              <a:rPr lang="en-US" altLang="zh-CN" sz="1200" b="1" dirty="0">
+                <a:solidFill>
+                  <a:srgbClr val="FF0000"/>
+                </a:solidFill>
+                <a:latin typeface="+mj-lt"/>
+              </a:rPr>
+              <a:t>total sales potentials</a:t>
+            </a:r>
+            <a:r>
+              <a:rPr lang="zh-CN" altLang="en-US" sz="1200" b="1" dirty="0">
+                <a:solidFill>
+                  <a:srgbClr val="FF0000"/>
+                </a:solidFill>
+                <a:latin typeface="+mj-lt"/>
+              </a:rPr>
+              <a:t>增长的</a:t>
+            </a:r>
+            <a:r>
+              <a:rPr lang="zh-CN" altLang="en-US" sz="1200" dirty="0">
+                <a:latin typeface="+mj-lt"/>
+              </a:rPr>
+              <a:t>新的</a:t>
+            </a:r>
+            <a:r>
+              <a:rPr lang="en-US" altLang="zh-CN" sz="1200" dirty="0">
+                <a:latin typeface="+mj-lt"/>
+              </a:rPr>
+              <a:t>products or processes? </a:t>
+            </a:r>
+            <a:r>
+              <a:rPr lang="zh-CN" altLang="en-US" sz="1200" dirty="0">
+                <a:latin typeface="+mj-lt"/>
+              </a:rPr>
+              <a:t>特别是当现在的主打</a:t>
+            </a:r>
+            <a:r>
+              <a:rPr lang="en-US" altLang="zh-CN" sz="1200" dirty="0">
+                <a:latin typeface="+mj-lt"/>
+              </a:rPr>
+              <a:t>product</a:t>
+            </a:r>
+            <a:r>
+              <a:rPr lang="zh-CN" altLang="en-US" sz="1200" dirty="0">
+                <a:latin typeface="+mj-lt"/>
+              </a:rPr>
+              <a:t>的</a:t>
+            </a:r>
+            <a:r>
+              <a:rPr lang="en-US" altLang="zh-CN" sz="1200" dirty="0">
+                <a:latin typeface="+mj-lt"/>
+              </a:rPr>
+              <a:t>potential</a:t>
+            </a:r>
+            <a:r>
+              <a:rPr lang="zh-CN" altLang="en-US" sz="1200" dirty="0">
+                <a:latin typeface="+mj-lt"/>
+              </a:rPr>
+              <a:t>已经被</a:t>
+            </a:r>
+            <a:r>
+              <a:rPr lang="en-US" altLang="zh-CN" sz="1200" dirty="0">
+                <a:latin typeface="+mj-lt"/>
+              </a:rPr>
+              <a:t>fully exploited</a:t>
+            </a:r>
+            <a:r>
+              <a:rPr lang="zh-CN" altLang="en-US" sz="1200" dirty="0">
+                <a:latin typeface="+mj-lt"/>
+              </a:rPr>
+              <a:t>的是时候</a:t>
+            </a:r>
+            <a:endParaRPr lang="en-US" altLang="zh-CN" sz="1200" dirty="0">
+              <a:latin typeface="+mj-lt"/>
+            </a:endParaRPr>
+          </a:p>
+          <a:p>
+            <a:pPr marL="285750" indent="-285750">
+              <a:buFont typeface="+mj-lt"/>
+              <a:buAutoNum type="arabicPeriod"/>
+            </a:pPr>
+            <a:r>
+              <a:rPr lang="zh-CN" altLang="en-US" sz="1200" dirty="0">
+                <a:latin typeface="+mj-lt"/>
+              </a:rPr>
+              <a:t>公司的</a:t>
+            </a:r>
+            <a:r>
+              <a:rPr lang="en-US" altLang="zh-CN" sz="1200" dirty="0">
+                <a:latin typeface="+mj-lt"/>
+              </a:rPr>
+              <a:t>R&amp;D</a:t>
+            </a:r>
+            <a:r>
+              <a:rPr lang="zh-CN" altLang="en-US" sz="1200" dirty="0">
+                <a:latin typeface="+mj-lt"/>
+              </a:rPr>
+              <a:t>成果和其公司</a:t>
+            </a:r>
+            <a:r>
+              <a:rPr lang="en-US" altLang="zh-CN" sz="1200" dirty="0">
+                <a:latin typeface="+mj-lt"/>
+              </a:rPr>
+              <a:t>Size</a:t>
+            </a:r>
+            <a:r>
+              <a:rPr lang="zh-CN" altLang="en-US" sz="1200" dirty="0">
+                <a:latin typeface="+mj-lt"/>
+              </a:rPr>
+              <a:t>的比例是否够大</a:t>
+            </a:r>
+            <a:r>
+              <a:rPr lang="en-US" altLang="zh-CN" sz="1200" dirty="0">
+                <a:latin typeface="+mj-lt"/>
+              </a:rPr>
+              <a:t>(</a:t>
+            </a:r>
+            <a:r>
+              <a:rPr lang="zh-CN" altLang="en-US" sz="1200" dirty="0">
+                <a:latin typeface="+mj-lt"/>
+              </a:rPr>
+              <a:t>可以用</a:t>
+            </a:r>
+            <a:r>
+              <a:rPr lang="en-US" altLang="zh-CN" sz="1200" dirty="0">
+                <a:latin typeface="+mj-lt"/>
+              </a:rPr>
+              <a:t>R&amp;D</a:t>
+            </a:r>
+            <a:r>
+              <a:rPr lang="zh-CN" altLang="en-US" sz="1200" dirty="0">
+                <a:latin typeface="+mj-lt"/>
+              </a:rPr>
+              <a:t>投资</a:t>
+            </a:r>
+            <a:r>
+              <a:rPr lang="en-US" altLang="zh-CN" sz="1200" dirty="0">
+                <a:latin typeface="+mj-lt"/>
+              </a:rPr>
+              <a:t>/</a:t>
+            </a:r>
+            <a:r>
+              <a:rPr lang="zh-CN" altLang="en-US" sz="1200" dirty="0">
+                <a:latin typeface="+mj-lt"/>
+              </a:rPr>
+              <a:t>成果和公司利益的比做评价</a:t>
+            </a:r>
+            <a:r>
+              <a:rPr lang="en-US" altLang="zh-CN" sz="1200" dirty="0">
+                <a:latin typeface="+mj-lt"/>
+              </a:rPr>
+              <a:t>)</a:t>
+            </a:r>
+          </a:p>
+          <a:p>
+            <a:pPr marL="285750" indent="-285750">
+              <a:buFont typeface="+mj-lt"/>
+              <a:buAutoNum type="arabicPeriod"/>
+            </a:pPr>
+            <a:r>
+              <a:rPr lang="zh-CN" altLang="en-US" sz="1200" dirty="0">
+                <a:latin typeface="+mj-lt"/>
+              </a:rPr>
+              <a:t>公司是否有一个好的</a:t>
+            </a:r>
+            <a:r>
+              <a:rPr lang="en-US" altLang="zh-CN" sz="1200" dirty="0">
+                <a:latin typeface="+mj-lt"/>
+              </a:rPr>
+              <a:t>sales organization?  (sales organization</a:t>
+            </a:r>
+            <a:r>
+              <a:rPr lang="zh-CN" altLang="en-US" sz="1200" dirty="0">
+                <a:latin typeface="+mj-lt"/>
+              </a:rPr>
+              <a:t>是专有名词，指公司里和</a:t>
+            </a:r>
+            <a:r>
+              <a:rPr lang="en-US" altLang="zh-CN" sz="1200" dirty="0">
+                <a:latin typeface="+mj-lt"/>
+              </a:rPr>
+              <a:t>profitability</a:t>
+            </a:r>
+            <a:r>
+              <a:rPr lang="zh-CN" altLang="en-US" sz="1200" dirty="0">
+                <a:latin typeface="+mj-lt"/>
+              </a:rPr>
+              <a:t>直接挂钩的，负责</a:t>
+            </a:r>
+            <a:r>
+              <a:rPr lang="en-US" altLang="zh-CN" sz="1200" dirty="0"/>
+              <a:t>distribute  </a:t>
+            </a:r>
+            <a:r>
+              <a:rPr lang="en-US" altLang="zh-CN" sz="1200" dirty="0">
+                <a:latin typeface="+mj-lt"/>
+              </a:rPr>
+              <a:t>goods to consumer</a:t>
+            </a:r>
+            <a:r>
+              <a:rPr lang="zh-CN" altLang="en-US" sz="1200" dirty="0">
+                <a:latin typeface="+mj-lt"/>
+              </a:rPr>
+              <a:t>的部门</a:t>
+            </a:r>
+            <a:r>
+              <a:rPr lang="en-US" altLang="zh-CN" sz="1200" dirty="0">
+                <a:latin typeface="+mj-lt"/>
+              </a:rPr>
+              <a:t>)</a:t>
+            </a:r>
+          </a:p>
+          <a:p>
+            <a:pPr marL="742950" lvl="1" indent="-285750">
+              <a:buFont typeface="Arial" panose="020B0604020202020204" pitchFamily="34" charset="0"/>
+              <a:buChar char="•"/>
+            </a:pPr>
+            <a:r>
+              <a:rPr lang="en-US" altLang="zh-CN" sz="1200" dirty="0" err="1">
+                <a:latin typeface="+mj-lt"/>
+              </a:rPr>
+              <a:t>ToDo</a:t>
+            </a:r>
+            <a:r>
+              <a:rPr lang="zh-CN" altLang="en-US" sz="1200" dirty="0">
+                <a:latin typeface="+mj-lt"/>
+              </a:rPr>
+              <a:t>：怎样评价一个公司的</a:t>
+            </a:r>
+            <a:r>
+              <a:rPr lang="en-US" altLang="zh-CN" sz="1200" dirty="0">
+                <a:latin typeface="+mj-lt"/>
+              </a:rPr>
+              <a:t>sales organization</a:t>
+            </a:r>
+            <a:r>
+              <a:rPr lang="zh-CN" altLang="en-US" sz="1200" dirty="0">
+                <a:latin typeface="+mj-lt"/>
+              </a:rPr>
+              <a:t>？</a:t>
+            </a:r>
+            <a:endParaRPr lang="en-US" altLang="zh-CN" sz="1200" dirty="0">
+              <a:latin typeface="+mj-lt"/>
+            </a:endParaRPr>
+          </a:p>
+          <a:p>
+            <a:pPr marL="285750" indent="-285750">
+              <a:buFont typeface="+mj-lt"/>
+              <a:buAutoNum type="arabicPeriod"/>
+            </a:pPr>
+            <a:r>
+              <a:rPr lang="zh-CN" altLang="en-US" sz="1200" dirty="0">
+                <a:latin typeface="+mj-lt"/>
+              </a:rPr>
+              <a:t>公司是否有一个</a:t>
+            </a:r>
+            <a:r>
+              <a:rPr lang="en-US" altLang="zh-CN" sz="1200" dirty="0">
+                <a:latin typeface="+mj-lt"/>
+              </a:rPr>
+              <a:t>worthwhile profit margin?</a:t>
+            </a:r>
+          </a:p>
+          <a:p>
+            <a:pPr marL="742950" lvl="1" indent="-285750">
+              <a:buFont typeface="Arial" panose="020B0604020202020204" pitchFamily="34" charset="0"/>
+              <a:buChar char="•"/>
+            </a:pPr>
+            <a:r>
+              <a:rPr lang="en-US" altLang="zh-CN" sz="1200" dirty="0" err="1">
+                <a:latin typeface="+mj-lt"/>
+              </a:rPr>
+              <a:t>ToDo</a:t>
+            </a:r>
+            <a:r>
+              <a:rPr lang="zh-CN" altLang="en-US" sz="1200" dirty="0">
+                <a:latin typeface="+mj-lt"/>
+              </a:rPr>
+              <a:t>：啥是</a:t>
+            </a:r>
+            <a:r>
+              <a:rPr lang="en-US" altLang="zh-CN" sz="1200" dirty="0">
+                <a:latin typeface="+mj-lt"/>
+              </a:rPr>
+              <a:t>profit margin? </a:t>
+            </a:r>
+            <a:r>
+              <a:rPr lang="zh-CN" altLang="en-US" sz="1200" dirty="0">
+                <a:latin typeface="+mj-lt"/>
+              </a:rPr>
+              <a:t>咋样才能算是</a:t>
+            </a:r>
+            <a:r>
+              <a:rPr lang="en-US" altLang="zh-CN" sz="1200" dirty="0">
+                <a:latin typeface="+mj-lt"/>
+              </a:rPr>
+              <a:t>worthwhile?</a:t>
+            </a:r>
+          </a:p>
+          <a:p>
+            <a:pPr marL="285750" indent="-285750">
+              <a:buFont typeface="+mj-lt"/>
+              <a:buAutoNum type="arabicPeriod"/>
+            </a:pPr>
+            <a:r>
+              <a:rPr lang="zh-CN" altLang="en-US" sz="1200" dirty="0">
+                <a:latin typeface="+mj-lt"/>
+              </a:rPr>
+              <a:t>公司是否在为了</a:t>
+            </a:r>
+            <a:r>
+              <a:rPr lang="en-US" altLang="zh-CN" sz="1200" dirty="0">
+                <a:latin typeface="+mj-lt"/>
+              </a:rPr>
+              <a:t>maintain / improve profit margins</a:t>
+            </a:r>
+            <a:r>
+              <a:rPr lang="zh-CN" altLang="en-US" sz="1200" dirty="0">
+                <a:latin typeface="+mj-lt"/>
+              </a:rPr>
+              <a:t>而努力</a:t>
+            </a:r>
+            <a:r>
+              <a:rPr lang="en-US" altLang="zh-CN" sz="1200" dirty="0">
+                <a:latin typeface="+mj-lt"/>
+              </a:rPr>
+              <a:t>? </a:t>
+            </a:r>
+            <a:r>
+              <a:rPr lang="zh-CN" altLang="en-US" sz="1200" dirty="0">
+                <a:latin typeface="+mj-lt"/>
+              </a:rPr>
+              <a:t>怎样努力</a:t>
+            </a:r>
+            <a:r>
+              <a:rPr lang="en-US" altLang="zh-CN" sz="1200" dirty="0">
+                <a:latin typeface="+mj-lt"/>
+              </a:rPr>
+              <a:t>?</a:t>
+            </a:r>
+          </a:p>
+          <a:p>
+            <a:pPr marL="285750" indent="-285750">
+              <a:buFont typeface="+mj-lt"/>
+              <a:buAutoNum type="arabicPeriod"/>
+            </a:pPr>
+            <a:r>
+              <a:rPr lang="zh-CN" altLang="en-US" sz="1200" dirty="0">
+                <a:latin typeface="+mj-lt"/>
+              </a:rPr>
+              <a:t>公司是否有</a:t>
+            </a:r>
+            <a:r>
+              <a:rPr lang="en-US" altLang="zh-CN" sz="1200" dirty="0">
+                <a:latin typeface="+mj-lt"/>
+              </a:rPr>
+              <a:t>outstanding labor and personnel relations?</a:t>
+            </a:r>
+          </a:p>
+          <a:p>
+            <a:pPr marL="742950" lvl="1" indent="-285750">
+              <a:buFont typeface="Arial" panose="020B0604020202020204" pitchFamily="34" charset="0"/>
+              <a:buChar char="•"/>
+            </a:pPr>
+            <a:r>
+              <a:rPr lang="en-US" altLang="zh-CN" sz="1200" dirty="0" err="1">
+                <a:latin typeface="+mj-lt"/>
+              </a:rPr>
+              <a:t>ToDo</a:t>
+            </a:r>
+            <a:r>
+              <a:rPr lang="en-US" altLang="zh-CN" sz="1200" dirty="0">
+                <a:latin typeface="+mj-lt"/>
+              </a:rPr>
+              <a:t>: </a:t>
+            </a:r>
+            <a:r>
+              <a:rPr lang="zh-CN" altLang="en-US" sz="1200" dirty="0">
+                <a:latin typeface="+mj-lt"/>
+              </a:rPr>
+              <a:t>怎样评价</a:t>
+            </a:r>
+            <a:r>
+              <a:rPr lang="en-US" altLang="zh-CN" sz="1200" dirty="0"/>
+              <a:t>labor and personnel relations</a:t>
+            </a:r>
+            <a:r>
+              <a:rPr lang="zh-CN" altLang="en-US" sz="1200" dirty="0"/>
+              <a:t>的好坏</a:t>
+            </a:r>
+            <a:r>
+              <a:rPr lang="en-US" altLang="zh-CN" sz="1200" dirty="0"/>
+              <a:t>?</a:t>
+            </a:r>
+          </a:p>
+          <a:p>
+            <a:pPr marL="285750" indent="-285750">
+              <a:buFont typeface="+mj-lt"/>
+              <a:buAutoNum type="arabicPeriod"/>
+            </a:pPr>
+            <a:r>
+              <a:rPr lang="zh-CN" altLang="en-US" sz="1200" dirty="0">
+                <a:latin typeface="+mj-lt"/>
+              </a:rPr>
+              <a:t>公司是否有</a:t>
+            </a:r>
+            <a:r>
+              <a:rPr lang="en-US" altLang="zh-CN" sz="1200" dirty="0">
+                <a:latin typeface="+mj-lt"/>
+              </a:rPr>
+              <a:t>outstanding executive relations? (</a:t>
+            </a:r>
+            <a:r>
+              <a:rPr lang="zh-CN" altLang="en-US" sz="1200" dirty="0">
+                <a:latin typeface="+mj-lt"/>
+              </a:rPr>
+              <a:t>我的理解是，</a:t>
+            </a:r>
+            <a:r>
+              <a:rPr lang="en-US" altLang="zh-CN" sz="1200" dirty="0">
+                <a:latin typeface="+mj-lt"/>
+              </a:rPr>
+              <a:t>executive relation</a:t>
+            </a:r>
+            <a:r>
+              <a:rPr lang="zh-CN" altLang="en-US" sz="1200" dirty="0">
+                <a:latin typeface="+mj-lt"/>
+              </a:rPr>
+              <a:t>是指一个公司的</a:t>
+            </a:r>
+            <a:r>
+              <a:rPr lang="en-US" altLang="zh-CN" sz="1200" dirty="0">
+                <a:latin typeface="+mj-lt"/>
+              </a:rPr>
+              <a:t>top</a:t>
+            </a:r>
+            <a:r>
+              <a:rPr lang="zh-CN" altLang="en-US" sz="1200" dirty="0">
+                <a:latin typeface="+mj-lt"/>
+              </a:rPr>
+              <a:t>和此公司的</a:t>
+            </a:r>
+            <a:r>
+              <a:rPr lang="en-US" altLang="zh-CN" sz="1200" dirty="0">
+                <a:latin typeface="+mj-lt"/>
+              </a:rPr>
+              <a:t>partner/customer</a:t>
+            </a:r>
+            <a:r>
+              <a:rPr lang="zh-CN" altLang="en-US" sz="1200" dirty="0">
+                <a:latin typeface="+mj-lt"/>
+              </a:rPr>
+              <a:t>公司的</a:t>
+            </a:r>
+            <a:r>
+              <a:rPr lang="en-US" altLang="zh-CN" sz="1200" dirty="0">
+                <a:latin typeface="+mj-lt"/>
+              </a:rPr>
+              <a:t>top</a:t>
+            </a:r>
+            <a:r>
+              <a:rPr lang="zh-CN" altLang="en-US" sz="1200" dirty="0">
+                <a:latin typeface="+mj-lt"/>
+              </a:rPr>
+              <a:t>之间的关系，可以归结到</a:t>
+            </a:r>
+            <a:r>
+              <a:rPr lang="en-US" altLang="zh-CN" sz="1200" dirty="0">
+                <a:latin typeface="+mj-lt"/>
+              </a:rPr>
+              <a:t>CEO</a:t>
+            </a:r>
+            <a:r>
+              <a:rPr lang="zh-CN" altLang="en-US" sz="1200" dirty="0">
+                <a:latin typeface="+mj-lt"/>
+              </a:rPr>
+              <a:t>和</a:t>
+            </a:r>
+            <a:r>
+              <a:rPr lang="en-US" altLang="zh-CN" sz="1200" dirty="0">
+                <a:latin typeface="+mj-lt"/>
+              </a:rPr>
+              <a:t>CEO</a:t>
+            </a:r>
+            <a:r>
+              <a:rPr lang="zh-CN" altLang="en-US" sz="1200" dirty="0">
+                <a:latin typeface="+mj-lt"/>
+              </a:rPr>
+              <a:t>之间的关系；此</a:t>
+            </a:r>
+            <a:r>
+              <a:rPr lang="en-US" altLang="zh-CN" sz="1200" dirty="0">
+                <a:latin typeface="+mj-lt"/>
+              </a:rPr>
+              <a:t>relation</a:t>
+            </a:r>
+            <a:r>
+              <a:rPr lang="zh-CN" altLang="en-US" sz="1200" dirty="0">
+                <a:latin typeface="+mj-lt"/>
+              </a:rPr>
+              <a:t>关系到一个公司是否被其</a:t>
+            </a:r>
+            <a:r>
+              <a:rPr lang="en-US" altLang="zh-CN" sz="1200" dirty="0">
+                <a:latin typeface="+mj-lt"/>
+              </a:rPr>
+              <a:t>customer</a:t>
+            </a:r>
+            <a:r>
+              <a:rPr lang="zh-CN" altLang="en-US" sz="1200" dirty="0">
+                <a:latin typeface="+mj-lt"/>
+              </a:rPr>
+              <a:t>认为是一个</a:t>
+            </a:r>
+            <a:r>
+              <a:rPr lang="en-US" altLang="zh-CN" sz="1200" dirty="0">
+                <a:latin typeface="+mj-lt"/>
+              </a:rPr>
+              <a:t>trusted partner that can shape the future together</a:t>
+            </a:r>
+            <a:r>
+              <a:rPr lang="zh-CN" altLang="en-US" sz="1200" dirty="0">
+                <a:latin typeface="+mj-lt"/>
+              </a:rPr>
+              <a:t>，还是仅仅是一个</a:t>
+            </a:r>
+            <a:r>
+              <a:rPr lang="en-US" altLang="zh-CN" sz="1200" dirty="0">
+                <a:latin typeface="+mj-lt"/>
+              </a:rPr>
+              <a:t>vendor that might be called later because of having competing price)</a:t>
+            </a:r>
+          </a:p>
+          <a:p>
+            <a:pPr marL="742950" lvl="1" indent="-285750">
+              <a:buFont typeface="+mj-lt"/>
+              <a:buAutoNum type="arabicPeriod"/>
+            </a:pPr>
+            <a:r>
+              <a:rPr lang="en-US" altLang="zh-CN" sz="1200" dirty="0" err="1">
+                <a:latin typeface="+mj-lt"/>
+              </a:rPr>
+              <a:t>ToDo</a:t>
+            </a:r>
+            <a:r>
+              <a:rPr lang="en-US" altLang="zh-CN" sz="1200" dirty="0">
+                <a:latin typeface="+mj-lt"/>
+              </a:rPr>
+              <a:t>: </a:t>
+            </a:r>
+            <a:r>
+              <a:rPr lang="zh-CN" altLang="en-US" sz="1200" dirty="0">
+                <a:latin typeface="+mj-lt"/>
+              </a:rPr>
+              <a:t>怎样评价</a:t>
+            </a:r>
+            <a:r>
+              <a:rPr lang="en-US" altLang="zh-CN" sz="1200" dirty="0">
+                <a:latin typeface="+mj-lt"/>
+              </a:rPr>
+              <a:t>executive relations</a:t>
+            </a:r>
+            <a:r>
+              <a:rPr lang="zh-CN" altLang="en-US" sz="1200" dirty="0">
+                <a:latin typeface="+mj-lt"/>
+              </a:rPr>
+              <a:t>的好坏？</a:t>
+            </a:r>
+            <a:endParaRPr lang="en-US" altLang="zh-CN" sz="1200" dirty="0">
+              <a:latin typeface="+mj-lt"/>
+            </a:endParaRPr>
+          </a:p>
+          <a:p>
+            <a:pPr marL="285750" indent="-285750">
+              <a:buFont typeface="+mj-lt"/>
+              <a:buAutoNum type="arabicPeriod"/>
+            </a:pPr>
+            <a:r>
+              <a:rPr lang="zh-CN" altLang="en-US" sz="1200" dirty="0">
+                <a:latin typeface="+mj-lt"/>
+              </a:rPr>
+              <a:t>公司是否有</a:t>
+            </a:r>
+            <a:r>
+              <a:rPr lang="en-US" altLang="zh-CN" sz="1200" dirty="0">
+                <a:latin typeface="+mj-lt"/>
+              </a:rPr>
+              <a:t>depth and talent in its management?</a:t>
+            </a:r>
+          </a:p>
+          <a:p>
+            <a:pPr marL="285750" indent="-285750">
+              <a:buFont typeface="+mj-lt"/>
+              <a:buAutoNum type="arabicPeriod"/>
+            </a:pPr>
+            <a:r>
+              <a:rPr lang="zh-CN" altLang="en-US" sz="1200" dirty="0">
+                <a:latin typeface="+mj-lt"/>
+              </a:rPr>
+              <a:t>公司的</a:t>
+            </a:r>
+            <a:r>
+              <a:rPr lang="en-US" altLang="zh-CN" sz="1200" dirty="0">
+                <a:latin typeface="+mj-lt"/>
+              </a:rPr>
+              <a:t>cost analysis and accounting</a:t>
+            </a:r>
+            <a:r>
+              <a:rPr lang="zh-CN" altLang="en-US" sz="1200" dirty="0">
+                <a:latin typeface="+mj-lt"/>
+              </a:rPr>
+              <a:t>是否很好</a:t>
+            </a:r>
+            <a:r>
+              <a:rPr lang="en-US" altLang="zh-CN" sz="1200" dirty="0">
+                <a:latin typeface="+mj-lt"/>
+              </a:rPr>
+              <a:t>?</a:t>
+            </a:r>
+          </a:p>
+          <a:p>
+            <a:pPr marL="285750" indent="-285750">
+              <a:buFont typeface="+mj-lt"/>
+              <a:buAutoNum type="arabicPeriod"/>
+            </a:pPr>
+            <a:r>
+              <a:rPr lang="zh-CN" altLang="en-US" sz="1200" dirty="0">
+                <a:latin typeface="+mj-lt"/>
+              </a:rPr>
+              <a:t>是否有其他证据能表明此公司在其</a:t>
+            </a:r>
+            <a:r>
+              <a:rPr lang="en-US" altLang="zh-CN" sz="1200" dirty="0">
+                <a:latin typeface="+mj-lt"/>
+              </a:rPr>
+              <a:t>involved industry</a:t>
+            </a:r>
+            <a:r>
+              <a:rPr lang="zh-CN" altLang="en-US" sz="1200" dirty="0">
+                <a:latin typeface="+mj-lt"/>
+              </a:rPr>
+              <a:t>中，非常</a:t>
+            </a:r>
+            <a:r>
+              <a:rPr lang="en-US" altLang="zh-CN" sz="1200" dirty="0">
+                <a:latin typeface="+mj-lt"/>
+              </a:rPr>
+              <a:t>outstanding?</a:t>
+            </a:r>
+          </a:p>
+          <a:p>
+            <a:pPr marL="285750" indent="-285750">
+              <a:buFont typeface="+mj-lt"/>
+              <a:buAutoNum type="arabicPeriod"/>
+            </a:pPr>
+            <a:r>
+              <a:rPr lang="zh-CN" altLang="en-US" sz="1200" dirty="0">
+                <a:latin typeface="+mj-lt"/>
+              </a:rPr>
+              <a:t>公司是否有</a:t>
+            </a:r>
+            <a:r>
+              <a:rPr lang="en-US" altLang="zh-CN" sz="1200" dirty="0">
+                <a:latin typeface="+mj-lt"/>
+              </a:rPr>
+              <a:t>profit</a:t>
+            </a:r>
+            <a:r>
+              <a:rPr lang="zh-CN" altLang="en-US" sz="1200" dirty="0">
+                <a:latin typeface="+mj-lt"/>
+              </a:rPr>
+              <a:t>相关的</a:t>
+            </a:r>
+            <a:r>
+              <a:rPr lang="en-US" altLang="zh-CN" sz="1200" dirty="0">
+                <a:latin typeface="+mj-lt"/>
+              </a:rPr>
+              <a:t>short-range / long-range outlook?</a:t>
+            </a:r>
+          </a:p>
+          <a:p>
+            <a:pPr marL="285750" indent="-285750">
+              <a:buFont typeface="+mj-lt"/>
+              <a:buAutoNum type="arabicPeriod"/>
+            </a:pPr>
+            <a:r>
+              <a:rPr lang="zh-CN" altLang="en-US" sz="1200" dirty="0">
+                <a:latin typeface="+mj-lt"/>
+              </a:rPr>
+              <a:t>在可预见的将来，公司是否需要大量股权融资，并且此融资会使现在的</a:t>
+            </a:r>
+            <a:r>
+              <a:rPr lang="en-US" altLang="zh-CN" sz="1200" dirty="0">
+                <a:latin typeface="+mj-lt"/>
+              </a:rPr>
+              <a:t>stockholder</a:t>
+            </a:r>
+            <a:r>
+              <a:rPr lang="zh-CN" altLang="en-US" sz="1200" dirty="0">
+                <a:latin typeface="+mj-lt"/>
+              </a:rPr>
+              <a:t>从公司</a:t>
+            </a:r>
+            <a:r>
+              <a:rPr lang="en-US" altLang="zh-CN" sz="1200" dirty="0">
+                <a:latin typeface="+mj-lt"/>
+              </a:rPr>
+              <a:t>growth</a:t>
+            </a:r>
+            <a:r>
+              <a:rPr lang="zh-CN" altLang="en-US" sz="1200" dirty="0">
+                <a:latin typeface="+mj-lt"/>
+              </a:rPr>
+              <a:t>中获得的利益减少很多</a:t>
+            </a:r>
+            <a:r>
+              <a:rPr lang="en-US" altLang="zh-CN" sz="1200" dirty="0">
+                <a:latin typeface="+mj-lt"/>
+              </a:rPr>
+              <a:t>?</a:t>
+            </a:r>
+          </a:p>
+          <a:p>
+            <a:pPr marL="742950" lvl="1" indent="-285750">
+              <a:buFont typeface="+mj-lt"/>
+              <a:buAutoNum type="arabicPeriod"/>
+            </a:pPr>
+            <a:r>
+              <a:rPr lang="en-US" altLang="zh-CN" sz="1200" dirty="0" err="1">
+                <a:latin typeface="+mj-lt"/>
+              </a:rPr>
+              <a:t>ToDo</a:t>
+            </a:r>
+            <a:r>
+              <a:rPr lang="en-US" altLang="zh-CN" sz="1200" dirty="0">
+                <a:latin typeface="+mj-lt"/>
+              </a:rPr>
+              <a:t>: </a:t>
+            </a:r>
+            <a:r>
+              <a:rPr lang="zh-CN" altLang="en-US" sz="1200" dirty="0">
+                <a:latin typeface="+mj-lt"/>
+              </a:rPr>
+              <a:t>这个怎么看</a:t>
+            </a:r>
+            <a:r>
+              <a:rPr lang="en-US" altLang="zh-CN" sz="1200" dirty="0">
+                <a:latin typeface="+mj-lt"/>
+              </a:rPr>
+              <a:t>?</a:t>
+            </a:r>
+          </a:p>
+          <a:p>
+            <a:pPr marL="285750" indent="-285750">
+              <a:buFont typeface="+mj-lt"/>
+              <a:buAutoNum type="arabicPeriod"/>
+            </a:pPr>
+            <a:r>
+              <a:rPr lang="zh-CN" altLang="en-US" sz="1200" dirty="0">
+                <a:latin typeface="+mj-lt"/>
+              </a:rPr>
+              <a:t>当</a:t>
+            </a:r>
+            <a:r>
+              <a:rPr lang="en-US" altLang="zh-CN" sz="1200" dirty="0">
+                <a:latin typeface="+mj-lt"/>
+              </a:rPr>
+              <a:t>troubles</a:t>
+            </a:r>
+            <a:r>
+              <a:rPr lang="zh-CN" altLang="en-US" sz="1200" dirty="0">
+                <a:latin typeface="+mj-lt"/>
+              </a:rPr>
+              <a:t>和</a:t>
+            </a:r>
+            <a:r>
+              <a:rPr lang="en-US" altLang="zh-CN" sz="1200" dirty="0">
+                <a:latin typeface="+mj-lt"/>
+              </a:rPr>
+              <a:t>disappointment</a:t>
+            </a:r>
+            <a:r>
+              <a:rPr lang="zh-CN" altLang="en-US" sz="1200" dirty="0">
+                <a:latin typeface="+mj-lt"/>
+              </a:rPr>
+              <a:t>发生的时候，公司的</a:t>
+            </a:r>
+            <a:r>
+              <a:rPr lang="en-US" altLang="zh-CN" sz="1200" dirty="0">
+                <a:latin typeface="+mj-lt"/>
+              </a:rPr>
+              <a:t>management</a:t>
+            </a:r>
+            <a:r>
+              <a:rPr lang="zh-CN" altLang="en-US" sz="1200" dirty="0">
+                <a:latin typeface="+mj-lt"/>
+              </a:rPr>
+              <a:t>是否能和</a:t>
+            </a:r>
+            <a:r>
+              <a:rPr lang="en-US" altLang="zh-CN" sz="1200" dirty="0">
+                <a:latin typeface="+mj-lt"/>
+              </a:rPr>
+              <a:t>investors</a:t>
+            </a:r>
+            <a:r>
+              <a:rPr lang="zh-CN" altLang="en-US" sz="1200" dirty="0">
+                <a:latin typeface="+mj-lt"/>
+              </a:rPr>
+              <a:t>良好的交流</a:t>
+            </a:r>
+            <a:r>
+              <a:rPr lang="en-US" altLang="zh-CN" sz="1200" dirty="0">
+                <a:latin typeface="+mj-lt"/>
+              </a:rPr>
+              <a:t>?</a:t>
+            </a:r>
+          </a:p>
+          <a:p>
+            <a:pPr marL="285750" indent="-285750">
+              <a:buFont typeface="+mj-lt"/>
+              <a:buAutoNum type="arabicPeriod"/>
+            </a:pPr>
+            <a:r>
+              <a:rPr lang="zh-CN" altLang="en-US" sz="1200" dirty="0">
+                <a:latin typeface="+mj-lt"/>
+              </a:rPr>
+              <a:t>公司的</a:t>
+            </a:r>
+            <a:r>
+              <a:rPr lang="en-US" altLang="zh-CN" sz="1200" dirty="0">
+                <a:latin typeface="+mj-lt"/>
+              </a:rPr>
+              <a:t>management</a:t>
+            </a:r>
+            <a:r>
+              <a:rPr lang="zh-CN" altLang="en-US" sz="1200" dirty="0">
+                <a:latin typeface="+mj-lt"/>
+              </a:rPr>
+              <a:t>是否有</a:t>
+            </a:r>
+            <a:r>
+              <a:rPr lang="en-US" altLang="zh-CN" sz="1200" dirty="0">
+                <a:latin typeface="+mj-lt"/>
+              </a:rPr>
+              <a:t>unquestionable integrity?</a:t>
+            </a:r>
+          </a:p>
+          <a:p>
+            <a:pPr marL="742950" lvl="1" indent="-285750">
+              <a:buFont typeface="+mj-lt"/>
+              <a:buAutoNum type="arabicPeriod"/>
+            </a:pPr>
+            <a:r>
+              <a:rPr lang="en-US" altLang="zh-CN" sz="1200" dirty="0" err="1">
+                <a:latin typeface="+mj-lt"/>
+              </a:rPr>
+              <a:t>ToDo</a:t>
+            </a:r>
+            <a:r>
+              <a:rPr lang="en-US" altLang="zh-CN" sz="1200" dirty="0">
+                <a:latin typeface="+mj-lt"/>
+              </a:rPr>
+              <a:t>: </a:t>
+            </a:r>
+            <a:r>
+              <a:rPr lang="zh-CN" altLang="en-US" sz="1200" dirty="0">
+                <a:latin typeface="+mj-lt"/>
+              </a:rPr>
+              <a:t>这个</a:t>
+            </a:r>
+            <a:r>
+              <a:rPr lang="en-US" altLang="zh-CN" sz="1200" dirty="0">
+                <a:latin typeface="+mj-lt"/>
+              </a:rPr>
+              <a:t>info</a:t>
+            </a:r>
+            <a:r>
+              <a:rPr lang="zh-CN" altLang="en-US" sz="1200" dirty="0">
+                <a:latin typeface="+mj-lt"/>
+              </a:rPr>
+              <a:t>怎么搜集</a:t>
+            </a:r>
+            <a:r>
+              <a:rPr lang="en-US" altLang="zh-CN" sz="1200" dirty="0">
+                <a:latin typeface="+mj-lt"/>
+              </a:rPr>
+              <a:t>?</a:t>
+            </a:r>
+          </a:p>
+          <a:p>
+            <a:r>
+              <a:rPr lang="en-US" altLang="zh-CN" sz="1200" dirty="0">
+                <a:latin typeface="+mj-lt"/>
+              </a:rPr>
+              <a:t>(</a:t>
+            </a:r>
+            <a:r>
+              <a:rPr lang="ja-JP" altLang="en-US" sz="1200" dirty="0">
+                <a:latin typeface="+mj-lt"/>
+              </a:rPr>
+              <a:t>以下是</a:t>
+            </a:r>
+            <a:r>
+              <a:rPr lang="en-US" altLang="ja-JP" sz="1200" dirty="0">
+                <a:latin typeface="+mj-lt"/>
+              </a:rPr>
+              <a:t>Warren</a:t>
+            </a:r>
+            <a:r>
+              <a:rPr lang="zh-CN" altLang="en-US" sz="1200" dirty="0">
+                <a:latin typeface="+mj-lt"/>
+              </a:rPr>
+              <a:t> </a:t>
+            </a:r>
+            <a:r>
+              <a:rPr lang="en-US" altLang="zh-CN" sz="1200" dirty="0">
+                <a:latin typeface="+mj-lt"/>
+              </a:rPr>
+              <a:t>Buffet</a:t>
+            </a:r>
+            <a:r>
+              <a:rPr lang="ja-JP" altLang="en-US" sz="1200" dirty="0">
+                <a:latin typeface="+mj-lt"/>
+              </a:rPr>
+              <a:t>的</a:t>
+            </a:r>
+            <a:r>
+              <a:rPr lang="en-US" altLang="ja-JP" sz="1200" dirty="0">
+                <a:latin typeface="+mj-lt"/>
+              </a:rPr>
+              <a:t>checklist</a:t>
+            </a:r>
+            <a:r>
+              <a:rPr lang="zh-CN" altLang="en-US" sz="1200" dirty="0">
+                <a:latin typeface="+mj-lt"/>
+              </a:rPr>
+              <a:t>，</a:t>
+            </a:r>
+            <a:r>
+              <a:rPr lang="en-US" altLang="zh-CN" sz="1200" dirty="0">
+                <a:latin typeface="+mj-lt"/>
+              </a:rPr>
+              <a:t>Value</a:t>
+            </a:r>
+            <a:r>
+              <a:rPr lang="zh-CN" altLang="en-US" sz="1200" dirty="0">
+                <a:latin typeface="+mj-lt"/>
+              </a:rPr>
+              <a:t> </a:t>
+            </a:r>
+            <a:r>
+              <a:rPr lang="en-US" altLang="zh-CN" sz="1200" dirty="0">
+                <a:latin typeface="+mj-lt"/>
+              </a:rPr>
+              <a:t>invest)</a:t>
+            </a:r>
+          </a:p>
+          <a:p>
+            <a:pPr marL="285750" indent="-285750">
+              <a:buFont typeface="+mj-lt"/>
+              <a:buAutoNum type="arabicPeriod"/>
+            </a:pPr>
+            <a:r>
+              <a:rPr lang="en-US" altLang="zh-CN" sz="1200" dirty="0">
+                <a:latin typeface="+mj-lt"/>
+              </a:rPr>
+              <a:t>Buy high quality business at cheap price (ignore short-term</a:t>
+            </a:r>
+            <a:r>
+              <a:rPr lang="ja-JP" altLang="en-US" sz="1200" dirty="0">
+                <a:latin typeface="+mj-lt"/>
+              </a:rPr>
+              <a:t>别担心短期股市</a:t>
+            </a:r>
+            <a:r>
+              <a:rPr lang="en-US" altLang="ja-JP" sz="1200" dirty="0">
+                <a:latin typeface="+mj-lt"/>
+              </a:rPr>
+              <a:t>up</a:t>
+            </a:r>
+            <a:r>
+              <a:rPr lang="ja-JP" altLang="en-US" sz="1200" dirty="0">
+                <a:latin typeface="+mj-lt"/>
+              </a:rPr>
+              <a:t>和</a:t>
+            </a:r>
+            <a:r>
+              <a:rPr lang="en-US" altLang="ja-JP" sz="1200" dirty="0">
+                <a:latin typeface="+mj-lt"/>
+              </a:rPr>
+              <a:t>down</a:t>
+            </a:r>
+            <a:r>
+              <a:rPr lang="zh-CN" altLang="en-US" sz="1200" dirty="0">
+                <a:latin typeface="+mj-lt"/>
+              </a:rPr>
+              <a:t>，</a:t>
+            </a:r>
+            <a:r>
+              <a:rPr lang="ja-JP" altLang="en-US" sz="1200" dirty="0">
+                <a:latin typeface="+mj-lt"/>
+              </a:rPr>
+              <a:t>关心</a:t>
+            </a:r>
+            <a:r>
+              <a:rPr lang="en-US" altLang="ja-JP" sz="1200" dirty="0">
+                <a:latin typeface="+mj-lt"/>
+              </a:rPr>
+              <a:t>business</a:t>
+            </a:r>
+            <a:r>
+              <a:rPr lang="zh-CN" altLang="en-US" sz="1200" dirty="0">
+                <a:latin typeface="+mj-lt"/>
+              </a:rPr>
+              <a:t> </a:t>
+            </a:r>
+            <a:r>
+              <a:rPr lang="en-US" altLang="zh-CN" sz="1200" dirty="0">
+                <a:latin typeface="+mj-lt"/>
+              </a:rPr>
+              <a:t>quality</a:t>
+            </a:r>
+            <a:r>
+              <a:rPr lang="ja-JP" altLang="en-US" sz="1200" dirty="0">
+                <a:latin typeface="+mj-lt"/>
+              </a:rPr>
+              <a:t>是不是好</a:t>
+            </a:r>
+            <a:r>
+              <a:rPr lang="en-US" altLang="zh-CN" sz="1200" dirty="0">
+                <a:latin typeface="+mj-lt"/>
+              </a:rPr>
+              <a:t>)</a:t>
+            </a:r>
+          </a:p>
+          <a:p>
+            <a:pPr marL="285750" indent="-285750">
+              <a:buFont typeface="+mj-lt"/>
+              <a:buAutoNum type="arabicPeriod"/>
+            </a:pPr>
+            <a:r>
+              <a:rPr lang="ja-JP" altLang="en-US" sz="1200" dirty="0">
+                <a:latin typeface="+mj-lt"/>
+              </a:rPr>
+              <a:t>公司是否有</a:t>
+            </a:r>
+            <a:r>
+              <a:rPr lang="en-US" altLang="ja-JP" sz="1200" dirty="0">
+                <a:latin typeface="+mj-lt"/>
+              </a:rPr>
+              <a:t>great</a:t>
+            </a:r>
+            <a:r>
+              <a:rPr lang="zh-CN" altLang="en-US" sz="1200" dirty="0">
+                <a:latin typeface="+mj-lt"/>
+              </a:rPr>
+              <a:t> </a:t>
+            </a:r>
+            <a:r>
+              <a:rPr lang="en-US" altLang="zh-CN" sz="1200" dirty="0">
+                <a:latin typeface="+mj-lt"/>
+              </a:rPr>
+              <a:t>management</a:t>
+            </a:r>
+          </a:p>
+          <a:p>
+            <a:pPr marL="285750" indent="-285750">
+              <a:buFont typeface="+mj-lt"/>
+              <a:buAutoNum type="arabicPeriod"/>
+            </a:pPr>
+            <a:r>
+              <a:rPr lang="ja-JP" altLang="en-US" sz="1200" dirty="0">
+                <a:latin typeface="+mj-lt"/>
+              </a:rPr>
+              <a:t>公司是否</a:t>
+            </a:r>
+            <a:r>
+              <a:rPr lang="en-US" altLang="ja-JP" sz="1200" dirty="0">
+                <a:latin typeface="+mj-lt"/>
+              </a:rPr>
+              <a:t>shareholder</a:t>
+            </a:r>
+            <a:r>
+              <a:rPr lang="en-US" altLang="zh-CN" sz="1200" dirty="0">
+                <a:latin typeface="+mj-lt"/>
+              </a:rPr>
+              <a:t>-oriented (</a:t>
+            </a:r>
+            <a:r>
+              <a:rPr lang="ja-JP" altLang="en-US" sz="1200" dirty="0">
+                <a:latin typeface="+mj-lt"/>
+              </a:rPr>
+              <a:t>从</a:t>
+            </a:r>
+            <a:r>
+              <a:rPr lang="en-US" altLang="ja-JP" sz="1200" dirty="0">
+                <a:latin typeface="+mj-lt"/>
+              </a:rPr>
+              <a:t>dividends</a:t>
+            </a:r>
+            <a:r>
+              <a:rPr lang="ja-JP" altLang="en-US" sz="1200" dirty="0">
+                <a:latin typeface="+mj-lt"/>
+              </a:rPr>
+              <a:t>和</a:t>
+            </a:r>
+            <a:r>
+              <a:rPr lang="en-US" altLang="ja-JP" sz="1200" dirty="0">
+                <a:latin typeface="+mj-lt"/>
+              </a:rPr>
+              <a:t>share-buy-back</a:t>
+            </a:r>
+            <a:r>
+              <a:rPr lang="ja-JP" altLang="en-US" sz="1200" dirty="0">
+                <a:latin typeface="+mj-lt"/>
+              </a:rPr>
+              <a:t>上看</a:t>
+            </a:r>
+            <a:r>
+              <a:rPr lang="en-US" altLang="zh-CN" sz="1200" dirty="0">
+                <a:latin typeface="+mj-lt"/>
+              </a:rPr>
+              <a:t>)</a:t>
+            </a:r>
+          </a:p>
+          <a:p>
+            <a:pPr marL="285750" indent="-285750">
+              <a:buFont typeface="+mj-lt"/>
+              <a:buAutoNum type="arabicPeriod"/>
+            </a:pPr>
+            <a:r>
+              <a:rPr lang="ja-JP" altLang="en-US" sz="1200" dirty="0">
+                <a:latin typeface="+mj-lt"/>
+              </a:rPr>
+              <a:t>我是否理解公司在干什么</a:t>
+            </a:r>
+            <a:r>
+              <a:rPr lang="zh-CN" altLang="en-US" sz="1200" dirty="0">
+                <a:latin typeface="+mj-lt"/>
+              </a:rPr>
+              <a:t>，</a:t>
+            </a:r>
+            <a:r>
+              <a:rPr lang="ja-JP" altLang="en-US" sz="1200" dirty="0">
+                <a:latin typeface="+mj-lt"/>
+              </a:rPr>
+              <a:t>能不能用自己的话说公司从原材料购入到生产商品最后倒卖商品给谁</a:t>
+            </a:r>
+            <a:endParaRPr lang="en-US" altLang="ja-JP" sz="1200" dirty="0">
+              <a:latin typeface="+mj-lt"/>
+            </a:endParaRPr>
+          </a:p>
+          <a:p>
+            <a:pPr marL="285750" indent="-285750">
+              <a:buFont typeface="+mj-lt"/>
+              <a:buAutoNum type="arabicPeriod"/>
+            </a:pPr>
+            <a:r>
+              <a:rPr lang="ja-JP" altLang="en-US" sz="1200" dirty="0">
+                <a:latin typeface="+mj-lt"/>
+              </a:rPr>
+              <a:t>公司的</a:t>
+            </a:r>
+            <a:r>
+              <a:rPr lang="en-US" altLang="ja-JP" sz="1200" dirty="0">
+                <a:latin typeface="+mj-lt"/>
+              </a:rPr>
+              <a:t>product</a:t>
+            </a:r>
+            <a:r>
+              <a:rPr lang="ja-JP" altLang="en-US" sz="1200" dirty="0">
+                <a:latin typeface="+mj-lt"/>
+              </a:rPr>
+              <a:t>时候高品质</a:t>
+            </a:r>
+            <a:r>
+              <a:rPr lang="zh-CN" altLang="en-US" sz="1200" dirty="0">
+                <a:latin typeface="+mj-lt"/>
+              </a:rPr>
+              <a:t>，</a:t>
+            </a:r>
+            <a:r>
+              <a:rPr lang="ja-JP" altLang="en-US" sz="1200" dirty="0">
+                <a:latin typeface="+mj-lt"/>
+              </a:rPr>
+              <a:t>并且能让</a:t>
+            </a:r>
+            <a:r>
+              <a:rPr lang="en-US" altLang="ja-JP" sz="1200" dirty="0">
+                <a:latin typeface="+mj-lt"/>
+              </a:rPr>
+              <a:t>customers</a:t>
+            </a:r>
+            <a:r>
+              <a:rPr lang="zh-CN" altLang="en-US" sz="1200" dirty="0">
+                <a:latin typeface="+mj-lt"/>
+              </a:rPr>
+              <a:t> </a:t>
+            </a:r>
+            <a:r>
+              <a:rPr lang="en-US" altLang="zh-CN" sz="1200" dirty="0">
+                <a:latin typeface="+mj-lt"/>
+              </a:rPr>
+              <a:t>keep</a:t>
+            </a:r>
+            <a:r>
+              <a:rPr lang="zh-CN" altLang="en-US" sz="1200" dirty="0">
+                <a:latin typeface="+mj-lt"/>
+              </a:rPr>
+              <a:t> </a:t>
+            </a:r>
+            <a:r>
+              <a:rPr lang="en-US" altLang="zh-CN" sz="1200" dirty="0">
+                <a:latin typeface="+mj-lt"/>
+              </a:rPr>
+              <a:t>purchasing</a:t>
+            </a:r>
+          </a:p>
+          <a:p>
+            <a:pPr marL="285750" indent="-285750">
+              <a:buFont typeface="+mj-lt"/>
+              <a:buAutoNum type="arabicPeriod"/>
+            </a:pPr>
+            <a:r>
+              <a:rPr lang="ja-JP" altLang="en-US" sz="1200" dirty="0">
+                <a:latin typeface="+mj-lt"/>
+              </a:rPr>
+              <a:t>公司和其</a:t>
+            </a:r>
+            <a:r>
+              <a:rPr lang="en-US" altLang="ja-JP" sz="1200" dirty="0">
+                <a:latin typeface="+mj-lt"/>
+              </a:rPr>
+              <a:t>competitor</a:t>
+            </a:r>
+            <a:r>
+              <a:rPr lang="ja-JP" altLang="en-US" sz="1200" dirty="0">
+                <a:latin typeface="+mj-lt"/>
+              </a:rPr>
+              <a:t>相比</a:t>
+            </a:r>
+            <a:r>
+              <a:rPr lang="zh-CN" altLang="en-US" sz="1200" dirty="0">
+                <a:latin typeface="+mj-lt"/>
+              </a:rPr>
+              <a:t>，</a:t>
+            </a:r>
+            <a:r>
+              <a:rPr lang="ja-JP" altLang="en-US" sz="1200" dirty="0">
+                <a:latin typeface="+mj-lt"/>
+              </a:rPr>
+              <a:t>是否有</a:t>
+            </a:r>
+            <a:r>
+              <a:rPr lang="en-US" altLang="ja-JP" sz="1200" dirty="0">
+                <a:latin typeface="+mj-lt"/>
+              </a:rPr>
+              <a:t>moat</a:t>
+            </a:r>
+            <a:r>
+              <a:rPr lang="zh-CN" altLang="en-US" sz="1200" dirty="0">
+                <a:latin typeface="+mj-lt"/>
+              </a:rPr>
+              <a:t> </a:t>
+            </a:r>
+            <a:r>
+              <a:rPr lang="en-US" altLang="zh-CN" sz="1200" dirty="0">
+                <a:latin typeface="+mj-lt"/>
+              </a:rPr>
+              <a:t>(moat</a:t>
+            </a:r>
+            <a:r>
+              <a:rPr lang="ja-JP" altLang="en-US" sz="1200" dirty="0">
+                <a:latin typeface="+mj-lt"/>
+              </a:rPr>
+              <a:t>是护城河</a:t>
+            </a:r>
+            <a:r>
+              <a:rPr lang="zh-CN" altLang="en-US" sz="1200" dirty="0">
+                <a:latin typeface="+mj-lt"/>
+              </a:rPr>
+              <a:t>，</a:t>
+            </a:r>
+            <a:r>
+              <a:rPr lang="ja-JP" altLang="en-US" sz="1200" dirty="0">
+                <a:latin typeface="+mj-lt"/>
+              </a:rPr>
+              <a:t>指</a:t>
+            </a:r>
+            <a:r>
+              <a:rPr lang="en-US" altLang="ja-JP" sz="1200" dirty="0">
+                <a:latin typeface="+mj-lt"/>
+              </a:rPr>
+              <a:t>unique</a:t>
+            </a:r>
+            <a:r>
+              <a:rPr lang="zh-CN" altLang="en-US" sz="1200" dirty="0">
+                <a:latin typeface="+mj-lt"/>
+              </a:rPr>
+              <a:t> </a:t>
+            </a:r>
+            <a:r>
+              <a:rPr lang="en-US" altLang="zh-CN" sz="1200" dirty="0">
+                <a:latin typeface="+mj-lt"/>
+              </a:rPr>
+              <a:t>tech</a:t>
+            </a:r>
+            <a:r>
+              <a:rPr lang="zh-CN" altLang="en-US" sz="1200" dirty="0">
+                <a:latin typeface="+mj-lt"/>
+              </a:rPr>
+              <a:t>，</a:t>
+            </a:r>
+            <a:r>
+              <a:rPr lang="en-US" altLang="zh-CN" sz="1200" dirty="0">
+                <a:latin typeface="+mj-lt"/>
+              </a:rPr>
+              <a:t>patent</a:t>
+            </a:r>
+            <a:r>
+              <a:rPr lang="zh-CN" altLang="en-US" sz="1200" dirty="0">
+                <a:latin typeface="+mj-lt"/>
+              </a:rPr>
+              <a:t>，</a:t>
+            </a:r>
+            <a:r>
+              <a:rPr lang="en-US" altLang="zh-CN" sz="1200" dirty="0">
+                <a:latin typeface="+mj-lt"/>
+              </a:rPr>
+              <a:t>brand</a:t>
+            </a:r>
+            <a:r>
+              <a:rPr lang="zh-CN" altLang="en-US" sz="1200" dirty="0">
+                <a:latin typeface="+mj-lt"/>
+              </a:rPr>
+              <a:t> </a:t>
+            </a:r>
+            <a:r>
+              <a:rPr lang="en-US" altLang="zh-CN" sz="1200" dirty="0">
+                <a:latin typeface="+mj-lt"/>
+              </a:rPr>
+              <a:t>name</a:t>
+            </a:r>
+            <a:r>
+              <a:rPr lang="ja-JP" altLang="en-US" sz="1200" dirty="0">
+                <a:latin typeface="+mj-lt"/>
+              </a:rPr>
+              <a:t>等</a:t>
+            </a:r>
+            <a:r>
+              <a:rPr lang="en-US" altLang="zh-CN" sz="1200" dirty="0">
+                <a:latin typeface="+mj-lt"/>
+              </a:rPr>
+              <a:t>)</a:t>
+            </a:r>
+          </a:p>
+          <a:p>
+            <a:r>
+              <a:rPr lang="en-US" altLang="zh-CN" sz="1200" dirty="0" err="1">
+                <a:latin typeface="+mj-lt"/>
+              </a:rPr>
+              <a:t>Lych’s</a:t>
+            </a:r>
+            <a:r>
+              <a:rPr lang="en-US" altLang="zh-CN" sz="1200" dirty="0">
+                <a:latin typeface="+mj-lt"/>
+              </a:rPr>
+              <a:t> list</a:t>
+            </a:r>
+          </a:p>
+          <a:p>
+            <a:pPr marL="228600" indent="-228600">
+              <a:buFont typeface="+mj-lt"/>
+              <a:buAutoNum type="arabicPeriod"/>
+            </a:pPr>
+            <a:r>
+              <a:rPr lang="zh-CN" altLang="en-US" sz="1200" dirty="0">
+                <a:latin typeface="+mj-lt"/>
+              </a:rPr>
+              <a:t>看看自己周围，大家都在用什么产品；</a:t>
+            </a:r>
+            <a:r>
+              <a:rPr lang="en-US" altLang="zh-CN" sz="1200" dirty="0">
+                <a:latin typeface="+mj-lt"/>
+              </a:rPr>
+              <a:t>if you are a construction worker, look at what cement you are using, etc.</a:t>
+            </a:r>
+          </a:p>
+          <a:p>
+            <a:pPr marL="228600" indent="-228600">
+              <a:buFont typeface="+mj-lt"/>
+              <a:buAutoNum type="arabicPeriod"/>
+            </a:pPr>
+            <a:r>
+              <a:rPr lang="en-US" altLang="zh-CN" sz="1200" dirty="0">
+                <a:latin typeface="+mj-lt"/>
+              </a:rPr>
+              <a:t>Use PEG (Price / earing to growth)</a:t>
+            </a:r>
+          </a:p>
+          <a:p>
+            <a:pPr marL="228600" indent="-228600">
+              <a:buFont typeface="+mj-lt"/>
+              <a:buAutoNum type="arabicPeriod"/>
+            </a:pPr>
+            <a:r>
+              <a:rPr lang="en-US" altLang="zh-CN" sz="1200" dirty="0">
+                <a:latin typeface="+mj-lt"/>
+              </a:rPr>
+              <a:t>Look at percentage of assets in cash. Strong cash position is better.</a:t>
+            </a:r>
+          </a:p>
+          <a:p>
+            <a:pPr marL="228600" indent="-228600">
+              <a:buFont typeface="+mj-lt"/>
+              <a:buAutoNum type="arabicPeriod"/>
+            </a:pPr>
+            <a:r>
+              <a:rPr lang="en-US" altLang="zh-CN" sz="1200" dirty="0">
+                <a:latin typeface="+mj-lt"/>
+              </a:rPr>
+              <a:t>Look at debts, lower is better.</a:t>
+            </a:r>
+          </a:p>
+          <a:p>
+            <a:pPr marL="228600" indent="-228600">
+              <a:buFont typeface="+mj-lt"/>
+              <a:buAutoNum type="arabicPeriod"/>
+            </a:pPr>
+            <a:r>
+              <a:rPr lang="zh-CN" altLang="en-US" sz="1200" dirty="0">
+                <a:latin typeface="+mj-lt"/>
+              </a:rPr>
+              <a:t>投资之前，</a:t>
+            </a:r>
+            <a:r>
+              <a:rPr lang="en-US" altLang="zh-CN" sz="1200" dirty="0">
+                <a:latin typeface="+mj-lt"/>
+              </a:rPr>
+              <a:t>create a story. About</a:t>
+            </a:r>
+            <a:r>
+              <a:rPr lang="zh-CN" altLang="en-US" sz="1200" dirty="0">
+                <a:latin typeface="+mj-lt"/>
+              </a:rPr>
+              <a:t> </a:t>
+            </a:r>
+            <a:r>
+              <a:rPr lang="en-US" altLang="zh-CN" sz="1200" dirty="0">
+                <a:latin typeface="+mj-lt"/>
+              </a:rPr>
+              <a:t>a</a:t>
+            </a:r>
+            <a:r>
+              <a:rPr lang="zh-CN" altLang="en-US" sz="1200" dirty="0">
+                <a:latin typeface="+mj-lt"/>
+              </a:rPr>
+              <a:t> </a:t>
+            </a:r>
+            <a:r>
+              <a:rPr lang="en-US" altLang="zh-CN" sz="1200" dirty="0">
+                <a:latin typeface="+mj-lt"/>
+              </a:rPr>
+              <a:t>company,</a:t>
+            </a:r>
+            <a:r>
+              <a:rPr lang="zh-CN" altLang="en-US" sz="1200" dirty="0">
+                <a:latin typeface="+mj-lt"/>
+              </a:rPr>
+              <a:t> </a:t>
+            </a:r>
+            <a:r>
+              <a:rPr lang="en-US" altLang="zh-CN" sz="1200" dirty="0">
+                <a:latin typeface="+mj-lt"/>
+              </a:rPr>
+              <a:t>why it’s good investment? What it needs to do to perform well? Where I</a:t>
+            </a:r>
+            <a:r>
+              <a:rPr lang="zh-CN" altLang="en-US" sz="1200" dirty="0">
+                <a:latin typeface="+mj-lt"/>
+              </a:rPr>
+              <a:t> </a:t>
+            </a:r>
+            <a:r>
+              <a:rPr lang="en-US" altLang="zh-CN" sz="1200" dirty="0">
+                <a:latin typeface="+mj-lt"/>
+              </a:rPr>
+              <a:t>hope</a:t>
+            </a:r>
+            <a:r>
+              <a:rPr lang="zh-CN" altLang="en-US" sz="1200" dirty="0">
+                <a:latin typeface="+mj-lt"/>
+              </a:rPr>
+              <a:t> </a:t>
+            </a:r>
+            <a:r>
+              <a:rPr lang="en-US" altLang="zh-CN" sz="1200" dirty="0">
+                <a:latin typeface="+mj-lt"/>
+              </a:rPr>
+              <a:t>it</a:t>
+            </a:r>
+            <a:r>
+              <a:rPr lang="zh-CN" altLang="en-US" sz="1200" dirty="0">
+                <a:latin typeface="+mj-lt"/>
+              </a:rPr>
+              <a:t> </a:t>
+            </a:r>
+            <a:r>
+              <a:rPr lang="en-US" altLang="zh-CN" sz="1200" dirty="0">
+                <a:latin typeface="+mj-lt"/>
+              </a:rPr>
+              <a:t>is</a:t>
+            </a:r>
+            <a:r>
+              <a:rPr lang="zh-CN" altLang="en-US" sz="1200" dirty="0">
+                <a:latin typeface="+mj-lt"/>
+              </a:rPr>
+              <a:t> </a:t>
+            </a:r>
+            <a:r>
+              <a:rPr lang="en-US" altLang="zh-CN" sz="1200" dirty="0">
+                <a:latin typeface="+mj-lt"/>
+              </a:rPr>
+              <a:t>headed? </a:t>
+            </a:r>
+            <a:r>
+              <a:rPr lang="zh-CN" altLang="en-US" sz="1200" dirty="0">
+                <a:latin typeface="+mj-lt"/>
+              </a:rPr>
+              <a:t>把这个</a:t>
+            </a:r>
+            <a:r>
+              <a:rPr lang="en-US" altLang="zh-CN" sz="1200" dirty="0">
+                <a:latin typeface="+mj-lt"/>
+              </a:rPr>
+              <a:t>story</a:t>
+            </a:r>
+            <a:r>
+              <a:rPr lang="zh-CN" altLang="en-US" sz="1200" dirty="0">
+                <a:latin typeface="+mj-lt"/>
+              </a:rPr>
+              <a:t>记下来，时不时</a:t>
+            </a:r>
+            <a:r>
+              <a:rPr lang="en-US" altLang="zh-CN" sz="1200" dirty="0">
+                <a:latin typeface="+mj-lt"/>
+              </a:rPr>
+              <a:t>recheck</a:t>
+            </a:r>
+            <a:r>
+              <a:rPr lang="zh-CN" altLang="en-US" sz="1200" dirty="0">
+                <a:latin typeface="+mj-lt"/>
+              </a:rPr>
+              <a:t>一下</a:t>
+            </a:r>
+            <a:endParaRPr lang="en-US" altLang="zh-CN" sz="1200" dirty="0">
+              <a:latin typeface="+mj-lt"/>
+            </a:endParaRPr>
+          </a:p>
+          <a:p>
+            <a:endParaRPr lang="en-US" altLang="zh-CN" sz="1200" dirty="0">
+              <a:latin typeface="+mj-lt"/>
+            </a:endParaRPr>
+          </a:p>
+          <a:p>
+            <a:r>
+              <a:rPr lang="en-US" altLang="zh-CN" sz="1200" dirty="0">
+                <a:latin typeface="+mj-lt"/>
+              </a:rPr>
+              <a:t>Value investor</a:t>
+            </a:r>
+            <a:r>
+              <a:rPr lang="zh-CN" altLang="en-US" sz="1200" dirty="0">
+                <a:latin typeface="+mj-lt"/>
+              </a:rPr>
+              <a:t>很看重现在公司的股价要低，低买高卖；</a:t>
+            </a:r>
+            <a:r>
+              <a:rPr lang="en-US" altLang="zh-CN" sz="1200" dirty="0">
+                <a:latin typeface="+mj-lt"/>
+              </a:rPr>
+              <a:t>growth investor</a:t>
+            </a:r>
+            <a:r>
+              <a:rPr lang="zh-CN" altLang="en-US" sz="1200" dirty="0">
+                <a:latin typeface="+mj-lt"/>
+              </a:rPr>
+              <a:t>则更看重公司前景，即使现在公司股价高也会买</a:t>
+            </a:r>
+            <a:endParaRPr lang="en-US" altLang="zh-CN" sz="1200" dirty="0">
+              <a:latin typeface="+mj-lt"/>
+            </a:endParaRPr>
+          </a:p>
+        </p:txBody>
+      </p:sp>
+    </p:spTree>
+    <p:extLst>
+      <p:ext uri="{BB962C8B-B14F-4D97-AF65-F5344CB8AC3E}">
+        <p14:creationId xmlns:p14="http://schemas.microsoft.com/office/powerpoint/2010/main" val="2382410945"/>
+      </p:ext>
+    </p:extLst>
+  </p:cSld>
+  <p:clrMapOvr>
+    <a:masterClrMapping/>
+  </p:clrMapOvr>
+</p:sld>
+</file>
+
+<file path=ppt/slides/slide3.xml><?xml version="1.0" encoding="utf-8"?>
+<p:sld xmlns:a="http://schemas.openxmlformats.org/drawingml/2006/main" xmlns:r="http://schemas.openxmlformats.org/officeDocument/2006/relationships" xmlns:p="http://schemas.openxmlformats.org/presentationml/2006/main">
+  <p:cSld>
+    <p:spTree>
+      <p:nvGrpSpPr>
+        <p:cNvPr id="1" name=""/>
+        <p:cNvGrpSpPr/>
+        <p:nvPr/>
+      </p:nvGrpSpPr>
+      <p:grpSpPr>
+        <a:xfrm>
+          <a:off x="0" y="0"/>
+          <a:ext cx="0" cy="0"/>
+          <a:chOff x="0" y="0"/>
+          <a:chExt cx="0" cy="0"/>
+        </a:xfrm>
+      </p:grpSpPr>
+      <p:sp>
+        <p:nvSpPr>
           <p:cNvPr id="2" name="TextBox 1">
             <a:extLst>
               <a:ext uri="{FF2B5EF4-FFF2-40B4-BE49-F238E27FC236}">
-                <a16:creationId xmlns:a16="http://schemas.microsoft.com/office/drawing/2014/main" xmlns="" id="{7089F4EE-31CC-4C8C-99D2-9CC3B35FDCAC}"/>
+                <a16:creationId xmlns="" xmlns:a16="http://schemas.microsoft.com/office/drawing/2014/main" id="{7089F4EE-31CC-4C8C-99D2-9CC3B35FDCAC}"/>
               </a:ext>
             </a:extLst>
           </p:cNvPr>
@@ -5374,7 +5968,7 @@
           <p:cNvPr id="3" name="TextBox 2">
             <a:extLst>
               <a:ext uri="{FF2B5EF4-FFF2-40B4-BE49-F238E27FC236}">
-                <a16:creationId xmlns:a16="http://schemas.microsoft.com/office/drawing/2014/main" xmlns="" id="{DB438EAF-213C-40F1-8DF0-CF7CBF419389}"/>
+                <a16:creationId xmlns="" xmlns:a16="http://schemas.microsoft.com/office/drawing/2014/main" id="{DB438EAF-213C-40F1-8DF0-CF7CBF419389}"/>
               </a:ext>
             </a:extLst>
           </p:cNvPr>
@@ -5564,7 +6158,7 @@
           <p:cNvPr id="4" name="TextBox 3">
             <a:extLst>
               <a:ext uri="{FF2B5EF4-FFF2-40B4-BE49-F238E27FC236}">
-                <a16:creationId xmlns:a16="http://schemas.microsoft.com/office/drawing/2014/main" xmlns="" id="{A645619F-2394-4D3E-89BC-966F9EC14737}"/>
+                <a16:creationId xmlns="" xmlns:a16="http://schemas.microsoft.com/office/drawing/2014/main" id="{A645619F-2394-4D3E-89BC-966F9EC14737}"/>
               </a:ext>
             </a:extLst>
           </p:cNvPr>
@@ -5700,7 +6294,7 @@
 </p:sld>
 </file>
 
-<file path=ppt/slides/slide3.xml><?xml version="1.0" encoding="utf-8"?>
+<file path=ppt/slides/slide4.xml><?xml version="1.0" encoding="utf-8"?>
 <p:sld xmlns:a="http://schemas.openxmlformats.org/drawingml/2006/main" xmlns:r="http://schemas.openxmlformats.org/officeDocument/2006/relationships" xmlns:p="http://schemas.openxmlformats.org/presentationml/2006/main">
   <p:cSld>
     <p:spTree>
@@ -6545,7 +7139,7 @@
 </p:sld>
 </file>
 
-<file path=ppt/slides/slide4.xml><?xml version="1.0" encoding="utf-8"?>
+<file path=ppt/slides/slide5.xml><?xml version="1.0" encoding="utf-8"?>
 <p:sld xmlns:a="http://schemas.openxmlformats.org/drawingml/2006/main" xmlns:r="http://schemas.openxmlformats.org/officeDocument/2006/relationships" xmlns:p="http://schemas.openxmlformats.org/presentationml/2006/main">
   <p:cSld>
     <p:spTree>
@@ -6747,7 +7341,7 @@
 </p:sld>
 </file>
 
-<file path=ppt/slides/slide5.xml><?xml version="1.0" encoding="utf-8"?>
+<file path=ppt/slides/slide6.xml><?xml version="1.0" encoding="utf-8"?>
 <p:sld xmlns:a="http://schemas.openxmlformats.org/drawingml/2006/main" xmlns:r="http://schemas.openxmlformats.org/officeDocument/2006/relationships" xmlns:p="http://schemas.openxmlformats.org/presentationml/2006/main">
   <p:cSld>
     <p:spTree>
@@ -6896,7 +7490,7 @@
 </p:sld>
 </file>
 
-<file path=ppt/slides/slide6.xml><?xml version="1.0" encoding="utf-8"?>
+<file path=ppt/slides/slide7.xml><?xml version="1.0" encoding="utf-8"?>
 <p:sld xmlns:a="http://schemas.openxmlformats.org/drawingml/2006/main" xmlns:r="http://schemas.openxmlformats.org/officeDocument/2006/relationships" xmlns:p="http://schemas.openxmlformats.org/presentationml/2006/main">
   <p:cSld>
     <p:spTree>
@@ -6918,7 +7512,7 @@
           <p:cNvPr id="2" name="TextBox 1">
             <a:extLst>
               <a:ext uri="{FF2B5EF4-FFF2-40B4-BE49-F238E27FC236}">
-                <a16:creationId xmlns:a16="http://schemas.microsoft.com/office/drawing/2014/main" xmlns="" id="{4A5C2DDE-5199-4DBB-ACD3-E82644E46320}"/>
+                <a16:creationId xmlns="" xmlns:a16="http://schemas.microsoft.com/office/drawing/2014/main" id="{4A5C2DDE-5199-4DBB-ACD3-E82644E46320}"/>
               </a:ext>
             </a:extLst>
           </p:cNvPr>
@@ -7465,7 +8059,7 @@
 </p:sld>
 </file>
 
-<file path=ppt/slides/slide7.xml><?xml version="1.0" encoding="utf-8"?>
+<file path=ppt/slides/slide8.xml><?xml version="1.0" encoding="utf-8"?>
 <p:sld xmlns:a="http://schemas.openxmlformats.org/drawingml/2006/main" xmlns:r="http://schemas.openxmlformats.org/officeDocument/2006/relationships" xmlns:p="http://schemas.openxmlformats.org/presentationml/2006/main">
   <p:cSld>
     <p:spTree>
@@ -7838,7 +8432,7 @@
 </p:sld>
 </file>
 
-<file path=ppt/slides/slide8.xml><?xml version="1.0" encoding="utf-8"?>
+<file path=ppt/slides/slide9.xml><?xml version="1.0" encoding="utf-8"?>
 <p:sld xmlns:a="http://schemas.openxmlformats.org/drawingml/2006/main" xmlns:r="http://schemas.openxmlformats.org/officeDocument/2006/relationships" xmlns:p="http://schemas.openxmlformats.org/presentationml/2006/main">
   <p:cSld>
     <p:spTree>

</xml_diff>

<commit_message>
add restricted stock unit knowledge
- investor
add RSU and vesting, a common term in salary packages
</commit_message>
<xml_diff>
--- a/[BeAInvestor].pptx
+++ b/[BeAInvestor].pptx
@@ -116,7 +116,7 @@
   </p:defaultTextStyle>
   <p:extLst>
     <p:ext uri="{EFAFB233-063F-42B5-8137-9DF3F51BA10A}">
-      <p15:sldGuideLst xmlns="" xmlns:p15="http://schemas.microsoft.com/office/powerpoint/2012/main">
+      <p15:sldGuideLst xmlns:p15="http://schemas.microsoft.com/office/powerpoint/2012/main" xmlns="">
         <p15:guide id="1" orient="horz" pos="2880">
           <p15:clr>
             <a:srgbClr val="A4A3A4"/>
@@ -4876,7 +4876,7 @@
         <p:spPr>
           <a:xfrm>
             <a:off x="0" y="0"/>
-            <a:ext cx="5715000" cy="2585323"/>
+            <a:ext cx="5715000" cy="4616648"/>
           </a:xfrm>
           <a:prstGeom prst="rect">
             <a:avLst/>
@@ -4890,7 +4890,7 @@
           <a:lstStyle/>
           <a:p>
             <a:r>
-              <a:rPr kumimoji="1" lang="en-US" altLang="ja-JP" dirty="0" smtClean="0">
+              <a:rPr kumimoji="1" lang="en-US" altLang="ja-JP" sz="1400" dirty="0" smtClean="0">
                 <a:latin typeface="Meiryo UI" panose="020B0604030504040204" pitchFamily="50" charset="-128"/>
                 <a:ea typeface="Meiryo UI" panose="020B0604030504040204" pitchFamily="50" charset="-128"/>
               </a:rPr>
@@ -4903,27 +4903,27 @@
               <a:buChar char="•"/>
             </a:pPr>
             <a:r>
-              <a:rPr lang="zh-CN" altLang="en-US" dirty="0" smtClean="0">
+              <a:rPr lang="zh-CN" altLang="en-US" sz="1400" dirty="0" smtClean="0">
                 <a:latin typeface="Meiryo UI" panose="020B0604030504040204" pitchFamily="50" charset="-128"/>
                 <a:ea typeface="Meiryo UI" panose="020B0604030504040204" pitchFamily="50" charset="-128"/>
               </a:rPr>
               <a:t>逛</a:t>
             </a:r>
             <a:r>
-              <a:rPr lang="en-US" altLang="zh-CN" dirty="0" err="1" smtClean="0">
+              <a:rPr lang="en-US" altLang="zh-CN" sz="1400" dirty="0" err="1" smtClean="0">
                 <a:latin typeface="Meiryo UI" panose="020B0604030504040204" pitchFamily="50" charset="-128"/>
                 <a:ea typeface="Meiryo UI" panose="020B0604030504040204" pitchFamily="50" charset="-128"/>
               </a:rPr>
               <a:t>facebook</a:t>
             </a:r>
             <a:r>
-              <a:rPr lang="zh-CN" altLang="en-US" dirty="0" smtClean="0">
+              <a:rPr lang="zh-CN" altLang="en-US" sz="1400" dirty="0" smtClean="0">
                 <a:latin typeface="Meiryo UI" panose="020B0604030504040204" pitchFamily="50" charset="-128"/>
                 <a:ea typeface="Meiryo UI" panose="020B0604030504040204" pitchFamily="50" charset="-128"/>
               </a:rPr>
               <a:t>的时候偶然发现了右图，感觉很有意思</a:t>
             </a:r>
-            <a:endParaRPr lang="en-US" altLang="zh-CN" dirty="0" smtClean="0">
+            <a:endParaRPr lang="en-US" altLang="zh-CN" sz="1400" dirty="0" smtClean="0">
               <a:latin typeface="Meiryo UI" panose="020B0604030504040204" pitchFamily="50" charset="-128"/>
               <a:ea typeface="Meiryo UI" panose="020B0604030504040204" pitchFamily="50" charset="-128"/>
             </a:endParaRPr>
@@ -4934,21 +4934,21 @@
               <a:buChar char="•"/>
             </a:pPr>
             <a:r>
-              <a:rPr kumimoji="1" lang="zh-CN" altLang="en-US" dirty="0" smtClean="0">
+              <a:rPr kumimoji="1" lang="zh-CN" altLang="en-US" sz="1400" dirty="0" smtClean="0">
                 <a:latin typeface="Meiryo UI" panose="020B0604030504040204" pitchFamily="50" charset="-128"/>
                 <a:ea typeface="Meiryo UI" panose="020B0604030504040204" pitchFamily="50" charset="-128"/>
               </a:rPr>
               <a:t>查了一下</a:t>
             </a:r>
             <a:r>
-              <a:rPr kumimoji="1" lang="ja-JP" altLang="en-US" dirty="0" smtClean="0">
+              <a:rPr kumimoji="1" lang="ja-JP" altLang="en-US" sz="1400" dirty="0" smtClean="0">
                 <a:latin typeface="Meiryo UI" panose="020B0604030504040204" pitchFamily="50" charset="-128"/>
                 <a:ea typeface="Meiryo UI" panose="020B0604030504040204" pitchFamily="50" charset="-128"/>
               </a:rPr>
               <a:t>「</a:t>
             </a:r>
             <a:r>
-              <a:rPr kumimoji="1" lang="ja-JP" altLang="en-US" b="1" dirty="0" smtClean="0">
+              <a:rPr kumimoji="1" lang="ja-JP" altLang="en-US" sz="1400" b="1" dirty="0" smtClean="0">
                 <a:solidFill>
                   <a:srgbClr val="FF0000"/>
                 </a:solidFill>
@@ -4958,27 +4958,27 @@
               <a:t>世界時価総額ランキング</a:t>
             </a:r>
             <a:r>
-              <a:rPr kumimoji="1" lang="ja-JP" altLang="en-US" dirty="0" smtClean="0">
+              <a:rPr kumimoji="1" lang="ja-JP" altLang="en-US" sz="1400" dirty="0" smtClean="0">
                 <a:latin typeface="Meiryo UI" panose="020B0604030504040204" pitchFamily="50" charset="-128"/>
                 <a:ea typeface="Meiryo UI" panose="020B0604030504040204" pitchFamily="50" charset="-128"/>
               </a:rPr>
               <a:t>」</a:t>
             </a:r>
             <a:r>
-              <a:rPr kumimoji="1" lang="en-US" altLang="ja-JP" dirty="0" smtClean="0">
+              <a:rPr kumimoji="1" lang="en-US" altLang="ja-JP" sz="1400" dirty="0" smtClean="0">
                 <a:latin typeface="Meiryo UI" panose="020B0604030504040204" pitchFamily="50" charset="-128"/>
                 <a:ea typeface="Meiryo UI" panose="020B0604030504040204" pitchFamily="50" charset="-128"/>
               </a:rPr>
               <a:t>, </a:t>
             </a:r>
             <a:r>
-              <a:rPr kumimoji="1" lang="zh-CN" altLang="en-US" dirty="0" smtClean="0">
+              <a:rPr kumimoji="1" lang="zh-CN" altLang="en-US" sz="1400" dirty="0" smtClean="0">
                 <a:latin typeface="Meiryo UI" panose="020B0604030504040204" pitchFamily="50" charset="-128"/>
                 <a:ea typeface="Meiryo UI" panose="020B0604030504040204" pitchFamily="50" charset="-128"/>
               </a:rPr>
               <a:t>感觉对股票投资有指导作用</a:t>
             </a:r>
-            <a:endParaRPr kumimoji="1" lang="en-US" altLang="zh-CN" dirty="0" smtClean="0">
+            <a:endParaRPr kumimoji="1" lang="en-US" altLang="zh-CN" sz="1400" dirty="0" smtClean="0">
               <a:latin typeface="Meiryo UI" panose="020B0604030504040204" pitchFamily="50" charset="-128"/>
               <a:ea typeface="Meiryo UI" panose="020B0604030504040204" pitchFamily="50" charset="-128"/>
             </a:endParaRPr>
@@ -4989,28 +4989,28 @@
               <a:buChar char="•"/>
             </a:pPr>
             <a:r>
-              <a:rPr lang="en-US" altLang="zh-CN" dirty="0" smtClean="0">
+              <a:rPr lang="en-US" altLang="zh-CN" sz="1400" dirty="0" smtClean="0">
                 <a:latin typeface="Meiryo UI" panose="020B0604030504040204" pitchFamily="50" charset="-128"/>
                 <a:ea typeface="Meiryo UI" panose="020B0604030504040204" pitchFamily="50" charset="-128"/>
               </a:rPr>
               <a:t>Yahoo Finance</a:t>
             </a:r>
             <a:r>
-              <a:rPr lang="zh-CN" altLang="en-US" dirty="0" smtClean="0">
+              <a:rPr lang="zh-CN" altLang="en-US" sz="1400" dirty="0" smtClean="0">
                 <a:latin typeface="Meiryo UI" panose="020B0604030504040204" pitchFamily="50" charset="-128"/>
                 <a:ea typeface="Meiryo UI" panose="020B0604030504040204" pitchFamily="50" charset="-128"/>
               </a:rPr>
               <a:t>也是很好的参考</a:t>
             </a:r>
             <a:r>
-              <a:rPr lang="en-US" altLang="zh-CN" dirty="0" smtClean="0">
+              <a:rPr lang="en-US" altLang="zh-CN" sz="1400" dirty="0" smtClean="0">
                 <a:latin typeface="Meiryo UI" panose="020B0604030504040204" pitchFamily="50" charset="-128"/>
                 <a:ea typeface="Meiryo UI" panose="020B0604030504040204" pitchFamily="50" charset="-128"/>
               </a:rPr>
               <a:t>(</a:t>
             </a:r>
             <a:r>
-              <a:rPr lang="en-US" altLang="zh-CN" dirty="0" smtClean="0">
+              <a:rPr lang="en-US" altLang="zh-CN" sz="1400" dirty="0" smtClean="0">
                 <a:latin typeface="Meiryo UI" panose="020B0604030504040204" pitchFamily="50" charset="-128"/>
                 <a:ea typeface="Meiryo UI" panose="020B0604030504040204" pitchFamily="50" charset="-128"/>
                 <a:hlinkClick r:id="rId2"/>
@@ -5018,7 +5018,7 @@
               <a:t>https</a:t>
             </a:r>
             <a:r>
-              <a:rPr lang="en-US" altLang="zh-CN" dirty="0">
+              <a:rPr lang="en-US" altLang="zh-CN" sz="1400" dirty="0">
                 <a:latin typeface="Meiryo UI" panose="020B0604030504040204" pitchFamily="50" charset="-128"/>
                 <a:ea typeface="Meiryo UI" panose="020B0604030504040204" pitchFamily="50" charset="-128"/>
                 <a:hlinkClick r:id="rId2"/>
@@ -5026,7 +5026,7 @@
               <a:t>://info.finance.yahoo.co.jp/ranking/?</a:t>
             </a:r>
             <a:r>
-              <a:rPr lang="en-US" altLang="zh-CN" dirty="0" smtClean="0">
+              <a:rPr lang="en-US" altLang="zh-CN" sz="1400" dirty="0" smtClean="0">
                 <a:latin typeface="Meiryo UI" panose="020B0604030504040204" pitchFamily="50" charset="-128"/>
                 <a:ea typeface="Meiryo UI" panose="020B0604030504040204" pitchFamily="50" charset="-128"/>
                 <a:hlinkClick r:id="rId2"/>
@@ -5034,21 +5034,21 @@
               <a:t>kd=4&amp;mk=1&amp;tm=m&amp;vl=a</a:t>
             </a:r>
             <a:r>
-              <a:rPr lang="en-US" altLang="zh-CN" dirty="0" smtClean="0">
+              <a:rPr lang="en-US" altLang="zh-CN" sz="1400" dirty="0" smtClean="0">
                 <a:latin typeface="Meiryo UI" panose="020B0604030504040204" pitchFamily="50" charset="-128"/>
                 <a:ea typeface="Meiryo UI" panose="020B0604030504040204" pitchFamily="50" charset="-128"/>
               </a:rPr>
               <a:t>), </a:t>
             </a:r>
             <a:r>
-              <a:rPr lang="zh-CN" altLang="en-US" dirty="0" smtClean="0">
+              <a:rPr lang="zh-CN" altLang="en-US" sz="1400" dirty="0" smtClean="0">
                 <a:latin typeface="Meiryo UI" panose="020B0604030504040204" pitchFamily="50" charset="-128"/>
                 <a:ea typeface="Meiryo UI" panose="020B0604030504040204" pitchFamily="50" charset="-128"/>
               </a:rPr>
               <a:t>这里提供了各只股票的 </a:t>
             </a:r>
             <a:r>
-              <a:rPr lang="zh-CN" altLang="en-US" b="1" dirty="0" smtClean="0">
+              <a:rPr lang="zh-CN" altLang="en-US" sz="1400" b="1" dirty="0" smtClean="0">
                 <a:solidFill>
                   <a:srgbClr val="FF0000"/>
                 </a:solidFill>
@@ -5058,14 +5058,14 @@
               <a:t>发行量</a:t>
             </a:r>
             <a:r>
-              <a:rPr lang="en-US" altLang="zh-CN" dirty="0" smtClean="0">
+              <a:rPr lang="en-US" altLang="zh-CN" sz="1400" dirty="0" smtClean="0">
                 <a:latin typeface="Meiryo UI" panose="020B0604030504040204" pitchFamily="50" charset="-128"/>
                 <a:ea typeface="Meiryo UI" panose="020B0604030504040204" pitchFamily="50" charset="-128"/>
               </a:rPr>
               <a:t>x</a:t>
             </a:r>
             <a:r>
-              <a:rPr lang="zh-CN" altLang="en-US" b="1" dirty="0" smtClean="0">
+              <a:rPr lang="zh-CN" altLang="en-US" sz="1400" b="1" dirty="0" smtClean="0">
                 <a:solidFill>
                   <a:srgbClr val="FF0000"/>
                 </a:solidFill>
@@ -5075,14 +5075,14 @@
               <a:t>时价</a:t>
             </a:r>
             <a:r>
-              <a:rPr lang="en-US" altLang="zh-CN" dirty="0" smtClean="0">
+              <a:rPr lang="en-US" altLang="zh-CN" sz="1400" dirty="0" smtClean="0">
                 <a:latin typeface="Meiryo UI" panose="020B0604030504040204" pitchFamily="50" charset="-128"/>
                 <a:ea typeface="Meiryo UI" panose="020B0604030504040204" pitchFamily="50" charset="-128"/>
               </a:rPr>
               <a:t>=</a:t>
             </a:r>
             <a:r>
-              <a:rPr lang="ja-JP" altLang="en-US" b="1" dirty="0">
+              <a:rPr lang="ja-JP" altLang="en-US" sz="1400" b="1" dirty="0">
                 <a:solidFill>
                   <a:srgbClr val="FF0000"/>
                 </a:solidFill>
@@ -5091,7 +5091,7 @@
               </a:rPr>
               <a:t>時価総額</a:t>
             </a:r>
-            <a:endParaRPr lang="en-US" altLang="zh-CN" b="1" dirty="0" smtClean="0">
+            <a:endParaRPr lang="en-US" altLang="zh-CN" sz="1400" b="1" dirty="0" smtClean="0">
               <a:solidFill>
                 <a:srgbClr val="FF0000"/>
               </a:solidFill>
@@ -5100,11 +5100,344 @@
             </a:endParaRPr>
           </a:p>
           <a:p>
+            <a:endParaRPr kumimoji="1" lang="en-US" altLang="ja-JP" sz="1400" dirty="0" smtClean="0">
+              <a:latin typeface="Meiryo UI" panose="020B0604030504040204" pitchFamily="50" charset="-128"/>
+              <a:ea typeface="Meiryo UI" panose="020B0604030504040204" pitchFamily="50" charset="-128"/>
+            </a:endParaRPr>
+          </a:p>
+          <a:p>
+            <a:r>
+              <a:rPr lang="en-US" altLang="ja-JP" sz="1400" dirty="0" smtClean="0">
+                <a:latin typeface="Meiryo UI" panose="020B0604030504040204" pitchFamily="50" charset="-128"/>
+                <a:ea typeface="Meiryo UI" panose="020B0604030504040204" pitchFamily="50" charset="-128"/>
+              </a:rPr>
+              <a:t>2018.08.27</a:t>
+            </a:r>
+          </a:p>
+          <a:p>
             <a:pPr marL="285750" indent="-285750">
               <a:buFont typeface="Arial" panose="020B0604020202020204" pitchFamily="34" charset="0"/>
               <a:buChar char="•"/>
             </a:pPr>
-            <a:endParaRPr kumimoji="1" lang="ja-JP" altLang="en-US" dirty="0">
+            <a:r>
+              <a:rPr lang="zh-CN" altLang="en-US" sz="1400" dirty="0">
+                <a:latin typeface="Meiryo UI" panose="020B0604030504040204" pitchFamily="50" charset="-128"/>
+                <a:ea typeface="Meiryo UI" panose="020B0604030504040204" pitchFamily="50" charset="-128"/>
+              </a:rPr>
+              <a:t>拿</a:t>
+            </a:r>
+            <a:r>
+              <a:rPr lang="zh-CN" altLang="en-US" sz="1400" dirty="0" smtClean="0">
+                <a:latin typeface="Meiryo UI" panose="020B0604030504040204" pitchFamily="50" charset="-128"/>
+                <a:ea typeface="Meiryo UI" panose="020B0604030504040204" pitchFamily="50" charset="-128"/>
+              </a:rPr>
+              <a:t>到</a:t>
+            </a:r>
+            <a:r>
+              <a:rPr lang="en-US" altLang="zh-CN" sz="1400" dirty="0" smtClean="0">
+                <a:latin typeface="Meiryo UI" panose="020B0604030504040204" pitchFamily="50" charset="-128"/>
+                <a:ea typeface="Meiryo UI" panose="020B0604030504040204" pitchFamily="50" charset="-128"/>
+              </a:rPr>
+              <a:t>Google Offer</a:t>
+            </a:r>
+            <a:r>
+              <a:rPr lang="zh-CN" altLang="en-US" sz="1400" dirty="0" smtClean="0">
+                <a:latin typeface="Meiryo UI" panose="020B0604030504040204" pitchFamily="50" charset="-128"/>
+                <a:ea typeface="Meiryo UI" panose="020B0604030504040204" pitchFamily="50" charset="-128"/>
+              </a:rPr>
+              <a:t>了，但感觉有点低</a:t>
+            </a:r>
+            <a:r>
+              <a:rPr lang="en-US" altLang="zh-CN" sz="1400" dirty="0" smtClean="0">
+                <a:latin typeface="Meiryo UI" panose="020B0604030504040204" pitchFamily="50" charset="-128"/>
+                <a:ea typeface="Meiryo UI" panose="020B0604030504040204" pitchFamily="50" charset="-128"/>
+              </a:rPr>
+              <a:t>…</a:t>
+            </a:r>
+          </a:p>
+          <a:p>
+            <a:pPr marL="285750" indent="-285750">
+              <a:buFont typeface="Arial" panose="020B0604020202020204" pitchFamily="34" charset="0"/>
+              <a:buChar char="•"/>
+            </a:pPr>
+            <a:r>
+              <a:rPr kumimoji="1" lang="zh-CN" altLang="en-US" sz="1400" dirty="0" smtClean="0">
+                <a:latin typeface="Meiryo UI" panose="020B0604030504040204" pitchFamily="50" charset="-128"/>
+                <a:ea typeface="Meiryo UI" panose="020B0604030504040204" pitchFamily="50" charset="-128"/>
+              </a:rPr>
+              <a:t>或说</a:t>
+            </a:r>
+            <a:r>
+              <a:rPr kumimoji="1" lang="en-US" altLang="zh-CN" sz="1400" dirty="0" smtClean="0">
+                <a:latin typeface="Meiryo UI" panose="020B0604030504040204" pitchFamily="50" charset="-128"/>
+                <a:ea typeface="Meiryo UI" panose="020B0604030504040204" pitchFamily="50" charset="-128"/>
+              </a:rPr>
+              <a:t>Google</a:t>
+            </a:r>
+            <a:r>
+              <a:rPr kumimoji="1" lang="zh-CN" altLang="en-US" sz="1400" dirty="0" smtClean="0">
+                <a:latin typeface="Meiryo UI" panose="020B0604030504040204" pitchFamily="50" charset="-128"/>
+                <a:ea typeface="Meiryo UI" panose="020B0604030504040204" pitchFamily="50" charset="-128"/>
+              </a:rPr>
+              <a:t>的</a:t>
+            </a:r>
+            <a:r>
+              <a:rPr kumimoji="1" lang="en-US" altLang="zh-CN" sz="1400" dirty="0" smtClean="0">
+                <a:latin typeface="Meiryo UI" panose="020B0604030504040204" pitchFamily="50" charset="-128"/>
+                <a:ea typeface="Meiryo UI" panose="020B0604030504040204" pitchFamily="50" charset="-128"/>
+              </a:rPr>
+              <a:t>compensation package</a:t>
+            </a:r>
+            <a:r>
+              <a:rPr kumimoji="1" lang="zh-CN" altLang="en-US" sz="1400" dirty="0" smtClean="0">
+                <a:latin typeface="Meiryo UI" panose="020B0604030504040204" pitchFamily="50" charset="-128"/>
+                <a:ea typeface="Meiryo UI" panose="020B0604030504040204" pitchFamily="50" charset="-128"/>
+              </a:rPr>
+              <a:t>里面有一个叫</a:t>
+            </a:r>
+            <a:r>
+              <a:rPr kumimoji="1" lang="en-US" altLang="zh-CN" sz="1400" b="1" dirty="0" smtClean="0">
+                <a:latin typeface="Meiryo UI" panose="020B0604030504040204" pitchFamily="50" charset="-128"/>
+                <a:ea typeface="Meiryo UI" panose="020B0604030504040204" pitchFamily="50" charset="-128"/>
+              </a:rPr>
+              <a:t>restricted stock unit</a:t>
+            </a:r>
+            <a:r>
+              <a:rPr kumimoji="1" lang="en-US" altLang="zh-CN" sz="1400" dirty="0" smtClean="0">
+                <a:latin typeface="Meiryo UI" panose="020B0604030504040204" pitchFamily="50" charset="-128"/>
+                <a:ea typeface="Meiryo UI" panose="020B0604030504040204" pitchFamily="50" charset="-128"/>
+              </a:rPr>
+              <a:t> (</a:t>
+            </a:r>
+            <a:r>
+              <a:rPr kumimoji="1" lang="en-US" altLang="zh-CN" sz="1400" b="1" dirty="0" smtClean="0">
+                <a:solidFill>
+                  <a:srgbClr val="FF0000"/>
+                </a:solidFill>
+                <a:latin typeface="Meiryo UI" panose="020B0604030504040204" pitchFamily="50" charset="-128"/>
+                <a:ea typeface="Meiryo UI" panose="020B0604030504040204" pitchFamily="50" charset="-128"/>
+              </a:rPr>
+              <a:t>RSU</a:t>
+            </a:r>
+            <a:r>
+              <a:rPr kumimoji="1" lang="en-US" altLang="zh-CN" sz="1400" dirty="0" smtClean="0">
+                <a:latin typeface="Meiryo UI" panose="020B0604030504040204" pitchFamily="50" charset="-128"/>
+                <a:ea typeface="Meiryo UI" panose="020B0604030504040204" pitchFamily="50" charset="-128"/>
+              </a:rPr>
+              <a:t>)</a:t>
+            </a:r>
+            <a:r>
+              <a:rPr kumimoji="1" lang="zh-CN" altLang="en-US" sz="1400" dirty="0" smtClean="0">
+                <a:latin typeface="Meiryo UI" panose="020B0604030504040204" pitchFamily="50" charset="-128"/>
+                <a:ea typeface="Meiryo UI" panose="020B0604030504040204" pitchFamily="50" charset="-128"/>
+              </a:rPr>
+              <a:t>的东西</a:t>
+            </a:r>
+            <a:r>
+              <a:rPr kumimoji="1" lang="en-US" altLang="zh-CN" sz="1400" dirty="0" smtClean="0">
+                <a:latin typeface="Meiryo UI" panose="020B0604030504040204" pitchFamily="50" charset="-128"/>
+                <a:ea typeface="Meiryo UI" panose="020B0604030504040204" pitchFamily="50" charset="-128"/>
+              </a:rPr>
+              <a:t>(</a:t>
+            </a:r>
+            <a:r>
+              <a:rPr kumimoji="1" lang="zh-CN" altLang="en-US" sz="1400" b="1" dirty="0" smtClean="0">
+                <a:latin typeface="Meiryo UI" panose="020B0604030504040204" pitchFamily="50" charset="-128"/>
+                <a:ea typeface="Meiryo UI" panose="020B0604030504040204" pitchFamily="50" charset="-128"/>
+              </a:rPr>
+              <a:t>期间</a:t>
+            </a:r>
+            <a:r>
+              <a:rPr kumimoji="1" lang="en-US" altLang="zh-CN" sz="1400" b="1" dirty="0" smtClean="0">
+                <a:latin typeface="Meiryo UI" panose="020B0604030504040204" pitchFamily="50" charset="-128"/>
+                <a:ea typeface="Meiryo UI" panose="020B0604030504040204" pitchFamily="50" charset="-128"/>
+              </a:rPr>
+              <a:t>12</a:t>
+            </a:r>
+            <a:r>
+              <a:rPr kumimoji="1" lang="zh-CN" altLang="en-US" sz="1400" b="1" dirty="0" smtClean="0">
+                <a:latin typeface="Meiryo UI" panose="020B0604030504040204" pitchFamily="50" charset="-128"/>
+                <a:ea typeface="Meiryo UI" panose="020B0604030504040204" pitchFamily="50" charset="-128"/>
+              </a:rPr>
+              <a:t>个月，</a:t>
+            </a:r>
+            <a:r>
+              <a:rPr kumimoji="1" lang="en-US" altLang="zh-CN" sz="1400" b="1" dirty="0" smtClean="0">
+                <a:latin typeface="Meiryo UI" panose="020B0604030504040204" pitchFamily="50" charset="-128"/>
+                <a:ea typeface="Meiryo UI" panose="020B0604030504040204" pitchFamily="50" charset="-128"/>
+              </a:rPr>
+              <a:t>12 month </a:t>
+            </a:r>
+            <a:r>
+              <a:rPr kumimoji="1" lang="en-US" altLang="zh-CN" sz="1400" b="1" dirty="0" smtClean="0">
+                <a:solidFill>
+                  <a:srgbClr val="FF0000"/>
+                </a:solidFill>
+                <a:latin typeface="Meiryo UI" panose="020B0604030504040204" pitchFamily="50" charset="-128"/>
+                <a:ea typeface="Meiryo UI" panose="020B0604030504040204" pitchFamily="50" charset="-128"/>
+              </a:rPr>
+              <a:t>vesting</a:t>
+            </a:r>
+            <a:r>
+              <a:rPr kumimoji="1" lang="en-US" altLang="zh-CN" sz="1400" dirty="0" smtClean="0">
+                <a:latin typeface="Meiryo UI" panose="020B0604030504040204" pitchFamily="50" charset="-128"/>
+                <a:ea typeface="Meiryo UI" panose="020B0604030504040204" pitchFamily="50" charset="-128"/>
+              </a:rPr>
+              <a:t>)</a:t>
+            </a:r>
+            <a:r>
+              <a:rPr kumimoji="1" lang="zh-CN" altLang="en-US" sz="1400" dirty="0" smtClean="0">
+                <a:latin typeface="Meiryo UI" panose="020B0604030504040204" pitchFamily="50" charset="-128"/>
+                <a:ea typeface="Meiryo UI" panose="020B0604030504040204" pitchFamily="50" charset="-128"/>
+              </a:rPr>
+              <a:t>，</a:t>
+            </a:r>
+            <a:r>
+              <a:rPr lang="zh-CN" altLang="en-US" sz="1400" dirty="0" smtClean="0">
+                <a:latin typeface="Meiryo UI" panose="020B0604030504040204" pitchFamily="50" charset="-128"/>
+                <a:ea typeface="Meiryo UI" panose="020B0604030504040204" pitchFamily="50" charset="-128"/>
+              </a:rPr>
+              <a:t>这个东西查了一下是啥</a:t>
+            </a:r>
+            <a:endParaRPr lang="en-US" altLang="zh-CN" sz="1400" dirty="0" smtClean="0">
+              <a:latin typeface="Meiryo UI" panose="020B0604030504040204" pitchFamily="50" charset="-128"/>
+              <a:ea typeface="Meiryo UI" panose="020B0604030504040204" pitchFamily="50" charset="-128"/>
+            </a:endParaRPr>
+          </a:p>
+          <a:p>
+            <a:pPr marL="285750" indent="-285750">
+              <a:buFont typeface="Arial" panose="020B0604020202020204" pitchFamily="34" charset="0"/>
+              <a:buChar char="•"/>
+            </a:pPr>
+            <a:r>
+              <a:rPr kumimoji="1" lang="zh-CN" altLang="en-US" sz="1400" dirty="0" smtClean="0">
+                <a:latin typeface="Meiryo UI" panose="020B0604030504040204" pitchFamily="50" charset="-128"/>
+                <a:ea typeface="Meiryo UI" panose="020B0604030504040204" pitchFamily="50" charset="-128"/>
+              </a:rPr>
+              <a:t>首先</a:t>
+            </a:r>
+            <a:r>
+              <a:rPr kumimoji="1" lang="en-US" altLang="zh-CN" sz="1400" dirty="0" smtClean="0">
+                <a:latin typeface="Meiryo UI" panose="020B0604030504040204" pitchFamily="50" charset="-128"/>
+                <a:ea typeface="Meiryo UI" panose="020B0604030504040204" pitchFamily="50" charset="-128"/>
+              </a:rPr>
+              <a:t>vesting</a:t>
+            </a:r>
+            <a:r>
+              <a:rPr kumimoji="1" lang="zh-CN" altLang="en-US" sz="1400" dirty="0" smtClean="0">
+                <a:latin typeface="Meiryo UI" panose="020B0604030504040204" pitchFamily="50" charset="-128"/>
+                <a:ea typeface="Meiryo UI" panose="020B0604030504040204" pitchFamily="50" charset="-128"/>
+              </a:rPr>
+              <a:t>的意思：</a:t>
+            </a:r>
+            <a:r>
+              <a:rPr lang="en-US" altLang="ja-JP" sz="1400" dirty="0"/>
+              <a:t>Vesting is a legal term that means to give or earn a right to a present or future payment, asset or benefit</a:t>
+            </a:r>
+            <a:r>
+              <a:rPr lang="en-US" altLang="ja-JP" sz="1400" dirty="0" smtClean="0"/>
+              <a:t>.</a:t>
+            </a:r>
+            <a:endParaRPr lang="en-US" altLang="ja-JP" sz="1400" dirty="0"/>
+          </a:p>
+          <a:p>
+            <a:pPr marL="285750" indent="-285750">
+              <a:buFont typeface="Arial" panose="020B0604020202020204" pitchFamily="34" charset="0"/>
+              <a:buChar char="•"/>
+            </a:pPr>
+            <a:r>
+              <a:rPr kumimoji="1" lang="zh-CN" altLang="en-US" sz="1400" dirty="0">
+                <a:latin typeface="Meiryo UI" panose="020B0604030504040204" pitchFamily="50" charset="-128"/>
+                <a:ea typeface="Meiryo UI" panose="020B0604030504040204" pitchFamily="50" charset="-128"/>
+              </a:rPr>
+              <a:t>然</a:t>
+            </a:r>
+            <a:r>
+              <a:rPr kumimoji="1" lang="zh-CN" altLang="en-US" sz="1400" dirty="0" smtClean="0">
+                <a:latin typeface="Meiryo UI" panose="020B0604030504040204" pitchFamily="50" charset="-128"/>
+                <a:ea typeface="Meiryo UI" panose="020B0604030504040204" pitchFamily="50" charset="-128"/>
+              </a:rPr>
+              <a:t>后</a:t>
+            </a:r>
+            <a:r>
+              <a:rPr kumimoji="1" lang="en-US" altLang="zh-CN" sz="1400" dirty="0" smtClean="0">
+                <a:latin typeface="Meiryo UI" panose="020B0604030504040204" pitchFamily="50" charset="-128"/>
+                <a:ea typeface="Meiryo UI" panose="020B0604030504040204" pitchFamily="50" charset="-128"/>
+              </a:rPr>
+              <a:t>RSU</a:t>
+            </a:r>
+            <a:r>
+              <a:rPr kumimoji="1" lang="zh-CN" altLang="en-US" sz="1400" dirty="0" smtClean="0">
+                <a:latin typeface="Meiryo UI" panose="020B0604030504040204" pitchFamily="50" charset="-128"/>
+                <a:ea typeface="Meiryo UI" panose="020B0604030504040204" pitchFamily="50" charset="-128"/>
+              </a:rPr>
+              <a:t>的：</a:t>
+            </a:r>
+            <a:r>
+              <a:rPr lang="en-US" altLang="ja-JP" sz="1400" dirty="0"/>
+              <a:t>A restricted stock unit (RSU) is a compensation issued by an employer to an employee in the form of company stock. Restricted stock units are issued to an employee through a </a:t>
+            </a:r>
+            <a:r>
+              <a:rPr lang="en-US" altLang="ja-JP" sz="1400" b="1" dirty="0"/>
+              <a:t>vesting</a:t>
+            </a:r>
+            <a:r>
+              <a:rPr lang="en-US" altLang="ja-JP" sz="1400" dirty="0"/>
+              <a:t> plan and distribution schedule after achieving required performance milestones or upon remaining with their employer for a particular length of time</a:t>
+            </a:r>
+            <a:r>
+              <a:rPr lang="en-US" altLang="ja-JP" sz="1400" dirty="0" smtClean="0"/>
+              <a:t>.</a:t>
+            </a:r>
+          </a:p>
+          <a:p>
+            <a:pPr marL="285750" indent="-285750">
+              <a:buFont typeface="Arial" panose="020B0604020202020204" pitchFamily="34" charset="0"/>
+              <a:buChar char="•"/>
+            </a:pPr>
+            <a:r>
+              <a:rPr kumimoji="1" lang="zh-CN" altLang="en-US" sz="1400" dirty="0">
+                <a:latin typeface="Meiryo UI" panose="020B0604030504040204" pitchFamily="50" charset="-128"/>
+                <a:ea typeface="Meiryo UI" panose="020B0604030504040204" pitchFamily="50" charset="-128"/>
+              </a:rPr>
+              <a:t>用</a:t>
+            </a:r>
+            <a:r>
+              <a:rPr kumimoji="1" lang="zh-CN" altLang="en-US" sz="1400" dirty="0" smtClean="0">
+                <a:latin typeface="Meiryo UI" panose="020B0604030504040204" pitchFamily="50" charset="-128"/>
+                <a:ea typeface="Meiryo UI" panose="020B0604030504040204" pitchFamily="50" charset="-128"/>
+              </a:rPr>
+              <a:t>自己的话总结一下就是，公司可以给我股票，但我必须先工作</a:t>
+            </a:r>
+            <a:r>
+              <a:rPr kumimoji="1" lang="en-US" altLang="zh-CN" sz="1400" dirty="0" smtClean="0">
+                <a:latin typeface="Meiryo UI" panose="020B0604030504040204" pitchFamily="50" charset="-128"/>
+                <a:ea typeface="Meiryo UI" panose="020B0604030504040204" pitchFamily="50" charset="-128"/>
+              </a:rPr>
+              <a:t>12</a:t>
+            </a:r>
+            <a:r>
+              <a:rPr kumimoji="1" lang="zh-CN" altLang="en-US" sz="1400" dirty="0" smtClean="0">
+                <a:latin typeface="Meiryo UI" panose="020B0604030504040204" pitchFamily="50" charset="-128"/>
+                <a:ea typeface="Meiryo UI" panose="020B0604030504040204" pitchFamily="50" charset="-128"/>
+              </a:rPr>
+              <a:t>个月才能拿到这</a:t>
+            </a:r>
+            <a:r>
+              <a:rPr kumimoji="1" lang="en-US" altLang="zh-CN" sz="1400" dirty="0" smtClean="0">
+                <a:latin typeface="Meiryo UI" panose="020B0604030504040204" pitchFamily="50" charset="-128"/>
+                <a:ea typeface="Meiryo UI" panose="020B0604030504040204" pitchFamily="50" charset="-128"/>
+              </a:rPr>
+              <a:t>12</a:t>
+            </a:r>
+            <a:r>
+              <a:rPr kumimoji="1" lang="zh-CN" altLang="en-US" sz="1400" dirty="0" smtClean="0">
+                <a:latin typeface="Meiryo UI" panose="020B0604030504040204" pitchFamily="50" charset="-128"/>
+                <a:ea typeface="Meiryo UI" panose="020B0604030504040204" pitchFamily="50" charset="-128"/>
+              </a:rPr>
+              <a:t>个月的股票</a:t>
+            </a:r>
+            <a:endParaRPr kumimoji="1" lang="en-US" altLang="ja-JP" sz="1400" dirty="0" smtClean="0">
               <a:latin typeface="Meiryo UI" panose="020B0604030504040204" pitchFamily="50" charset="-128"/>
               <a:ea typeface="Meiryo UI" panose="020B0604030504040204" pitchFamily="50" charset="-128"/>
             </a:endParaRPr>
@@ -7096,7 +7429,7 @@
           <p:cNvPr id="2" name="TextBox 1">
             <a:extLst>
               <a:ext uri="{FF2B5EF4-FFF2-40B4-BE49-F238E27FC236}">
-                <a16:creationId xmlns="" xmlns:a16="http://schemas.microsoft.com/office/drawing/2014/main" id="{7089F4EE-31CC-4C8C-99D2-9CC3B35FDCAC}"/>
+                <a16:creationId xmlns:a16="http://schemas.microsoft.com/office/drawing/2014/main" xmlns="" id="{7089F4EE-31CC-4C8C-99D2-9CC3B35FDCAC}"/>
               </a:ext>
             </a:extLst>
           </p:cNvPr>
@@ -7254,7 +7587,7 @@
           <p:cNvPr id="3" name="TextBox 2">
             <a:extLst>
               <a:ext uri="{FF2B5EF4-FFF2-40B4-BE49-F238E27FC236}">
-                <a16:creationId xmlns="" xmlns:a16="http://schemas.microsoft.com/office/drawing/2014/main" id="{DB438EAF-213C-40F1-8DF0-CF7CBF419389}"/>
+                <a16:creationId xmlns:a16="http://schemas.microsoft.com/office/drawing/2014/main" xmlns="" id="{DB438EAF-213C-40F1-8DF0-CF7CBF419389}"/>
               </a:ext>
             </a:extLst>
           </p:cNvPr>
@@ -7444,7 +7777,7 @@
           <p:cNvPr id="4" name="TextBox 3">
             <a:extLst>
               <a:ext uri="{FF2B5EF4-FFF2-40B4-BE49-F238E27FC236}">
-                <a16:creationId xmlns="" xmlns:a16="http://schemas.microsoft.com/office/drawing/2014/main" id="{A645619F-2394-4D3E-89BC-966F9EC14737}"/>
+                <a16:creationId xmlns:a16="http://schemas.microsoft.com/office/drawing/2014/main" xmlns="" id="{A645619F-2394-4D3E-89BC-966F9EC14737}"/>
               </a:ext>
             </a:extLst>
           </p:cNvPr>
@@ -8895,7 +9228,7 @@
           <p:cNvPr id="2" name="TextBox 1">
             <a:extLst>
               <a:ext uri="{FF2B5EF4-FFF2-40B4-BE49-F238E27FC236}">
-                <a16:creationId xmlns="" xmlns:a16="http://schemas.microsoft.com/office/drawing/2014/main" id="{4A5C2DDE-5199-4DBB-ACD3-E82644E46320}"/>
+                <a16:creationId xmlns:a16="http://schemas.microsoft.com/office/drawing/2014/main" xmlns="" id="{4A5C2DDE-5199-4DBB-ACD3-E82644E46320}"/>
               </a:ext>
             </a:extLst>
           </p:cNvPr>

</xml_diff>

<commit_message>
add more stock option knowledge
- investor
add difference between stock option, restricted stock unit knowledge
</commit_message>
<xml_diff>
--- a/[BeAInvestor].pptx
+++ b/[BeAInvestor].pptx
@@ -116,7 +116,7 @@
   </p:defaultTextStyle>
   <p:extLst>
     <p:ext uri="{EFAFB233-063F-42B5-8137-9DF3F51BA10A}">
-      <p15:sldGuideLst xmlns:p15="http://schemas.microsoft.com/office/powerpoint/2012/main" xmlns="">
+      <p15:sldGuideLst xmlns="" xmlns:p15="http://schemas.microsoft.com/office/powerpoint/2012/main">
         <p15:guide id="1" orient="horz" pos="2880">
           <p15:clr>
             <a:srgbClr val="A4A3A4"/>
@@ -312,7 +312,7 @@
           <a:p>
             <a:fld id="{E90ED720-0104-4369-84BC-D37694168613}" type="datetimeFigureOut">
               <a:rPr kumimoji="1" lang="ja-JP" altLang="en-US" smtClean="0"/>
-              <a:t>2018/8/27</a:t>
+              <a:t>2018/8/28</a:t>
             </a:fld>
             <a:endParaRPr kumimoji="1" lang="ja-JP" altLang="en-US"/>
           </a:p>
@@ -507,7 +507,7 @@
           <a:p>
             <a:fld id="{E90ED720-0104-4369-84BC-D37694168613}" type="datetimeFigureOut">
               <a:rPr kumimoji="1" lang="ja-JP" altLang="en-US" smtClean="0"/>
-              <a:t>2018/8/27</a:t>
+              <a:t>2018/8/28</a:t>
             </a:fld>
             <a:endParaRPr kumimoji="1" lang="ja-JP" altLang="en-US"/>
           </a:p>
@@ -712,7 +712,7 @@
           <a:p>
             <a:fld id="{E90ED720-0104-4369-84BC-D37694168613}" type="datetimeFigureOut">
               <a:rPr kumimoji="1" lang="ja-JP" altLang="en-US" smtClean="0"/>
-              <a:t>2018/8/27</a:t>
+              <a:t>2018/8/28</a:t>
             </a:fld>
             <a:endParaRPr kumimoji="1" lang="ja-JP" altLang="en-US"/>
           </a:p>
@@ -907,7 +907,7 @@
           <a:p>
             <a:fld id="{E90ED720-0104-4369-84BC-D37694168613}" type="datetimeFigureOut">
               <a:rPr kumimoji="1" lang="ja-JP" altLang="en-US" smtClean="0"/>
-              <a:t>2018/8/27</a:t>
+              <a:t>2018/8/28</a:t>
             </a:fld>
             <a:endParaRPr kumimoji="1" lang="ja-JP" altLang="en-US"/>
           </a:p>
@@ -1147,7 +1147,7 @@
           <a:p>
             <a:fld id="{E90ED720-0104-4369-84BC-D37694168613}" type="datetimeFigureOut">
               <a:rPr kumimoji="1" lang="ja-JP" altLang="en-US" smtClean="0"/>
-              <a:t>2018/8/27</a:t>
+              <a:t>2018/8/28</a:t>
             </a:fld>
             <a:endParaRPr kumimoji="1" lang="ja-JP" altLang="en-US"/>
           </a:p>
@@ -1491,7 +1491,7 @@
           <a:p>
             <a:fld id="{E90ED720-0104-4369-84BC-D37694168613}" type="datetimeFigureOut">
               <a:rPr kumimoji="1" lang="ja-JP" altLang="en-US" smtClean="0"/>
-              <a:t>2018/8/27</a:t>
+              <a:t>2018/8/28</a:t>
             </a:fld>
             <a:endParaRPr kumimoji="1" lang="ja-JP" altLang="en-US"/>
           </a:p>
@@ -1969,7 +1969,7 @@
           <a:p>
             <a:fld id="{E90ED720-0104-4369-84BC-D37694168613}" type="datetimeFigureOut">
               <a:rPr kumimoji="1" lang="ja-JP" altLang="en-US" smtClean="0"/>
-              <a:t>2018/8/27</a:t>
+              <a:t>2018/8/28</a:t>
             </a:fld>
             <a:endParaRPr kumimoji="1" lang="ja-JP" altLang="en-US"/>
           </a:p>
@@ -2081,7 +2081,7 @@
           <a:p>
             <a:fld id="{E90ED720-0104-4369-84BC-D37694168613}" type="datetimeFigureOut">
               <a:rPr kumimoji="1" lang="ja-JP" altLang="en-US" smtClean="0"/>
-              <a:t>2018/8/27</a:t>
+              <a:t>2018/8/28</a:t>
             </a:fld>
             <a:endParaRPr kumimoji="1" lang="ja-JP" altLang="en-US"/>
           </a:p>
@@ -2171,7 +2171,7 @@
           <a:p>
             <a:fld id="{E90ED720-0104-4369-84BC-D37694168613}" type="datetimeFigureOut">
               <a:rPr kumimoji="1" lang="ja-JP" altLang="en-US" smtClean="0"/>
-              <a:t>2018/8/27</a:t>
+              <a:t>2018/8/28</a:t>
             </a:fld>
             <a:endParaRPr kumimoji="1" lang="ja-JP" altLang="en-US"/>
           </a:p>
@@ -2473,7 +2473,7 @@
           <a:p>
             <a:fld id="{E90ED720-0104-4369-84BC-D37694168613}" type="datetimeFigureOut">
               <a:rPr kumimoji="1" lang="ja-JP" altLang="en-US" smtClean="0"/>
-              <a:t>2018/8/27</a:t>
+              <a:t>2018/8/28</a:t>
             </a:fld>
             <a:endParaRPr kumimoji="1" lang="ja-JP" altLang="en-US"/>
           </a:p>
@@ -2720,7 +2720,7 @@
           <a:p>
             <a:fld id="{E90ED720-0104-4369-84BC-D37694168613}" type="datetimeFigureOut">
               <a:rPr kumimoji="1" lang="ja-JP" altLang="en-US" smtClean="0"/>
-              <a:t>2018/8/27</a:t>
+              <a:t>2018/8/28</a:t>
             </a:fld>
             <a:endParaRPr kumimoji="1" lang="ja-JP" altLang="en-US"/>
           </a:p>
@@ -2958,7 +2958,7 @@
           <a:p>
             <a:fld id="{E90ED720-0104-4369-84BC-D37694168613}" type="datetimeFigureOut">
               <a:rPr kumimoji="1" lang="ja-JP" altLang="en-US" smtClean="0"/>
-              <a:t>2018/8/27</a:t>
+              <a:t>2018/8/28</a:t>
             </a:fld>
             <a:endParaRPr kumimoji="1" lang="ja-JP" altLang="en-US"/>
           </a:p>
@@ -5508,6 +5508,644 @@
           </a:extLst>
         </p:spPr>
       </p:pic>
+      <p:sp>
+        <p:nvSpPr>
+          <p:cNvPr id="3" name="テキスト ボックス 2"/>
+          <p:cNvSpPr txBox="1"/>
+          <p:nvPr/>
+        </p:nvSpPr>
+        <p:spPr>
+          <a:xfrm>
+            <a:off x="-4919364" y="1619671"/>
+            <a:ext cx="4919364" cy="5909310"/>
+          </a:xfrm>
+          <a:prstGeom prst="rect">
+            <a:avLst/>
+          </a:prstGeom>
+          <a:noFill/>
+        </p:spPr>
+        <p:txBody>
+          <a:bodyPr wrap="square" rtlCol="0">
+            <a:spAutoFit/>
+          </a:bodyPr>
+          <a:lstStyle/>
+          <a:p>
+            <a:r>
+              <a:rPr kumimoji="1" lang="en-US" altLang="ja-JP" sz="1400" dirty="0" smtClean="0">
+                <a:latin typeface="Meiryo UI" panose="020B0604030504040204" pitchFamily="50" charset="-128"/>
+                <a:ea typeface="Meiryo UI" panose="020B0604030504040204" pitchFamily="50" charset="-128"/>
+              </a:rPr>
+              <a:t>2018.08.28</a:t>
+            </a:r>
+          </a:p>
+          <a:p>
+            <a:pPr marL="285750" indent="-285750">
+              <a:buFont typeface="Arial" panose="020B0604020202020204" pitchFamily="34" charset="0"/>
+              <a:buChar char="•"/>
+            </a:pPr>
+            <a:r>
+              <a:rPr lang="zh-CN" altLang="en-US" sz="1400" dirty="0">
+                <a:latin typeface="Meiryo UI" panose="020B0604030504040204" pitchFamily="50" charset="-128"/>
+                <a:ea typeface="Meiryo UI" panose="020B0604030504040204" pitchFamily="50" charset="-128"/>
+              </a:rPr>
+              <a:t>查</a:t>
+            </a:r>
+            <a:r>
+              <a:rPr lang="zh-CN" altLang="en-US" sz="1400" dirty="0" smtClean="0">
+                <a:latin typeface="Meiryo UI" panose="020B0604030504040204" pitchFamily="50" charset="-128"/>
+                <a:ea typeface="Meiryo UI" panose="020B0604030504040204" pitchFamily="50" charset="-128"/>
+              </a:rPr>
+              <a:t>了更多的</a:t>
+            </a:r>
+            <a:r>
+              <a:rPr lang="en-US" altLang="zh-CN" sz="1400" dirty="0" smtClean="0">
+                <a:latin typeface="Meiryo UI" panose="020B0604030504040204" pitchFamily="50" charset="-128"/>
+                <a:ea typeface="Meiryo UI" panose="020B0604030504040204" pitchFamily="50" charset="-128"/>
+              </a:rPr>
+              <a:t>compensation</a:t>
+            </a:r>
+            <a:r>
+              <a:rPr lang="zh-CN" altLang="en-US" sz="1400" dirty="0" smtClean="0">
+                <a:latin typeface="Meiryo UI" panose="020B0604030504040204" pitchFamily="50" charset="-128"/>
+                <a:ea typeface="Meiryo UI" panose="020B0604030504040204" pitchFamily="50" charset="-128"/>
+              </a:rPr>
+              <a:t>中</a:t>
+            </a:r>
+            <a:r>
+              <a:rPr lang="en-US" altLang="zh-CN" sz="1400" dirty="0" smtClean="0">
+                <a:latin typeface="Meiryo UI" panose="020B0604030504040204" pitchFamily="50" charset="-128"/>
+                <a:ea typeface="Meiryo UI" panose="020B0604030504040204" pitchFamily="50" charset="-128"/>
+              </a:rPr>
+              <a:t>stock</a:t>
+            </a:r>
+            <a:r>
+              <a:rPr lang="zh-CN" altLang="en-US" sz="1400" dirty="0" smtClean="0">
+                <a:latin typeface="Meiryo UI" panose="020B0604030504040204" pitchFamily="50" charset="-128"/>
+                <a:ea typeface="Meiryo UI" panose="020B0604030504040204" pitchFamily="50" charset="-128"/>
+              </a:rPr>
+              <a:t>的种类</a:t>
+            </a:r>
+            <a:endParaRPr lang="en-US" altLang="zh-CN" sz="1400" dirty="0" smtClean="0">
+              <a:latin typeface="Meiryo UI" panose="020B0604030504040204" pitchFamily="50" charset="-128"/>
+              <a:ea typeface="Meiryo UI" panose="020B0604030504040204" pitchFamily="50" charset="-128"/>
+            </a:endParaRPr>
+          </a:p>
+          <a:p>
+            <a:pPr marL="285750" indent="-285750">
+              <a:buFont typeface="Arial" panose="020B0604020202020204" pitchFamily="34" charset="0"/>
+              <a:buChar char="•"/>
+            </a:pPr>
+            <a:r>
+              <a:rPr kumimoji="1" lang="en-US" altLang="ja-JP" sz="1400" b="1" dirty="0" smtClean="0">
+                <a:solidFill>
+                  <a:srgbClr val="FF0000"/>
+                </a:solidFill>
+                <a:latin typeface="Meiryo UI" panose="020B0604030504040204" pitchFamily="50" charset="-128"/>
+                <a:ea typeface="Meiryo UI" panose="020B0604030504040204" pitchFamily="50" charset="-128"/>
+              </a:rPr>
+              <a:t>Stoc</a:t>
+            </a:r>
+            <a:r>
+              <a:rPr lang="en-US" altLang="ja-JP" sz="1400" b="1" dirty="0" smtClean="0">
+                <a:solidFill>
+                  <a:srgbClr val="FF0000"/>
+                </a:solidFill>
+                <a:latin typeface="Meiryo UI" panose="020B0604030504040204" pitchFamily="50" charset="-128"/>
+                <a:ea typeface="Meiryo UI" panose="020B0604030504040204" pitchFamily="50" charset="-128"/>
+              </a:rPr>
+              <a:t>k option</a:t>
+            </a:r>
+            <a:r>
+              <a:rPr lang="en-US" altLang="ja-JP" sz="1400" dirty="0" smtClean="0">
+                <a:latin typeface="Meiryo UI" panose="020B0604030504040204" pitchFamily="50" charset="-128"/>
+                <a:ea typeface="Meiryo UI" panose="020B0604030504040204" pitchFamily="50" charset="-128"/>
+              </a:rPr>
+              <a:t>: </a:t>
+            </a:r>
+          </a:p>
+          <a:p>
+            <a:pPr marL="742950" lvl="1" indent="-285750">
+              <a:buFont typeface="Arial" panose="020B0604020202020204" pitchFamily="34" charset="0"/>
+              <a:buChar char="•"/>
+            </a:pPr>
+            <a:r>
+              <a:rPr lang="en-US" altLang="ja-JP" sz="1400" dirty="0" smtClean="0">
+                <a:latin typeface="Meiryo UI" panose="020B0604030504040204" pitchFamily="50" charset="-128"/>
+                <a:ea typeface="Meiryo UI" panose="020B0604030504040204" pitchFamily="50" charset="-128"/>
+              </a:rPr>
+              <a:t>The right to buy a company’s stock at some future date </a:t>
+            </a:r>
+            <a:r>
+              <a:rPr lang="en-US" altLang="ja-JP" sz="1400" b="1" dirty="0" smtClean="0">
+                <a:latin typeface="Meiryo UI" panose="020B0604030504040204" pitchFamily="50" charset="-128"/>
+                <a:ea typeface="Meiryo UI" panose="020B0604030504040204" pitchFamily="50" charset="-128"/>
+              </a:rPr>
+              <a:t>at a price established now</a:t>
+            </a:r>
+            <a:r>
+              <a:rPr lang="en-US" altLang="ja-JP" sz="1400" dirty="0" smtClean="0">
+                <a:latin typeface="Meiryo UI" panose="020B0604030504040204" pitchFamily="50" charset="-128"/>
+                <a:ea typeface="Meiryo UI" panose="020B0604030504040204" pitchFamily="50" charset="-128"/>
+              </a:rPr>
+              <a:t>. </a:t>
+            </a:r>
+          </a:p>
+          <a:p>
+            <a:pPr marL="742950" lvl="1" indent="-285750">
+              <a:buFont typeface="Arial" panose="020B0604020202020204" pitchFamily="34" charset="0"/>
+              <a:buChar char="•"/>
+            </a:pPr>
+            <a:r>
+              <a:rPr lang="en-US" altLang="ja-JP" sz="1400" b="1" dirty="0" smtClean="0">
+                <a:latin typeface="Meiryo UI" panose="020B0604030504040204" pitchFamily="50" charset="-128"/>
+                <a:ea typeface="Meiryo UI" panose="020B0604030504040204" pitchFamily="50" charset="-128"/>
+              </a:rPr>
+              <a:t>High-growth company</a:t>
+            </a:r>
+            <a:r>
+              <a:rPr lang="zh-CN" altLang="en-US" sz="1400" b="1" dirty="0" smtClean="0">
+                <a:latin typeface="Meiryo UI" panose="020B0604030504040204" pitchFamily="50" charset="-128"/>
+                <a:ea typeface="Meiryo UI" panose="020B0604030504040204" pitchFamily="50" charset="-128"/>
+              </a:rPr>
+              <a:t>的话，会很划算</a:t>
+            </a:r>
+            <a:r>
+              <a:rPr lang="zh-CN" altLang="en-US" sz="1400" dirty="0" smtClean="0">
+                <a:latin typeface="Meiryo UI" panose="020B0604030504040204" pitchFamily="50" charset="-128"/>
+                <a:ea typeface="Meiryo UI" panose="020B0604030504040204" pitchFamily="50" charset="-128"/>
+              </a:rPr>
+              <a:t>，比如在未来公司股票</a:t>
+            </a:r>
+            <a:r>
+              <a:rPr lang="en-US" altLang="zh-CN" sz="1400" dirty="0" smtClean="0">
+                <a:latin typeface="Meiryo UI" panose="020B0604030504040204" pitchFamily="50" charset="-128"/>
+                <a:ea typeface="Meiryo UI" panose="020B0604030504040204" pitchFamily="50" charset="-128"/>
+              </a:rPr>
+              <a:t>100</a:t>
+            </a:r>
+            <a:r>
+              <a:rPr lang="zh-CN" altLang="en-US" sz="1400" dirty="0" smtClean="0">
+                <a:latin typeface="Meiryo UI" panose="020B0604030504040204" pitchFamily="50" charset="-128"/>
+                <a:ea typeface="Meiryo UI" panose="020B0604030504040204" pitchFamily="50" charset="-128"/>
+              </a:rPr>
+              <a:t>元的时候，以现在的价钱</a:t>
+            </a:r>
+            <a:r>
+              <a:rPr lang="en-US" altLang="zh-CN" sz="1400" dirty="0" smtClean="0">
+                <a:latin typeface="Meiryo UI" panose="020B0604030504040204" pitchFamily="50" charset="-128"/>
+                <a:ea typeface="Meiryo UI" panose="020B0604030504040204" pitchFamily="50" charset="-128"/>
+              </a:rPr>
+              <a:t>10</a:t>
+            </a:r>
+            <a:r>
+              <a:rPr lang="zh-CN" altLang="en-US" sz="1400" dirty="0" smtClean="0">
+                <a:latin typeface="Meiryo UI" panose="020B0604030504040204" pitchFamily="50" charset="-128"/>
+                <a:ea typeface="Meiryo UI" panose="020B0604030504040204" pitchFamily="50" charset="-128"/>
+              </a:rPr>
+              <a:t>元购买</a:t>
+            </a:r>
+            <a:endParaRPr lang="en-US" altLang="zh-CN" sz="1400" dirty="0" smtClean="0">
+              <a:latin typeface="Meiryo UI" panose="020B0604030504040204" pitchFamily="50" charset="-128"/>
+              <a:ea typeface="Meiryo UI" panose="020B0604030504040204" pitchFamily="50" charset="-128"/>
+            </a:endParaRPr>
+          </a:p>
+          <a:p>
+            <a:pPr marL="285750" indent="-285750">
+              <a:buFont typeface="Arial" panose="020B0604020202020204" pitchFamily="34" charset="0"/>
+              <a:buChar char="•"/>
+            </a:pPr>
+            <a:r>
+              <a:rPr kumimoji="1" lang="en-US" altLang="zh-CN" sz="1400" b="1" dirty="0" smtClean="0">
+                <a:solidFill>
+                  <a:srgbClr val="FF0000"/>
+                </a:solidFill>
+                <a:latin typeface="Meiryo UI" panose="020B0604030504040204" pitchFamily="50" charset="-128"/>
+                <a:ea typeface="Meiryo UI" panose="020B0604030504040204" pitchFamily="50" charset="-128"/>
+              </a:rPr>
+              <a:t>Restricted stock</a:t>
+            </a:r>
+            <a:r>
+              <a:rPr kumimoji="1" lang="en-US" altLang="zh-CN" sz="1400" dirty="0" smtClean="0">
+                <a:latin typeface="Meiryo UI" panose="020B0604030504040204" pitchFamily="50" charset="-128"/>
+                <a:ea typeface="Meiryo UI" panose="020B0604030504040204" pitchFamily="50" charset="-128"/>
+              </a:rPr>
+              <a:t>:</a:t>
+            </a:r>
+          </a:p>
+          <a:p>
+            <a:pPr marL="742950" lvl="1" indent="-285750">
+              <a:buFont typeface="Arial" panose="020B0604020202020204" pitchFamily="34" charset="0"/>
+              <a:buChar char="•"/>
+            </a:pPr>
+            <a:r>
+              <a:rPr lang="en-US" altLang="ja-JP" sz="1400" dirty="0" smtClean="0">
+                <a:latin typeface="Meiryo UI" panose="020B0604030504040204" pitchFamily="50" charset="-128"/>
+                <a:ea typeface="Meiryo UI" panose="020B0604030504040204" pitchFamily="50" charset="-128"/>
+              </a:rPr>
+              <a:t>Stock for which payment is usually not required. Simply common stock that vests. Can not sell until vest.</a:t>
+            </a:r>
+          </a:p>
+          <a:p>
+            <a:pPr marL="742950" lvl="1" indent="-285750">
+              <a:buFont typeface="Arial" panose="020B0604020202020204" pitchFamily="34" charset="0"/>
+              <a:buChar char="•"/>
+            </a:pPr>
+            <a:r>
+              <a:rPr kumimoji="1" lang="zh-CN" altLang="en-US" sz="1400" dirty="0" smtClean="0">
+                <a:latin typeface="Meiryo UI" panose="020B0604030504040204" pitchFamily="50" charset="-128"/>
+                <a:ea typeface="Meiryo UI" panose="020B0604030504040204" pitchFamily="50" charset="-128"/>
+              </a:rPr>
+              <a:t>比如</a:t>
+            </a:r>
+            <a:r>
+              <a:rPr lang="zh-CN" altLang="en-US" sz="1400" dirty="0">
+                <a:latin typeface="Meiryo UI" panose="020B0604030504040204" pitchFamily="50" charset="-128"/>
+                <a:ea typeface="Meiryo UI" panose="020B0604030504040204" pitchFamily="50" charset="-128"/>
+              </a:rPr>
+              <a:t>，</a:t>
+            </a:r>
+            <a:r>
+              <a:rPr kumimoji="1" lang="zh-CN" altLang="en-US" sz="1400" dirty="0" smtClean="0">
+                <a:latin typeface="Meiryo UI" panose="020B0604030504040204" pitchFamily="50" charset="-128"/>
+                <a:ea typeface="Meiryo UI" panose="020B0604030504040204" pitchFamily="50" charset="-128"/>
+              </a:rPr>
+              <a:t>就是公司同意在</a:t>
+            </a:r>
+            <a:r>
+              <a:rPr kumimoji="1" lang="en-US" altLang="zh-CN" sz="1400" dirty="0" smtClean="0">
+                <a:latin typeface="Meiryo UI" panose="020B0604030504040204" pitchFamily="50" charset="-128"/>
+                <a:ea typeface="Meiryo UI" panose="020B0604030504040204" pitchFamily="50" charset="-128"/>
+              </a:rPr>
+              <a:t>1</a:t>
+            </a:r>
+            <a:r>
+              <a:rPr kumimoji="1" lang="zh-CN" altLang="en-US" sz="1400" dirty="0" smtClean="0">
+                <a:latin typeface="Meiryo UI" panose="020B0604030504040204" pitchFamily="50" charset="-128"/>
+                <a:ea typeface="Meiryo UI" panose="020B0604030504040204" pitchFamily="50" charset="-128"/>
+              </a:rPr>
+              <a:t>年后给我</a:t>
+            </a:r>
+            <a:r>
+              <a:rPr kumimoji="1" lang="en-US" altLang="zh-CN" sz="1400" dirty="0" smtClean="0">
+                <a:latin typeface="Meiryo UI" panose="020B0604030504040204" pitchFamily="50" charset="-128"/>
+                <a:ea typeface="Meiryo UI" panose="020B0604030504040204" pitchFamily="50" charset="-128"/>
+              </a:rPr>
+              <a:t>100</a:t>
+            </a:r>
+            <a:r>
+              <a:rPr kumimoji="1" lang="zh-CN" altLang="en-US" sz="1400" dirty="0" smtClean="0">
+                <a:latin typeface="Meiryo UI" panose="020B0604030504040204" pitchFamily="50" charset="-128"/>
+                <a:ea typeface="Meiryo UI" panose="020B0604030504040204" pitchFamily="50" charset="-128"/>
+              </a:rPr>
+              <a:t>股，我必须干满</a:t>
+            </a:r>
+            <a:r>
+              <a:rPr kumimoji="1" lang="en-US" altLang="zh-CN" sz="1400" dirty="0" smtClean="0">
+                <a:latin typeface="Meiryo UI" panose="020B0604030504040204" pitchFamily="50" charset="-128"/>
+                <a:ea typeface="Meiryo UI" panose="020B0604030504040204" pitchFamily="50" charset="-128"/>
+              </a:rPr>
+              <a:t>1</a:t>
+            </a:r>
+            <a:r>
+              <a:rPr kumimoji="1" lang="zh-CN" altLang="en-US" sz="1400" dirty="0" smtClean="0">
+                <a:latin typeface="Meiryo UI" panose="020B0604030504040204" pitchFamily="50" charset="-128"/>
+                <a:ea typeface="Meiryo UI" panose="020B0604030504040204" pitchFamily="50" charset="-128"/>
+              </a:rPr>
+              <a:t>年才能拿到这</a:t>
+            </a:r>
+            <a:r>
+              <a:rPr kumimoji="1" lang="en-US" altLang="zh-CN" sz="1400" dirty="0" smtClean="0">
+                <a:latin typeface="Meiryo UI" panose="020B0604030504040204" pitchFamily="50" charset="-128"/>
+                <a:ea typeface="Meiryo UI" panose="020B0604030504040204" pitchFamily="50" charset="-128"/>
+              </a:rPr>
+              <a:t>100</a:t>
+            </a:r>
+            <a:r>
+              <a:rPr kumimoji="1" lang="zh-CN" altLang="en-US" sz="1400" dirty="0" smtClean="0">
+                <a:latin typeface="Meiryo UI" panose="020B0604030504040204" pitchFamily="50" charset="-128"/>
+                <a:ea typeface="Meiryo UI" panose="020B0604030504040204" pitchFamily="50" charset="-128"/>
+              </a:rPr>
+              <a:t>股</a:t>
+            </a:r>
+            <a:r>
+              <a:rPr kumimoji="1" lang="en-US" altLang="zh-CN" sz="1400" dirty="0" smtClean="0">
+                <a:latin typeface="Meiryo UI" panose="020B0604030504040204" pitchFamily="50" charset="-128"/>
+                <a:ea typeface="Meiryo UI" panose="020B0604030504040204" pitchFamily="50" charset="-128"/>
+              </a:rPr>
+              <a:t>(vest)</a:t>
+            </a:r>
+            <a:r>
+              <a:rPr kumimoji="1" lang="zh-CN" altLang="en-US" sz="1400" dirty="0" smtClean="0">
+                <a:latin typeface="Meiryo UI" panose="020B0604030504040204" pitchFamily="50" charset="-128"/>
+                <a:ea typeface="Meiryo UI" panose="020B0604030504040204" pitchFamily="50" charset="-128"/>
+              </a:rPr>
+              <a:t>，然后我可以决定卖掉或是继续持有</a:t>
+            </a:r>
+            <a:endParaRPr kumimoji="1" lang="en-US" altLang="zh-CN" sz="1400" dirty="0" smtClean="0">
+              <a:latin typeface="Meiryo UI" panose="020B0604030504040204" pitchFamily="50" charset="-128"/>
+              <a:ea typeface="Meiryo UI" panose="020B0604030504040204" pitchFamily="50" charset="-128"/>
+            </a:endParaRPr>
+          </a:p>
+          <a:p>
+            <a:pPr marL="285750" indent="-285750">
+              <a:buFont typeface="Arial" panose="020B0604020202020204" pitchFamily="34" charset="0"/>
+              <a:buChar char="•"/>
+            </a:pPr>
+            <a:r>
+              <a:rPr kumimoji="1" lang="en-US" altLang="zh-CN" sz="1400" b="1" dirty="0" smtClean="0">
+                <a:solidFill>
+                  <a:srgbClr val="FF0000"/>
+                </a:solidFill>
+                <a:latin typeface="Meiryo UI" panose="020B0604030504040204" pitchFamily="50" charset="-128"/>
+                <a:ea typeface="Meiryo UI" panose="020B0604030504040204" pitchFamily="50" charset="-128"/>
+              </a:rPr>
+              <a:t>Restricted stock unit</a:t>
+            </a:r>
+            <a:r>
+              <a:rPr lang="en-US" altLang="zh-CN" sz="1400" dirty="0" smtClean="0">
+                <a:latin typeface="Meiryo UI" panose="020B0604030504040204" pitchFamily="50" charset="-128"/>
+                <a:ea typeface="Meiryo UI" panose="020B0604030504040204" pitchFamily="50" charset="-128"/>
+              </a:rPr>
+              <a:t>:</a:t>
+            </a:r>
+          </a:p>
+          <a:p>
+            <a:pPr marL="742950" lvl="1" indent="-285750">
+              <a:buFont typeface="Arial" panose="020B0604020202020204" pitchFamily="34" charset="0"/>
+              <a:buChar char="•"/>
+            </a:pPr>
+            <a:r>
+              <a:rPr kumimoji="1" lang="en-US" altLang="ja-JP" sz="1400" dirty="0" smtClean="0">
+                <a:latin typeface="Meiryo UI" panose="020B0604030504040204" pitchFamily="50" charset="-128"/>
+                <a:ea typeface="Meiryo UI" panose="020B0604030504040204" pitchFamily="50" charset="-128"/>
+              </a:rPr>
+              <a:t>RSU can occur in stock or equivalent cash value of the company’s stock. (</a:t>
+            </a:r>
+            <a:r>
+              <a:rPr kumimoji="1" lang="en-US" altLang="zh-CN" sz="1400" dirty="0" smtClean="0">
+                <a:latin typeface="Meiryo UI" panose="020B0604030504040204" pitchFamily="50" charset="-128"/>
+                <a:ea typeface="Meiryo UI" panose="020B0604030504040204" pitchFamily="50" charset="-128"/>
+              </a:rPr>
+              <a:t>Google</a:t>
+            </a:r>
+            <a:r>
+              <a:rPr kumimoji="1" lang="zh-CN" altLang="en-US" sz="1400" dirty="0" smtClean="0">
+                <a:latin typeface="Meiryo UI" panose="020B0604030504040204" pitchFamily="50" charset="-128"/>
+                <a:ea typeface="Meiryo UI" panose="020B0604030504040204" pitchFamily="50" charset="-128"/>
+              </a:rPr>
+              <a:t> </a:t>
+            </a:r>
+            <a:r>
+              <a:rPr kumimoji="1" lang="en-US" altLang="zh-CN" sz="1400" dirty="0" smtClean="0">
+                <a:latin typeface="Meiryo UI" panose="020B0604030504040204" pitchFamily="50" charset="-128"/>
+                <a:ea typeface="Meiryo UI" panose="020B0604030504040204" pitchFamily="50" charset="-128"/>
+              </a:rPr>
+              <a:t>offer</a:t>
+            </a:r>
+            <a:r>
+              <a:rPr kumimoji="1" lang="zh-CN" altLang="en-US" sz="1400" dirty="0" smtClean="0">
+                <a:latin typeface="Meiryo UI" panose="020B0604030504040204" pitchFamily="50" charset="-128"/>
+                <a:ea typeface="Meiryo UI" panose="020B0604030504040204" pitchFamily="50" charset="-128"/>
+              </a:rPr>
+              <a:t>的是</a:t>
+            </a:r>
+            <a:r>
+              <a:rPr kumimoji="1" lang="en-US" altLang="zh-CN" sz="1400" dirty="0" smtClean="0">
+                <a:latin typeface="Meiryo UI" panose="020B0604030504040204" pitchFamily="50" charset="-128"/>
+                <a:ea typeface="Meiryo UI" panose="020B0604030504040204" pitchFamily="50" charset="-128"/>
+              </a:rPr>
+              <a:t>cash</a:t>
+            </a:r>
+            <a:r>
+              <a:rPr kumimoji="1" lang="zh-CN" altLang="en-US" sz="1400" dirty="0" smtClean="0">
+                <a:latin typeface="Meiryo UI" panose="020B0604030504040204" pitchFamily="50" charset="-128"/>
+                <a:ea typeface="Meiryo UI" panose="020B0604030504040204" pitchFamily="50" charset="-128"/>
+              </a:rPr>
+              <a:t>，这种情况下</a:t>
+            </a:r>
+            <a:r>
+              <a:rPr kumimoji="1" lang="en-US" altLang="zh-CN" sz="1400" dirty="0" smtClean="0">
+                <a:latin typeface="Meiryo UI" panose="020B0604030504040204" pitchFamily="50" charset="-128"/>
+                <a:ea typeface="Meiryo UI" panose="020B0604030504040204" pitchFamily="50" charset="-128"/>
+              </a:rPr>
+              <a:t>Google</a:t>
+            </a:r>
+            <a:r>
+              <a:rPr kumimoji="1" lang="zh-CN" altLang="en-US" sz="1400" dirty="0" smtClean="0">
+                <a:latin typeface="Meiryo UI" panose="020B0604030504040204" pitchFamily="50" charset="-128"/>
+                <a:ea typeface="Meiryo UI" panose="020B0604030504040204" pitchFamily="50" charset="-128"/>
+              </a:rPr>
+              <a:t>股价变化和我能拿到的钱没有关系</a:t>
+            </a:r>
+            <a:r>
+              <a:rPr kumimoji="1" lang="en-US" altLang="ja-JP" sz="1400" dirty="0" smtClean="0">
+                <a:latin typeface="Meiryo UI" panose="020B0604030504040204" pitchFamily="50" charset="-128"/>
+                <a:ea typeface="Meiryo UI" panose="020B0604030504040204" pitchFamily="50" charset="-128"/>
+              </a:rPr>
+              <a:t>)</a:t>
+            </a:r>
+          </a:p>
+          <a:p>
+            <a:pPr marL="742950" lvl="1" indent="-285750">
+              <a:buFont typeface="Arial" panose="020B0604020202020204" pitchFamily="34" charset="0"/>
+              <a:buChar char="•"/>
+            </a:pPr>
+            <a:r>
+              <a:rPr lang="zh-CN" altLang="en-US" sz="1400" dirty="0" smtClean="0">
+                <a:latin typeface="Meiryo UI" panose="020B0604030504040204" pitchFamily="50" charset="-128"/>
+                <a:ea typeface="Meiryo UI" panose="020B0604030504040204" pitchFamily="50" charset="-128"/>
+              </a:rPr>
+              <a:t>我拿到的是</a:t>
+            </a:r>
+            <a:r>
+              <a:rPr lang="en-US" altLang="zh-CN" sz="1400" dirty="0" smtClean="0">
+                <a:latin typeface="Meiryo UI" panose="020B0604030504040204" pitchFamily="50" charset="-128"/>
+                <a:ea typeface="Meiryo UI" panose="020B0604030504040204" pitchFamily="50" charset="-128"/>
+              </a:rPr>
+              <a:t>Google</a:t>
+            </a:r>
+            <a:r>
+              <a:rPr lang="zh-CN" altLang="en-US" sz="1400" dirty="0" smtClean="0">
+                <a:latin typeface="Meiryo UI" panose="020B0604030504040204" pitchFamily="50" charset="-128"/>
+                <a:ea typeface="Meiryo UI" panose="020B0604030504040204" pitchFamily="50" charset="-128"/>
+              </a:rPr>
+              <a:t>同意在</a:t>
+            </a:r>
+            <a:r>
+              <a:rPr lang="en-US" altLang="zh-CN" sz="1400" dirty="0" smtClean="0">
+                <a:latin typeface="Meiryo UI" panose="020B0604030504040204" pitchFamily="50" charset="-128"/>
+                <a:ea typeface="Meiryo UI" panose="020B0604030504040204" pitchFamily="50" charset="-128"/>
+              </a:rPr>
+              <a:t>4</a:t>
+            </a:r>
+            <a:r>
+              <a:rPr lang="zh-CN" altLang="en-US" sz="1400" dirty="0" smtClean="0">
+                <a:latin typeface="Meiryo UI" panose="020B0604030504040204" pitchFamily="50" charset="-128"/>
+                <a:ea typeface="Meiryo UI" panose="020B0604030504040204" pitchFamily="50" charset="-128"/>
+              </a:rPr>
+              <a:t>年内，给我等同月</a:t>
+            </a:r>
+            <a:r>
+              <a:rPr lang="en-US" altLang="zh-CN" sz="1400" dirty="0" smtClean="0">
+                <a:latin typeface="Meiryo UI" panose="020B0604030504040204" pitchFamily="50" charset="-128"/>
+                <a:ea typeface="Meiryo UI" panose="020B0604030504040204" pitchFamily="50" charset="-128"/>
+              </a:rPr>
+              <a:t>4</a:t>
+            </a:r>
+            <a:r>
+              <a:rPr lang="zh-CN" altLang="en-US" sz="1400" dirty="0" smtClean="0">
+                <a:latin typeface="Meiryo UI" panose="020B0604030504040204" pitchFamily="50" charset="-128"/>
+                <a:ea typeface="Meiryo UI" panose="020B0604030504040204" pitchFamily="50" charset="-128"/>
+              </a:rPr>
+              <a:t>万多美元的</a:t>
+            </a:r>
+            <a:r>
+              <a:rPr lang="en-US" altLang="zh-CN" sz="1400" dirty="0" smtClean="0">
+                <a:latin typeface="Meiryo UI" panose="020B0604030504040204" pitchFamily="50" charset="-128"/>
+                <a:ea typeface="Meiryo UI" panose="020B0604030504040204" pitchFamily="50" charset="-128"/>
+              </a:rPr>
+              <a:t>RSU</a:t>
+            </a:r>
+            <a:r>
+              <a:rPr lang="zh-CN" altLang="en-US" sz="1400" dirty="0" smtClean="0">
+                <a:latin typeface="Meiryo UI" panose="020B0604030504040204" pitchFamily="50" charset="-128"/>
+                <a:ea typeface="Meiryo UI" panose="020B0604030504040204" pitchFamily="50" charset="-128"/>
+              </a:rPr>
+              <a:t>，每年可以</a:t>
+            </a:r>
+            <a:r>
+              <a:rPr lang="en-US" altLang="zh-CN" sz="1400" dirty="0" smtClean="0">
+                <a:latin typeface="Meiryo UI" panose="020B0604030504040204" pitchFamily="50" charset="-128"/>
+                <a:ea typeface="Meiryo UI" panose="020B0604030504040204" pitchFamily="50" charset="-128"/>
+              </a:rPr>
+              <a:t>vest 1</a:t>
+            </a:r>
+            <a:r>
+              <a:rPr lang="zh-CN" altLang="en-US" sz="1400" dirty="0" smtClean="0">
+                <a:latin typeface="Meiryo UI" panose="020B0604030504040204" pitchFamily="50" charset="-128"/>
+                <a:ea typeface="Meiryo UI" panose="020B0604030504040204" pitchFamily="50" charset="-128"/>
+              </a:rPr>
+              <a:t>万多美元，在</a:t>
+            </a:r>
+            <a:r>
+              <a:rPr lang="en-US" altLang="zh-CN" sz="1400" dirty="0" smtClean="0">
+                <a:latin typeface="Meiryo UI" panose="020B0604030504040204" pitchFamily="50" charset="-128"/>
+                <a:ea typeface="Meiryo UI" panose="020B0604030504040204" pitchFamily="50" charset="-128"/>
+              </a:rPr>
+              <a:t>vest</a:t>
+            </a:r>
+            <a:r>
+              <a:rPr lang="zh-CN" altLang="en-US" sz="1400" dirty="0" smtClean="0">
+                <a:latin typeface="Meiryo UI" panose="020B0604030504040204" pitchFamily="50" charset="-128"/>
+                <a:ea typeface="Meiryo UI" panose="020B0604030504040204" pitchFamily="50" charset="-128"/>
+              </a:rPr>
+              <a:t>之前，和</a:t>
+            </a:r>
+            <a:r>
+              <a:rPr lang="en-US" altLang="zh-CN" sz="1400" dirty="0" smtClean="0">
+                <a:latin typeface="Meiryo UI" panose="020B0604030504040204" pitchFamily="50" charset="-128"/>
+                <a:ea typeface="Meiryo UI" panose="020B0604030504040204" pitchFamily="50" charset="-128"/>
+              </a:rPr>
+              <a:t>Google</a:t>
+            </a:r>
+            <a:r>
+              <a:rPr lang="zh-CN" altLang="en-US" sz="1400" dirty="0" smtClean="0">
+                <a:latin typeface="Meiryo UI" panose="020B0604030504040204" pitchFamily="50" charset="-128"/>
+                <a:ea typeface="Meiryo UI" panose="020B0604030504040204" pitchFamily="50" charset="-128"/>
+              </a:rPr>
+              <a:t>股价无关，在</a:t>
+            </a:r>
+            <a:r>
+              <a:rPr lang="en-US" altLang="zh-CN" sz="1400" dirty="0" smtClean="0">
+                <a:latin typeface="Meiryo UI" panose="020B0604030504040204" pitchFamily="50" charset="-128"/>
+                <a:ea typeface="Meiryo UI" panose="020B0604030504040204" pitchFamily="50" charset="-128"/>
+              </a:rPr>
+              <a:t>vest</a:t>
+            </a:r>
+            <a:r>
+              <a:rPr lang="zh-CN" altLang="en-US" sz="1400" dirty="0" smtClean="0">
+                <a:latin typeface="Meiryo UI" panose="020B0604030504040204" pitchFamily="50" charset="-128"/>
+                <a:ea typeface="Meiryo UI" panose="020B0604030504040204" pitchFamily="50" charset="-128"/>
+              </a:rPr>
+              <a:t>的时候，我可以决定是卖掉或者是继续持有</a:t>
+            </a:r>
+            <a:r>
+              <a:rPr lang="en-US" altLang="zh-CN" sz="1400" dirty="0" smtClean="0">
+                <a:latin typeface="Meiryo UI" panose="020B0604030504040204" pitchFamily="50" charset="-128"/>
+                <a:ea typeface="Meiryo UI" panose="020B0604030504040204" pitchFamily="50" charset="-128"/>
+              </a:rPr>
+              <a:t>(</a:t>
+            </a:r>
+            <a:r>
+              <a:rPr lang="zh-CN" altLang="en-US" sz="1400" dirty="0" smtClean="0">
+                <a:latin typeface="Meiryo UI" panose="020B0604030504040204" pitchFamily="50" charset="-128"/>
+                <a:ea typeface="Meiryo UI" panose="020B0604030504040204" pitchFamily="50" charset="-128"/>
+              </a:rPr>
+              <a:t>就是把这</a:t>
+            </a:r>
+            <a:r>
+              <a:rPr lang="en-US" altLang="zh-CN" sz="1400" dirty="0" smtClean="0">
+                <a:latin typeface="Meiryo UI" panose="020B0604030504040204" pitchFamily="50" charset="-128"/>
+                <a:ea typeface="Meiryo UI" panose="020B0604030504040204" pitchFamily="50" charset="-128"/>
+              </a:rPr>
+              <a:t>1</a:t>
+            </a:r>
+            <a:r>
+              <a:rPr lang="zh-CN" altLang="en-US" sz="1400" smtClean="0">
+                <a:latin typeface="Meiryo UI" panose="020B0604030504040204" pitchFamily="50" charset="-128"/>
+                <a:ea typeface="Meiryo UI" panose="020B0604030504040204" pitchFamily="50" charset="-128"/>
+              </a:rPr>
+              <a:t>万多美元按当时的价钱换算成股票</a:t>
+            </a:r>
+            <a:r>
+              <a:rPr lang="en-US" altLang="zh-CN" sz="1400" smtClean="0">
+                <a:latin typeface="Meiryo UI" panose="020B0604030504040204" pitchFamily="50" charset="-128"/>
+                <a:ea typeface="Meiryo UI" panose="020B0604030504040204" pitchFamily="50" charset="-128"/>
+              </a:rPr>
+              <a:t>)</a:t>
+            </a:r>
+            <a:r>
+              <a:rPr lang="zh-CN" altLang="en-US" sz="1400" dirty="0" smtClean="0">
+                <a:latin typeface="Meiryo UI" panose="020B0604030504040204" pitchFamily="50" charset="-128"/>
+                <a:ea typeface="Meiryo UI" panose="020B0604030504040204" pitchFamily="50" charset="-128"/>
+              </a:rPr>
+              <a:t>。卖掉的情况下我一定能拿到这</a:t>
+            </a:r>
+            <a:r>
+              <a:rPr lang="en-US" altLang="zh-CN" sz="1400" dirty="0" smtClean="0">
+                <a:latin typeface="Meiryo UI" panose="020B0604030504040204" pitchFamily="50" charset="-128"/>
+                <a:ea typeface="Meiryo UI" panose="020B0604030504040204" pitchFamily="50" charset="-128"/>
+              </a:rPr>
+              <a:t>1</a:t>
+            </a:r>
+            <a:r>
+              <a:rPr lang="zh-CN" altLang="en-US" sz="1400" dirty="0" smtClean="0">
+                <a:latin typeface="Meiryo UI" panose="020B0604030504040204" pitchFamily="50" charset="-128"/>
+                <a:ea typeface="Meiryo UI" panose="020B0604030504040204" pitchFamily="50" charset="-128"/>
+              </a:rPr>
+              <a:t>万多美元；在持有的情况下，</a:t>
+            </a:r>
+            <a:r>
+              <a:rPr lang="en-US" altLang="zh-CN" sz="1400" dirty="0" smtClean="0">
+                <a:latin typeface="Meiryo UI" panose="020B0604030504040204" pitchFamily="50" charset="-128"/>
+                <a:ea typeface="Meiryo UI" panose="020B0604030504040204" pitchFamily="50" charset="-128"/>
+              </a:rPr>
+              <a:t>Google</a:t>
+            </a:r>
+            <a:r>
+              <a:rPr lang="zh-CN" altLang="en-US" sz="1400" dirty="0" smtClean="0">
+                <a:latin typeface="Meiryo UI" panose="020B0604030504040204" pitchFamily="50" charset="-128"/>
+                <a:ea typeface="Meiryo UI" panose="020B0604030504040204" pitchFamily="50" charset="-128"/>
+              </a:rPr>
+              <a:t>的股价就开始影响我了</a:t>
+            </a:r>
+            <a:endParaRPr kumimoji="1" lang="ja-JP" altLang="en-US" sz="1400" dirty="0">
+              <a:latin typeface="Meiryo UI" panose="020B0604030504040204" pitchFamily="50" charset="-128"/>
+              <a:ea typeface="Meiryo UI" panose="020B0604030504040204" pitchFamily="50" charset="-128"/>
+            </a:endParaRPr>
+          </a:p>
+        </p:txBody>
+      </p:sp>
     </p:spTree>
     <p:extLst>
       <p:ext uri="{BB962C8B-B14F-4D97-AF65-F5344CB8AC3E}">
@@ -7429,7 +8067,7 @@
           <p:cNvPr id="2" name="TextBox 1">
             <a:extLst>
               <a:ext uri="{FF2B5EF4-FFF2-40B4-BE49-F238E27FC236}">
-                <a16:creationId xmlns:a16="http://schemas.microsoft.com/office/drawing/2014/main" xmlns="" id="{7089F4EE-31CC-4C8C-99D2-9CC3B35FDCAC}"/>
+                <a16:creationId xmlns="" xmlns:a16="http://schemas.microsoft.com/office/drawing/2014/main" id="{7089F4EE-31CC-4C8C-99D2-9CC3B35FDCAC}"/>
               </a:ext>
             </a:extLst>
           </p:cNvPr>
@@ -7587,7 +8225,7 @@
           <p:cNvPr id="3" name="TextBox 2">
             <a:extLst>
               <a:ext uri="{FF2B5EF4-FFF2-40B4-BE49-F238E27FC236}">
-                <a16:creationId xmlns:a16="http://schemas.microsoft.com/office/drawing/2014/main" xmlns="" id="{DB438EAF-213C-40F1-8DF0-CF7CBF419389}"/>
+                <a16:creationId xmlns="" xmlns:a16="http://schemas.microsoft.com/office/drawing/2014/main" id="{DB438EAF-213C-40F1-8DF0-CF7CBF419389}"/>
               </a:ext>
             </a:extLst>
           </p:cNvPr>
@@ -7777,7 +8415,7 @@
           <p:cNvPr id="4" name="TextBox 3">
             <a:extLst>
               <a:ext uri="{FF2B5EF4-FFF2-40B4-BE49-F238E27FC236}">
-                <a16:creationId xmlns:a16="http://schemas.microsoft.com/office/drawing/2014/main" xmlns="" id="{A645619F-2394-4D3E-89BC-966F9EC14737}"/>
+                <a16:creationId xmlns="" xmlns:a16="http://schemas.microsoft.com/office/drawing/2014/main" id="{A645619F-2394-4D3E-89BC-966F9EC14737}"/>
               </a:ext>
             </a:extLst>
           </p:cNvPr>
@@ -9228,7 +9866,7 @@
           <p:cNvPr id="2" name="TextBox 1">
             <a:extLst>
               <a:ext uri="{FF2B5EF4-FFF2-40B4-BE49-F238E27FC236}">
-                <a16:creationId xmlns:a16="http://schemas.microsoft.com/office/drawing/2014/main" xmlns="" id="{4A5C2DDE-5199-4DBB-ACD3-E82644E46320}"/>
+                <a16:creationId xmlns="" xmlns:a16="http://schemas.microsoft.com/office/drawing/2014/main" id="{4A5C2DDE-5199-4DBB-ACD3-E82644E46320}"/>
               </a:ext>
             </a:extLst>
           </p:cNvPr>

</xml_diff>

<commit_message>
add Geek, Investor, tax calculation knowledge
- Geek
add MVC design pattern knowledge
- Investor
majority shareholder, outstanding share, preferred stock, share classes
- Maths
how to calculate salary & tax in Japan (Not finished!!)
</commit_message>
<xml_diff>
--- a/[BeAInvestor].pptx
+++ b/[BeAInvestor].pptx
@@ -116,7 +116,7 @@
   </p:defaultTextStyle>
   <p:extLst>
     <p:ext uri="{EFAFB233-063F-42B5-8137-9DF3F51BA10A}">
-      <p15:sldGuideLst xmlns="" xmlns:p15="http://schemas.microsoft.com/office/powerpoint/2012/main">
+      <p15:sldGuideLst xmlns:p15="http://schemas.microsoft.com/office/powerpoint/2012/main" xmlns="">
         <p15:guide id="1" orient="horz" pos="2880">
           <p15:clr>
             <a:srgbClr val="A4A3A4"/>
@@ -312,7 +312,7 @@
           <a:p>
             <a:fld id="{E90ED720-0104-4369-84BC-D37694168613}" type="datetimeFigureOut">
               <a:rPr kumimoji="1" lang="ja-JP" altLang="en-US" smtClean="0"/>
-              <a:t>2018/8/28</a:t>
+              <a:t>2018/8/31</a:t>
             </a:fld>
             <a:endParaRPr kumimoji="1" lang="ja-JP" altLang="en-US"/>
           </a:p>
@@ -507,7 +507,7 @@
           <a:p>
             <a:fld id="{E90ED720-0104-4369-84BC-D37694168613}" type="datetimeFigureOut">
               <a:rPr kumimoji="1" lang="ja-JP" altLang="en-US" smtClean="0"/>
-              <a:t>2018/8/28</a:t>
+              <a:t>2018/8/31</a:t>
             </a:fld>
             <a:endParaRPr kumimoji="1" lang="ja-JP" altLang="en-US"/>
           </a:p>
@@ -712,7 +712,7 @@
           <a:p>
             <a:fld id="{E90ED720-0104-4369-84BC-D37694168613}" type="datetimeFigureOut">
               <a:rPr kumimoji="1" lang="ja-JP" altLang="en-US" smtClean="0"/>
-              <a:t>2018/8/28</a:t>
+              <a:t>2018/8/31</a:t>
             </a:fld>
             <a:endParaRPr kumimoji="1" lang="ja-JP" altLang="en-US"/>
           </a:p>
@@ -907,7 +907,7 @@
           <a:p>
             <a:fld id="{E90ED720-0104-4369-84BC-D37694168613}" type="datetimeFigureOut">
               <a:rPr kumimoji="1" lang="ja-JP" altLang="en-US" smtClean="0"/>
-              <a:t>2018/8/28</a:t>
+              <a:t>2018/8/31</a:t>
             </a:fld>
             <a:endParaRPr kumimoji="1" lang="ja-JP" altLang="en-US"/>
           </a:p>
@@ -1147,7 +1147,7 @@
           <a:p>
             <a:fld id="{E90ED720-0104-4369-84BC-D37694168613}" type="datetimeFigureOut">
               <a:rPr kumimoji="1" lang="ja-JP" altLang="en-US" smtClean="0"/>
-              <a:t>2018/8/28</a:t>
+              <a:t>2018/8/31</a:t>
             </a:fld>
             <a:endParaRPr kumimoji="1" lang="ja-JP" altLang="en-US"/>
           </a:p>
@@ -1491,7 +1491,7 @@
           <a:p>
             <a:fld id="{E90ED720-0104-4369-84BC-D37694168613}" type="datetimeFigureOut">
               <a:rPr kumimoji="1" lang="ja-JP" altLang="en-US" smtClean="0"/>
-              <a:t>2018/8/28</a:t>
+              <a:t>2018/8/31</a:t>
             </a:fld>
             <a:endParaRPr kumimoji="1" lang="ja-JP" altLang="en-US"/>
           </a:p>
@@ -1969,7 +1969,7 @@
           <a:p>
             <a:fld id="{E90ED720-0104-4369-84BC-D37694168613}" type="datetimeFigureOut">
               <a:rPr kumimoji="1" lang="ja-JP" altLang="en-US" smtClean="0"/>
-              <a:t>2018/8/28</a:t>
+              <a:t>2018/8/31</a:t>
             </a:fld>
             <a:endParaRPr kumimoji="1" lang="ja-JP" altLang="en-US"/>
           </a:p>
@@ -2081,7 +2081,7 @@
           <a:p>
             <a:fld id="{E90ED720-0104-4369-84BC-D37694168613}" type="datetimeFigureOut">
               <a:rPr kumimoji="1" lang="ja-JP" altLang="en-US" smtClean="0"/>
-              <a:t>2018/8/28</a:t>
+              <a:t>2018/8/31</a:t>
             </a:fld>
             <a:endParaRPr kumimoji="1" lang="ja-JP" altLang="en-US"/>
           </a:p>
@@ -2171,7 +2171,7 @@
           <a:p>
             <a:fld id="{E90ED720-0104-4369-84BC-D37694168613}" type="datetimeFigureOut">
               <a:rPr kumimoji="1" lang="ja-JP" altLang="en-US" smtClean="0"/>
-              <a:t>2018/8/28</a:t>
+              <a:t>2018/8/31</a:t>
             </a:fld>
             <a:endParaRPr kumimoji="1" lang="ja-JP" altLang="en-US"/>
           </a:p>
@@ -2473,7 +2473,7 @@
           <a:p>
             <a:fld id="{E90ED720-0104-4369-84BC-D37694168613}" type="datetimeFigureOut">
               <a:rPr kumimoji="1" lang="ja-JP" altLang="en-US" smtClean="0"/>
-              <a:t>2018/8/28</a:t>
+              <a:t>2018/8/31</a:t>
             </a:fld>
             <a:endParaRPr kumimoji="1" lang="ja-JP" altLang="en-US"/>
           </a:p>
@@ -2720,7 +2720,7 @@
           <a:p>
             <a:fld id="{E90ED720-0104-4369-84BC-D37694168613}" type="datetimeFigureOut">
               <a:rPr kumimoji="1" lang="ja-JP" altLang="en-US" smtClean="0"/>
-              <a:t>2018/8/28</a:t>
+              <a:t>2018/8/31</a:t>
             </a:fld>
             <a:endParaRPr kumimoji="1" lang="ja-JP" altLang="en-US"/>
           </a:p>
@@ -2958,7 +2958,7 @@
           <a:p>
             <a:fld id="{E90ED720-0104-4369-84BC-D37694168613}" type="datetimeFigureOut">
               <a:rPr kumimoji="1" lang="ja-JP" altLang="en-US" smtClean="0"/>
-              <a:t>2018/8/28</a:t>
+              <a:t>2018/8/31</a:t>
             </a:fld>
             <a:endParaRPr kumimoji="1" lang="ja-JP" altLang="en-US"/>
           </a:p>
@@ -8067,7 +8067,7 @@
           <p:cNvPr id="2" name="TextBox 1">
             <a:extLst>
               <a:ext uri="{FF2B5EF4-FFF2-40B4-BE49-F238E27FC236}">
-                <a16:creationId xmlns="" xmlns:a16="http://schemas.microsoft.com/office/drawing/2014/main" id="{7089F4EE-31CC-4C8C-99D2-9CC3B35FDCAC}"/>
+                <a16:creationId xmlns:a16="http://schemas.microsoft.com/office/drawing/2014/main" xmlns="" id="{7089F4EE-31CC-4C8C-99D2-9CC3B35FDCAC}"/>
               </a:ext>
             </a:extLst>
           </p:cNvPr>
@@ -8225,7 +8225,7 @@
           <p:cNvPr id="3" name="TextBox 2">
             <a:extLst>
               <a:ext uri="{FF2B5EF4-FFF2-40B4-BE49-F238E27FC236}">
-                <a16:creationId xmlns="" xmlns:a16="http://schemas.microsoft.com/office/drawing/2014/main" id="{DB438EAF-213C-40F1-8DF0-CF7CBF419389}"/>
+                <a16:creationId xmlns:a16="http://schemas.microsoft.com/office/drawing/2014/main" xmlns="" id="{DB438EAF-213C-40F1-8DF0-CF7CBF419389}"/>
               </a:ext>
             </a:extLst>
           </p:cNvPr>
@@ -8415,7 +8415,7 @@
           <p:cNvPr id="4" name="TextBox 3">
             <a:extLst>
               <a:ext uri="{FF2B5EF4-FFF2-40B4-BE49-F238E27FC236}">
-                <a16:creationId xmlns="" xmlns:a16="http://schemas.microsoft.com/office/drawing/2014/main" id="{A645619F-2394-4D3E-89BC-966F9EC14737}"/>
+                <a16:creationId xmlns:a16="http://schemas.microsoft.com/office/drawing/2014/main" xmlns="" id="{A645619F-2394-4D3E-89BC-966F9EC14737}"/>
               </a:ext>
             </a:extLst>
           </p:cNvPr>
@@ -9866,7 +9866,7 @@
           <p:cNvPr id="2" name="TextBox 1">
             <a:extLst>
               <a:ext uri="{FF2B5EF4-FFF2-40B4-BE49-F238E27FC236}">
-                <a16:creationId xmlns="" xmlns:a16="http://schemas.microsoft.com/office/drawing/2014/main" id="{4A5C2DDE-5199-4DBB-ACD3-E82644E46320}"/>
+                <a16:creationId xmlns:a16="http://schemas.microsoft.com/office/drawing/2014/main" xmlns="" id="{4A5C2DDE-5199-4DBB-ACD3-E82644E46320}"/>
               </a:ext>
             </a:extLst>
           </p:cNvPr>
@@ -10439,7 +10439,7 @@
         <p:spPr>
           <a:xfrm>
             <a:off x="0" y="0"/>
-            <a:ext cx="5715000" cy="5909310"/>
+            <a:ext cx="5715000" cy="3754874"/>
           </a:xfrm>
           <a:prstGeom prst="rect">
             <a:avLst/>
@@ -10453,33 +10453,33 @@
           <a:lstStyle/>
           <a:p>
             <a:r>
-              <a:rPr lang="en-US" altLang="ja-JP" dirty="0"/>
+              <a:rPr lang="en-US" altLang="ja-JP" sz="1400" dirty="0"/>
               <a:t>Funds</a:t>
             </a:r>
             <a:r>
-              <a:rPr lang="zh-CN" altLang="en-US" dirty="0"/>
+              <a:rPr lang="zh-CN" altLang="en-US" sz="1400" dirty="0"/>
               <a:t>分类</a:t>
             </a:r>
             <a:r>
-              <a:rPr lang="en-US" altLang="zh-CN" dirty="0"/>
+              <a:rPr lang="en-US" altLang="zh-CN" sz="1400" dirty="0"/>
               <a:t>:</a:t>
             </a:r>
           </a:p>
           <a:p>
             <a:r>
-              <a:rPr lang="zh-CN" altLang="en-US" dirty="0"/>
+              <a:rPr lang="zh-CN" altLang="en-US" sz="1400" dirty="0"/>
               <a:t>一般分为两类，</a:t>
             </a:r>
             <a:r>
-              <a:rPr lang="en-US" altLang="zh-CN" dirty="0"/>
+              <a:rPr lang="en-US" altLang="zh-CN" sz="1400" dirty="0"/>
               <a:t>Hedge Fund</a:t>
             </a:r>
             <a:r>
-              <a:rPr lang="zh-CN" altLang="en-US" dirty="0"/>
+              <a:rPr lang="zh-CN" altLang="en-US" sz="1400" dirty="0"/>
               <a:t>和</a:t>
             </a:r>
             <a:r>
-              <a:rPr lang="en-US" altLang="zh-CN" dirty="0"/>
+              <a:rPr lang="en-US" altLang="zh-CN" sz="1400" dirty="0"/>
               <a:t>Mutual fund</a:t>
             </a:r>
           </a:p>
@@ -10489,7 +10489,7 @@
               <a:buChar char="•"/>
             </a:pPr>
             <a:r>
-              <a:rPr kumimoji="1" lang="en-US" altLang="ja-JP" b="1" dirty="0">
+              <a:rPr kumimoji="1" lang="en-US" altLang="ja-JP" sz="1400" b="1" dirty="0">
                 <a:solidFill>
                   <a:srgbClr val="FF0000"/>
                 </a:solidFill>
@@ -10497,26 +10497,26 @@
               <a:t>Hedge fund</a:t>
             </a:r>
             <a:r>
-              <a:rPr kumimoji="1" lang="en-US" altLang="ja-JP" dirty="0"/>
+              <a:rPr kumimoji="1" lang="en-US" altLang="ja-JP" sz="1400" dirty="0"/>
               <a:t>: </a:t>
             </a:r>
             <a:r>
-              <a:rPr kumimoji="1" lang="zh-CN" altLang="en-US" dirty="0"/>
+              <a:rPr kumimoji="1" lang="zh-CN" altLang="en-US" sz="1400" dirty="0"/>
               <a:t>汉语名应该叫私募，</a:t>
             </a:r>
             <a:r>
-              <a:rPr kumimoji="1" lang="ja-JP" altLang="en-US"/>
+              <a:rPr kumimoji="1" lang="ja-JP" altLang="en-US" sz="1400" dirty="0"/>
               <a:t>也叫</a:t>
             </a:r>
             <a:r>
-              <a:rPr kumimoji="1" lang="ja-JP" altLang="en-US" b="1">
+              <a:rPr kumimoji="1" lang="ja-JP" altLang="en-US" sz="1400" b="1" dirty="0">
                 <a:solidFill>
                   <a:srgbClr val="FF0000"/>
                 </a:solidFill>
               </a:rPr>
               <a:t>对冲基金</a:t>
             </a:r>
-            <a:endParaRPr kumimoji="1" lang="en-US" altLang="zh-CN" b="1" dirty="0">
+            <a:endParaRPr kumimoji="1" lang="en-US" altLang="zh-CN" sz="1400" b="1" dirty="0">
               <a:solidFill>
                 <a:srgbClr val="FF0000"/>
               </a:solidFill>
@@ -10528,18 +10528,18 @@
               <a:buChar char="•"/>
             </a:pPr>
             <a:r>
-              <a:rPr lang="zh-CN" altLang="en-US" dirty="0"/>
+              <a:rPr lang="zh-CN" altLang="en-US" sz="1400" dirty="0"/>
               <a:t>就美国而言，没有被</a:t>
             </a:r>
             <a:r>
-              <a:rPr lang="en-US" altLang="zh-CN" dirty="0"/>
+              <a:rPr lang="en-US" altLang="zh-CN" sz="1400" dirty="0"/>
               <a:t>SEC</a:t>
             </a:r>
             <a:r>
-              <a:rPr lang="zh-CN" altLang="en-US" dirty="0"/>
+              <a:rPr lang="zh-CN" altLang="en-US" sz="1400" dirty="0"/>
               <a:t>管理</a:t>
             </a:r>
-            <a:endParaRPr lang="en-US" altLang="zh-CN" dirty="0"/>
+            <a:endParaRPr lang="en-US" altLang="zh-CN" sz="1400" dirty="0"/>
           </a:p>
           <a:p>
             <a:pPr marL="742950" lvl="1" indent="-285750">
@@ -10547,47 +10547,47 @@
               <a:buChar char="•"/>
             </a:pPr>
             <a:r>
-              <a:rPr lang="zh-CN" altLang="en-US" dirty="0"/>
+              <a:rPr lang="zh-CN" altLang="en-US" sz="1400" dirty="0"/>
               <a:t>用的</a:t>
             </a:r>
             <a:r>
-              <a:rPr lang="en-US" altLang="zh-CN" dirty="0"/>
+              <a:rPr lang="en-US" altLang="zh-CN" sz="1400" dirty="0"/>
               <a:t>technique</a:t>
             </a:r>
             <a:r>
-              <a:rPr lang="zh-CN" altLang="en-US" dirty="0"/>
+              <a:rPr lang="zh-CN" altLang="en-US" sz="1400" dirty="0"/>
               <a:t>和</a:t>
             </a:r>
             <a:r>
-              <a:rPr lang="en-US" altLang="zh-CN" dirty="0"/>
+              <a:rPr lang="en-US" altLang="zh-CN" sz="1400" dirty="0"/>
               <a:t>mutual fund</a:t>
             </a:r>
             <a:r>
-              <a:rPr lang="zh-CN" altLang="en-US" dirty="0"/>
+              <a:rPr lang="zh-CN" altLang="en-US" sz="1400" dirty="0"/>
               <a:t>不同，经常</a:t>
             </a:r>
             <a:r>
-              <a:rPr lang="zh-CN" altLang="en-US" b="1" dirty="0"/>
+              <a:rPr lang="zh-CN" altLang="en-US" sz="1400" b="1" dirty="0"/>
               <a:t>借钱买卖股票</a:t>
             </a:r>
             <a:r>
-              <a:rPr lang="zh-CN" altLang="en-US" dirty="0"/>
+              <a:rPr lang="zh-CN" altLang="en-US" sz="1400" dirty="0"/>
               <a:t>，以使收益最大化 </a:t>
             </a:r>
             <a:r>
-              <a:rPr lang="en-US" altLang="zh-CN" dirty="0"/>
+              <a:rPr lang="en-US" altLang="zh-CN" sz="1400" dirty="0"/>
               <a:t>(</a:t>
             </a:r>
             <a:r>
-              <a:rPr lang="zh-CN" altLang="en-US" dirty="0"/>
+              <a:rPr lang="zh-CN" altLang="en-US" sz="1400" dirty="0"/>
               <a:t>这技巧叫</a:t>
             </a:r>
             <a:r>
-              <a:rPr lang="en-US" altLang="zh-CN" b="1" dirty="0"/>
+              <a:rPr lang="en-US" altLang="zh-CN" sz="1400" b="1" dirty="0"/>
               <a:t>leverage</a:t>
             </a:r>
             <a:r>
-              <a:rPr lang="en-US" altLang="zh-CN" dirty="0"/>
+              <a:rPr lang="en-US" altLang="zh-CN" sz="1400" dirty="0"/>
               <a:t>)</a:t>
             </a:r>
           </a:p>
@@ -10597,11 +10597,11 @@
               <a:buChar char="•"/>
             </a:pPr>
             <a:r>
-              <a:rPr lang="zh-CN" altLang="en-US" dirty="0"/>
+              <a:rPr lang="zh-CN" altLang="en-US" sz="1400" dirty="0"/>
               <a:t>经常投资 </a:t>
             </a:r>
             <a:r>
-              <a:rPr lang="en-US" altLang="zh-CN" dirty="0"/>
+              <a:rPr lang="en-US" altLang="zh-CN" sz="1400" dirty="0"/>
               <a:t>derivatives</a:t>
             </a:r>
           </a:p>
@@ -10611,27 +10611,27 @@
               <a:buChar char="•"/>
             </a:pPr>
             <a:r>
-              <a:rPr lang="zh-CN" altLang="en-US" dirty="0"/>
+              <a:rPr lang="zh-CN" altLang="en-US" sz="1400" dirty="0"/>
               <a:t>一般是“死期投资”，不能随时出入</a:t>
             </a:r>
             <a:r>
-              <a:rPr lang="en-US" altLang="zh-CN" dirty="0"/>
+              <a:rPr lang="en-US" altLang="zh-CN" sz="1400" dirty="0"/>
               <a:t>fund (</a:t>
             </a:r>
             <a:r>
-              <a:rPr lang="zh-CN" altLang="en-US" dirty="0"/>
+              <a:rPr lang="zh-CN" altLang="en-US" sz="1400" dirty="0"/>
               <a:t>比如说一投就是</a:t>
             </a:r>
             <a:r>
-              <a:rPr lang="en-US" altLang="zh-CN" dirty="0"/>
+              <a:rPr lang="en-US" altLang="zh-CN" sz="1400" dirty="0"/>
               <a:t>5</a:t>
             </a:r>
             <a:r>
-              <a:rPr lang="zh-CN" altLang="en-US" dirty="0"/>
+              <a:rPr lang="zh-CN" altLang="en-US" sz="1400" dirty="0"/>
               <a:t>年</a:t>
             </a:r>
             <a:r>
-              <a:rPr lang="en-US" altLang="zh-CN" dirty="0"/>
+              <a:rPr lang="en-US" altLang="zh-CN" sz="1400" dirty="0"/>
               <a:t>)</a:t>
             </a:r>
           </a:p>
@@ -10641,22 +10641,22 @@
               <a:buChar char="•"/>
             </a:pPr>
             <a:r>
-              <a:rPr lang="zh-CN" altLang="en-US" dirty="0"/>
+              <a:rPr lang="zh-CN" altLang="en-US" sz="1400" dirty="0"/>
               <a:t>能入</a:t>
             </a:r>
             <a:r>
-              <a:rPr lang="en-US" altLang="zh-CN" dirty="0"/>
+              <a:rPr lang="en-US" altLang="zh-CN" sz="1400" dirty="0"/>
               <a:t>hedge fund</a:t>
             </a:r>
             <a:r>
-              <a:rPr lang="zh-CN" altLang="en-US" dirty="0"/>
+              <a:rPr lang="zh-CN" altLang="en-US" sz="1400" dirty="0"/>
               <a:t>的一般是很有钱的人或者</a:t>
             </a:r>
             <a:r>
-              <a:rPr lang="en-US" altLang="zh-CN" dirty="0"/>
+              <a:rPr lang="en-US" altLang="zh-CN" sz="1400" dirty="0"/>
               <a:t>institutes</a:t>
             </a:r>
-            <a:endParaRPr kumimoji="1" lang="en-US" altLang="ja-JP" dirty="0"/>
+            <a:endParaRPr kumimoji="1" lang="en-US" altLang="ja-JP" sz="1400" dirty="0"/>
           </a:p>
           <a:p>
             <a:pPr marL="285750" indent="-285750">
@@ -10664,7 +10664,7 @@
               <a:buChar char="•"/>
             </a:pPr>
             <a:r>
-              <a:rPr kumimoji="1" lang="en-US" altLang="zh-CN" b="1" dirty="0">
+              <a:rPr kumimoji="1" lang="en-US" altLang="zh-CN" sz="1400" b="1" dirty="0">
                 <a:solidFill>
                   <a:srgbClr val="FF0000"/>
                 </a:solidFill>
@@ -10672,15 +10672,15 @@
               <a:t>Mutual fund</a:t>
             </a:r>
             <a:r>
-              <a:rPr kumimoji="1" lang="en-US" altLang="zh-CN" dirty="0"/>
+              <a:rPr kumimoji="1" lang="en-US" altLang="zh-CN" sz="1400" dirty="0"/>
               <a:t>: </a:t>
             </a:r>
             <a:r>
-              <a:rPr kumimoji="1" lang="zh-CN" altLang="en-US" dirty="0"/>
+              <a:rPr kumimoji="1" lang="zh-CN" altLang="en-US" sz="1400" dirty="0"/>
               <a:t>就是一般基金，根据策略可细分为</a:t>
             </a:r>
             <a:r>
-              <a:rPr kumimoji="1" lang="en-US" altLang="zh-CN" dirty="0"/>
+              <a:rPr kumimoji="1" lang="en-US" altLang="zh-CN" sz="1400" dirty="0"/>
               <a:t>index fund, balanced fund</a:t>
             </a:r>
           </a:p>
@@ -10690,10 +10690,10 @@
               <a:buChar char="•"/>
             </a:pPr>
             <a:r>
-              <a:rPr kumimoji="1" lang="zh-CN" altLang="en-US" dirty="0"/>
+              <a:rPr kumimoji="1" lang="zh-CN" altLang="en-US" sz="1400" dirty="0"/>
               <a:t>从散户收集资金</a:t>
             </a:r>
-            <a:endParaRPr kumimoji="1" lang="en-US" altLang="zh-CN" dirty="0"/>
+            <a:endParaRPr kumimoji="1" lang="en-US" altLang="zh-CN" sz="1400" dirty="0"/>
           </a:p>
           <a:p>
             <a:pPr marL="742950" lvl="1" indent="-285750">
@@ -10701,26 +10701,26 @@
               <a:buChar char="•"/>
             </a:pPr>
             <a:r>
-              <a:rPr lang="zh-CN" altLang="en-US" dirty="0"/>
+              <a:rPr lang="zh-CN" altLang="en-US" sz="1400" dirty="0"/>
               <a:t>每天计算</a:t>
             </a:r>
             <a:r>
-              <a:rPr lang="en-US" altLang="zh-CN" dirty="0"/>
+              <a:rPr lang="en-US" altLang="zh-CN" sz="1400" dirty="0"/>
               <a:t>mutual fund</a:t>
             </a:r>
             <a:r>
-              <a:rPr lang="zh-CN" altLang="en-US" dirty="0"/>
+              <a:rPr lang="zh-CN" altLang="en-US" sz="1400" dirty="0"/>
               <a:t>的</a:t>
             </a:r>
             <a:r>
-              <a:rPr lang="en-US" altLang="zh-CN" dirty="0"/>
+              <a:rPr lang="en-US" altLang="zh-CN" sz="1400" dirty="0"/>
               <a:t>share price</a:t>
             </a:r>
             <a:r>
-              <a:rPr lang="zh-CN" altLang="en-US" dirty="0"/>
+              <a:rPr lang="zh-CN" altLang="en-US" sz="1400" dirty="0"/>
               <a:t>，可以随时出入</a:t>
             </a:r>
-            <a:endParaRPr lang="en-US" altLang="zh-CN" dirty="0"/>
+            <a:endParaRPr lang="en-US" altLang="zh-CN" sz="1400" dirty="0"/>
           </a:p>
           <a:p>
             <a:pPr marL="742950" lvl="1" indent="-285750">
@@ -10728,52 +10728,439 @@
               <a:buChar char="•"/>
             </a:pPr>
             <a:r>
-              <a:rPr kumimoji="1" lang="zh-CN" altLang="en-US" dirty="0"/>
+              <a:rPr kumimoji="1" lang="zh-CN" altLang="en-US" sz="1400" dirty="0"/>
               <a:t>被</a:t>
             </a:r>
             <a:r>
-              <a:rPr kumimoji="1" lang="en-US" altLang="zh-CN" dirty="0"/>
+              <a:rPr kumimoji="1" lang="en-US" altLang="zh-CN" sz="1400" dirty="0"/>
               <a:t>SEC</a:t>
             </a:r>
             <a:r>
-              <a:rPr kumimoji="1" lang="zh-CN" altLang="en-US" dirty="0"/>
+              <a:rPr kumimoji="1" lang="zh-CN" altLang="en-US" sz="1400" dirty="0"/>
               <a:t>管理，投资种类有限定，比较稳妥的是投</a:t>
             </a:r>
             <a:r>
-              <a:rPr kumimoji="1" lang="en-US" altLang="zh-CN" dirty="0"/>
+              <a:rPr kumimoji="1" lang="en-US" altLang="zh-CN" sz="1400" dirty="0"/>
               <a:t>government/cooperate bonds</a:t>
             </a:r>
             <a:r>
-              <a:rPr kumimoji="1" lang="zh-CN" altLang="en-US" dirty="0"/>
+              <a:rPr kumimoji="1" lang="zh-CN" altLang="en-US" sz="1400" dirty="0"/>
               <a:t>和</a:t>
             </a:r>
             <a:r>
-              <a:rPr lang="zh-CN" altLang="en-US" dirty="0"/>
+              <a:rPr lang="zh-CN" altLang="en-US" sz="1400" dirty="0"/>
               <a:t>买</a:t>
             </a:r>
             <a:r>
-              <a:rPr lang="en-US" altLang="zh-CN" dirty="0"/>
+              <a:rPr lang="en-US" altLang="zh-CN" sz="1400" dirty="0"/>
               <a:t>index</a:t>
             </a:r>
             <a:r>
-              <a:rPr lang="zh-CN" altLang="en-US" dirty="0"/>
+              <a:rPr lang="zh-CN" altLang="en-US" sz="1400" dirty="0"/>
               <a:t>中所有股票</a:t>
             </a:r>
-            <a:endParaRPr lang="en-US" altLang="zh-CN" dirty="0"/>
+            <a:endParaRPr lang="en-US" altLang="zh-CN" sz="1400" dirty="0"/>
           </a:p>
           <a:p>
             <a:pPr marL="742950" lvl="1" indent="-285750">
               <a:buFont typeface="Arial" panose="020B0604020202020204" pitchFamily="34" charset="0"/>
               <a:buChar char="•"/>
             </a:pPr>
-            <a:endParaRPr lang="en-US" altLang="zh-CN" dirty="0"/>
-          </a:p>
-          <a:p>
-            <a:r>
-              <a:rPr lang="zh-CN" altLang="en-US" dirty="0"/>
+            <a:endParaRPr lang="en-US" altLang="zh-CN" sz="1400" dirty="0"/>
+          </a:p>
+          <a:p>
+            <a:r>
+              <a:rPr lang="zh-CN" altLang="en-US" sz="1400" dirty="0"/>
               <a:t>现在先理解到这，之后有需要再详细查。</a:t>
             </a:r>
-            <a:endParaRPr lang="en-US" altLang="zh-CN" dirty="0"/>
+            <a:endParaRPr lang="en-US" altLang="zh-CN" sz="1400" dirty="0"/>
+          </a:p>
+        </p:txBody>
+      </p:sp>
+      <p:sp>
+        <p:nvSpPr>
+          <p:cNvPr id="3" name="テキスト ボックス 2"/>
+          <p:cNvSpPr txBox="1"/>
+          <p:nvPr/>
+        </p:nvSpPr>
+        <p:spPr>
+          <a:xfrm>
+            <a:off x="0" y="4355976"/>
+            <a:ext cx="5715000" cy="4185761"/>
+          </a:xfrm>
+          <a:prstGeom prst="rect">
+            <a:avLst/>
+          </a:prstGeom>
+          <a:noFill/>
+        </p:spPr>
+        <p:txBody>
+          <a:bodyPr wrap="square" rtlCol="0">
+            <a:spAutoFit/>
+          </a:bodyPr>
+          <a:lstStyle/>
+          <a:p>
+            <a:r>
+              <a:rPr lang="zh-CN" altLang="en-US" sz="1400" dirty="0" smtClean="0"/>
+              <a:t>关于</a:t>
+            </a:r>
+            <a:r>
+              <a:rPr lang="en-US" altLang="zh-CN" sz="1400" dirty="0" smtClean="0"/>
+              <a:t>share</a:t>
+            </a:r>
+            <a:r>
+              <a:rPr lang="zh-CN" altLang="en-US" sz="1400" dirty="0" smtClean="0"/>
+              <a:t>和</a:t>
+            </a:r>
+            <a:r>
+              <a:rPr lang="en-US" altLang="zh-CN" sz="1400" dirty="0" smtClean="0"/>
+              <a:t>shareholder</a:t>
+            </a:r>
+          </a:p>
+          <a:p>
+            <a:pPr marL="285750" indent="-285750">
+              <a:buFont typeface="Arial" panose="020B0604020202020204" pitchFamily="34" charset="0"/>
+              <a:buChar char="•"/>
+            </a:pPr>
+            <a:r>
+              <a:rPr kumimoji="1" lang="zh-CN" altLang="en-US" sz="1400" dirty="0"/>
+              <a:t>一般</a:t>
+            </a:r>
+            <a:r>
+              <a:rPr kumimoji="1" lang="zh-CN" altLang="en-US" sz="1400" dirty="0" smtClean="0"/>
+              <a:t>公司</a:t>
+            </a:r>
+            <a:r>
+              <a:rPr kumimoji="1" lang="en-US" altLang="zh-CN" sz="1400" dirty="0" smtClean="0"/>
+              <a:t>issue 2</a:t>
+            </a:r>
+            <a:r>
+              <a:rPr lang="ja-JP" altLang="en-US" sz="1400" dirty="0" smtClean="0"/>
+              <a:t> </a:t>
+            </a:r>
+            <a:r>
+              <a:rPr lang="en-US" altLang="ja-JP" sz="1400" dirty="0" smtClean="0"/>
+              <a:t>types of stocks: </a:t>
+            </a:r>
+            <a:r>
+              <a:rPr lang="en-US" altLang="ja-JP" sz="1400" b="1" dirty="0" smtClean="0">
+                <a:solidFill>
+                  <a:srgbClr val="FF0000"/>
+                </a:solidFill>
+              </a:rPr>
+              <a:t>common stock</a:t>
+            </a:r>
+            <a:r>
+              <a:rPr lang="en-US" altLang="ja-JP" sz="1400" dirty="0" smtClean="0"/>
+              <a:t>, preferred stock</a:t>
+            </a:r>
+          </a:p>
+          <a:p>
+            <a:pPr marL="285750" indent="-285750">
+              <a:buFont typeface="Arial" panose="020B0604020202020204" pitchFamily="34" charset="0"/>
+              <a:buChar char="•"/>
+            </a:pPr>
+            <a:r>
+              <a:rPr kumimoji="1" lang="zh-CN" altLang="en-US" sz="1400" dirty="0" smtClean="0"/>
+              <a:t>一般散户都卖的是</a:t>
+            </a:r>
+            <a:r>
+              <a:rPr kumimoji="1" lang="en-US" altLang="zh-CN" sz="1400" dirty="0" smtClean="0"/>
+              <a:t>common stock</a:t>
+            </a:r>
+            <a:r>
+              <a:rPr kumimoji="1" lang="zh-CN" altLang="en-US" sz="1400" dirty="0" smtClean="0"/>
+              <a:t>，因为跟家便宜，发行数量也多</a:t>
+            </a:r>
+            <a:endParaRPr kumimoji="1" lang="en-US" altLang="zh-CN" sz="1400" dirty="0" smtClean="0"/>
+          </a:p>
+          <a:p>
+            <a:pPr marL="285750" indent="-285750">
+              <a:buFont typeface="Arial" panose="020B0604020202020204" pitchFamily="34" charset="0"/>
+              <a:buChar char="•"/>
+            </a:pPr>
+            <a:r>
+              <a:rPr kumimoji="1" lang="en-US" altLang="zh-CN" sz="1400" b="1" dirty="0" smtClean="0">
+                <a:solidFill>
+                  <a:srgbClr val="FF0000"/>
+                </a:solidFill>
+              </a:rPr>
+              <a:t>Preferred st</a:t>
+            </a:r>
+            <a:r>
+              <a:rPr kumimoji="1" lang="en-US" altLang="zh-CN" sz="1400" dirty="0" smtClean="0"/>
+              <a:t>ock</a:t>
+            </a:r>
+            <a:r>
+              <a:rPr kumimoji="1" lang="zh-CN" altLang="en-US" sz="1400" dirty="0" smtClean="0"/>
+              <a:t>的</a:t>
+            </a:r>
+            <a:r>
+              <a:rPr kumimoji="1" lang="en-US" altLang="zh-CN" sz="1400" dirty="0" smtClean="0"/>
+              <a:t>shareholder</a:t>
+            </a:r>
+            <a:r>
+              <a:rPr kumimoji="1" lang="zh-CN" altLang="en-US" sz="1400" dirty="0" smtClean="0"/>
+              <a:t>会收到</a:t>
+            </a:r>
+            <a:r>
+              <a:rPr kumimoji="1" lang="en-US" altLang="zh-CN" sz="1400" b="1" dirty="0" smtClean="0"/>
+              <a:t>fixed dividends</a:t>
+            </a:r>
+            <a:r>
+              <a:rPr lang="zh-CN" altLang="en-US" sz="1400" b="1" dirty="0"/>
+              <a:t> </a:t>
+            </a:r>
+            <a:r>
+              <a:rPr lang="en-US" altLang="zh-CN" sz="1400" dirty="0" smtClean="0"/>
+              <a:t>(</a:t>
+            </a:r>
+            <a:r>
+              <a:rPr lang="zh-CN" altLang="en-US" sz="1400" dirty="0" smtClean="0"/>
+              <a:t>一般来说不少</a:t>
+            </a:r>
+            <a:r>
+              <a:rPr lang="en-US" altLang="zh-CN" sz="1400" dirty="0" smtClean="0"/>
+              <a:t>)</a:t>
+            </a:r>
+            <a:r>
+              <a:rPr lang="zh-CN" altLang="en-US" sz="1400" dirty="0" smtClean="0"/>
+              <a:t>，</a:t>
+            </a:r>
+            <a:r>
+              <a:rPr lang="en-US" altLang="zh-CN" sz="1400" dirty="0" smtClean="0"/>
+              <a:t>preferred stock</a:t>
+            </a:r>
+            <a:r>
+              <a:rPr lang="zh-CN" altLang="en-US" sz="1400" dirty="0" smtClean="0"/>
+              <a:t>的</a:t>
+            </a:r>
+            <a:r>
+              <a:rPr lang="en-US" altLang="zh-CN" sz="1400" dirty="0" smtClean="0"/>
+              <a:t>price</a:t>
+            </a:r>
+            <a:r>
+              <a:rPr lang="zh-CN" altLang="en-US" sz="1400" dirty="0" smtClean="0"/>
+              <a:t>也</a:t>
+            </a:r>
+            <a:r>
+              <a:rPr lang="en-US" altLang="zh-CN" sz="1400" dirty="0" smtClean="0"/>
+              <a:t>less volatile</a:t>
+            </a:r>
+            <a:r>
+              <a:rPr lang="zh-CN" altLang="en-US" sz="1400" dirty="0" smtClean="0"/>
+              <a:t>；但有一点，</a:t>
+            </a:r>
+            <a:r>
+              <a:rPr lang="en-US" altLang="zh-CN" sz="1400" dirty="0" smtClean="0"/>
+              <a:t>preferred stock shareholder</a:t>
+            </a:r>
+            <a:r>
+              <a:rPr lang="zh-CN" altLang="en-US" sz="1400" dirty="0" smtClean="0"/>
+              <a:t>并没有</a:t>
+            </a:r>
+            <a:r>
+              <a:rPr lang="en-US" altLang="zh-CN" sz="1400" dirty="0" smtClean="0"/>
+              <a:t>voting</a:t>
+            </a:r>
+            <a:r>
+              <a:rPr lang="zh-CN" altLang="en-US" sz="1400" dirty="0" smtClean="0"/>
+              <a:t>的权利</a:t>
+            </a:r>
+            <a:endParaRPr lang="en-US" altLang="zh-CN" sz="1400" dirty="0" smtClean="0"/>
+          </a:p>
+          <a:p>
+            <a:endParaRPr kumimoji="1" lang="en-US" altLang="zh-CN" sz="1400" dirty="0" smtClean="0"/>
+          </a:p>
+          <a:p>
+            <a:r>
+              <a:rPr lang="en-US" altLang="zh-CN" sz="1400" dirty="0" smtClean="0"/>
+              <a:t>Shareholder</a:t>
+            </a:r>
+            <a:r>
+              <a:rPr lang="zh-CN" altLang="en-US" sz="1400" dirty="0" smtClean="0"/>
+              <a:t>根据持有股票的数量的不同，拥有的权力也不同</a:t>
+            </a:r>
+            <a:endParaRPr kumimoji="1" lang="en-US" altLang="zh-CN" sz="1400" dirty="0"/>
+          </a:p>
+          <a:p>
+            <a:pPr marL="285750" indent="-285750">
+              <a:buFont typeface="Arial" panose="020B0604020202020204" pitchFamily="34" charset="0"/>
+              <a:buChar char="•"/>
+            </a:pPr>
+            <a:r>
+              <a:rPr lang="en-US" altLang="zh-CN" sz="1400" b="1" dirty="0">
+                <a:solidFill>
+                  <a:srgbClr val="FF0000"/>
+                </a:solidFill>
+              </a:rPr>
+              <a:t>Majority shareholder</a:t>
+            </a:r>
+            <a:r>
+              <a:rPr lang="en-US" altLang="zh-CN" sz="1400" dirty="0"/>
+              <a:t>: is a person or entity that owns and controls </a:t>
+            </a:r>
+            <a:r>
+              <a:rPr lang="en-US" altLang="zh-CN" sz="1400" b="1" dirty="0"/>
+              <a:t>more than 50 percent</a:t>
+            </a:r>
+            <a:r>
+              <a:rPr lang="en-US" altLang="zh-CN" sz="1400" dirty="0"/>
+              <a:t> of a company's outstanding </a:t>
+            </a:r>
+            <a:r>
+              <a:rPr lang="en-US" altLang="zh-CN" sz="1400" dirty="0" smtClean="0"/>
+              <a:t>shares</a:t>
+            </a:r>
+          </a:p>
+          <a:p>
+            <a:pPr marL="285750" indent="-285750">
+              <a:buFont typeface="Arial" panose="020B0604020202020204" pitchFamily="34" charset="0"/>
+              <a:buChar char="•"/>
+            </a:pPr>
+            <a:r>
+              <a:rPr lang="en-US" altLang="zh-CN" sz="1400" b="1" dirty="0" smtClean="0">
+                <a:solidFill>
+                  <a:srgbClr val="FF0000"/>
+                </a:solidFill>
+              </a:rPr>
+              <a:t>Outstanding share</a:t>
+            </a:r>
+            <a:r>
+              <a:rPr lang="zh-CN" altLang="en-US" sz="1400" dirty="0" smtClean="0"/>
+              <a:t>的意思是，公司发行的股票</a:t>
+            </a:r>
+            <a:r>
+              <a:rPr lang="en-US" altLang="zh-CN" sz="1400" dirty="0" smtClean="0"/>
+              <a:t>share</a:t>
+            </a:r>
+            <a:r>
+              <a:rPr lang="zh-CN" altLang="en-US" sz="1400" dirty="0" smtClean="0"/>
+              <a:t>中，</a:t>
+            </a:r>
+            <a:r>
+              <a:rPr lang="zh-CN" altLang="en-US" sz="1400" b="1" dirty="0" smtClean="0"/>
+              <a:t>已经被买了的部分</a:t>
+            </a:r>
+            <a:endParaRPr lang="en-US" altLang="zh-CN" sz="1400" b="1" dirty="0" smtClean="0"/>
+          </a:p>
+          <a:p>
+            <a:pPr marL="285750" indent="-285750">
+              <a:buFont typeface="Arial" panose="020B0604020202020204" pitchFamily="34" charset="0"/>
+              <a:buChar char="•"/>
+            </a:pPr>
+            <a:endParaRPr lang="en-US" altLang="zh-CN" sz="1400" b="1" dirty="0"/>
+          </a:p>
+          <a:p>
+            <a:r>
+              <a:rPr lang="en-US" altLang="zh-CN" sz="1400" dirty="0" smtClean="0"/>
+              <a:t>Share</a:t>
+            </a:r>
+            <a:r>
+              <a:rPr lang="zh-CN" altLang="en-US" sz="1400" dirty="0" smtClean="0"/>
+              <a:t>也有</a:t>
+            </a:r>
+            <a:r>
+              <a:rPr lang="en-US" altLang="zh-CN" sz="1400" dirty="0" smtClean="0"/>
+              <a:t>3</a:t>
+            </a:r>
+            <a:r>
+              <a:rPr lang="zh-CN" altLang="en-US" sz="1400" dirty="0" smtClean="0"/>
+              <a:t>个</a:t>
+            </a:r>
+            <a:r>
+              <a:rPr lang="en-US" altLang="zh-CN" sz="1400" dirty="0" smtClean="0"/>
+              <a:t>class</a:t>
+            </a:r>
+            <a:r>
+              <a:rPr lang="zh-CN" altLang="en-US" sz="1400" dirty="0" smtClean="0"/>
+              <a:t>，不同公司会用不同</a:t>
+            </a:r>
+            <a:r>
+              <a:rPr lang="en-US" altLang="zh-CN" sz="1400" dirty="0" smtClean="0"/>
+              <a:t>class</a:t>
+            </a:r>
+            <a:r>
+              <a:rPr lang="zh-CN" altLang="en-US" sz="1400" dirty="0" smtClean="0"/>
+              <a:t>来实现不同目的，以</a:t>
+            </a:r>
+            <a:r>
+              <a:rPr lang="en-US" altLang="zh-CN" sz="1400" dirty="0" smtClean="0"/>
+              <a:t>Google (alphabet)</a:t>
+            </a:r>
+            <a:r>
+              <a:rPr lang="zh-CN" altLang="en-US" sz="1400" dirty="0" smtClean="0"/>
+              <a:t>为例</a:t>
+            </a:r>
+            <a:endParaRPr lang="en-US" altLang="zh-CN" sz="1400" dirty="0" smtClean="0"/>
+          </a:p>
+          <a:p>
+            <a:pPr marL="285750" indent="-285750">
+              <a:buFont typeface="Arial" panose="020B0604020202020204" pitchFamily="34" charset="0"/>
+              <a:buChar char="•"/>
+            </a:pPr>
+            <a:r>
+              <a:rPr lang="en-US" altLang="zh-CN" sz="1400" dirty="0" smtClean="0"/>
+              <a:t>Class A: hold by regular investors, 1 vote per share</a:t>
+            </a:r>
+          </a:p>
+          <a:p>
+            <a:pPr marL="285750" indent="-285750">
+              <a:buFont typeface="Arial" panose="020B0604020202020204" pitchFamily="34" charset="0"/>
+              <a:buChar char="•"/>
+            </a:pPr>
+            <a:r>
+              <a:rPr lang="en-US" altLang="zh-CN" sz="1400" dirty="0" smtClean="0"/>
+              <a:t>Class B: hold primarily by founders (</a:t>
+            </a:r>
+            <a:r>
+              <a:rPr lang="en-US" altLang="zh-CN" sz="1400" dirty="0" err="1" smtClean="0"/>
+              <a:t>Brin</a:t>
+            </a:r>
+            <a:r>
+              <a:rPr lang="en-US" altLang="zh-CN" sz="1400" dirty="0" smtClean="0"/>
+              <a:t> and Page), 10 vote per share</a:t>
+            </a:r>
+          </a:p>
+          <a:p>
+            <a:pPr marL="285750" indent="-285750">
+              <a:buFont typeface="Arial" panose="020B0604020202020204" pitchFamily="34" charset="0"/>
+              <a:buChar char="•"/>
+            </a:pPr>
+            <a:r>
+              <a:rPr lang="en-US" altLang="zh-CN" sz="1400" dirty="0" smtClean="0"/>
+              <a:t>Class C: hold by employees, no voting right</a:t>
+            </a:r>
+          </a:p>
+          <a:p>
+            <a:r>
+              <a:rPr lang="zh-CN" altLang="en-US" sz="1400" dirty="0" smtClean="0"/>
+              <a:t>综上所述，</a:t>
+            </a:r>
+            <a:r>
+              <a:rPr lang="en-US" altLang="zh-CN" sz="1400" dirty="0" smtClean="0"/>
+              <a:t>share</a:t>
+            </a:r>
+            <a:r>
+              <a:rPr lang="zh-CN" altLang="en-US" sz="1400" dirty="0" smtClean="0"/>
+              <a:t>的</a:t>
+            </a:r>
+            <a:r>
+              <a:rPr lang="en-US" altLang="zh-CN" sz="1400" dirty="0" smtClean="0"/>
+              <a:t>class</a:t>
+            </a:r>
+            <a:r>
+              <a:rPr lang="zh-CN" altLang="en-US" sz="1400" dirty="0" smtClean="0"/>
+              <a:t>不同主要就是</a:t>
+            </a:r>
+            <a:r>
+              <a:rPr lang="en-US" altLang="zh-CN" sz="1400" dirty="0" smtClean="0"/>
+              <a:t>voting right</a:t>
+            </a:r>
+            <a:r>
+              <a:rPr lang="zh-CN" altLang="en-US" sz="1400" dirty="0" smtClean="0"/>
+              <a:t>的不同</a:t>
+            </a:r>
+            <a:endParaRPr lang="en-US" altLang="zh-CN" sz="1400" dirty="0"/>
           </a:p>
         </p:txBody>
       </p:sp>

</xml_diff>

<commit_message>
add knowledge, delete temp
- investor
add venture rounds A,B,C knowledge
</commit_message>
<xml_diff>
--- a/[BeAInvestor].pptx
+++ b/[BeAInvestor].pptx
@@ -16,6 +16,7 @@
     <p:sldId id="256" r:id="rId10"/>
     <p:sldId id="263" r:id="rId11"/>
     <p:sldId id="265" r:id="rId12"/>
+    <p:sldId id="267" r:id="rId13"/>
   </p:sldIdLst>
   <p:sldSz cx="5715000" cy="9144000" type="screen16x10"/>
   <p:notesSz cx="6858000" cy="9144000"/>
@@ -116,7 +117,7 @@
   </p:defaultTextStyle>
   <p:extLst>
     <p:ext uri="{EFAFB233-063F-42B5-8137-9DF3F51BA10A}">
-      <p15:sldGuideLst xmlns:p15="http://schemas.microsoft.com/office/powerpoint/2012/main" xmlns="">
+      <p15:sldGuideLst xmlns="" xmlns:p15="http://schemas.microsoft.com/office/powerpoint/2012/main">
         <p15:guide id="1" orient="horz" pos="2880">
           <p15:clr>
             <a:srgbClr val="A4A3A4"/>
@@ -312,7 +313,7 @@
           <a:p>
             <a:fld id="{E90ED720-0104-4369-84BC-D37694168613}" type="datetimeFigureOut">
               <a:rPr kumimoji="1" lang="ja-JP" altLang="en-US" smtClean="0"/>
-              <a:t>2018/9/20</a:t>
+              <a:t>2018/9/25</a:t>
             </a:fld>
             <a:endParaRPr kumimoji="1" lang="ja-JP" altLang="en-US"/>
           </a:p>
@@ -507,7 +508,7 @@
           <a:p>
             <a:fld id="{E90ED720-0104-4369-84BC-D37694168613}" type="datetimeFigureOut">
               <a:rPr kumimoji="1" lang="ja-JP" altLang="en-US" smtClean="0"/>
-              <a:t>2018/9/20</a:t>
+              <a:t>2018/9/25</a:t>
             </a:fld>
             <a:endParaRPr kumimoji="1" lang="ja-JP" altLang="en-US"/>
           </a:p>
@@ -712,7 +713,7 @@
           <a:p>
             <a:fld id="{E90ED720-0104-4369-84BC-D37694168613}" type="datetimeFigureOut">
               <a:rPr kumimoji="1" lang="ja-JP" altLang="en-US" smtClean="0"/>
-              <a:t>2018/9/20</a:t>
+              <a:t>2018/9/25</a:t>
             </a:fld>
             <a:endParaRPr kumimoji="1" lang="ja-JP" altLang="en-US"/>
           </a:p>
@@ -907,7 +908,7 @@
           <a:p>
             <a:fld id="{E90ED720-0104-4369-84BC-D37694168613}" type="datetimeFigureOut">
               <a:rPr kumimoji="1" lang="ja-JP" altLang="en-US" smtClean="0"/>
-              <a:t>2018/9/20</a:t>
+              <a:t>2018/9/25</a:t>
             </a:fld>
             <a:endParaRPr kumimoji="1" lang="ja-JP" altLang="en-US"/>
           </a:p>
@@ -1147,7 +1148,7 @@
           <a:p>
             <a:fld id="{E90ED720-0104-4369-84BC-D37694168613}" type="datetimeFigureOut">
               <a:rPr kumimoji="1" lang="ja-JP" altLang="en-US" smtClean="0"/>
-              <a:t>2018/9/20</a:t>
+              <a:t>2018/9/25</a:t>
             </a:fld>
             <a:endParaRPr kumimoji="1" lang="ja-JP" altLang="en-US"/>
           </a:p>
@@ -1491,7 +1492,7 @@
           <a:p>
             <a:fld id="{E90ED720-0104-4369-84BC-D37694168613}" type="datetimeFigureOut">
               <a:rPr kumimoji="1" lang="ja-JP" altLang="en-US" smtClean="0"/>
-              <a:t>2018/9/20</a:t>
+              <a:t>2018/9/25</a:t>
             </a:fld>
             <a:endParaRPr kumimoji="1" lang="ja-JP" altLang="en-US"/>
           </a:p>
@@ -1969,7 +1970,7 @@
           <a:p>
             <a:fld id="{E90ED720-0104-4369-84BC-D37694168613}" type="datetimeFigureOut">
               <a:rPr kumimoji="1" lang="ja-JP" altLang="en-US" smtClean="0"/>
-              <a:t>2018/9/20</a:t>
+              <a:t>2018/9/25</a:t>
             </a:fld>
             <a:endParaRPr kumimoji="1" lang="ja-JP" altLang="en-US"/>
           </a:p>
@@ -2081,7 +2082,7 @@
           <a:p>
             <a:fld id="{E90ED720-0104-4369-84BC-D37694168613}" type="datetimeFigureOut">
               <a:rPr kumimoji="1" lang="ja-JP" altLang="en-US" smtClean="0"/>
-              <a:t>2018/9/20</a:t>
+              <a:t>2018/9/25</a:t>
             </a:fld>
             <a:endParaRPr kumimoji="1" lang="ja-JP" altLang="en-US"/>
           </a:p>
@@ -2171,7 +2172,7 @@
           <a:p>
             <a:fld id="{E90ED720-0104-4369-84BC-D37694168613}" type="datetimeFigureOut">
               <a:rPr kumimoji="1" lang="ja-JP" altLang="en-US" smtClean="0"/>
-              <a:t>2018/9/20</a:t>
+              <a:t>2018/9/25</a:t>
             </a:fld>
             <a:endParaRPr kumimoji="1" lang="ja-JP" altLang="en-US"/>
           </a:p>
@@ -2473,7 +2474,7 @@
           <a:p>
             <a:fld id="{E90ED720-0104-4369-84BC-D37694168613}" type="datetimeFigureOut">
               <a:rPr kumimoji="1" lang="ja-JP" altLang="en-US" smtClean="0"/>
-              <a:t>2018/9/20</a:t>
+              <a:t>2018/9/25</a:t>
             </a:fld>
             <a:endParaRPr kumimoji="1" lang="ja-JP" altLang="en-US"/>
           </a:p>
@@ -2720,7 +2721,7 @@
           <a:p>
             <a:fld id="{E90ED720-0104-4369-84BC-D37694168613}" type="datetimeFigureOut">
               <a:rPr kumimoji="1" lang="ja-JP" altLang="en-US" smtClean="0"/>
-              <a:t>2018/9/20</a:t>
+              <a:t>2018/9/25</a:t>
             </a:fld>
             <a:endParaRPr kumimoji="1" lang="ja-JP" altLang="en-US"/>
           </a:p>
@@ -2958,7 +2959,7 @@
           <a:p>
             <a:fld id="{E90ED720-0104-4369-84BC-D37694168613}" type="datetimeFigureOut">
               <a:rPr kumimoji="1" lang="ja-JP" altLang="en-US" smtClean="0"/>
-              <a:t>2018/9/20</a:t>
+              <a:t>2018/9/25</a:t>
             </a:fld>
             <a:endParaRPr kumimoji="1" lang="ja-JP" altLang="en-US"/>
           </a:p>
@@ -3740,11 +3741,7 @@
             </a:r>
             <a:r>
               <a:rPr lang="zh-CN" altLang="en-US" dirty="0" smtClean="0"/>
-              <a:t>就是方向的其</a:t>
-            </a:r>
-            <a:r>
-              <a:rPr lang="zh-CN" altLang="en-US" dirty="0" smtClean="0"/>
-              <a:t>中之一</a:t>
+              <a:t>就是方向的其中之一</a:t>
             </a:r>
             <a:endParaRPr lang="en-US" altLang="zh-CN" dirty="0" smtClean="0"/>
           </a:p>
@@ -5127,6 +5124,720 @@
 </p:sld>
 </file>
 
+<file path=ppt/slides/slide12.xml><?xml version="1.0" encoding="utf-8"?>
+<p:sld xmlns:a="http://schemas.openxmlformats.org/drawingml/2006/main" xmlns:r="http://schemas.openxmlformats.org/officeDocument/2006/relationships" xmlns:p="http://schemas.openxmlformats.org/presentationml/2006/main">
+  <p:cSld>
+    <p:spTree>
+      <p:nvGrpSpPr>
+        <p:cNvPr id="1" name=""/>
+        <p:cNvGrpSpPr/>
+        <p:nvPr/>
+      </p:nvGrpSpPr>
+      <p:grpSpPr>
+        <a:xfrm>
+          <a:off x="0" y="0"/>
+          <a:ext cx="0" cy="0"/>
+          <a:chOff x="0" y="0"/>
+          <a:chExt cx="0" cy="0"/>
+        </a:xfrm>
+      </p:grpSpPr>
+      <p:sp>
+        <p:nvSpPr>
+          <p:cNvPr id="2" name="テキスト ボックス 1"/>
+          <p:cNvSpPr txBox="1"/>
+          <p:nvPr/>
+        </p:nvSpPr>
+        <p:spPr>
+          <a:xfrm>
+            <a:off x="1" y="0"/>
+            <a:ext cx="5715000" cy="7632859"/>
+          </a:xfrm>
+          <a:prstGeom prst="rect">
+            <a:avLst/>
+          </a:prstGeom>
+          <a:noFill/>
+        </p:spPr>
+        <p:txBody>
+          <a:bodyPr wrap="square" rtlCol="0">
+            <a:spAutoFit/>
+          </a:bodyPr>
+          <a:lstStyle/>
+          <a:p>
+            <a:r>
+              <a:rPr kumimoji="1" lang="en-US" altLang="ja-JP" sz="1400" dirty="0" smtClean="0"/>
+              <a:t>Startup</a:t>
+            </a:r>
+            <a:r>
+              <a:rPr lang="zh-CN" altLang="en-US" sz="1400" dirty="0" smtClean="0"/>
+              <a:t>公司的</a:t>
+            </a:r>
+            <a:r>
+              <a:rPr lang="en-US" altLang="zh-CN" sz="1400" dirty="0" smtClean="0"/>
+              <a:t>ABC</a:t>
+            </a:r>
+            <a:r>
+              <a:rPr lang="zh-CN" altLang="en-US" sz="1400" dirty="0" smtClean="0"/>
+              <a:t>轮</a:t>
+            </a:r>
+            <a:r>
+              <a:rPr lang="en-US" altLang="zh-CN" sz="1400" dirty="0" smtClean="0"/>
+              <a:t>(</a:t>
+            </a:r>
+            <a:r>
+              <a:rPr lang="zh-CN" altLang="en-US" sz="1400" dirty="0" smtClean="0"/>
+              <a:t>英语是</a:t>
+            </a:r>
+            <a:r>
+              <a:rPr lang="en-US" altLang="zh-CN" sz="1400" b="1" dirty="0" smtClean="0">
+                <a:solidFill>
+                  <a:srgbClr val="FF0000"/>
+                </a:solidFill>
+              </a:rPr>
+              <a:t>serial A, B, C</a:t>
+            </a:r>
+            <a:r>
+              <a:rPr lang="en-US" altLang="zh-CN" sz="1400" dirty="0" smtClean="0"/>
+              <a:t>)</a:t>
+            </a:r>
+            <a:r>
+              <a:rPr lang="zh-CN" altLang="en-US" sz="1400" dirty="0" smtClean="0"/>
+              <a:t>啥时意思？</a:t>
+            </a:r>
+            <a:endParaRPr lang="en-US" altLang="zh-CN" sz="1400" dirty="0" smtClean="0"/>
+          </a:p>
+          <a:p>
+            <a:pPr marL="285750" indent="-285750">
+              <a:buFont typeface="Arial" panose="020B0604020202020204" pitchFamily="34" charset="0"/>
+              <a:buChar char="•"/>
+            </a:pPr>
+            <a:r>
+              <a:rPr kumimoji="1" lang="en-US" altLang="ja-JP" sz="1400" b="1" dirty="0" smtClean="0">
+                <a:solidFill>
+                  <a:srgbClr val="FF0000"/>
+                </a:solidFill>
+              </a:rPr>
+              <a:t>Venture round</a:t>
+            </a:r>
+            <a:r>
+              <a:rPr lang="en-US" altLang="ja-JP" sz="1400" dirty="0"/>
+              <a:t>: venture round is a type of funding round used for </a:t>
+            </a:r>
+            <a:r>
+              <a:rPr lang="en-US" altLang="ja-JP" sz="1400" b="1" dirty="0"/>
+              <a:t>venture capital financing</a:t>
+            </a:r>
+            <a:r>
+              <a:rPr lang="en-US" altLang="ja-JP" sz="1400" dirty="0"/>
+              <a:t>, by which startup companies obtain </a:t>
+            </a:r>
+            <a:r>
+              <a:rPr lang="en-US" altLang="ja-JP" sz="1400" dirty="0" smtClean="0"/>
+              <a:t>investment</a:t>
+            </a:r>
+          </a:p>
+          <a:p>
+            <a:pPr marL="285750" indent="-285750">
+              <a:buFont typeface="Arial" panose="020B0604020202020204" pitchFamily="34" charset="0"/>
+              <a:buChar char="•"/>
+            </a:pPr>
+            <a:r>
+              <a:rPr lang="en-US" altLang="ja-JP" sz="1400" b="1" dirty="0">
+                <a:solidFill>
+                  <a:srgbClr val="FF0000"/>
+                </a:solidFill>
+              </a:rPr>
+              <a:t>venture capital </a:t>
+            </a:r>
+            <a:r>
+              <a:rPr lang="en-US" altLang="ja-JP" sz="1400" b="1" dirty="0" smtClean="0">
+                <a:solidFill>
+                  <a:srgbClr val="FF0000"/>
+                </a:solidFill>
+              </a:rPr>
+              <a:t>financing</a:t>
+            </a:r>
+            <a:r>
+              <a:rPr lang="en-US" altLang="ja-JP" sz="1400" dirty="0"/>
+              <a:t>: private equity capital provided as seed funding to early-stage, high-potential, growth companies </a:t>
+            </a:r>
+            <a:endParaRPr lang="en-US" altLang="ja-JP" sz="1400" dirty="0" smtClean="0"/>
+          </a:p>
+          <a:p>
+            <a:pPr marL="285750" indent="-285750">
+              <a:buFont typeface="Arial" panose="020B0604020202020204" pitchFamily="34" charset="0"/>
+              <a:buChar char="•"/>
+            </a:pPr>
+            <a:r>
+              <a:rPr kumimoji="1" lang="en-US" altLang="ja-JP" sz="1400" dirty="0" smtClean="0"/>
+              <a:t>A,B,C</a:t>
+            </a:r>
+            <a:r>
+              <a:rPr kumimoji="1" lang="zh-CN" altLang="en-US" sz="1400" dirty="0" smtClean="0"/>
+              <a:t>和字母表顺序没什么关系，但是与</a:t>
+            </a:r>
+            <a:r>
+              <a:rPr kumimoji="1" lang="zh-CN" altLang="en-US" sz="1400" b="1" dirty="0" smtClean="0">
+                <a:solidFill>
+                  <a:srgbClr val="FF0000"/>
+                </a:solidFill>
+              </a:rPr>
+              <a:t>公司的</a:t>
+            </a:r>
+            <a:r>
+              <a:rPr kumimoji="1" lang="en-US" altLang="zh-CN" sz="1400" b="1" dirty="0" smtClean="0">
+                <a:solidFill>
+                  <a:srgbClr val="FF0000"/>
+                </a:solidFill>
+              </a:rPr>
+              <a:t>development stage</a:t>
+            </a:r>
+            <a:r>
+              <a:rPr kumimoji="1" lang="zh-CN" altLang="en-US" sz="1400" dirty="0" smtClean="0"/>
+              <a:t>有关系 </a:t>
+            </a:r>
+            <a:r>
+              <a:rPr kumimoji="1" lang="en-US" altLang="zh-CN" sz="1400" dirty="0" smtClean="0"/>
+              <a:t>(</a:t>
+            </a:r>
+            <a:r>
+              <a:rPr kumimoji="1" lang="zh-CN" altLang="en-US" sz="1400" dirty="0" smtClean="0"/>
+              <a:t>或者说</a:t>
+            </a:r>
+            <a:r>
+              <a:rPr kumimoji="1" lang="en-US" altLang="zh-CN" sz="1400" dirty="0" smtClean="0"/>
+              <a:t>maturity levels of the business)</a:t>
+            </a:r>
+          </a:p>
+          <a:p>
+            <a:pPr marL="285750" indent="-285750">
+              <a:buFont typeface="Arial" panose="020B0604020202020204" pitchFamily="34" charset="0"/>
+              <a:buChar char="•"/>
+            </a:pPr>
+            <a:r>
+              <a:rPr lang="zh-CN" altLang="en-US" sz="1400" dirty="0" smtClean="0"/>
+              <a:t>公司决定进行</a:t>
+            </a:r>
+            <a:r>
+              <a:rPr lang="en-US" altLang="zh-CN" sz="1400" dirty="0" smtClean="0"/>
+              <a:t>A</a:t>
+            </a:r>
+            <a:r>
+              <a:rPr lang="zh-CN" altLang="en-US" sz="1400" dirty="0" smtClean="0"/>
+              <a:t>，</a:t>
+            </a:r>
+            <a:r>
+              <a:rPr lang="en-US" altLang="zh-CN" sz="1400" dirty="0" smtClean="0"/>
+              <a:t>B</a:t>
+            </a:r>
+            <a:r>
+              <a:rPr lang="zh-CN" altLang="en-US" sz="1400" dirty="0" smtClean="0"/>
+              <a:t>，</a:t>
+            </a:r>
+            <a:r>
+              <a:rPr lang="en-US" altLang="zh-CN" sz="1400" dirty="0" smtClean="0"/>
+              <a:t>C</a:t>
+            </a:r>
+            <a:r>
+              <a:rPr lang="zh-CN" altLang="en-US" sz="1400" dirty="0" smtClean="0"/>
+              <a:t>轮的原因可能是只依靠自己口袋里的钱的话已经不够了，需要外部</a:t>
+            </a:r>
+            <a:r>
+              <a:rPr lang="en-US" altLang="zh-CN" sz="1400" dirty="0" smtClean="0"/>
+              <a:t>investor</a:t>
+            </a:r>
+          </a:p>
+          <a:p>
+            <a:pPr marL="285750" indent="-285750">
+              <a:buFont typeface="Arial" panose="020B0604020202020204" pitchFamily="34" charset="0"/>
+              <a:buChar char="•"/>
+            </a:pPr>
+            <a:r>
+              <a:rPr lang="zh-CN" altLang="en-US" sz="1400" dirty="0" smtClean="0"/>
+              <a:t>再每一轮之前，都会有一个</a:t>
+            </a:r>
+            <a:r>
+              <a:rPr lang="en-US" altLang="zh-CN" sz="1400" dirty="0" smtClean="0"/>
+              <a:t>valuation of the company, </a:t>
+            </a:r>
+            <a:r>
+              <a:rPr lang="zh-CN" altLang="en-US" sz="1400" dirty="0" smtClean="0"/>
+              <a:t>这个</a:t>
+            </a:r>
+            <a:r>
+              <a:rPr lang="en-US" altLang="zh-CN" sz="1400" dirty="0" smtClean="0"/>
+              <a:t>valuation</a:t>
+            </a:r>
+            <a:r>
+              <a:rPr lang="zh-CN" altLang="en-US" sz="1400" dirty="0" smtClean="0"/>
+              <a:t>包括</a:t>
+            </a:r>
+            <a:r>
+              <a:rPr lang="en-US" altLang="zh-CN" sz="1400" dirty="0" smtClean="0"/>
+              <a:t>management, proven track record(?), market size, risk.</a:t>
+            </a:r>
+          </a:p>
+          <a:p>
+            <a:pPr marL="285750" indent="-285750">
+              <a:buFont typeface="Arial" panose="020B0604020202020204" pitchFamily="34" charset="0"/>
+              <a:buChar char="•"/>
+            </a:pPr>
+            <a:r>
+              <a:rPr lang="zh-CN" altLang="en-US" sz="1400" dirty="0" smtClean="0"/>
+              <a:t>再</a:t>
+            </a:r>
+            <a:r>
+              <a:rPr lang="en-US" altLang="zh-CN" sz="1400" dirty="0" smtClean="0"/>
+              <a:t>ABC</a:t>
+            </a:r>
+            <a:r>
+              <a:rPr lang="zh-CN" altLang="en-US" sz="1400" dirty="0" smtClean="0"/>
+              <a:t>之前，会有</a:t>
+            </a:r>
+            <a:r>
+              <a:rPr lang="en-US" altLang="zh-CN" sz="1400" b="1" dirty="0" smtClean="0">
+                <a:solidFill>
+                  <a:srgbClr val="FF0000"/>
+                </a:solidFill>
+              </a:rPr>
+              <a:t>seed</a:t>
+            </a:r>
+            <a:r>
+              <a:rPr lang="zh-CN" altLang="en-US" sz="1400" b="1" dirty="0" smtClean="0">
+                <a:solidFill>
+                  <a:srgbClr val="FF0000"/>
+                </a:solidFill>
+              </a:rPr>
+              <a:t>轮</a:t>
+            </a:r>
+            <a:r>
+              <a:rPr lang="zh-CN" altLang="en-US" sz="1400" dirty="0" smtClean="0"/>
+              <a:t>，筹集到的钱一般用来</a:t>
+            </a:r>
+            <a:r>
+              <a:rPr lang="en-US" altLang="zh-CN" sz="1400" dirty="0" smtClean="0"/>
+              <a:t>support initial market research</a:t>
+            </a:r>
+            <a:r>
+              <a:rPr lang="zh-CN" altLang="en-US" sz="1400" dirty="0"/>
+              <a:t> </a:t>
+            </a:r>
+            <a:r>
+              <a:rPr lang="en-US" altLang="zh-CN" sz="1400" dirty="0" smtClean="0"/>
+              <a:t>and development</a:t>
+            </a:r>
+            <a:r>
+              <a:rPr lang="zh-CN" altLang="en-US" sz="1400" dirty="0" smtClean="0"/>
+              <a:t>；在这一轮之前，很多</a:t>
+            </a:r>
+            <a:r>
+              <a:rPr lang="en-US" altLang="zh-CN" sz="1400" dirty="0" smtClean="0"/>
+              <a:t>entrepreneurs</a:t>
+            </a:r>
+            <a:r>
+              <a:rPr lang="zh-CN" altLang="en-US" sz="1400" dirty="0" smtClean="0"/>
+              <a:t>都</a:t>
+            </a:r>
+            <a:r>
+              <a:rPr lang="en-US" altLang="zh-CN" sz="1400" dirty="0" smtClean="0"/>
+              <a:t>work alone</a:t>
+            </a:r>
+            <a:r>
+              <a:rPr lang="zh-CN" altLang="en-US" sz="1400" dirty="0"/>
+              <a:t> </a:t>
+            </a:r>
+            <a:r>
+              <a:rPr lang="en-US" altLang="zh-CN" sz="1400" dirty="0" smtClean="0"/>
+              <a:t>or with a few partners</a:t>
+            </a:r>
+            <a:r>
+              <a:rPr lang="zh-CN" altLang="en-US" sz="1400" dirty="0" smtClean="0"/>
+              <a:t>；他们可以用这一轮拿到的钱</a:t>
+            </a:r>
+            <a:r>
+              <a:rPr lang="en-US" altLang="zh-CN" sz="1400" dirty="0" smtClean="0"/>
+              <a:t>launch their product</a:t>
+            </a:r>
+          </a:p>
+          <a:p>
+            <a:pPr marL="742950" lvl="1" indent="-285750">
+              <a:buFont typeface="Arial" panose="020B0604020202020204" pitchFamily="34" charset="0"/>
+              <a:buChar char="•"/>
+            </a:pPr>
+            <a:r>
+              <a:rPr lang="zh-CN" altLang="en-US" sz="1400" dirty="0" smtClean="0"/>
+              <a:t>这一轮的</a:t>
+            </a:r>
+            <a:r>
+              <a:rPr lang="en-US" altLang="zh-CN" sz="1400" dirty="0" smtClean="0"/>
+              <a:t>investors</a:t>
+            </a:r>
+            <a:r>
+              <a:rPr lang="zh-CN" altLang="en-US" sz="1400" dirty="0" smtClean="0"/>
+              <a:t>一般是</a:t>
+            </a:r>
+            <a:r>
+              <a:rPr lang="en-US" altLang="zh-CN" sz="1400" dirty="0" smtClean="0"/>
+              <a:t>risk-loving types</a:t>
+            </a:r>
+          </a:p>
+          <a:p>
+            <a:pPr marL="742950" lvl="1" indent="-285750">
+              <a:buFont typeface="Arial" panose="020B0604020202020204" pitchFamily="34" charset="0"/>
+              <a:buChar char="•"/>
+            </a:pPr>
+            <a:r>
+              <a:rPr lang="zh-CN" altLang="en-US" sz="1400" dirty="0" smtClean="0"/>
+              <a:t>这一轮公司能筹到的钱一般是</a:t>
+            </a:r>
+            <a:r>
+              <a:rPr lang="en-US" altLang="zh-CN" sz="1400" dirty="0" smtClean="0"/>
+              <a:t>50~200</a:t>
+            </a:r>
+            <a:r>
+              <a:rPr lang="zh-CN" altLang="en-US" sz="1400" dirty="0" smtClean="0"/>
+              <a:t>万美元</a:t>
+            </a:r>
+            <a:endParaRPr lang="en-US" altLang="zh-CN" sz="1400" dirty="0" smtClean="0"/>
+          </a:p>
+          <a:p>
+            <a:pPr marL="285750" indent="-285750">
+              <a:buFont typeface="Arial" panose="020B0604020202020204" pitchFamily="34" charset="0"/>
+              <a:buChar char="•"/>
+            </a:pPr>
+            <a:r>
+              <a:rPr kumimoji="1" lang="en-US" altLang="zh-CN" sz="1400" b="1" dirty="0" smtClean="0">
+                <a:solidFill>
+                  <a:srgbClr val="FF0000"/>
+                </a:solidFill>
+              </a:rPr>
+              <a:t>A</a:t>
+            </a:r>
+            <a:r>
+              <a:rPr kumimoji="1" lang="zh-CN" altLang="en-US" sz="1400" b="1" dirty="0" smtClean="0">
+                <a:solidFill>
+                  <a:srgbClr val="FF0000"/>
+                </a:solidFill>
+              </a:rPr>
+              <a:t>轮</a:t>
+            </a:r>
+            <a:r>
+              <a:rPr kumimoji="1" lang="zh-CN" altLang="en-US" sz="1400" dirty="0" smtClean="0"/>
+              <a:t>，在公司有一定的</a:t>
+            </a:r>
+            <a:r>
+              <a:rPr kumimoji="1" lang="en-US" altLang="zh-CN" sz="1400" dirty="0" smtClean="0"/>
+              <a:t>track record</a:t>
+            </a:r>
+            <a:r>
+              <a:rPr kumimoji="1" lang="zh-CN" altLang="en-US" sz="1400" dirty="0" smtClean="0"/>
+              <a:t>之后，可以参加这一轮并用筹到的钱来</a:t>
+            </a:r>
+            <a:r>
+              <a:rPr kumimoji="1" lang="en-US" altLang="zh-CN" sz="1400" dirty="0" smtClean="0"/>
+              <a:t>optimize</a:t>
+            </a:r>
+            <a:r>
+              <a:rPr kumimoji="1" lang="zh-CN" altLang="en-US" sz="1400" dirty="0" smtClean="0"/>
+              <a:t> </a:t>
+            </a:r>
+            <a:r>
+              <a:rPr kumimoji="1" lang="en-US" altLang="zh-CN" sz="1400" dirty="0" smtClean="0"/>
+              <a:t>product and user base</a:t>
+            </a:r>
+            <a:r>
+              <a:rPr kumimoji="1" lang="zh-CN" altLang="en-US" sz="1400" dirty="0" smtClean="0"/>
+              <a:t>；对公司而言，一定要有</a:t>
+            </a:r>
+            <a:r>
+              <a:rPr kumimoji="1" lang="en-US" altLang="zh-CN" sz="1400" b="1" dirty="0" smtClean="0"/>
+              <a:t>business model</a:t>
+            </a:r>
+            <a:r>
+              <a:rPr kumimoji="1" lang="en-US" altLang="zh-CN" sz="1400" dirty="0" smtClean="0"/>
+              <a:t> (for long-term profit)</a:t>
+            </a:r>
+          </a:p>
+          <a:p>
+            <a:pPr marL="742950" lvl="1" indent="-285750">
+              <a:buFont typeface="Arial" panose="020B0604020202020204" pitchFamily="34" charset="0"/>
+              <a:buChar char="•"/>
+            </a:pPr>
+            <a:r>
+              <a:rPr lang="zh-CN" altLang="en-US" sz="1400" dirty="0"/>
+              <a:t>这一轮</a:t>
+            </a:r>
+            <a:r>
+              <a:rPr lang="zh-CN" altLang="en-US" sz="1400" dirty="0" smtClean="0"/>
+              <a:t>的</a:t>
+            </a:r>
+            <a:r>
+              <a:rPr lang="en-US" altLang="zh-CN" sz="1400" dirty="0" smtClean="0"/>
+              <a:t>investors</a:t>
+            </a:r>
+            <a:r>
+              <a:rPr lang="zh-CN" altLang="en-US" sz="1400" dirty="0" smtClean="0"/>
+              <a:t>一般是</a:t>
+            </a:r>
+            <a:r>
+              <a:rPr lang="en-US" altLang="zh-CN" sz="1400" dirty="0" smtClean="0"/>
+              <a:t>traditional venture capital firms (e.g., Sequoia, Benchmark, </a:t>
+            </a:r>
+            <a:r>
+              <a:rPr lang="en-US" altLang="zh-CN" sz="1400" dirty="0" err="1" smtClean="0"/>
+              <a:t>Greylock</a:t>
+            </a:r>
+            <a:r>
+              <a:rPr lang="en-US" altLang="zh-CN" sz="1400" dirty="0" smtClean="0"/>
+              <a:t>, </a:t>
+            </a:r>
+            <a:r>
+              <a:rPr lang="en-US" altLang="zh-CN" sz="1400" dirty="0" err="1" smtClean="0"/>
+              <a:t>Accel</a:t>
+            </a:r>
+            <a:r>
+              <a:rPr lang="en-US" altLang="zh-CN" sz="1400" dirty="0" smtClean="0"/>
+              <a:t>, etc.)</a:t>
+            </a:r>
+            <a:endParaRPr kumimoji="1" lang="en-US" altLang="zh-CN" sz="1400" dirty="0" smtClean="0"/>
+          </a:p>
+          <a:p>
+            <a:pPr marL="742950" lvl="1" indent="-285750">
+              <a:buFont typeface="Arial" panose="020B0604020202020204" pitchFamily="34" charset="0"/>
+              <a:buChar char="•"/>
+            </a:pPr>
+            <a:r>
+              <a:rPr lang="zh-CN" altLang="en-US" sz="1400" dirty="0" smtClean="0"/>
+              <a:t>这一轮公司可能筹到的钱是</a:t>
+            </a:r>
+            <a:r>
+              <a:rPr lang="en-US" altLang="zh-CN" sz="1400" dirty="0" smtClean="0"/>
+              <a:t>200~1500</a:t>
+            </a:r>
+            <a:r>
+              <a:rPr lang="zh-CN" altLang="en-US" sz="1400" dirty="0" smtClean="0"/>
+              <a:t>万美元</a:t>
+            </a:r>
+            <a:endParaRPr lang="en-US" altLang="zh-CN" sz="1400" dirty="0" smtClean="0"/>
+          </a:p>
+          <a:p>
+            <a:pPr marL="285750" indent="-285750">
+              <a:buFont typeface="Arial" panose="020B0604020202020204" pitchFamily="34" charset="0"/>
+              <a:buChar char="•"/>
+            </a:pPr>
+            <a:r>
+              <a:rPr kumimoji="1" lang="en-US" altLang="ja-JP" sz="1400" b="1" dirty="0" smtClean="0">
+                <a:solidFill>
+                  <a:srgbClr val="FF0000"/>
+                </a:solidFill>
+              </a:rPr>
+              <a:t>B</a:t>
+            </a:r>
+            <a:r>
+              <a:rPr kumimoji="1" lang="zh-CN" altLang="en-US" sz="1400" b="1" dirty="0" smtClean="0">
+                <a:solidFill>
+                  <a:srgbClr val="FF0000"/>
+                </a:solidFill>
+              </a:rPr>
+              <a:t>轮</a:t>
+            </a:r>
+            <a:r>
+              <a:rPr kumimoji="1" lang="en-US" altLang="zh-CN" sz="1400" dirty="0" smtClean="0"/>
+              <a:t>(build)</a:t>
+            </a:r>
+            <a:r>
+              <a:rPr kumimoji="1" lang="zh-CN" altLang="en-US" sz="1400" dirty="0" smtClean="0"/>
+              <a:t>，</a:t>
+            </a:r>
+            <a:r>
+              <a:rPr lang="zh-CN" altLang="en-US" sz="1400" dirty="0" smtClean="0"/>
+              <a:t>公司可以用这一轮的钱来</a:t>
+            </a:r>
+            <a:r>
+              <a:rPr lang="en-US" altLang="zh-CN" sz="1400" dirty="0" smtClean="0"/>
+              <a:t>expand market reach (e.g., bulk up on business development, sales, advertising, tech, support, etc.)</a:t>
+            </a:r>
+            <a:r>
+              <a:rPr lang="zh-CN" altLang="en-US" sz="1400" dirty="0" smtClean="0"/>
+              <a:t>，经过前两轮，一个公司的</a:t>
+            </a:r>
+            <a:r>
+              <a:rPr lang="en-US" altLang="zh-CN" sz="1400" dirty="0" smtClean="0"/>
+              <a:t>value</a:t>
+            </a:r>
+            <a:r>
+              <a:rPr lang="zh-CN" altLang="en-US" sz="1400" dirty="0" smtClean="0"/>
+              <a:t>就更好评价了</a:t>
+            </a:r>
+            <a:endParaRPr lang="en-US" altLang="zh-CN" sz="1400" dirty="0" smtClean="0"/>
+          </a:p>
+          <a:p>
+            <a:pPr marL="742950" lvl="1" indent="-285750">
+              <a:buFont typeface="Arial" panose="020B0604020202020204" pitchFamily="34" charset="0"/>
+              <a:buChar char="•"/>
+            </a:pPr>
+            <a:r>
+              <a:rPr lang="zh-CN" altLang="en-US" sz="1400" dirty="0"/>
+              <a:t>这一轮</a:t>
+            </a:r>
+            <a:r>
+              <a:rPr lang="zh-CN" altLang="en-US" sz="1400" dirty="0" smtClean="0"/>
+              <a:t>的</a:t>
+            </a:r>
+            <a:r>
+              <a:rPr lang="en-US" altLang="zh-CN" sz="1400" dirty="0" smtClean="0"/>
+              <a:t>investors</a:t>
+            </a:r>
+            <a:r>
+              <a:rPr lang="zh-CN" altLang="en-US" sz="1400" dirty="0" smtClean="0"/>
+              <a:t>一般是和</a:t>
+            </a:r>
+            <a:r>
+              <a:rPr lang="en-US" altLang="zh-CN" sz="1400" dirty="0" smtClean="0"/>
+              <a:t>A</a:t>
+            </a:r>
+            <a:r>
+              <a:rPr lang="zh-CN" altLang="en-US" sz="1400" dirty="0" smtClean="0"/>
+              <a:t>轮相似</a:t>
+            </a:r>
+            <a:endParaRPr lang="en-US" altLang="zh-CN" sz="1400" dirty="0" smtClean="0"/>
+          </a:p>
+          <a:p>
+            <a:pPr marL="742950" lvl="1" indent="-285750">
+              <a:buFont typeface="Arial" panose="020B0604020202020204" pitchFamily="34" charset="0"/>
+              <a:buChar char="•"/>
+            </a:pPr>
+            <a:r>
+              <a:rPr lang="zh-CN" altLang="en-US" sz="1400" dirty="0" smtClean="0"/>
+              <a:t>这一轮公司能筹到的钱一般是</a:t>
+            </a:r>
+            <a:r>
+              <a:rPr lang="en-US" altLang="zh-CN" sz="1400" dirty="0" smtClean="0"/>
+              <a:t>700~1000</a:t>
+            </a:r>
+            <a:r>
+              <a:rPr lang="zh-CN" altLang="en-US" sz="1400" dirty="0" smtClean="0"/>
+              <a:t>万美元</a:t>
+            </a:r>
+            <a:endParaRPr lang="en-US" altLang="zh-CN" sz="1400" dirty="0" smtClean="0"/>
+          </a:p>
+          <a:p>
+            <a:pPr marL="285750" indent="-285750">
+              <a:buFont typeface="Arial" panose="020B0604020202020204" pitchFamily="34" charset="0"/>
+              <a:buChar char="•"/>
+            </a:pPr>
+            <a:r>
+              <a:rPr lang="en-US" altLang="zh-CN" sz="1400" b="1" dirty="0" smtClean="0">
+                <a:solidFill>
+                  <a:srgbClr val="FF0000"/>
+                </a:solidFill>
+              </a:rPr>
+              <a:t>C</a:t>
+            </a:r>
+            <a:r>
+              <a:rPr lang="zh-CN" altLang="en-US" sz="1400" b="1" dirty="0" smtClean="0">
+                <a:solidFill>
+                  <a:srgbClr val="FF0000"/>
+                </a:solidFill>
+              </a:rPr>
+              <a:t>轮</a:t>
+            </a:r>
+            <a:r>
+              <a:rPr lang="en-US" altLang="zh-CN" sz="1400" dirty="0" smtClean="0"/>
+              <a:t>(scale), successful</a:t>
+            </a:r>
+            <a:r>
+              <a:rPr lang="zh-CN" altLang="en-US" sz="1400" dirty="0" smtClean="0"/>
+              <a:t>的公司可以得到</a:t>
+            </a:r>
+            <a:r>
+              <a:rPr lang="en-US" altLang="zh-CN" sz="1400" dirty="0" smtClean="0"/>
+              <a:t>investor</a:t>
+            </a:r>
+            <a:r>
+              <a:rPr lang="zh-CN" altLang="en-US" sz="1400" dirty="0" smtClean="0"/>
+              <a:t>的青睐，这些成功的公司可以筹钱来</a:t>
+            </a:r>
+            <a:r>
+              <a:rPr lang="en-US" altLang="zh-CN" sz="1400" dirty="0" smtClean="0"/>
+              <a:t>perfect</a:t>
+            </a:r>
+            <a:r>
+              <a:rPr lang="zh-CN" altLang="en-US" sz="1400" dirty="0" smtClean="0"/>
+              <a:t>产品和扩张，或者用来买其他</a:t>
+            </a:r>
+            <a:r>
+              <a:rPr lang="en-US" altLang="zh-CN" sz="1400" dirty="0" smtClean="0"/>
+              <a:t>competitor</a:t>
+            </a:r>
+          </a:p>
+          <a:p>
+            <a:pPr marL="742950" lvl="1" indent="-285750">
+              <a:buFont typeface="Arial" panose="020B0604020202020204" pitchFamily="34" charset="0"/>
+              <a:buChar char="•"/>
+            </a:pPr>
+            <a:r>
+              <a:rPr lang="zh-CN" altLang="en-US" sz="1400" dirty="0" smtClean="0"/>
+              <a:t>这一轮的</a:t>
+            </a:r>
+            <a:r>
+              <a:rPr lang="en-US" altLang="zh-CN" sz="1400" dirty="0" smtClean="0"/>
+              <a:t>investors</a:t>
+            </a:r>
+            <a:r>
+              <a:rPr lang="zh-CN" altLang="en-US" sz="1400" dirty="0" smtClean="0"/>
+              <a:t>有很多，</a:t>
+            </a:r>
+            <a:r>
+              <a:rPr lang="en-US" altLang="zh-CN" sz="1400" dirty="0" smtClean="0"/>
+              <a:t>hedge funds, investment banks private equity firms, etc. </a:t>
+            </a:r>
+            <a:r>
+              <a:rPr lang="zh-CN" altLang="en-US" sz="1400" dirty="0" smtClean="0"/>
+              <a:t>因为公司已经</a:t>
+            </a:r>
+            <a:r>
+              <a:rPr lang="en-US" altLang="zh-CN" sz="1400" dirty="0" smtClean="0"/>
+              <a:t>less risky</a:t>
+            </a:r>
+            <a:r>
+              <a:rPr lang="zh-CN" altLang="en-US" sz="1400" dirty="0" smtClean="0"/>
+              <a:t>了</a:t>
+            </a:r>
+            <a:endParaRPr lang="en-US" altLang="zh-CN" sz="1400" dirty="0" smtClean="0"/>
+          </a:p>
+          <a:p>
+            <a:pPr marL="742950" lvl="1" indent="-285750">
+              <a:buFont typeface="Arial" panose="020B0604020202020204" pitchFamily="34" charset="0"/>
+              <a:buChar char="•"/>
+            </a:pPr>
+            <a:r>
+              <a:rPr lang="zh-CN" altLang="en-US" sz="1400" dirty="0" smtClean="0"/>
+              <a:t>这一轮公司可能筹到的钱也说不定，从几百万到几亿美元</a:t>
+            </a:r>
+            <a:endParaRPr lang="en-US" altLang="zh-CN" sz="1400" dirty="0" smtClean="0"/>
+          </a:p>
+          <a:p>
+            <a:pPr marL="742950" lvl="1" indent="-285750">
+              <a:buFont typeface="Arial" panose="020B0604020202020204" pitchFamily="34" charset="0"/>
+              <a:buChar char="•"/>
+            </a:pPr>
+            <a:endParaRPr lang="en-US" altLang="zh-CN" sz="1400" dirty="0" smtClean="0"/>
+          </a:p>
+        </p:txBody>
+      </p:sp>
+    </p:spTree>
+    <p:extLst>
+      <p:ext uri="{BB962C8B-B14F-4D97-AF65-F5344CB8AC3E}">
+        <p14:creationId xmlns:p14="http://schemas.microsoft.com/office/powerpoint/2010/main" val="1286384471"/>
+      </p:ext>
+    </p:extLst>
+  </p:cSld>
+  <p:clrMapOvr>
+    <a:masterClrMapping/>
+  </p:clrMapOvr>
+</p:sld>
+</file>
+
 <file path=ppt/slides/slide2.xml><?xml version="1.0" encoding="utf-8"?>
 <p:sld xmlns:a="http://schemas.openxmlformats.org/drawingml/2006/main" xmlns:r="http://schemas.openxmlformats.org/officeDocument/2006/relationships" xmlns:p="http://schemas.openxmlformats.org/presentationml/2006/main">
   <p:cSld>
@@ -8344,7 +9055,7 @@
           <p:cNvPr id="2" name="TextBox 1">
             <a:extLst>
               <a:ext uri="{FF2B5EF4-FFF2-40B4-BE49-F238E27FC236}">
-                <a16:creationId xmlns:a16="http://schemas.microsoft.com/office/drawing/2014/main" xmlns="" id="{7089F4EE-31CC-4C8C-99D2-9CC3B35FDCAC}"/>
+                <a16:creationId xmlns="" xmlns:a16="http://schemas.microsoft.com/office/drawing/2014/main" id="{7089F4EE-31CC-4C8C-99D2-9CC3B35FDCAC}"/>
               </a:ext>
             </a:extLst>
           </p:cNvPr>
@@ -8502,7 +9213,7 @@
           <p:cNvPr id="3" name="TextBox 2">
             <a:extLst>
               <a:ext uri="{FF2B5EF4-FFF2-40B4-BE49-F238E27FC236}">
-                <a16:creationId xmlns:a16="http://schemas.microsoft.com/office/drawing/2014/main" xmlns="" id="{DB438EAF-213C-40F1-8DF0-CF7CBF419389}"/>
+                <a16:creationId xmlns="" xmlns:a16="http://schemas.microsoft.com/office/drawing/2014/main" id="{DB438EAF-213C-40F1-8DF0-CF7CBF419389}"/>
               </a:ext>
             </a:extLst>
           </p:cNvPr>
@@ -8692,7 +9403,7 @@
           <p:cNvPr id="4" name="TextBox 3">
             <a:extLst>
               <a:ext uri="{FF2B5EF4-FFF2-40B4-BE49-F238E27FC236}">
-                <a16:creationId xmlns:a16="http://schemas.microsoft.com/office/drawing/2014/main" xmlns="" id="{A645619F-2394-4D3E-89BC-966F9EC14737}"/>
+                <a16:creationId xmlns="" xmlns:a16="http://schemas.microsoft.com/office/drawing/2014/main" id="{A645619F-2394-4D3E-89BC-966F9EC14737}"/>
               </a:ext>
             </a:extLst>
           </p:cNvPr>
@@ -10143,7 +10854,7 @@
           <p:cNvPr id="2" name="TextBox 1">
             <a:extLst>
               <a:ext uri="{FF2B5EF4-FFF2-40B4-BE49-F238E27FC236}">
-                <a16:creationId xmlns:a16="http://schemas.microsoft.com/office/drawing/2014/main" xmlns="" id="{4A5C2DDE-5199-4DBB-ACD3-E82644E46320}"/>
+                <a16:creationId xmlns="" xmlns:a16="http://schemas.microsoft.com/office/drawing/2014/main" id="{4A5C2DDE-5199-4DBB-ACD3-E82644E46320}"/>
               </a:ext>
             </a:extLst>
           </p:cNvPr>

</xml_diff>